<commit_message>
Corrected misplaced GPIO pins
</commit_message>
<xml_diff>
--- a/CMSIS/Documentation/Doxygen/Driver/src/images/driver.pptx
+++ b/CMSIS/Documentation/Doxygen/Driver/src/images/driver.pptx
@@ -122,7 +122,7 @@
             <a:srgbClr val="A4A3A4"/>
           </p15:clr>
         </p15:guide>
-        <p15:guide id="3" orient="horz" pos="1999">
+        <p15:guide id="3" orient="horz" pos="2024" userDrawn="1">
           <p15:clr>
             <a:srgbClr val="A4A3A4"/>
           </p15:clr>
@@ -259,7 +259,7 @@
             <a:fld id="{E72D30EF-8F20-0B47-8B5D-39A8BC29E860}" type="datetimeFigureOut">
               <a:rPr lang="en-US" smtClean="0"/>
               <a:pPr/>
-              <a:t>7/10/23</a:t>
+              <a:t>6/5/24</a:t>
             </a:fld>
             <a:endParaRPr lang="en-US"/>
           </a:p>
@@ -427,7 +427,7 @@
             <a:fld id="{77EDD36E-1E02-F241-9611-1F1D9EAAD326}" type="datetimeFigureOut">
               <a:rPr lang="en-US" smtClean="0"/>
               <a:pPr/>
-              <a:t>7/10/23</a:t>
+              <a:t>6/5/24</a:t>
             </a:fld>
             <a:endParaRPr lang="en-US"/>
           </a:p>
@@ -25143,10 +25143,10 @@
       </p:grpSpPr>
       <p:sp>
         <p:nvSpPr>
-          <p:cNvPr id="148" name="Rectangle 147">
+          <p:cNvPr id="110" name="Rectangle 109">
             <a:extLst>
               <a:ext uri="{FF2B5EF4-FFF2-40B4-BE49-F238E27FC236}">
-                <a16:creationId xmlns:a16="http://schemas.microsoft.com/office/drawing/2014/main" id="{EF1A8983-451E-4FCB-9C4B-B85D81DC79EB}"/>
+                <a16:creationId xmlns:a16="http://schemas.microsoft.com/office/drawing/2014/main" id="{B6F311E0-662C-EF4E-1FDC-5E70E9127FC3}"/>
               </a:ext>
             </a:extLst>
           </p:cNvPr>
@@ -25155,51 +25155,68 @@
         </p:nvSpPr>
         <p:spPr>
           <a:xfrm>
-            <a:off x="697831" y="975769"/>
+            <a:off x="2646344" y="3429000"/>
             <a:ext cx="7003995" cy="2531062"/>
           </a:xfrm>
           <a:prstGeom prst="rect">
             <a:avLst/>
           </a:prstGeom>
           <a:solidFill>
-            <a:schemeClr val="bg1"/>
+            <a:srgbClr val="FFFFFF"/>
           </a:solidFill>
-          <a:ln>
+          <a:ln w="6350" cap="flat" cmpd="sng" algn="ctr">
             <a:solidFill>
-              <a:schemeClr val="accent1"/>
+              <a:srgbClr val="0091BD"/>
             </a:solidFill>
+            <a:prstDash val="solid"/>
+            <a:miter lim="800000"/>
           </a:ln>
           <a:effectLst/>
         </p:spPr>
-        <p:style>
-          <a:lnRef idx="1">
-            <a:schemeClr val="accent1"/>
-          </a:lnRef>
-          <a:fillRef idx="3">
-            <a:schemeClr val="accent1"/>
-          </a:fillRef>
-          <a:effectRef idx="2">
-            <a:schemeClr val="accent1"/>
-          </a:effectRef>
-          <a:fontRef idx="minor">
-            <a:schemeClr val="lt1"/>
-          </a:fontRef>
-        </p:style>
         <p:txBody>
           <a:bodyPr rtlCol="0" anchor="ctr"/>
           <a:lstStyle/>
           <a:p>
-            <a:pPr algn="ctr"/>
-            <a:endParaRPr lang="en-US"/>
-          </a:p>
-        </p:txBody>
-      </p:sp>
-      <p:sp>
-        <p:nvSpPr>
-          <p:cNvPr id="4" name="Rounded Rectangle 3">
+            <a:pPr marL="0" marR="0" lvl="0" indent="0" algn="ctr" defTabSz="914400" eaLnBrk="0" fontAlgn="base" latinLnBrk="0" hangingPunct="0">
+              <a:lnSpc>
+                <a:spcPct val="100000"/>
+              </a:lnSpc>
+              <a:spcBef>
+                <a:spcPct val="0"/>
+              </a:spcBef>
+              <a:spcAft>
+                <a:spcPct val="0"/>
+              </a:spcAft>
+              <a:buClrTx/>
+              <a:buSzTx/>
+              <a:buFontTx/>
+              <a:buNone/>
+              <a:tabLst/>
+              <a:defRPr/>
+            </a:pPr>
+            <a:endParaRPr kumimoji="0" lang="en-US" sz="1800" b="0" i="0" u="none" strike="noStrike" kern="0" cap="none" spc="0" normalizeH="0" baseline="0" noProof="0">
+              <a:ln>
+                <a:noFill/>
+              </a:ln>
+              <a:solidFill>
+                <a:srgbClr val="FFFFFF"/>
+              </a:solidFill>
+              <a:effectLst/>
+              <a:uLnTx/>
+              <a:uFillTx/>
+              <a:latin typeface="Calibri"/>
+              <a:ea typeface="+mn-ea"/>
+              <a:cs typeface="+mn-cs"/>
+            </a:endParaRPr>
+          </a:p>
+        </p:txBody>
+      </p:sp>
+      <p:sp>
+        <p:nvSpPr>
+          <p:cNvPr id="111" name="Rounded Rectangle 110">
             <a:extLst>
               <a:ext uri="{FF2B5EF4-FFF2-40B4-BE49-F238E27FC236}">
-                <a16:creationId xmlns:a16="http://schemas.microsoft.com/office/drawing/2014/main" id="{42611988-3B36-ED23-74C7-CD79BEE958BA}"/>
+                <a16:creationId xmlns:a16="http://schemas.microsoft.com/office/drawing/2014/main" id="{2F2C0646-91D9-59D1-9704-23265AC34BCA}"/>
               </a:ext>
             </a:extLst>
           </p:cNvPr>
@@ -25208,7 +25225,7 @@
         </p:nvSpPr>
         <p:spPr bwMode="auto">
           <a:xfrm>
-            <a:off x="6218261" y="1429256"/>
+            <a:off x="8166773" y="3882487"/>
             <a:ext cx="684000" cy="288000"/>
           </a:xfrm>
           <a:prstGeom prst="roundRect">
@@ -25230,22 +25247,36 @@
           <a:bodyPr wrap="none" lIns="121944" tIns="60972" rIns="121944" bIns="60972" anchor="ctr"/>
           <a:lstStyle/>
           <a:p>
-            <a:pPr algn="ctr" fontAlgn="auto">
+            <a:pPr marL="0" marR="0" lvl="0" indent="0" algn="ctr" defTabSz="914400" eaLnBrk="0" fontAlgn="auto" latinLnBrk="0" hangingPunct="0">
+              <a:lnSpc>
+                <a:spcPct val="100000"/>
+              </a:lnSpc>
               <a:spcBef>
                 <a:spcPts val="0"/>
               </a:spcBef>
               <a:spcAft>
                 <a:spcPts val="0"/>
               </a:spcAft>
+              <a:buClrTx/>
+              <a:buSzTx/>
+              <a:buFontTx/>
+              <a:buNone/>
+              <a:tabLst/>
               <a:defRPr/>
             </a:pPr>
             <a:r>
-              <a:rPr lang="en-US" sz="1400" b="1" kern="0">
+              <a:rPr kumimoji="0" lang="en-US" sz="1400" b="1" i="0" u="none" strike="noStrike" kern="0" cap="none" spc="0" normalizeH="0" baseline="0" noProof="0">
+                <a:ln>
+                  <a:noFill/>
+                </a:ln>
                 <a:solidFill>
                   <a:sysClr val="window" lastClr="FFFFFF"/>
                 </a:solidFill>
+                <a:effectLst/>
+                <a:uLnTx/>
+                <a:uFillTx/>
                 <a:latin typeface="Calibri" panose="020F0502020204030204" pitchFamily="34" charset="0"/>
-                <a:ea typeface="ＭＳ Ｐゴシック" pitchFamily="34" charset="-128"/>
+                <a:ea typeface="ＭＳ Ｐゴシック" panose="020B0600070205080204" pitchFamily="34" charset="-128"/>
                 <a:cs typeface="Calibri" panose="020F0502020204030204" pitchFamily="34" charset="0"/>
               </a:rPr>
               <a:t>Graphics</a:t>
@@ -25255,10 +25286,10 @@
       </p:sp>
       <p:sp>
         <p:nvSpPr>
-          <p:cNvPr id="5" name="Rounded Rectangle 4">
+          <p:cNvPr id="112" name="Rounded Rectangle 111">
             <a:extLst>
               <a:ext uri="{FF2B5EF4-FFF2-40B4-BE49-F238E27FC236}">
-                <a16:creationId xmlns:a16="http://schemas.microsoft.com/office/drawing/2014/main" id="{41560457-1854-5E21-74A3-C5BF6C4AA3FB}"/>
+                <a16:creationId xmlns:a16="http://schemas.microsoft.com/office/drawing/2014/main" id="{750D1426-772B-C70B-3E82-E2EE974EEA1E}"/>
               </a:ext>
             </a:extLst>
           </p:cNvPr>
@@ -25267,7 +25298,7 @@
         </p:nvSpPr>
         <p:spPr bwMode="auto">
           <a:xfrm>
-            <a:off x="2421751" y="1429256"/>
+            <a:off x="4370263" y="3882487"/>
             <a:ext cx="900000" cy="288000"/>
           </a:xfrm>
           <a:prstGeom prst="roundRect">
@@ -25289,22 +25320,36 @@
           <a:bodyPr wrap="none" lIns="121944" tIns="60972" rIns="121944" bIns="60972" anchor="ctr"/>
           <a:lstStyle/>
           <a:p>
-            <a:pPr algn="ctr" fontAlgn="auto">
+            <a:pPr marL="0" marR="0" lvl="0" indent="0" algn="ctr" defTabSz="914400" eaLnBrk="0" fontAlgn="auto" latinLnBrk="0" hangingPunct="0">
+              <a:lnSpc>
+                <a:spcPct val="100000"/>
+              </a:lnSpc>
               <a:spcBef>
                 <a:spcPts val="0"/>
               </a:spcBef>
               <a:spcAft>
                 <a:spcPts val="0"/>
               </a:spcAft>
+              <a:buClrTx/>
+              <a:buSzTx/>
+              <a:buFontTx/>
+              <a:buNone/>
+              <a:tabLst/>
               <a:defRPr/>
             </a:pPr>
             <a:r>
-              <a:rPr lang="en-US" sz="1400" b="1" kern="0">
+              <a:rPr kumimoji="0" lang="en-US" sz="1400" b="1" i="0" u="none" strike="noStrike" kern="0" cap="none" spc="0" normalizeH="0" baseline="0" noProof="0">
+                <a:ln>
+                  <a:noFill/>
+                </a:ln>
                 <a:solidFill>
                   <a:sysClr val="window" lastClr="FFFFFF"/>
                 </a:solidFill>
+                <a:effectLst/>
+                <a:uLnTx/>
+                <a:uFillTx/>
                 <a:latin typeface="Calibri" panose="020F0502020204030204" pitchFamily="34" charset="0"/>
-                <a:ea typeface="ＭＳ Ｐゴシック" pitchFamily="34" charset="-128"/>
+                <a:ea typeface="ＭＳ Ｐゴシック" panose="020B0600070205080204" pitchFamily="34" charset="-128"/>
                 <a:cs typeface="Calibri" panose="020F0502020204030204" pitchFamily="34" charset="0"/>
               </a:rPr>
               <a:t>USB Device</a:t>
@@ -25314,10 +25359,10 @@
       </p:sp>
       <p:sp>
         <p:nvSpPr>
-          <p:cNvPr id="6" name="Rounded Rectangle 5">
+          <p:cNvPr id="113" name="Rounded Rectangle 112">
             <a:extLst>
               <a:ext uri="{FF2B5EF4-FFF2-40B4-BE49-F238E27FC236}">
-                <a16:creationId xmlns:a16="http://schemas.microsoft.com/office/drawing/2014/main" id="{A685A6A0-21B1-2A4B-BE7C-547C84A7B76B}"/>
+                <a16:creationId xmlns:a16="http://schemas.microsoft.com/office/drawing/2014/main" id="{6FDF485B-36A8-40C4-9791-B05182FACA1A}"/>
               </a:ext>
             </a:extLst>
           </p:cNvPr>
@@ -25326,7 +25371,7 @@
         </p:nvSpPr>
         <p:spPr bwMode="auto">
           <a:xfrm>
-            <a:off x="5296068" y="1429256"/>
+            <a:off x="7244580" y="3882487"/>
             <a:ext cx="864000" cy="288000"/>
           </a:xfrm>
           <a:prstGeom prst="roundRect">
@@ -25350,20 +25395,34 @@
           <a:bodyPr wrap="none" lIns="0" tIns="60972" rIns="0" bIns="60972" anchor="ctr"/>
           <a:lstStyle/>
           <a:p>
-            <a:pPr algn="ctr" fontAlgn="auto">
+            <a:pPr marL="0" marR="0" lvl="0" indent="0" algn="ctr" defTabSz="914400" eaLnBrk="0" fontAlgn="auto" latinLnBrk="0" hangingPunct="0">
+              <a:lnSpc>
+                <a:spcPct val="100000"/>
+              </a:lnSpc>
               <a:spcBef>
                 <a:spcPts val="0"/>
               </a:spcBef>
               <a:spcAft>
                 <a:spcPts val="0"/>
               </a:spcAft>
+              <a:buClrTx/>
+              <a:buSzTx/>
+              <a:buFontTx/>
+              <a:buNone/>
+              <a:tabLst/>
               <a:defRPr/>
             </a:pPr>
             <a:r>
-              <a:rPr lang="en-US" sz="1400" b="1" kern="0">
+              <a:rPr kumimoji="0" lang="en-US" sz="1400" b="1" i="0" u="none" strike="noStrike" kern="0" cap="none" spc="0" normalizeH="0" baseline="0" noProof="0">
+                <a:ln>
+                  <a:noFill/>
+                </a:ln>
                 <a:solidFill>
                   <a:srgbClr val="FDFDFD"/>
                 </a:solidFill>
+                <a:effectLst/>
+                <a:uLnTx/>
+                <a:uFillTx/>
                 <a:latin typeface="Calibri" panose="020F0502020204030204" pitchFamily="34" charset="0"/>
                 <a:ea typeface="MS PGothic" pitchFamily="34" charset="-128"/>
                 <a:cs typeface="Calibri" panose="020F0502020204030204" pitchFamily="34" charset="0"/>
@@ -25375,10 +25434,10 @@
       </p:sp>
       <p:sp>
         <p:nvSpPr>
-          <p:cNvPr id="7" name="Rounded Rectangle 6">
+          <p:cNvPr id="114" name="Rounded Rectangle 113">
             <a:extLst>
               <a:ext uri="{FF2B5EF4-FFF2-40B4-BE49-F238E27FC236}">
-                <a16:creationId xmlns:a16="http://schemas.microsoft.com/office/drawing/2014/main" id="{0790D936-5EDB-0A14-98C4-60665492C181}"/>
+                <a16:creationId xmlns:a16="http://schemas.microsoft.com/office/drawing/2014/main" id="{AD3CBD01-8C59-0C53-3540-27A0C61163D9}"/>
               </a:ext>
             </a:extLst>
           </p:cNvPr>
@@ -25387,7 +25446,7 @@
         </p:nvSpPr>
         <p:spPr bwMode="auto">
           <a:xfrm>
-            <a:off x="3397061" y="1429256"/>
+            <a:off x="5345573" y="3882487"/>
             <a:ext cx="1844092" cy="288000"/>
           </a:xfrm>
           <a:prstGeom prst="roundRect">
@@ -25409,22 +25468,36 @@
           <a:bodyPr wrap="none" lIns="121944" tIns="60972" rIns="121944" bIns="60972" anchor="ctr"/>
           <a:lstStyle/>
           <a:p>
-            <a:pPr algn="ctr" fontAlgn="auto">
+            <a:pPr marL="0" marR="0" lvl="0" indent="0" algn="ctr" defTabSz="914400" eaLnBrk="0" fontAlgn="auto" latinLnBrk="0" hangingPunct="0">
+              <a:lnSpc>
+                <a:spcPct val="100000"/>
+              </a:lnSpc>
               <a:spcBef>
                 <a:spcPts val="0"/>
               </a:spcBef>
               <a:spcAft>
                 <a:spcPts val="0"/>
               </a:spcAft>
+              <a:buClrTx/>
+              <a:buSzTx/>
+              <a:buFontTx/>
+              <a:buNone/>
+              <a:tabLst/>
               <a:defRPr/>
             </a:pPr>
             <a:r>
-              <a:rPr lang="en-US" sz="1400" b="1" kern="0">
+              <a:rPr kumimoji="0" lang="en-US" sz="1400" b="1" i="0" u="none" strike="noStrike" kern="0" cap="none" spc="0" normalizeH="0" baseline="0" noProof="0">
+                <a:ln>
+                  <a:noFill/>
+                </a:ln>
                 <a:solidFill>
                   <a:sysClr val="window" lastClr="FFFFFF"/>
                 </a:solidFill>
+                <a:effectLst/>
+                <a:uLnTx/>
+                <a:uFillTx/>
                 <a:latin typeface="Calibri" panose="020F0502020204030204" pitchFamily="34" charset="0"/>
-                <a:ea typeface="ＭＳ Ｐゴシック" pitchFamily="34" charset="-128"/>
+                <a:ea typeface="ＭＳ Ｐゴシック" panose="020B0600070205080204" pitchFamily="34" charset="-128"/>
                 <a:cs typeface="Calibri" panose="020F0502020204030204" pitchFamily="34" charset="0"/>
               </a:rPr>
               <a:t>Networking</a:t>
@@ -25434,10 +25507,10 @@
       </p:sp>
       <p:sp>
         <p:nvSpPr>
-          <p:cNvPr id="9" name="Rounded Rectangle 8">
+          <p:cNvPr id="115" name="Rounded Rectangle 114">
             <a:extLst>
               <a:ext uri="{FF2B5EF4-FFF2-40B4-BE49-F238E27FC236}">
-                <a16:creationId xmlns:a16="http://schemas.microsoft.com/office/drawing/2014/main" id="{8B463F3E-3724-5192-F2E8-861F5E155D81}"/>
+                <a16:creationId xmlns:a16="http://schemas.microsoft.com/office/drawing/2014/main" id="{2E388248-5924-5B37-D4AA-8F15B50C4EC7}"/>
               </a:ext>
             </a:extLst>
           </p:cNvPr>
@@ -25446,7 +25519,7 @@
         </p:nvSpPr>
         <p:spPr bwMode="auto">
           <a:xfrm>
-            <a:off x="1673170" y="1429256"/>
+            <a:off x="3621682" y="3882487"/>
             <a:ext cx="684000" cy="288000"/>
           </a:xfrm>
           <a:prstGeom prst="roundRect">
@@ -25468,22 +25541,36 @@
           <a:bodyPr wrap="none" lIns="121944" tIns="60972" rIns="121944" bIns="60972" anchor="ctr"/>
           <a:lstStyle/>
           <a:p>
-            <a:pPr algn="ctr" fontAlgn="auto">
+            <a:pPr marL="0" marR="0" lvl="0" indent="0" algn="ctr" defTabSz="914400" eaLnBrk="0" fontAlgn="auto" latinLnBrk="0" hangingPunct="0">
+              <a:lnSpc>
+                <a:spcPct val="100000"/>
+              </a:lnSpc>
               <a:spcBef>
                 <a:spcPts val="0"/>
               </a:spcBef>
               <a:spcAft>
                 <a:spcPts val="0"/>
               </a:spcAft>
+              <a:buClrTx/>
+              <a:buSzTx/>
+              <a:buFontTx/>
+              <a:buNone/>
+              <a:tabLst/>
               <a:defRPr/>
             </a:pPr>
             <a:r>
-              <a:rPr lang="en-US" sz="1400" b="1" kern="0">
+              <a:rPr kumimoji="0" lang="en-US" sz="1400" b="1" i="0" u="none" strike="noStrike" kern="0" cap="none" spc="0" normalizeH="0" baseline="0" noProof="0">
+                <a:ln>
+                  <a:noFill/>
+                </a:ln>
                 <a:solidFill>
                   <a:sysClr val="window" lastClr="FFFFFF"/>
                 </a:solidFill>
+                <a:effectLst/>
+                <a:uLnTx/>
+                <a:uFillTx/>
                 <a:latin typeface="Calibri" panose="020F0502020204030204" pitchFamily="34" charset="0"/>
-                <a:ea typeface="ＭＳ Ｐゴシック" pitchFamily="34" charset="-128"/>
+                <a:ea typeface="ＭＳ Ｐゴシック" panose="020B0600070205080204" pitchFamily="34" charset="-128"/>
                 <a:cs typeface="Calibri" panose="020F0502020204030204" pitchFamily="34" charset="0"/>
               </a:rPr>
               <a:t>Generic</a:t>
@@ -25493,10 +25580,10 @@
       </p:sp>
       <p:sp>
         <p:nvSpPr>
-          <p:cNvPr id="10" name="Rectangle 9">
+          <p:cNvPr id="120" name="Rectangle 119">
             <a:extLst>
               <a:ext uri="{FF2B5EF4-FFF2-40B4-BE49-F238E27FC236}">
-                <a16:creationId xmlns:a16="http://schemas.microsoft.com/office/drawing/2014/main" id="{41E64819-5585-43F5-BE77-30FEECF0CFCB}"/>
+                <a16:creationId xmlns:a16="http://schemas.microsoft.com/office/drawing/2014/main" id="{117FFCD4-DBB6-172C-D831-C5B5F304812B}"/>
               </a:ext>
             </a:extLst>
           </p:cNvPr>
@@ -25505,48 +25592,56 @@
         </p:nvSpPr>
         <p:spPr bwMode="auto">
           <a:xfrm>
-            <a:off x="6218261" y="1836620"/>
+            <a:off x="8166773" y="4289851"/>
             <a:ext cx="684000" cy="216000"/>
           </a:xfrm>
           <a:prstGeom prst="rect">
             <a:avLst/>
           </a:prstGeom>
           <a:noFill/>
-          <a:ln w="6350">
+          <a:ln w="6350" cap="flat" cmpd="sng" algn="ctr">
             <a:solidFill>
-              <a:schemeClr val="tx1"/>
+              <a:srgbClr val="000000"/>
             </a:solidFill>
-          </a:ln>
-        </p:spPr>
-        <p:style>
-          <a:lnRef idx="2">
-            <a:schemeClr val="accent1">
-              <a:shade val="50000"/>
-            </a:schemeClr>
-          </a:lnRef>
-          <a:fillRef idx="1">
-            <a:schemeClr val="accent1"/>
-          </a:fillRef>
-          <a:effectRef idx="0">
-            <a:schemeClr val="accent1"/>
-          </a:effectRef>
-          <a:fontRef idx="minor">
-            <a:schemeClr val="lt1"/>
-          </a:fontRef>
-        </p:style>
+            <a:prstDash val="solid"/>
+            <a:miter lim="800000"/>
+          </a:ln>
+          <a:effectLst/>
+        </p:spPr>
         <p:txBody>
           <a:bodyPr anchor="ctr"/>
           <a:lstStyle/>
           <a:p>
-            <a:pPr algn="ctr">
+            <a:pPr marL="0" marR="0" lvl="0" indent="0" algn="ctr" defTabSz="914400" eaLnBrk="0" fontAlgn="base" latinLnBrk="0" hangingPunct="0">
+              <a:lnSpc>
+                <a:spcPct val="100000"/>
+              </a:lnSpc>
+              <a:spcBef>
+                <a:spcPct val="0"/>
+              </a:spcBef>
+              <a:spcAft>
+                <a:spcPct val="0"/>
+              </a:spcAft>
+              <a:buClrTx/>
+              <a:buSzTx/>
+              <a:buFontTx/>
+              <a:buNone/>
+              <a:tabLst/>
               <a:defRPr/>
             </a:pPr>
             <a:r>
-              <a:rPr lang="en-US" sz="1100">
+              <a:rPr kumimoji="0" lang="en-US" sz="1100" b="0" i="0" u="none" strike="noStrike" kern="0" cap="none" spc="0" normalizeH="0" baseline="0" noProof="0">
+                <a:ln>
+                  <a:noFill/>
+                </a:ln>
                 <a:solidFill>
-                  <a:schemeClr val="tx1"/>
+                  <a:srgbClr val="000000"/>
                 </a:solidFill>
+                <a:effectLst/>
+                <a:uLnTx/>
+                <a:uFillTx/>
                 <a:latin typeface="Calibri" panose="020F0502020204030204" pitchFamily="34" charset="0"/>
+                <a:ea typeface="+mn-ea"/>
                 <a:cs typeface="Calibri" panose="020F0502020204030204" pitchFamily="34" charset="0"/>
               </a:rPr>
               <a:t>SPI0</a:t>
@@ -25556,10 +25651,10 @@
       </p:sp>
       <p:sp>
         <p:nvSpPr>
-          <p:cNvPr id="11" name="Rectangle 10">
+          <p:cNvPr id="121" name="Rectangle 120">
             <a:extLst>
               <a:ext uri="{FF2B5EF4-FFF2-40B4-BE49-F238E27FC236}">
-                <a16:creationId xmlns:a16="http://schemas.microsoft.com/office/drawing/2014/main" id="{0F27AE60-071B-007A-5058-46E39299D239}"/>
+                <a16:creationId xmlns:a16="http://schemas.microsoft.com/office/drawing/2014/main" id="{9B201D83-55F7-9B6A-3194-B76397D7E677}"/>
               </a:ext>
             </a:extLst>
           </p:cNvPr>
@@ -25568,48 +25663,56 @@
         </p:nvSpPr>
         <p:spPr bwMode="auto">
           <a:xfrm>
-            <a:off x="5296068" y="1836620"/>
+            <a:off x="7244580" y="4289851"/>
             <a:ext cx="864000" cy="216000"/>
           </a:xfrm>
           <a:prstGeom prst="rect">
             <a:avLst/>
           </a:prstGeom>
           <a:noFill/>
-          <a:ln w="6350">
+          <a:ln w="6350" cap="flat" cmpd="sng" algn="ctr">
             <a:solidFill>
-              <a:schemeClr val="tx1"/>
+              <a:srgbClr val="000000"/>
             </a:solidFill>
-          </a:ln>
-        </p:spPr>
-        <p:style>
-          <a:lnRef idx="2">
-            <a:schemeClr val="accent1">
-              <a:shade val="50000"/>
-            </a:schemeClr>
-          </a:lnRef>
-          <a:fillRef idx="1">
-            <a:schemeClr val="accent1"/>
-          </a:fillRef>
-          <a:effectRef idx="0">
-            <a:schemeClr val="accent1"/>
-          </a:effectRef>
-          <a:fontRef idx="minor">
-            <a:schemeClr val="lt1"/>
-          </a:fontRef>
-        </p:style>
+            <a:prstDash val="solid"/>
+            <a:miter lim="800000"/>
+          </a:ln>
+          <a:effectLst/>
+        </p:spPr>
         <p:txBody>
           <a:bodyPr anchor="ctr"/>
           <a:lstStyle/>
           <a:p>
-            <a:pPr algn="ctr">
+            <a:pPr marL="0" marR="0" lvl="0" indent="0" algn="ctr" defTabSz="914400" eaLnBrk="0" fontAlgn="base" latinLnBrk="0" hangingPunct="0">
+              <a:lnSpc>
+                <a:spcPct val="100000"/>
+              </a:lnSpc>
+              <a:spcBef>
+                <a:spcPct val="0"/>
+              </a:spcBef>
+              <a:spcAft>
+                <a:spcPct val="0"/>
+              </a:spcAft>
+              <a:buClrTx/>
+              <a:buSzTx/>
+              <a:buFontTx/>
+              <a:buNone/>
+              <a:tabLst/>
               <a:defRPr/>
             </a:pPr>
             <a:r>
-              <a:rPr lang="en-US" sz="1100">
+              <a:rPr kumimoji="0" lang="en-US" sz="1100" b="0" i="0" u="none" strike="noStrike" kern="0" cap="none" spc="0" normalizeH="0" baseline="0" noProof="0">
+                <a:ln>
+                  <a:noFill/>
+                </a:ln>
                 <a:solidFill>
-                  <a:schemeClr val="tx1"/>
+                  <a:srgbClr val="000000"/>
                 </a:solidFill>
+                <a:effectLst/>
+                <a:uLnTx/>
+                <a:uFillTx/>
                 <a:latin typeface="Calibri" panose="020F0502020204030204" pitchFamily="34" charset="0"/>
+                <a:ea typeface="+mn-ea"/>
                 <a:cs typeface="Calibri" panose="020F0502020204030204" pitchFamily="34" charset="0"/>
               </a:rPr>
               <a:t>MCI0</a:t>
@@ -25619,10 +25722,10 @@
       </p:sp>
       <p:sp>
         <p:nvSpPr>
-          <p:cNvPr id="13" name="Rectangle 12">
+          <p:cNvPr id="122" name="Rectangle 121">
             <a:extLst>
               <a:ext uri="{FF2B5EF4-FFF2-40B4-BE49-F238E27FC236}">
-                <a16:creationId xmlns:a16="http://schemas.microsoft.com/office/drawing/2014/main" id="{3A98AF13-41AB-0A47-445E-082AAA5A5B90}"/>
+                <a16:creationId xmlns:a16="http://schemas.microsoft.com/office/drawing/2014/main" id="{391FCF46-7614-7BDE-0184-72B8A95DAC02}"/>
               </a:ext>
             </a:extLst>
           </p:cNvPr>
@@ -25631,48 +25734,56 @@
         </p:nvSpPr>
         <p:spPr bwMode="auto">
           <a:xfrm>
-            <a:off x="2427188" y="1836620"/>
+            <a:off x="4375700" y="4289851"/>
             <a:ext cx="900000" cy="216000"/>
           </a:xfrm>
           <a:prstGeom prst="rect">
             <a:avLst/>
           </a:prstGeom>
           <a:noFill/>
-          <a:ln w="6350">
+          <a:ln w="6350" cap="flat" cmpd="sng" algn="ctr">
             <a:solidFill>
-              <a:schemeClr val="tx1"/>
+              <a:srgbClr val="000000"/>
             </a:solidFill>
-          </a:ln>
-        </p:spPr>
-        <p:style>
-          <a:lnRef idx="2">
-            <a:schemeClr val="accent1">
-              <a:shade val="50000"/>
-            </a:schemeClr>
-          </a:lnRef>
-          <a:fillRef idx="1">
-            <a:schemeClr val="accent1"/>
-          </a:fillRef>
-          <a:effectRef idx="0">
-            <a:schemeClr val="accent1"/>
-          </a:effectRef>
-          <a:fontRef idx="minor">
-            <a:schemeClr val="lt1"/>
-          </a:fontRef>
-        </p:style>
+            <a:prstDash val="solid"/>
+            <a:miter lim="800000"/>
+          </a:ln>
+          <a:effectLst/>
+        </p:spPr>
         <p:txBody>
           <a:bodyPr anchor="ctr"/>
           <a:lstStyle/>
           <a:p>
-            <a:pPr algn="ctr">
+            <a:pPr marL="0" marR="0" lvl="0" indent="0" algn="ctr" defTabSz="914400" eaLnBrk="0" fontAlgn="base" latinLnBrk="0" hangingPunct="0">
+              <a:lnSpc>
+                <a:spcPct val="100000"/>
+              </a:lnSpc>
+              <a:spcBef>
+                <a:spcPct val="0"/>
+              </a:spcBef>
+              <a:spcAft>
+                <a:spcPct val="0"/>
+              </a:spcAft>
+              <a:buClrTx/>
+              <a:buSzTx/>
+              <a:buFontTx/>
+              <a:buNone/>
+              <a:tabLst/>
               <a:defRPr/>
             </a:pPr>
             <a:r>
-              <a:rPr lang="en-US" sz="1100">
+              <a:rPr kumimoji="0" lang="en-US" sz="1100" b="0" i="0" u="none" strike="noStrike" kern="0" cap="none" spc="0" normalizeH="0" baseline="0" noProof="0">
+                <a:ln>
+                  <a:noFill/>
+                </a:ln>
                 <a:solidFill>
-                  <a:schemeClr val="tx1"/>
+                  <a:srgbClr val="000000"/>
                 </a:solidFill>
+                <a:effectLst/>
+                <a:uLnTx/>
+                <a:uFillTx/>
                 <a:latin typeface="Calibri" panose="020F0502020204030204" pitchFamily="34" charset="0"/>
+                <a:ea typeface="+mn-ea"/>
                 <a:cs typeface="Calibri" panose="020F0502020204030204" pitchFamily="34" charset="0"/>
               </a:rPr>
               <a:t>USBD0</a:t>
@@ -25682,10 +25793,10 @@
       </p:sp>
       <p:sp>
         <p:nvSpPr>
-          <p:cNvPr id="17" name="Rounded Rectangle 16">
+          <p:cNvPr id="123" name="Rounded Rectangle 122">
             <a:extLst>
               <a:ext uri="{FF2B5EF4-FFF2-40B4-BE49-F238E27FC236}">
-                <a16:creationId xmlns:a16="http://schemas.microsoft.com/office/drawing/2014/main" id="{124E1A72-1669-7DBD-EA23-0EB3287D7DD4}"/>
+                <a16:creationId xmlns:a16="http://schemas.microsoft.com/office/drawing/2014/main" id="{174A24DA-ABAD-DD03-F584-0E606E9B895E}"/>
               </a:ext>
             </a:extLst>
           </p:cNvPr>
@@ -25694,46 +25805,54 @@
         </p:nvSpPr>
         <p:spPr bwMode="auto">
           <a:xfrm>
-            <a:off x="593149" y="1836620"/>
-            <a:ext cx="1080000" cy="219686"/>
+            <a:off x="2646343" y="4289851"/>
+            <a:ext cx="975317" cy="219686"/>
           </a:xfrm>
           <a:prstGeom prst="roundRect">
             <a:avLst/>
           </a:prstGeom>
           <a:noFill/>
-          <a:ln w="12700">
+          <a:ln w="12700" cap="flat" cmpd="sng" algn="ctr">
             <a:noFill/>
-          </a:ln>
-        </p:spPr>
-        <p:style>
-          <a:lnRef idx="2">
-            <a:schemeClr val="accent1">
-              <a:shade val="50000"/>
-            </a:schemeClr>
-          </a:lnRef>
-          <a:fillRef idx="1">
-            <a:schemeClr val="accent1"/>
-          </a:fillRef>
-          <a:effectRef idx="0">
-            <a:schemeClr val="accent1"/>
-          </a:effectRef>
-          <a:fontRef idx="minor">
-            <a:schemeClr val="lt1"/>
-          </a:fontRef>
-        </p:style>
+            <a:prstDash val="solid"/>
+            <a:miter lim="800000"/>
+          </a:ln>
+          <a:effectLst/>
+        </p:spPr>
         <p:txBody>
           <a:bodyPr lIns="0" rIns="36000" anchor="ctr"/>
           <a:lstStyle/>
           <a:p>
-            <a:pPr algn="r">
+            <a:pPr marL="0" marR="0" lvl="0" indent="0" algn="r" defTabSz="914400" eaLnBrk="0" fontAlgn="base" latinLnBrk="0" hangingPunct="0">
+              <a:lnSpc>
+                <a:spcPct val="100000"/>
+              </a:lnSpc>
+              <a:spcBef>
+                <a:spcPct val="0"/>
+              </a:spcBef>
+              <a:spcAft>
+                <a:spcPct val="0"/>
+              </a:spcAft>
+              <a:buClrTx/>
+              <a:buSzTx/>
+              <a:buFontTx/>
+              <a:buNone/>
+              <a:tabLst/>
               <a:defRPr/>
             </a:pPr>
             <a:r>
-              <a:rPr lang="en-US" sz="1100">
+              <a:rPr kumimoji="0" lang="en-US" sz="1100" b="0" i="0" u="none" strike="noStrike" kern="0" cap="none" spc="0" normalizeH="0" baseline="0" noProof="0">
+                <a:ln>
+                  <a:noFill/>
+                </a:ln>
                 <a:solidFill>
-                  <a:schemeClr val="tx1"/>
+                  <a:srgbClr val="000000"/>
                 </a:solidFill>
+                <a:effectLst/>
+                <a:uLnTx/>
+                <a:uFillTx/>
                 <a:latin typeface="Calibri" panose="020F0502020204030204" pitchFamily="34" charset="0"/>
+                <a:ea typeface="+mn-ea"/>
                 <a:cs typeface="Calibri" panose="020F0502020204030204" pitchFamily="34" charset="0"/>
               </a:rPr>
               <a:t>Control Structs</a:t>
@@ -25743,10 +25862,10 @@
       </p:sp>
       <p:sp>
         <p:nvSpPr>
-          <p:cNvPr id="19" name="Rectangle 18">
+          <p:cNvPr id="132" name="Rectangle 131">
             <a:extLst>
               <a:ext uri="{FF2B5EF4-FFF2-40B4-BE49-F238E27FC236}">
-                <a16:creationId xmlns:a16="http://schemas.microsoft.com/office/drawing/2014/main" id="{BB7E5760-201A-C685-300F-69FD778AD4E4}"/>
+                <a16:creationId xmlns:a16="http://schemas.microsoft.com/office/drawing/2014/main" id="{32499253-184E-B162-CCC2-ABEAA434A124}"/>
               </a:ext>
             </a:extLst>
           </p:cNvPr>
@@ -25755,48 +25874,56 @@
         </p:nvSpPr>
         <p:spPr bwMode="auto">
           <a:xfrm>
-            <a:off x="6961310" y="1836620"/>
+            <a:off x="8909822" y="4289851"/>
             <a:ext cx="684000" cy="216000"/>
           </a:xfrm>
           <a:prstGeom prst="rect">
             <a:avLst/>
           </a:prstGeom>
           <a:noFill/>
-          <a:ln w="6350">
+          <a:ln w="6350" cap="flat" cmpd="sng" algn="ctr">
             <a:solidFill>
-              <a:schemeClr val="tx1"/>
+              <a:srgbClr val="000000"/>
             </a:solidFill>
-          </a:ln>
-        </p:spPr>
-        <p:style>
-          <a:lnRef idx="2">
-            <a:schemeClr val="accent1">
-              <a:shade val="50000"/>
-            </a:schemeClr>
-          </a:lnRef>
-          <a:fillRef idx="1">
-            <a:schemeClr val="accent1"/>
-          </a:fillRef>
-          <a:effectRef idx="0">
-            <a:schemeClr val="accent1"/>
-          </a:effectRef>
-          <a:fontRef idx="minor">
-            <a:schemeClr val="lt1"/>
-          </a:fontRef>
-        </p:style>
+            <a:prstDash val="solid"/>
+            <a:miter lim="800000"/>
+          </a:ln>
+          <a:effectLst/>
+        </p:spPr>
         <p:txBody>
           <a:bodyPr anchor="ctr"/>
           <a:lstStyle/>
           <a:p>
-            <a:pPr algn="ctr">
+            <a:pPr marL="0" marR="0" lvl="0" indent="0" algn="ctr" defTabSz="914400" eaLnBrk="0" fontAlgn="base" latinLnBrk="0" hangingPunct="0">
+              <a:lnSpc>
+                <a:spcPct val="100000"/>
+              </a:lnSpc>
+              <a:spcBef>
+                <a:spcPct val="0"/>
+              </a:spcBef>
+              <a:spcAft>
+                <a:spcPct val="0"/>
+              </a:spcAft>
+              <a:buClrTx/>
+              <a:buSzTx/>
+              <a:buFontTx/>
+              <a:buNone/>
+              <a:tabLst/>
               <a:defRPr/>
             </a:pPr>
             <a:r>
-              <a:rPr lang="en-US" sz="1100">
+              <a:rPr kumimoji="0" lang="en-US" sz="1100" b="0" i="0" u="none" strike="noStrike" kern="0" cap="none" spc="0" normalizeH="0" baseline="0" noProof="0">
+                <a:ln>
+                  <a:noFill/>
+                </a:ln>
                 <a:solidFill>
-                  <a:schemeClr val="tx1"/>
+                  <a:srgbClr val="000000"/>
                 </a:solidFill>
+                <a:effectLst/>
+                <a:uLnTx/>
+                <a:uFillTx/>
                 <a:latin typeface="Calibri" panose="020F0502020204030204" pitchFamily="34" charset="0"/>
+                <a:ea typeface="+mn-ea"/>
                 <a:cs typeface="Calibri" panose="020F0502020204030204" pitchFamily="34" charset="0"/>
               </a:rPr>
               <a:t>CAN0</a:t>
@@ -25806,10 +25933,10 @@
       </p:sp>
       <p:sp>
         <p:nvSpPr>
-          <p:cNvPr id="14" name="Rectangle 13">
+          <p:cNvPr id="136" name="Rectangle 135">
             <a:extLst>
               <a:ext uri="{FF2B5EF4-FFF2-40B4-BE49-F238E27FC236}">
-                <a16:creationId xmlns:a16="http://schemas.microsoft.com/office/drawing/2014/main" id="{64242524-24CF-DF65-519D-DA768C403A54}"/>
+                <a16:creationId xmlns:a16="http://schemas.microsoft.com/office/drawing/2014/main" id="{F8D1D9F6-D3E4-7610-02E4-3C37299F037B}"/>
               </a:ext>
             </a:extLst>
           </p:cNvPr>
@@ -25818,48 +25945,56 @@
         </p:nvSpPr>
         <p:spPr bwMode="auto">
           <a:xfrm>
-            <a:off x="3386237" y="1836620"/>
+            <a:off x="5334749" y="4289851"/>
             <a:ext cx="900000" cy="216000"/>
           </a:xfrm>
           <a:prstGeom prst="rect">
             <a:avLst/>
           </a:prstGeom>
           <a:noFill/>
-          <a:ln w="6350">
+          <a:ln w="6350" cap="flat" cmpd="sng" algn="ctr">
             <a:solidFill>
-              <a:schemeClr val="tx1"/>
+              <a:srgbClr val="000000"/>
             </a:solidFill>
-          </a:ln>
-        </p:spPr>
-        <p:style>
-          <a:lnRef idx="2">
-            <a:schemeClr val="accent1">
-              <a:shade val="50000"/>
-            </a:schemeClr>
-          </a:lnRef>
-          <a:fillRef idx="1">
-            <a:schemeClr val="accent1"/>
-          </a:fillRef>
-          <a:effectRef idx="0">
-            <a:schemeClr val="accent1"/>
-          </a:effectRef>
-          <a:fontRef idx="minor">
-            <a:schemeClr val="lt1"/>
-          </a:fontRef>
-        </p:style>
+            <a:prstDash val="solid"/>
+            <a:miter lim="800000"/>
+          </a:ln>
+          <a:effectLst/>
+        </p:spPr>
         <p:txBody>
           <a:bodyPr anchor="ctr"/>
           <a:lstStyle/>
           <a:p>
-            <a:pPr algn="ctr">
+            <a:pPr marL="0" marR="0" lvl="0" indent="0" algn="ctr" defTabSz="914400" eaLnBrk="0" fontAlgn="base" latinLnBrk="0" hangingPunct="0">
+              <a:lnSpc>
+                <a:spcPct val="100000"/>
+              </a:lnSpc>
+              <a:spcBef>
+                <a:spcPct val="0"/>
+              </a:spcBef>
+              <a:spcAft>
+                <a:spcPct val="0"/>
+              </a:spcAft>
+              <a:buClrTx/>
+              <a:buSzTx/>
+              <a:buFontTx/>
+              <a:buNone/>
+              <a:tabLst/>
               <a:defRPr/>
             </a:pPr>
             <a:r>
-              <a:rPr lang="en-US" sz="1100">
+              <a:rPr kumimoji="0" lang="en-US" sz="1100" b="0" i="0" u="none" strike="noStrike" kern="0" cap="none" spc="0" normalizeH="0" baseline="0" noProof="0">
+                <a:ln>
+                  <a:noFill/>
+                </a:ln>
                 <a:solidFill>
-                  <a:schemeClr val="tx1"/>
+                  <a:srgbClr val="000000"/>
                 </a:solidFill>
+                <a:effectLst/>
+                <a:uLnTx/>
+                <a:uFillTx/>
                 <a:latin typeface="Calibri" panose="020F0502020204030204" pitchFamily="34" charset="0"/>
+                <a:ea typeface="+mn-ea"/>
                 <a:cs typeface="Calibri" panose="020F0502020204030204" pitchFamily="34" charset="0"/>
               </a:rPr>
               <a:t>ETH_PHY0</a:t>
@@ -25869,10 +26004,10 @@
       </p:sp>
       <p:sp>
         <p:nvSpPr>
-          <p:cNvPr id="16" name="Rectangle 15">
+          <p:cNvPr id="137" name="Rectangle 136">
             <a:extLst>
               <a:ext uri="{FF2B5EF4-FFF2-40B4-BE49-F238E27FC236}">
-                <a16:creationId xmlns:a16="http://schemas.microsoft.com/office/drawing/2014/main" id="{C07C5AD1-F717-C30C-33AF-DC7E284815A6}"/>
+                <a16:creationId xmlns:a16="http://schemas.microsoft.com/office/drawing/2014/main" id="{C4925C99-41DF-CA69-48DA-2EA2C976F932}"/>
               </a:ext>
             </a:extLst>
           </p:cNvPr>
@@ -25881,48 +26016,56 @@
         </p:nvSpPr>
         <p:spPr bwMode="auto">
           <a:xfrm>
-            <a:off x="4341152" y="1836620"/>
+            <a:off x="6289664" y="4289851"/>
             <a:ext cx="900000" cy="216000"/>
           </a:xfrm>
           <a:prstGeom prst="rect">
             <a:avLst/>
           </a:prstGeom>
           <a:noFill/>
-          <a:ln w="6350">
+          <a:ln w="6350" cap="flat" cmpd="sng" algn="ctr">
             <a:solidFill>
-              <a:schemeClr val="tx1"/>
+              <a:srgbClr val="000000"/>
             </a:solidFill>
-          </a:ln>
-        </p:spPr>
-        <p:style>
-          <a:lnRef idx="2">
-            <a:schemeClr val="accent1">
-              <a:shade val="50000"/>
-            </a:schemeClr>
-          </a:lnRef>
-          <a:fillRef idx="1">
-            <a:schemeClr val="accent1"/>
-          </a:fillRef>
-          <a:effectRef idx="0">
-            <a:schemeClr val="accent1"/>
-          </a:effectRef>
-          <a:fontRef idx="minor">
-            <a:schemeClr val="lt1"/>
-          </a:fontRef>
-        </p:style>
+            <a:prstDash val="solid"/>
+            <a:miter lim="800000"/>
+          </a:ln>
+          <a:effectLst/>
+        </p:spPr>
         <p:txBody>
           <a:bodyPr anchor="ctr"/>
           <a:lstStyle/>
           <a:p>
-            <a:pPr algn="ctr">
+            <a:pPr marL="0" marR="0" lvl="0" indent="0" algn="ctr" defTabSz="914400" eaLnBrk="0" fontAlgn="base" latinLnBrk="0" hangingPunct="0">
+              <a:lnSpc>
+                <a:spcPct val="100000"/>
+              </a:lnSpc>
+              <a:spcBef>
+                <a:spcPct val="0"/>
+              </a:spcBef>
+              <a:spcAft>
+                <a:spcPct val="0"/>
+              </a:spcAft>
+              <a:buClrTx/>
+              <a:buSzTx/>
+              <a:buFontTx/>
+              <a:buNone/>
+              <a:tabLst/>
               <a:defRPr/>
             </a:pPr>
             <a:r>
-              <a:rPr lang="en-US" sz="1100">
+              <a:rPr kumimoji="0" lang="en-US" sz="1100" b="0" i="0" u="none" strike="noStrike" kern="0" cap="none" spc="0" normalizeH="0" baseline="0" noProof="0">
+                <a:ln>
+                  <a:noFill/>
+                </a:ln>
                 <a:solidFill>
-                  <a:schemeClr val="tx1"/>
+                  <a:srgbClr val="000000"/>
                 </a:solidFill>
+                <a:effectLst/>
+                <a:uLnTx/>
+                <a:uFillTx/>
                 <a:latin typeface="Calibri" panose="020F0502020204030204" pitchFamily="34" charset="0"/>
+                <a:ea typeface="+mn-ea"/>
                 <a:cs typeface="Calibri" panose="020F0502020204030204" pitchFamily="34" charset="0"/>
               </a:rPr>
               <a:t>ETH_MAC0</a:t>
@@ -25932,10 +26075,10 @@
       </p:sp>
       <p:sp>
         <p:nvSpPr>
-          <p:cNvPr id="22" name="Rectangle 21">
+          <p:cNvPr id="139" name="Rectangle 138">
             <a:extLst>
               <a:ext uri="{FF2B5EF4-FFF2-40B4-BE49-F238E27FC236}">
-                <a16:creationId xmlns:a16="http://schemas.microsoft.com/office/drawing/2014/main" id="{35EFC368-C610-0626-54A7-D1AF43BC25BC}"/>
+                <a16:creationId xmlns:a16="http://schemas.microsoft.com/office/drawing/2014/main" id="{BDD6F7D5-0998-BB97-15F3-39307DC10A69}"/>
               </a:ext>
             </a:extLst>
           </p:cNvPr>
@@ -25944,48 +26087,56 @@
         </p:nvSpPr>
         <p:spPr bwMode="auto">
           <a:xfrm>
-            <a:off x="1678607" y="1836620"/>
+            <a:off x="3627119" y="4289851"/>
             <a:ext cx="684000" cy="216000"/>
           </a:xfrm>
           <a:prstGeom prst="rect">
             <a:avLst/>
           </a:prstGeom>
           <a:noFill/>
-          <a:ln w="6350">
+          <a:ln w="6350" cap="flat" cmpd="sng" algn="ctr">
             <a:solidFill>
-              <a:schemeClr val="tx1"/>
+              <a:srgbClr val="000000"/>
             </a:solidFill>
-          </a:ln>
-        </p:spPr>
-        <p:style>
-          <a:lnRef idx="2">
-            <a:schemeClr val="accent1">
-              <a:shade val="50000"/>
-            </a:schemeClr>
-          </a:lnRef>
-          <a:fillRef idx="1">
-            <a:schemeClr val="accent1"/>
-          </a:fillRef>
-          <a:effectRef idx="0">
-            <a:schemeClr val="accent1"/>
-          </a:effectRef>
-          <a:fontRef idx="minor">
-            <a:schemeClr val="lt1"/>
-          </a:fontRef>
-        </p:style>
+            <a:prstDash val="solid"/>
+            <a:miter lim="800000"/>
+          </a:ln>
+          <a:effectLst/>
+        </p:spPr>
         <p:txBody>
           <a:bodyPr anchor="ctr"/>
           <a:lstStyle/>
           <a:p>
-            <a:pPr algn="ctr">
+            <a:pPr marL="0" marR="0" lvl="0" indent="0" algn="ctr" defTabSz="914400" eaLnBrk="0" fontAlgn="base" latinLnBrk="0" hangingPunct="0">
+              <a:lnSpc>
+                <a:spcPct val="100000"/>
+              </a:lnSpc>
+              <a:spcBef>
+                <a:spcPct val="0"/>
+              </a:spcBef>
+              <a:spcAft>
+                <a:spcPct val="0"/>
+              </a:spcAft>
+              <a:buClrTx/>
+              <a:buSzTx/>
+              <a:buFontTx/>
+              <a:buNone/>
+              <a:tabLst/>
               <a:defRPr/>
             </a:pPr>
             <a:r>
-              <a:rPr lang="en-US" sz="1100">
+              <a:rPr kumimoji="0" lang="en-US" sz="1100" b="0" i="0" u="none" strike="noStrike" kern="0" cap="none" spc="0" normalizeH="0" baseline="0" noProof="0">
+                <a:ln>
+                  <a:noFill/>
+                </a:ln>
                 <a:solidFill>
-                  <a:schemeClr val="tx1"/>
+                  <a:srgbClr val="000000"/>
                 </a:solidFill>
+                <a:effectLst/>
+                <a:uLnTx/>
+                <a:uFillTx/>
                 <a:latin typeface="Calibri" panose="020F0502020204030204" pitchFamily="34" charset="0"/>
+                <a:ea typeface="+mn-ea"/>
                 <a:cs typeface="Calibri" panose="020F0502020204030204" pitchFamily="34" charset="0"/>
               </a:rPr>
               <a:t>GPIO0</a:t>
@@ -25995,10 +26146,10 @@
       </p:sp>
       <p:sp>
         <p:nvSpPr>
-          <p:cNvPr id="23" name="Rounded Rectangle 22">
+          <p:cNvPr id="143" name="Rounded Rectangle 142">
             <a:extLst>
               <a:ext uri="{FF2B5EF4-FFF2-40B4-BE49-F238E27FC236}">
-                <a16:creationId xmlns:a16="http://schemas.microsoft.com/office/drawing/2014/main" id="{6FC437FC-9015-EBC6-FF24-C0B6CE178EB0}"/>
+                <a16:creationId xmlns:a16="http://schemas.microsoft.com/office/drawing/2014/main" id="{2C5A2E46-FD11-45C7-0352-2DA7B328855F}"/>
               </a:ext>
             </a:extLst>
           </p:cNvPr>
@@ -26007,7 +26158,7 @@
         </p:nvSpPr>
         <p:spPr bwMode="auto">
           <a:xfrm>
-            <a:off x="6961310" y="1429256"/>
+            <a:off x="8909822" y="3882487"/>
             <a:ext cx="684000" cy="288000"/>
           </a:xfrm>
           <a:prstGeom prst="roundRect">
@@ -26029,22 +26180,36 @@
           <a:bodyPr wrap="none" lIns="121944" tIns="60972" rIns="121944" bIns="60972" anchor="ctr"/>
           <a:lstStyle/>
           <a:p>
-            <a:pPr algn="ctr" fontAlgn="auto">
+            <a:pPr marL="0" marR="0" lvl="0" indent="0" algn="ctr" defTabSz="914400" eaLnBrk="0" fontAlgn="auto" latinLnBrk="0" hangingPunct="0">
+              <a:lnSpc>
+                <a:spcPct val="100000"/>
+              </a:lnSpc>
               <a:spcBef>
                 <a:spcPts val="0"/>
               </a:spcBef>
               <a:spcAft>
                 <a:spcPts val="0"/>
               </a:spcAft>
+              <a:buClrTx/>
+              <a:buSzTx/>
+              <a:buFontTx/>
+              <a:buNone/>
+              <a:tabLst/>
               <a:defRPr/>
             </a:pPr>
             <a:r>
-              <a:rPr lang="en-US" sz="1400" b="1" kern="0">
+              <a:rPr kumimoji="0" lang="en-US" sz="1400" b="1" i="0" u="none" strike="noStrike" kern="0" cap="none" spc="0" normalizeH="0" baseline="0" noProof="0">
+                <a:ln>
+                  <a:noFill/>
+                </a:ln>
                 <a:solidFill>
                   <a:sysClr val="window" lastClr="FFFFFF"/>
                 </a:solidFill>
+                <a:effectLst/>
+                <a:uLnTx/>
+                <a:uFillTx/>
                 <a:latin typeface="Calibri" panose="020F0502020204030204" pitchFamily="34" charset="0"/>
-                <a:ea typeface="ＭＳ Ｐゴシック" pitchFamily="34" charset="-128"/>
+                <a:ea typeface="ＭＳ Ｐゴシック" panose="020B0600070205080204" pitchFamily="34" charset="-128"/>
                 <a:cs typeface="Calibri" panose="020F0502020204030204" pitchFamily="34" charset="0"/>
               </a:rPr>
               <a:t>CAN</a:t>
@@ -26054,10 +26219,10 @@
       </p:sp>
       <p:sp>
         <p:nvSpPr>
-          <p:cNvPr id="25" name="Rounded Rectangle 24">
+          <p:cNvPr id="149" name="Rounded Rectangle 148">
             <a:extLst>
               <a:ext uri="{FF2B5EF4-FFF2-40B4-BE49-F238E27FC236}">
-                <a16:creationId xmlns:a16="http://schemas.microsoft.com/office/drawing/2014/main" id="{75BBDD7B-7AA8-E81A-5B23-94A97131EF56}"/>
+                <a16:creationId xmlns:a16="http://schemas.microsoft.com/office/drawing/2014/main" id="{C312DF6E-E496-3CA1-C01F-434B2245F022}"/>
               </a:ext>
             </a:extLst>
           </p:cNvPr>
@@ -26066,7 +26231,7 @@
         </p:nvSpPr>
         <p:spPr bwMode="auto">
           <a:xfrm>
-            <a:off x="6218261" y="2169442"/>
+            <a:off x="8166773" y="4622673"/>
             <a:ext cx="684000" cy="288000"/>
           </a:xfrm>
           <a:prstGeom prst="roundRect">
@@ -26090,22 +26255,36 @@
           </a:bodyPr>
           <a:lstStyle/>
           <a:p>
-            <a:pPr algn="ctr" fontAlgn="auto">
+            <a:pPr marL="0" marR="0" lvl="0" indent="0" algn="ctr" defTabSz="914400" eaLnBrk="0" fontAlgn="auto" latinLnBrk="0" hangingPunct="0">
+              <a:lnSpc>
+                <a:spcPct val="100000"/>
+              </a:lnSpc>
               <a:spcBef>
                 <a:spcPts val="0"/>
               </a:spcBef>
               <a:spcAft>
                 <a:spcPts val="0"/>
               </a:spcAft>
+              <a:buClrTx/>
+              <a:buSzTx/>
+              <a:buFontTx/>
+              <a:buNone/>
+              <a:tabLst/>
               <a:defRPr/>
             </a:pPr>
             <a:r>
-              <a:rPr lang="en-US" sz="1400" b="1" kern="0">
+              <a:rPr kumimoji="0" lang="en-US" sz="1400" b="1" i="0" u="none" strike="noStrike" kern="0" cap="none" spc="0" normalizeH="0" baseline="0" noProof="0">
+                <a:ln>
+                  <a:noFill/>
+                </a:ln>
                 <a:solidFill>
                   <a:sysClr val="window" lastClr="FFFFFF"/>
                 </a:solidFill>
+                <a:effectLst/>
+                <a:uLnTx/>
+                <a:uFillTx/>
                 <a:latin typeface="Calibri" panose="020F0502020204030204" pitchFamily="34" charset="0"/>
-                <a:ea typeface="ＭＳ Ｐゴシック" pitchFamily="34" charset="-128"/>
+                <a:ea typeface="ＭＳ Ｐゴシック" panose="020B0600070205080204" pitchFamily="34" charset="-128"/>
                 <a:cs typeface="Calibri" panose="020F0502020204030204" pitchFamily="34" charset="0"/>
               </a:rPr>
               <a:t>SPI</a:t>
@@ -26115,10 +26294,10 @@
       </p:sp>
       <p:sp>
         <p:nvSpPr>
-          <p:cNvPr id="26" name="Rounded Rectangle 25">
+          <p:cNvPr id="150" name="Rounded Rectangle 149">
             <a:extLst>
               <a:ext uri="{FF2B5EF4-FFF2-40B4-BE49-F238E27FC236}">
-                <a16:creationId xmlns:a16="http://schemas.microsoft.com/office/drawing/2014/main" id="{CDAF23D6-6158-9562-E41B-BD2088221D66}"/>
+                <a16:creationId xmlns:a16="http://schemas.microsoft.com/office/drawing/2014/main" id="{1F469D37-409A-0457-1AA0-BD30771D26E0}"/>
               </a:ext>
             </a:extLst>
           </p:cNvPr>
@@ -26127,7 +26306,7 @@
         </p:nvSpPr>
         <p:spPr bwMode="auto">
           <a:xfrm>
-            <a:off x="5296068" y="2169442"/>
+            <a:off x="7244580" y="4622673"/>
             <a:ext cx="864000" cy="288000"/>
           </a:xfrm>
           <a:prstGeom prst="roundRect">
@@ -26151,22 +26330,36 @@
           </a:bodyPr>
           <a:lstStyle/>
           <a:p>
-            <a:pPr algn="ctr" fontAlgn="auto">
+            <a:pPr marL="0" marR="0" lvl="0" indent="0" algn="ctr" defTabSz="914400" eaLnBrk="0" fontAlgn="auto" latinLnBrk="0" hangingPunct="0">
+              <a:lnSpc>
+                <a:spcPct val="100000"/>
+              </a:lnSpc>
               <a:spcBef>
                 <a:spcPts val="0"/>
               </a:spcBef>
               <a:spcAft>
                 <a:spcPts val="0"/>
               </a:spcAft>
+              <a:buClrTx/>
+              <a:buSzTx/>
+              <a:buFontTx/>
+              <a:buNone/>
+              <a:tabLst/>
               <a:defRPr/>
             </a:pPr>
             <a:r>
-              <a:rPr lang="en-US" sz="1400" b="1" kern="0">
+              <a:rPr kumimoji="0" lang="en-US" sz="1400" b="1" i="0" u="none" strike="noStrike" kern="0" cap="none" spc="0" normalizeH="0" baseline="0" noProof="0">
+                <a:ln>
+                  <a:noFill/>
+                </a:ln>
                 <a:solidFill>
                   <a:sysClr val="window" lastClr="FFFFFF"/>
                 </a:solidFill>
+                <a:effectLst/>
+                <a:uLnTx/>
+                <a:uFillTx/>
                 <a:latin typeface="Calibri" panose="020F0502020204030204" pitchFamily="34" charset="0"/>
-                <a:ea typeface="ＭＳ Ｐゴシック" pitchFamily="34" charset="-128"/>
+                <a:ea typeface="ＭＳ Ｐゴシック" panose="020B0600070205080204" pitchFamily="34" charset="-128"/>
                 <a:cs typeface="Calibri" panose="020F0502020204030204" pitchFamily="34" charset="0"/>
               </a:rPr>
               <a:t>MCI</a:t>
@@ -26176,10 +26369,10 @@
       </p:sp>
       <p:sp>
         <p:nvSpPr>
-          <p:cNvPr id="28" name="Rounded Rectangle 27">
+          <p:cNvPr id="151" name="Rounded Rectangle 150">
             <a:extLst>
               <a:ext uri="{FF2B5EF4-FFF2-40B4-BE49-F238E27FC236}">
-                <a16:creationId xmlns:a16="http://schemas.microsoft.com/office/drawing/2014/main" id="{DD1E0E29-1F06-642B-017C-F6ABC1BEA674}"/>
+                <a16:creationId xmlns:a16="http://schemas.microsoft.com/office/drawing/2014/main" id="{49BBE379-FF91-A196-AE44-D3DB325F6E0C}"/>
               </a:ext>
             </a:extLst>
           </p:cNvPr>
@@ -26188,7 +26381,7 @@
         </p:nvSpPr>
         <p:spPr bwMode="auto">
           <a:xfrm>
-            <a:off x="2427188" y="2169442"/>
+            <a:off x="4375700" y="4622673"/>
             <a:ext cx="900000" cy="288000"/>
           </a:xfrm>
           <a:prstGeom prst="roundRect">
@@ -26212,22 +26405,36 @@
           </a:bodyPr>
           <a:lstStyle/>
           <a:p>
-            <a:pPr algn="ctr" fontAlgn="auto">
+            <a:pPr marL="0" marR="0" lvl="0" indent="0" algn="ctr" defTabSz="914400" eaLnBrk="0" fontAlgn="auto" latinLnBrk="0" hangingPunct="0">
+              <a:lnSpc>
+                <a:spcPct val="100000"/>
+              </a:lnSpc>
               <a:spcBef>
                 <a:spcPts val="0"/>
               </a:spcBef>
               <a:spcAft>
                 <a:spcPts val="0"/>
               </a:spcAft>
+              <a:buClrTx/>
+              <a:buSzTx/>
+              <a:buFontTx/>
+              <a:buNone/>
+              <a:tabLst/>
               <a:defRPr/>
             </a:pPr>
             <a:r>
-              <a:rPr lang="en-US" sz="1400" b="1" kern="0">
+              <a:rPr kumimoji="0" lang="en-US" sz="1400" b="1" i="0" u="none" strike="noStrike" kern="0" cap="none" spc="0" normalizeH="0" baseline="0" noProof="0">
+                <a:ln>
+                  <a:noFill/>
+                </a:ln>
                 <a:solidFill>
                   <a:sysClr val="window" lastClr="FFFFFF"/>
                 </a:solidFill>
+                <a:effectLst/>
+                <a:uLnTx/>
+                <a:uFillTx/>
                 <a:latin typeface="Calibri" panose="020F0502020204030204" pitchFamily="34" charset="0"/>
-                <a:ea typeface="ＭＳ Ｐゴシック" pitchFamily="34" charset="-128"/>
+                <a:ea typeface="ＭＳ Ｐゴシック" panose="020B0600070205080204" pitchFamily="34" charset="-128"/>
                 <a:cs typeface="Calibri" panose="020F0502020204030204" pitchFamily="34" charset="0"/>
               </a:rPr>
               <a:t>USB Device</a:t>
@@ -26237,10 +26444,10 @@
       </p:sp>
       <p:sp>
         <p:nvSpPr>
-          <p:cNvPr id="30" name="Rounded Rectangle 29">
+          <p:cNvPr id="152" name="Rounded Rectangle 151">
             <a:extLst>
               <a:ext uri="{FF2B5EF4-FFF2-40B4-BE49-F238E27FC236}">
-                <a16:creationId xmlns:a16="http://schemas.microsoft.com/office/drawing/2014/main" id="{858BE6E4-FF32-92B8-83F1-F06CF6AA417C}"/>
+                <a16:creationId xmlns:a16="http://schemas.microsoft.com/office/drawing/2014/main" id="{492573DD-9999-D622-548B-F129E355418E}"/>
               </a:ext>
             </a:extLst>
           </p:cNvPr>
@@ -26249,7 +26456,7 @@
         </p:nvSpPr>
         <p:spPr bwMode="auto">
           <a:xfrm>
-            <a:off x="3386237" y="2169442"/>
+            <a:off x="5334749" y="4622673"/>
             <a:ext cx="900000" cy="288000"/>
           </a:xfrm>
           <a:prstGeom prst="roundRect">
@@ -26273,22 +26480,36 @@
           </a:bodyPr>
           <a:lstStyle/>
           <a:p>
-            <a:pPr algn="ctr" fontAlgn="auto">
+            <a:pPr marL="0" marR="0" lvl="0" indent="0" algn="ctr" defTabSz="914400" eaLnBrk="0" fontAlgn="auto" latinLnBrk="0" hangingPunct="0">
+              <a:lnSpc>
+                <a:spcPct val="100000"/>
+              </a:lnSpc>
               <a:spcBef>
                 <a:spcPts val="0"/>
               </a:spcBef>
               <a:spcAft>
                 <a:spcPts val="0"/>
               </a:spcAft>
+              <a:buClrTx/>
+              <a:buSzTx/>
+              <a:buFontTx/>
+              <a:buNone/>
+              <a:tabLst/>
               <a:defRPr/>
             </a:pPr>
             <a:r>
-              <a:rPr lang="en-US" sz="1400" b="1" kern="0">
+              <a:rPr kumimoji="0" lang="en-US" sz="1400" b="1" i="0" u="none" strike="noStrike" kern="0" cap="none" spc="0" normalizeH="0" baseline="0" noProof="0">
+                <a:ln>
+                  <a:noFill/>
+                </a:ln>
                 <a:solidFill>
                   <a:sysClr val="window" lastClr="FFFFFF"/>
                 </a:solidFill>
+                <a:effectLst/>
+                <a:uLnTx/>
+                <a:uFillTx/>
                 <a:latin typeface="Calibri" panose="020F0502020204030204" pitchFamily="34" charset="0"/>
-                <a:ea typeface="ＭＳ Ｐゴシック" pitchFamily="34" charset="-128"/>
+                <a:ea typeface="ＭＳ Ｐゴシック" panose="020B0600070205080204" pitchFamily="34" charset="-128"/>
                 <a:cs typeface="Calibri" panose="020F0502020204030204" pitchFamily="34" charset="0"/>
               </a:rPr>
               <a:t>Eth. PHY</a:t>
@@ -26298,10 +26519,10 @@
       </p:sp>
       <p:sp>
         <p:nvSpPr>
-          <p:cNvPr id="31" name="Rounded Rectangle 30">
+          <p:cNvPr id="153" name="Rounded Rectangle 152">
             <a:extLst>
               <a:ext uri="{FF2B5EF4-FFF2-40B4-BE49-F238E27FC236}">
-                <a16:creationId xmlns:a16="http://schemas.microsoft.com/office/drawing/2014/main" id="{B14B8886-0478-9C23-AC12-3CE03744709F}"/>
+                <a16:creationId xmlns:a16="http://schemas.microsoft.com/office/drawing/2014/main" id="{39DC9682-E912-874D-A5FE-3DF1DDB03135}"/>
               </a:ext>
             </a:extLst>
           </p:cNvPr>
@@ -26310,7 +26531,7 @@
         </p:nvSpPr>
         <p:spPr bwMode="auto">
           <a:xfrm>
-            <a:off x="4341152" y="2169442"/>
+            <a:off x="6289664" y="4622673"/>
             <a:ext cx="900000" cy="288000"/>
           </a:xfrm>
           <a:prstGeom prst="roundRect">
@@ -26334,22 +26555,36 @@
           </a:bodyPr>
           <a:lstStyle/>
           <a:p>
-            <a:pPr algn="ctr" fontAlgn="auto">
+            <a:pPr marL="0" marR="0" lvl="0" indent="0" algn="ctr" defTabSz="914400" eaLnBrk="0" fontAlgn="auto" latinLnBrk="0" hangingPunct="0">
+              <a:lnSpc>
+                <a:spcPct val="100000"/>
+              </a:lnSpc>
               <a:spcBef>
                 <a:spcPts val="0"/>
               </a:spcBef>
               <a:spcAft>
                 <a:spcPts val="0"/>
               </a:spcAft>
+              <a:buClrTx/>
+              <a:buSzTx/>
+              <a:buFontTx/>
+              <a:buNone/>
+              <a:tabLst/>
               <a:defRPr/>
             </a:pPr>
             <a:r>
-              <a:rPr lang="en-US" sz="1400" b="1" kern="0">
+              <a:rPr kumimoji="0" lang="en-US" sz="1400" b="1" i="0" u="none" strike="noStrike" kern="0" cap="none" spc="0" normalizeH="0" baseline="0" noProof="0">
+                <a:ln>
+                  <a:noFill/>
+                </a:ln>
                 <a:solidFill>
                   <a:sysClr val="window" lastClr="FFFFFF"/>
                 </a:solidFill>
+                <a:effectLst/>
+                <a:uLnTx/>
+                <a:uFillTx/>
                 <a:latin typeface="Calibri" panose="020F0502020204030204" pitchFamily="34" charset="0"/>
-                <a:ea typeface="ＭＳ Ｐゴシック" pitchFamily="34" charset="-128"/>
+                <a:ea typeface="ＭＳ Ｐゴシック" panose="020B0600070205080204" pitchFamily="34" charset="-128"/>
                 <a:cs typeface="Calibri" panose="020F0502020204030204" pitchFamily="34" charset="0"/>
               </a:rPr>
               <a:t>Eth. MAC</a:t>
@@ -26359,10 +26594,10 @@
       </p:sp>
       <p:sp>
         <p:nvSpPr>
-          <p:cNvPr id="33" name="Rounded Rectangle 32">
+          <p:cNvPr id="154" name="Rounded Rectangle 153">
             <a:extLst>
               <a:ext uri="{FF2B5EF4-FFF2-40B4-BE49-F238E27FC236}">
-                <a16:creationId xmlns:a16="http://schemas.microsoft.com/office/drawing/2014/main" id="{50C0D808-CA2D-9F60-DB5D-66F2E914D2C4}"/>
+                <a16:creationId xmlns:a16="http://schemas.microsoft.com/office/drawing/2014/main" id="{59A07E10-7985-18F0-86DD-2A687D9AD0BC}"/>
               </a:ext>
             </a:extLst>
           </p:cNvPr>
@@ -26371,7 +26606,7 @@
         </p:nvSpPr>
         <p:spPr bwMode="auto">
           <a:xfrm>
-            <a:off x="6961310" y="2169442"/>
+            <a:off x="8909822" y="4622673"/>
             <a:ext cx="684000" cy="288000"/>
           </a:xfrm>
           <a:prstGeom prst="roundRect">
@@ -26395,22 +26630,36 @@
           </a:bodyPr>
           <a:lstStyle/>
           <a:p>
-            <a:pPr algn="ctr" fontAlgn="auto">
+            <a:pPr marL="0" marR="0" lvl="0" indent="0" algn="ctr" defTabSz="914400" eaLnBrk="0" fontAlgn="auto" latinLnBrk="0" hangingPunct="0">
+              <a:lnSpc>
+                <a:spcPct val="100000"/>
+              </a:lnSpc>
               <a:spcBef>
                 <a:spcPts val="0"/>
               </a:spcBef>
               <a:spcAft>
                 <a:spcPts val="0"/>
               </a:spcAft>
+              <a:buClrTx/>
+              <a:buSzTx/>
+              <a:buFontTx/>
+              <a:buNone/>
+              <a:tabLst/>
               <a:defRPr/>
             </a:pPr>
             <a:r>
-              <a:rPr lang="en-US" sz="1400" b="1" kern="0">
+              <a:rPr kumimoji="0" lang="en-US" sz="1400" b="1" i="0" u="none" strike="noStrike" kern="0" cap="none" spc="0" normalizeH="0" baseline="0" noProof="0">
+                <a:ln>
+                  <a:noFill/>
+                </a:ln>
                 <a:solidFill>
                   <a:sysClr val="window" lastClr="FFFFFF"/>
                 </a:solidFill>
+                <a:effectLst/>
+                <a:uLnTx/>
+                <a:uFillTx/>
                 <a:latin typeface="Calibri" panose="020F0502020204030204" pitchFamily="34" charset="0"/>
-                <a:ea typeface="ＭＳ Ｐゴシック" pitchFamily="34" charset="-128"/>
+                <a:ea typeface="ＭＳ Ｐゴシック" panose="020B0600070205080204" pitchFamily="34" charset="-128"/>
                 <a:cs typeface="Calibri" panose="020F0502020204030204" pitchFamily="34" charset="0"/>
               </a:rPr>
               <a:t>CAN</a:t>
@@ -26420,10 +26669,10 @@
       </p:sp>
       <p:sp>
         <p:nvSpPr>
-          <p:cNvPr id="38" name="Rounded Rectangle 37">
+          <p:cNvPr id="155" name="Rounded Rectangle 154">
             <a:extLst>
               <a:ext uri="{FF2B5EF4-FFF2-40B4-BE49-F238E27FC236}">
-                <a16:creationId xmlns:a16="http://schemas.microsoft.com/office/drawing/2014/main" id="{2D4DA2DE-C564-E15D-1CCD-D347BCAA9DE7}"/>
+                <a16:creationId xmlns:a16="http://schemas.microsoft.com/office/drawing/2014/main" id="{25D90CF8-12CA-9AFA-1A8F-949A2C3001B5}"/>
               </a:ext>
             </a:extLst>
           </p:cNvPr>
@@ -26432,7 +26681,7 @@
         </p:nvSpPr>
         <p:spPr bwMode="auto">
           <a:xfrm>
-            <a:off x="1678607" y="2169442"/>
+            <a:off x="3627119" y="4622673"/>
             <a:ext cx="684000" cy="288000"/>
           </a:xfrm>
           <a:prstGeom prst="roundRect">
@@ -26456,22 +26705,36 @@
           </a:bodyPr>
           <a:lstStyle/>
           <a:p>
-            <a:pPr algn="ctr" fontAlgn="auto">
+            <a:pPr marL="0" marR="0" lvl="0" indent="0" algn="ctr" defTabSz="914400" eaLnBrk="0" fontAlgn="auto" latinLnBrk="0" hangingPunct="0">
+              <a:lnSpc>
+                <a:spcPct val="100000"/>
+              </a:lnSpc>
               <a:spcBef>
                 <a:spcPts val="0"/>
               </a:spcBef>
               <a:spcAft>
                 <a:spcPts val="0"/>
               </a:spcAft>
+              <a:buClrTx/>
+              <a:buSzTx/>
+              <a:buFontTx/>
+              <a:buNone/>
+              <a:tabLst/>
               <a:defRPr/>
             </a:pPr>
             <a:r>
-              <a:rPr lang="en-US" sz="1400" b="1" kern="0">
+              <a:rPr kumimoji="0" lang="en-US" sz="1400" b="1" i="0" u="none" strike="noStrike" kern="0" cap="none" spc="0" normalizeH="0" baseline="0" noProof="0">
+                <a:ln>
+                  <a:noFill/>
+                </a:ln>
                 <a:solidFill>
                   <a:sysClr val="window" lastClr="FFFFFF"/>
                 </a:solidFill>
+                <a:effectLst/>
+                <a:uLnTx/>
+                <a:uFillTx/>
                 <a:latin typeface="Calibri" panose="020F0502020204030204" pitchFamily="34" charset="0"/>
-                <a:ea typeface="ＭＳ Ｐゴシック" pitchFamily="34" charset="-128"/>
+                <a:ea typeface="ＭＳ Ｐゴシック" panose="020B0600070205080204" pitchFamily="34" charset="-128"/>
                 <a:cs typeface="Calibri" panose="020F0502020204030204" pitchFamily="34" charset="0"/>
               </a:rPr>
               <a:t>GPIO</a:t>
@@ -26481,10 +26744,10 @@
       </p:sp>
       <p:sp>
         <p:nvSpPr>
-          <p:cNvPr id="39" name="TextBox 38">
+          <p:cNvPr id="156" name="TextBox 155">
             <a:extLst>
               <a:ext uri="{FF2B5EF4-FFF2-40B4-BE49-F238E27FC236}">
-                <a16:creationId xmlns:a16="http://schemas.microsoft.com/office/drawing/2014/main" id="{484C5234-46E1-9C3C-AE48-419A8EB26929}"/>
+                <a16:creationId xmlns:a16="http://schemas.microsoft.com/office/drawing/2014/main" id="{CFD1D0CC-C985-FBE9-9626-1F5AFED37241}"/>
               </a:ext>
             </a:extLst>
           </p:cNvPr>
@@ -26493,8 +26756,8 @@
         </p:nvSpPr>
         <p:spPr bwMode="auto">
           <a:xfrm>
-            <a:off x="6218261" y="2574820"/>
-            <a:ext cx="684000" cy="432000"/>
+            <a:off x="8166773" y="5028051"/>
+            <a:ext cx="684000" cy="430332"/>
           </a:xfrm>
           <a:prstGeom prst="rect">
             <a:avLst/>
@@ -26507,47 +26770,54 @@
           </a:ln>
         </p:spPr>
         <p:txBody>
-          <a:bodyPr lIns="72000" rIns="72000">
-            <a:spAutoFit/>
+          <a:bodyPr lIns="72000" rIns="72000" anchor="ctr">
+            <a:noAutofit/>
           </a:bodyPr>
           <a:lstStyle/>
           <a:p>
-            <a:pPr algn="ctr">
+            <a:pPr marL="0" marR="0" lvl="0" indent="0" algn="ctr" defTabSz="914400" eaLnBrk="0" fontAlgn="base" latinLnBrk="0" hangingPunct="0">
+              <a:lnSpc>
+                <a:spcPct val="100000"/>
+              </a:lnSpc>
+              <a:spcBef>
+                <a:spcPct val="0"/>
+              </a:spcBef>
+              <a:spcAft>
+                <a:spcPct val="0"/>
+              </a:spcAft>
+              <a:buClrTx/>
+              <a:buSzTx/>
+              <a:buFontTx/>
+              <a:buNone/>
+              <a:tabLst/>
               <a:defRPr/>
             </a:pPr>
             <a:r>
-              <a:rPr lang="en-US" sz="1400">
+              <a:rPr kumimoji="0" lang="en-US" sz="1400" b="0" i="0" u="none" strike="noStrike" kern="0" cap="none" spc="0" normalizeH="0" baseline="0" noProof="0" dirty="0">
+                <a:ln>
+                  <a:noFill/>
+                </a:ln>
+                <a:solidFill>
+                  <a:srgbClr val="000000"/>
+                </a:solidFill>
+                <a:effectLst/>
+                <a:uLnTx/>
+                <a:uFillTx/>
                 <a:latin typeface="Calibri" panose="020F0502020204030204" pitchFamily="34" charset="0"/>
+                <a:ea typeface="ＭＳ Ｐゴシック" panose="020B0600070205080204" pitchFamily="34" charset="-128"/>
                 <a:cs typeface="Calibri" panose="020F0502020204030204" pitchFamily="34" charset="0"/>
               </a:rPr>
               <a:t>SPI</a:t>
             </a:r>
           </a:p>
-          <a:p>
-            <a:pPr algn="ctr">
-              <a:defRPr/>
-            </a:pPr>
-            <a:r>
-              <a:rPr lang="en-US" sz="800">
-                <a:latin typeface="Calibri" panose="020F0502020204030204" pitchFamily="34" charset="0"/>
-                <a:cs typeface="Calibri" panose="020F0502020204030204" pitchFamily="34" charset="0"/>
-              </a:rPr>
-              <a:t>Controller</a:t>
-            </a:r>
-            <a:endParaRPr lang="en-US" sz="800">
-              <a:latin typeface="Calibri" panose="020F0502020204030204" pitchFamily="34" charset="0"/>
-              <a:ea typeface="Segoe UI" panose="020B0502040204020203" pitchFamily="34" charset="0"/>
-              <a:cs typeface="Calibri" panose="020F0502020204030204" pitchFamily="34" charset="0"/>
-            </a:endParaRPr>
-          </a:p>
-        </p:txBody>
-      </p:sp>
-      <p:sp>
-        <p:nvSpPr>
-          <p:cNvPr id="42" name="TextBox 41">
+        </p:txBody>
+      </p:sp>
+      <p:sp>
+        <p:nvSpPr>
+          <p:cNvPr id="157" name="TextBox 156">
             <a:extLst>
               <a:ext uri="{FF2B5EF4-FFF2-40B4-BE49-F238E27FC236}">
-                <a16:creationId xmlns:a16="http://schemas.microsoft.com/office/drawing/2014/main" id="{E1C1C5E9-B9DB-A431-CDAA-7188727D9C16}"/>
+                <a16:creationId xmlns:a16="http://schemas.microsoft.com/office/drawing/2014/main" id="{06FEE6D9-EAB6-0780-C9CB-B4136904AA23}"/>
               </a:ext>
             </a:extLst>
           </p:cNvPr>
@@ -26556,8 +26826,8 @@
         </p:nvSpPr>
         <p:spPr bwMode="auto">
           <a:xfrm>
-            <a:off x="2427188" y="2574820"/>
-            <a:ext cx="900000" cy="432000"/>
+            <a:off x="4375700" y="5028051"/>
+            <a:ext cx="900000" cy="430332"/>
           </a:xfrm>
           <a:prstGeom prst="rect">
             <a:avLst/>
@@ -26570,42 +26840,54 @@
           </a:ln>
         </p:spPr>
         <p:txBody>
-          <a:bodyPr rIns="144000">
-            <a:spAutoFit/>
+          <a:bodyPr rIns="144000" anchor="ctr">
+            <a:noAutofit/>
           </a:bodyPr>
           <a:lstStyle/>
           <a:p>
-            <a:pPr algn="ctr">
+            <a:pPr marL="0" marR="0" lvl="0" indent="0" algn="ctr" defTabSz="914400" eaLnBrk="0" fontAlgn="base" latinLnBrk="0" hangingPunct="0">
+              <a:lnSpc>
+                <a:spcPct val="100000"/>
+              </a:lnSpc>
+              <a:spcBef>
+                <a:spcPct val="0"/>
+              </a:spcBef>
+              <a:spcAft>
+                <a:spcPct val="0"/>
+              </a:spcAft>
+              <a:buClrTx/>
+              <a:buSzTx/>
+              <a:buFontTx/>
+              <a:buNone/>
+              <a:tabLst/>
               <a:defRPr/>
             </a:pPr>
             <a:r>
-              <a:rPr lang="en-US" sz="1400">
+              <a:rPr kumimoji="0" lang="en-US" sz="1400" b="0" i="0" u="none" strike="noStrike" kern="0" cap="none" spc="0" normalizeH="0" baseline="0" noProof="0" dirty="0">
+                <a:ln>
+                  <a:noFill/>
+                </a:ln>
+                <a:solidFill>
+                  <a:srgbClr val="000000"/>
+                </a:solidFill>
+                <a:effectLst/>
+                <a:uLnTx/>
+                <a:uFillTx/>
                 <a:latin typeface="Calibri" panose="020F0502020204030204" pitchFamily="34" charset="0"/>
+                <a:ea typeface="ＭＳ Ｐゴシック" panose="020B0600070205080204" pitchFamily="34" charset="-128"/>
                 <a:cs typeface="Calibri" panose="020F0502020204030204" pitchFamily="34" charset="0"/>
               </a:rPr>
               <a:t>USB </a:t>
             </a:r>
           </a:p>
-          <a:p>
-            <a:pPr algn="ctr">
-              <a:defRPr/>
-            </a:pPr>
-            <a:r>
-              <a:rPr lang="en-US" sz="800">
-                <a:latin typeface="Calibri" panose="020F0502020204030204" pitchFamily="34" charset="0"/>
-                <a:cs typeface="Calibri" panose="020F0502020204030204" pitchFamily="34" charset="0"/>
-              </a:rPr>
-              <a:t>Controller</a:t>
-            </a:r>
-          </a:p>
-        </p:txBody>
-      </p:sp>
-      <p:sp>
-        <p:nvSpPr>
-          <p:cNvPr id="43" name="TextBox 42">
+        </p:txBody>
+      </p:sp>
+      <p:sp>
+        <p:nvSpPr>
+          <p:cNvPr id="158" name="TextBox 157">
             <a:extLst>
               <a:ext uri="{FF2B5EF4-FFF2-40B4-BE49-F238E27FC236}">
-                <a16:creationId xmlns:a16="http://schemas.microsoft.com/office/drawing/2014/main" id="{4CD31FA4-EAAA-F7BE-1E08-E09D88F76E8A}"/>
+                <a16:creationId xmlns:a16="http://schemas.microsoft.com/office/drawing/2014/main" id="{40FD697C-88B3-9827-192E-1C8A9DF0FD6F}"/>
               </a:ext>
             </a:extLst>
           </p:cNvPr>
@@ -26614,7 +26896,7 @@
         </p:nvSpPr>
         <p:spPr bwMode="auto">
           <a:xfrm>
-            <a:off x="3386237" y="2574820"/>
+            <a:off x="5334749" y="5028051"/>
             <a:ext cx="900000" cy="432000"/>
           </a:xfrm>
           <a:prstGeom prst="rect">
@@ -26628,29 +26910,77 @@
           </a:ln>
         </p:spPr>
         <p:txBody>
-          <a:bodyPr rIns="144000">
+          <a:bodyPr rIns="144000" anchor="ctr">
             <a:spAutoFit/>
           </a:bodyPr>
           <a:lstStyle/>
           <a:p>
-            <a:pPr algn="ctr">
+            <a:pPr marL="0" marR="0" lvl="0" indent="0" algn="ctr" defTabSz="914400" eaLnBrk="0" fontAlgn="base" latinLnBrk="0" hangingPunct="0">
+              <a:lnSpc>
+                <a:spcPct val="100000"/>
+              </a:lnSpc>
+              <a:spcBef>
+                <a:spcPct val="0"/>
+              </a:spcBef>
+              <a:spcAft>
+                <a:spcPct val="0"/>
+              </a:spcAft>
+              <a:buClrTx/>
+              <a:buSzTx/>
+              <a:buFontTx/>
+              <a:buNone/>
+              <a:tabLst/>
               <a:defRPr/>
             </a:pPr>
             <a:r>
-              <a:rPr lang="en-US" sz="1400">
+              <a:rPr kumimoji="0" lang="en-US" sz="1400" b="0" i="0" u="none" strike="noStrike" kern="0" cap="none" spc="0" normalizeH="0" baseline="0" noProof="0">
+                <a:ln>
+                  <a:noFill/>
+                </a:ln>
+                <a:solidFill>
+                  <a:srgbClr val="000000"/>
+                </a:solidFill>
+                <a:effectLst/>
+                <a:uLnTx/>
+                <a:uFillTx/>
                 <a:latin typeface="Calibri" panose="020F0502020204030204" pitchFamily="34" charset="0"/>
+                <a:ea typeface="ＭＳ Ｐゴシック" panose="020B0600070205080204" pitchFamily="34" charset="-128"/>
                 <a:cs typeface="Calibri" panose="020F0502020204030204" pitchFamily="34" charset="0"/>
               </a:rPr>
               <a:t>Ethernet</a:t>
             </a:r>
           </a:p>
           <a:p>
-            <a:pPr algn="ctr">
+            <a:pPr marL="0" marR="0" lvl="0" indent="0" algn="ctr" defTabSz="914400" eaLnBrk="0" fontAlgn="base" latinLnBrk="0" hangingPunct="0">
+              <a:lnSpc>
+                <a:spcPct val="100000"/>
+              </a:lnSpc>
+              <a:spcBef>
+                <a:spcPct val="0"/>
+              </a:spcBef>
+              <a:spcAft>
+                <a:spcPct val="0"/>
+              </a:spcAft>
+              <a:buClrTx/>
+              <a:buSzTx/>
+              <a:buFontTx/>
+              <a:buNone/>
+              <a:tabLst/>
               <a:defRPr/>
             </a:pPr>
             <a:r>
-              <a:rPr lang="en-US" sz="800">
+              <a:rPr kumimoji="0" lang="en-US" sz="800" b="0" i="0" u="none" strike="noStrike" kern="0" cap="none" spc="0" normalizeH="0" baseline="0" noProof="0">
+                <a:ln>
+                  <a:noFill/>
+                </a:ln>
+                <a:solidFill>
+                  <a:srgbClr val="000000"/>
+                </a:solidFill>
+                <a:effectLst/>
+                <a:uLnTx/>
+                <a:uFillTx/>
                 <a:latin typeface="Calibri" panose="020F0502020204030204" pitchFamily="34" charset="0"/>
+                <a:ea typeface="ＭＳ Ｐゴシック" panose="020B0600070205080204" pitchFamily="34" charset="-128"/>
                 <a:cs typeface="Calibri" panose="020F0502020204030204" pitchFamily="34" charset="0"/>
               </a:rPr>
               <a:t>PHY</a:t>
@@ -26660,10 +26990,10 @@
       </p:sp>
       <p:sp>
         <p:nvSpPr>
-          <p:cNvPr id="44" name="TextBox 43">
+          <p:cNvPr id="159" name="TextBox 158">
             <a:extLst>
               <a:ext uri="{FF2B5EF4-FFF2-40B4-BE49-F238E27FC236}">
-                <a16:creationId xmlns:a16="http://schemas.microsoft.com/office/drawing/2014/main" id="{AFBF7C09-8A1B-6EA3-B370-9C4403852786}"/>
+                <a16:creationId xmlns:a16="http://schemas.microsoft.com/office/drawing/2014/main" id="{46426D8B-B863-3B23-40B9-CA0603D62A78}"/>
               </a:ext>
             </a:extLst>
           </p:cNvPr>
@@ -26672,7 +27002,7 @@
         </p:nvSpPr>
         <p:spPr bwMode="auto">
           <a:xfrm>
-            <a:off x="5296068" y="2574264"/>
+            <a:off x="7244580" y="5027496"/>
             <a:ext cx="864000" cy="430887"/>
           </a:xfrm>
           <a:prstGeom prst="rect">
@@ -26691,12 +27021,36 @@
           </a:bodyPr>
           <a:lstStyle/>
           <a:p>
-            <a:pPr algn="ctr">
+            <a:pPr marL="0" marR="0" lvl="0" indent="0" algn="ctr" defTabSz="914400" eaLnBrk="0" fontAlgn="base" latinLnBrk="0" hangingPunct="0">
+              <a:lnSpc>
+                <a:spcPct val="100000"/>
+              </a:lnSpc>
+              <a:spcBef>
+                <a:spcPct val="0"/>
+              </a:spcBef>
+              <a:spcAft>
+                <a:spcPct val="0"/>
+              </a:spcAft>
+              <a:buClrTx/>
+              <a:buSzTx/>
+              <a:buFontTx/>
+              <a:buNone/>
+              <a:tabLst/>
               <a:defRPr/>
             </a:pPr>
             <a:r>
-              <a:rPr lang="en-US" sz="1200">
+              <a:rPr kumimoji="0" lang="en-US" sz="1400" b="0" i="0" u="none" strike="noStrike" kern="0" cap="none" spc="0" normalizeH="0" baseline="0" noProof="0">
+                <a:ln>
+                  <a:noFill/>
+                </a:ln>
+                <a:solidFill>
+                  <a:srgbClr val="000000"/>
+                </a:solidFill>
+                <a:effectLst/>
+                <a:uLnTx/>
+                <a:uFillTx/>
                 <a:latin typeface="Calibri" panose="020F0502020204030204" pitchFamily="34" charset="0"/>
+                <a:ea typeface="ＭＳ Ｐゴシック" panose="020B0600070205080204" pitchFamily="34" charset="-128"/>
                 <a:cs typeface="Calibri" panose="020F0502020204030204" pitchFamily="34" charset="0"/>
               </a:rPr>
               <a:t>SDIO</a:t>
@@ -26706,10 +27060,10 @@
       </p:sp>
       <p:sp>
         <p:nvSpPr>
-          <p:cNvPr id="46" name="TextBox 45">
+          <p:cNvPr id="160" name="TextBox 159">
             <a:extLst>
               <a:ext uri="{FF2B5EF4-FFF2-40B4-BE49-F238E27FC236}">
-                <a16:creationId xmlns:a16="http://schemas.microsoft.com/office/drawing/2014/main" id="{B99FA971-C681-3761-D235-634274CE50FF}"/>
+                <a16:creationId xmlns:a16="http://schemas.microsoft.com/office/drawing/2014/main" id="{13A5066E-14F6-6877-A2E7-B253DD3BD5DA}"/>
               </a:ext>
             </a:extLst>
           </p:cNvPr>
@@ -26718,7 +27072,7 @@
         </p:nvSpPr>
         <p:spPr bwMode="auto">
           <a:xfrm>
-            <a:off x="4341152" y="2574820"/>
+            <a:off x="6289664" y="5028051"/>
             <a:ext cx="900000" cy="432000"/>
           </a:xfrm>
           <a:prstGeom prst="rect">
@@ -26732,29 +27086,77 @@
           </a:ln>
         </p:spPr>
         <p:txBody>
-          <a:bodyPr wrap="square" rIns="144000">
+          <a:bodyPr wrap="square" rIns="144000" anchor="ctr">
             <a:spAutoFit/>
           </a:bodyPr>
           <a:lstStyle/>
           <a:p>
-            <a:pPr algn="ctr">
+            <a:pPr marL="0" marR="0" lvl="0" indent="0" algn="ctr" defTabSz="914400" eaLnBrk="0" fontAlgn="base" latinLnBrk="0" hangingPunct="0">
+              <a:lnSpc>
+                <a:spcPct val="100000"/>
+              </a:lnSpc>
+              <a:spcBef>
+                <a:spcPct val="0"/>
+              </a:spcBef>
+              <a:spcAft>
+                <a:spcPct val="0"/>
+              </a:spcAft>
+              <a:buClrTx/>
+              <a:buSzTx/>
+              <a:buFontTx/>
+              <a:buNone/>
+              <a:tabLst/>
               <a:defRPr/>
             </a:pPr>
             <a:r>
-              <a:rPr lang="en-US" sz="1400">
+              <a:rPr kumimoji="0" lang="en-US" sz="1400" b="0" i="0" u="none" strike="noStrike" kern="0" cap="none" spc="0" normalizeH="0" baseline="0" noProof="0" dirty="0">
+                <a:ln>
+                  <a:noFill/>
+                </a:ln>
+                <a:solidFill>
+                  <a:srgbClr val="000000"/>
+                </a:solidFill>
+                <a:effectLst/>
+                <a:uLnTx/>
+                <a:uFillTx/>
                 <a:latin typeface="Calibri" panose="020F0502020204030204" pitchFamily="34" charset="0"/>
+                <a:ea typeface="ＭＳ Ｐゴシック" panose="020B0600070205080204" pitchFamily="34" charset="-128"/>
                 <a:cs typeface="Calibri" panose="020F0502020204030204" pitchFamily="34" charset="0"/>
               </a:rPr>
               <a:t>Ethernet </a:t>
             </a:r>
           </a:p>
           <a:p>
-            <a:pPr algn="ctr">
+            <a:pPr marL="0" marR="0" lvl="0" indent="0" algn="ctr" defTabSz="914400" eaLnBrk="0" fontAlgn="base" latinLnBrk="0" hangingPunct="0">
+              <a:lnSpc>
+                <a:spcPct val="100000"/>
+              </a:lnSpc>
+              <a:spcBef>
+                <a:spcPct val="0"/>
+              </a:spcBef>
+              <a:spcAft>
+                <a:spcPct val="0"/>
+              </a:spcAft>
+              <a:buClrTx/>
+              <a:buSzTx/>
+              <a:buFontTx/>
+              <a:buNone/>
+              <a:tabLst/>
               <a:defRPr/>
             </a:pPr>
             <a:r>
-              <a:rPr lang="en-US" sz="800">
+              <a:rPr kumimoji="0" lang="en-US" sz="800" b="0" i="0" u="none" strike="noStrike" kern="0" cap="none" spc="0" normalizeH="0" baseline="0" noProof="0" dirty="0">
+                <a:ln>
+                  <a:noFill/>
+                </a:ln>
+                <a:solidFill>
+                  <a:srgbClr val="000000"/>
+                </a:solidFill>
+                <a:effectLst/>
+                <a:uLnTx/>
+                <a:uFillTx/>
                 <a:latin typeface="Calibri" panose="020F0502020204030204" pitchFamily="34" charset="0"/>
+                <a:ea typeface="ＭＳ Ｐゴシック" panose="020B0600070205080204" pitchFamily="34" charset="-128"/>
                 <a:cs typeface="Calibri" panose="020F0502020204030204" pitchFamily="34" charset="0"/>
               </a:rPr>
               <a:t>MAC</a:t>
@@ -26764,10 +27166,10 @@
       </p:sp>
       <p:sp>
         <p:nvSpPr>
-          <p:cNvPr id="48" name="TextBox 47">
+          <p:cNvPr id="161" name="TextBox 160">
             <a:extLst>
               <a:ext uri="{FF2B5EF4-FFF2-40B4-BE49-F238E27FC236}">
-                <a16:creationId xmlns:a16="http://schemas.microsoft.com/office/drawing/2014/main" id="{954240A7-F516-02FD-EE0C-441FDDC13BEB}"/>
+                <a16:creationId xmlns:a16="http://schemas.microsoft.com/office/drawing/2014/main" id="{A3EF2645-F36F-ECE7-5C00-993AD532EFEA}"/>
               </a:ext>
             </a:extLst>
           </p:cNvPr>
@@ -26776,8 +27178,8 @@
         </p:nvSpPr>
         <p:spPr bwMode="auto">
           <a:xfrm>
-            <a:off x="6961310" y="2575377"/>
-            <a:ext cx="684000" cy="430887"/>
+            <a:off x="8909822" y="5028609"/>
+            <a:ext cx="684000" cy="429774"/>
           </a:xfrm>
           <a:prstGeom prst="rect">
             <a:avLst/>
@@ -26790,46 +27192,68 @@
           </a:ln>
         </p:spPr>
         <p:txBody>
-          <a:bodyPr rIns="144000">
-            <a:spAutoFit/>
+          <a:bodyPr rIns="144000" anchor="ctr">
+            <a:noAutofit/>
           </a:bodyPr>
           <a:lstStyle/>
           <a:p>
-            <a:pPr algn="ctr">
+            <a:pPr marL="0" marR="0" lvl="0" indent="0" algn="ctr" defTabSz="914400" eaLnBrk="0" fontAlgn="base" latinLnBrk="0" hangingPunct="0">
+              <a:lnSpc>
+                <a:spcPct val="100000"/>
+              </a:lnSpc>
+              <a:spcBef>
+                <a:spcPct val="0"/>
+              </a:spcBef>
+              <a:spcAft>
+                <a:spcPct val="0"/>
+              </a:spcAft>
+              <a:buClrTx/>
+              <a:buSzTx/>
+              <a:buFontTx/>
+              <a:buNone/>
+              <a:tabLst/>
               <a:defRPr/>
             </a:pPr>
             <a:r>
-              <a:rPr lang="en-US" sz="1400">
+              <a:rPr kumimoji="0" lang="en-US" sz="1400" b="0" i="0" u="none" strike="noStrike" kern="0" cap="none" spc="0" normalizeH="0" baseline="0" noProof="0" dirty="0">
+                <a:ln>
+                  <a:noFill/>
+                </a:ln>
+                <a:solidFill>
+                  <a:srgbClr val="000000"/>
+                </a:solidFill>
+                <a:effectLst/>
+                <a:uLnTx/>
+                <a:uFillTx/>
                 <a:latin typeface="Calibri" panose="020F0502020204030204" pitchFamily="34" charset="0"/>
+                <a:ea typeface="ＭＳ Ｐゴシック" panose="020B0600070205080204" pitchFamily="34" charset="-128"/>
                 <a:cs typeface="Calibri" panose="020F0502020204030204" pitchFamily="34" charset="0"/>
               </a:rPr>
               <a:t>CAN</a:t>
             </a:r>
-            <a:endParaRPr lang="en-US" sz="1200">
+            <a:endParaRPr kumimoji="0" lang="en-US" sz="1200" b="0" i="0" u="none" strike="noStrike" kern="0" cap="none" spc="0" normalizeH="0" baseline="0" noProof="0" dirty="0">
+              <a:ln>
+                <a:noFill/>
+              </a:ln>
+              <a:solidFill>
+                <a:srgbClr val="000000"/>
+              </a:solidFill>
+              <a:effectLst/>
+              <a:uLnTx/>
+              <a:uFillTx/>
               <a:latin typeface="Calibri" panose="020F0502020204030204" pitchFamily="34" charset="0"/>
+              <a:ea typeface="ＭＳ Ｐゴシック" panose="020B0600070205080204" pitchFamily="34" charset="-128"/>
               <a:cs typeface="Calibri" panose="020F0502020204030204" pitchFamily="34" charset="0"/>
             </a:endParaRPr>
           </a:p>
-          <a:p>
-            <a:pPr algn="ctr">
-              <a:defRPr/>
-            </a:pPr>
-            <a:r>
-              <a:rPr lang="en-US" sz="800">
-                <a:latin typeface="Calibri" panose="020F0502020204030204" pitchFamily="34" charset="0"/>
-                <a:cs typeface="Calibri" panose="020F0502020204030204" pitchFamily="34" charset="0"/>
-              </a:rPr>
-              <a:t>Controller</a:t>
-            </a:r>
-          </a:p>
-        </p:txBody>
-      </p:sp>
-      <p:sp>
-        <p:nvSpPr>
-          <p:cNvPr id="50" name="TextBox 49">
+        </p:txBody>
+      </p:sp>
+      <p:sp>
+        <p:nvSpPr>
+          <p:cNvPr id="162" name="TextBox 161">
             <a:extLst>
               <a:ext uri="{FF2B5EF4-FFF2-40B4-BE49-F238E27FC236}">
-                <a16:creationId xmlns:a16="http://schemas.microsoft.com/office/drawing/2014/main" id="{A9544A76-DCFB-CF21-3A4D-28517AEB91B5}"/>
+                <a16:creationId xmlns:a16="http://schemas.microsoft.com/office/drawing/2014/main" id="{46E5CFB6-3041-A5EF-B953-D4AEA337D8C8}"/>
               </a:ext>
             </a:extLst>
           </p:cNvPr>
@@ -26838,7 +27262,7 @@
         </p:nvSpPr>
         <p:spPr bwMode="auto">
           <a:xfrm>
-            <a:off x="1673170" y="2574820"/>
+            <a:off x="3621682" y="5028051"/>
             <a:ext cx="684000" cy="432000"/>
           </a:xfrm>
           <a:prstGeom prst="rect">
@@ -26857,12 +27281,36 @@
           </a:bodyPr>
           <a:lstStyle/>
           <a:p>
-            <a:pPr algn="ctr">
+            <a:pPr marL="0" marR="0" lvl="0" indent="0" algn="ctr" defTabSz="914400" eaLnBrk="0" fontAlgn="base" latinLnBrk="0" hangingPunct="0">
+              <a:lnSpc>
+                <a:spcPct val="100000"/>
+              </a:lnSpc>
+              <a:spcBef>
+                <a:spcPct val="0"/>
+              </a:spcBef>
+              <a:spcAft>
+                <a:spcPct val="0"/>
+              </a:spcAft>
+              <a:buClrTx/>
+              <a:buSzTx/>
+              <a:buFontTx/>
+              <a:buNone/>
+              <a:tabLst/>
               <a:defRPr/>
             </a:pPr>
             <a:r>
-              <a:rPr lang="en-US" sz="1200">
+              <a:rPr kumimoji="0" lang="en-US" sz="1400" b="0" i="0" u="none" strike="noStrike" kern="0" cap="none" spc="0" normalizeH="0" baseline="0" noProof="0" dirty="0">
+                <a:ln>
+                  <a:noFill/>
+                </a:ln>
+                <a:solidFill>
+                  <a:srgbClr val="000000"/>
+                </a:solidFill>
+                <a:effectLst/>
+                <a:uLnTx/>
+                <a:uFillTx/>
                 <a:latin typeface="Calibri" panose="020F0502020204030204" pitchFamily="34" charset="0"/>
+                <a:ea typeface="ＭＳ Ｐゴシック" panose="020B0600070205080204" pitchFamily="34" charset="-128"/>
                 <a:cs typeface="Calibri" panose="020F0502020204030204" pitchFamily="34" charset="0"/>
               </a:rPr>
               <a:t>GPIO</a:t>
@@ -26872,10 +27320,10 @@
       </p:sp>
       <p:sp>
         <p:nvSpPr>
-          <p:cNvPr id="57" name="TextBox 56">
+          <p:cNvPr id="163" name="TextBox 162">
             <a:extLst>
               <a:ext uri="{FF2B5EF4-FFF2-40B4-BE49-F238E27FC236}">
-                <a16:creationId xmlns:a16="http://schemas.microsoft.com/office/drawing/2014/main" id="{6B2236CF-A36D-BE96-08FB-C8F5B6D97541}"/>
+                <a16:creationId xmlns:a16="http://schemas.microsoft.com/office/drawing/2014/main" id="{A7554A01-1070-B205-E822-27AFA1DB2537}"/>
               </a:ext>
             </a:extLst>
           </p:cNvPr>
@@ -26884,7 +27332,7 @@
         </p:nvSpPr>
         <p:spPr bwMode="auto">
           <a:xfrm>
-            <a:off x="3397061" y="3222459"/>
+            <a:off x="5345574" y="5675691"/>
             <a:ext cx="889173" cy="276999"/>
           </a:xfrm>
           <a:prstGeom prst="rect">
@@ -26901,12 +27349,36 @@
           </a:bodyPr>
           <a:lstStyle/>
           <a:p>
-            <a:pPr algn="ctr">
+            <a:pPr marL="0" marR="0" lvl="0" indent="0" algn="ctr" defTabSz="914400" eaLnBrk="0" fontAlgn="base" latinLnBrk="0" hangingPunct="0">
+              <a:lnSpc>
+                <a:spcPct val="100000"/>
+              </a:lnSpc>
+              <a:spcBef>
+                <a:spcPct val="0"/>
+              </a:spcBef>
+              <a:spcAft>
+                <a:spcPct val="0"/>
+              </a:spcAft>
+              <a:buClrTx/>
+              <a:buSzTx/>
+              <a:buFontTx/>
+              <a:buNone/>
+              <a:tabLst/>
               <a:defRPr/>
             </a:pPr>
             <a:r>
-              <a:rPr lang="en-US" sz="1200">
+              <a:rPr kumimoji="0" lang="en-US" sz="1200" b="0" i="0" u="none" strike="noStrike" kern="0" cap="none" spc="0" normalizeH="0" baseline="0" noProof="0">
+                <a:ln>
+                  <a:noFill/>
+                </a:ln>
+                <a:solidFill>
+                  <a:srgbClr val="000000"/>
+                </a:solidFill>
+                <a:effectLst/>
+                <a:uLnTx/>
+                <a:uFillTx/>
                 <a:latin typeface="Calibri" panose="020F0502020204030204" pitchFamily="34" charset="0"/>
+                <a:ea typeface="ＭＳ Ｐゴシック" panose="020B0600070205080204" pitchFamily="34" charset="-128"/>
                 <a:cs typeface="Calibri" panose="020F0502020204030204" pitchFamily="34" charset="0"/>
               </a:rPr>
               <a:t>Ethernet</a:t>
@@ -26916,10 +27388,10 @@
       </p:sp>
       <p:grpSp>
         <p:nvGrpSpPr>
-          <p:cNvPr id="90" name="Group 89">
+          <p:cNvPr id="164" name="Group 163">
             <a:extLst>
               <a:ext uri="{FF2B5EF4-FFF2-40B4-BE49-F238E27FC236}">
-                <a16:creationId xmlns:a16="http://schemas.microsoft.com/office/drawing/2014/main" id="{F1A78D8F-C949-B6DA-3067-66A5BD8A7C08}"/>
+                <a16:creationId xmlns:a16="http://schemas.microsoft.com/office/drawing/2014/main" id="{DB8DA5C5-8E26-82A2-4736-E1920FD95E06}"/>
               </a:ext>
             </a:extLst>
           </p:cNvPr>
@@ -26928,7 +27400,7 @@
         </p:nvGrpSpPr>
         <p:grpSpPr>
           <a:xfrm rot="16200000">
-            <a:off x="2804957" y="3007478"/>
+            <a:off x="4753469" y="5460709"/>
             <a:ext cx="144462" cy="258762"/>
             <a:chOff x="4487395" y="5226823"/>
             <a:chExt cx="144462" cy="258762"/>
@@ -26936,10 +27408,10 @@
         </p:grpSpPr>
         <p:sp>
           <p:nvSpPr>
-            <p:cNvPr id="91" name="Rectangle 90">
+            <p:cNvPr id="196" name="Rectangle 195">
               <a:extLst>
                 <a:ext uri="{FF2B5EF4-FFF2-40B4-BE49-F238E27FC236}">
-                  <a16:creationId xmlns:a16="http://schemas.microsoft.com/office/drawing/2014/main" id="{1F97BE2F-0A38-795E-B10E-D7BD927CE8E2}"/>
+                  <a16:creationId xmlns:a16="http://schemas.microsoft.com/office/drawing/2014/main" id="{4C4D8AE2-4530-5C34-6753-07887D952A12}"/>
                 </a:ext>
               </a:extLst>
             </p:cNvPr>
@@ -26955,38 +27427,48 @@
               <a:avLst/>
             </a:prstGeom>
             <a:noFill/>
-            <a:ln w="19050">
+            <a:ln w="19050" cap="flat" cmpd="sng" algn="ctr">
               <a:solidFill>
-                <a:schemeClr val="tx1"/>
+                <a:srgbClr val="000000"/>
               </a:solidFill>
+              <a:prstDash val="solid"/>
               <a:miter lim="800000"/>
             </a:ln>
+            <a:effectLst/>
           </p:spPr>
-          <p:style>
-            <a:lnRef idx="2">
-              <a:schemeClr val="accent1">
-                <a:shade val="50000"/>
-              </a:schemeClr>
-            </a:lnRef>
-            <a:fillRef idx="1">
-              <a:schemeClr val="accent1"/>
-            </a:fillRef>
-            <a:effectRef idx="0">
-              <a:schemeClr val="accent1"/>
-            </a:effectRef>
-            <a:fontRef idx="minor">
-              <a:schemeClr val="lt1"/>
-            </a:fontRef>
-          </p:style>
           <p:txBody>
             <a:bodyPr anchor="ctr"/>
             <a:lstStyle/>
             <a:p>
-              <a:pPr algn="ctr">
+              <a:pPr marL="0" marR="0" lvl="0" indent="0" algn="ctr" defTabSz="914400" eaLnBrk="0" fontAlgn="base" latinLnBrk="0" hangingPunct="0">
+                <a:lnSpc>
+                  <a:spcPct val="100000"/>
+                </a:lnSpc>
+                <a:spcBef>
+                  <a:spcPct val="0"/>
+                </a:spcBef>
+                <a:spcAft>
+                  <a:spcPct val="0"/>
+                </a:spcAft>
+                <a:buClrTx/>
+                <a:buSzTx/>
+                <a:buFontTx/>
+                <a:buNone/>
+                <a:tabLst/>
                 <a:defRPr/>
               </a:pPr>
-              <a:endParaRPr lang="en-US">
+              <a:endParaRPr kumimoji="0" lang="en-US" sz="1800" b="0" i="0" u="none" strike="noStrike" kern="0" cap="none" spc="0" normalizeH="0" baseline="0" noProof="0">
+                <a:ln>
+                  <a:noFill/>
+                </a:ln>
+                <a:solidFill>
+                  <a:srgbClr val="FFFFFF"/>
+                </a:solidFill>
+                <a:effectLst/>
+                <a:uLnTx/>
+                <a:uFillTx/>
                 <a:latin typeface="Calibri" panose="020F0502020204030204" pitchFamily="34" charset="0"/>
+                <a:ea typeface="+mn-ea"/>
                 <a:cs typeface="Calibri" panose="020F0502020204030204" pitchFamily="34" charset="0"/>
               </a:endParaRPr>
             </a:p>
@@ -26994,10 +27476,10 @@
         </p:sp>
         <p:cxnSp>
           <p:nvCxnSpPr>
-            <p:cNvPr id="92" name="Straight Connector 91">
+            <p:cNvPr id="197" name="Straight Connector 196">
               <a:extLst>
                 <a:ext uri="{FF2B5EF4-FFF2-40B4-BE49-F238E27FC236}">
-                  <a16:creationId xmlns:a16="http://schemas.microsoft.com/office/drawing/2014/main" id="{4556D3C8-ED00-B186-61F6-7485F7AABA67}"/>
+                  <a16:creationId xmlns:a16="http://schemas.microsoft.com/office/drawing/2014/main" id="{03FF1D1E-9EBA-1787-E4A9-A31EC6AD5AF8}"/>
                 </a:ext>
               </a:extLst>
             </p:cNvPr>
@@ -27012,34 +27494,23 @@
             <a:prstGeom prst="line">
               <a:avLst/>
             </a:prstGeom>
-            <a:ln w="22225">
+            <a:noFill/>
+            <a:ln w="22225" cap="flat" cmpd="sng" algn="ctr">
               <a:solidFill>
-                <a:schemeClr val="tx1"/>
+                <a:srgbClr val="000000"/>
               </a:solidFill>
+              <a:prstDash val="solid"/>
               <a:miter lim="800000"/>
             </a:ln>
+            <a:effectLst/>
           </p:spPr>
-          <p:style>
-            <a:lnRef idx="1">
-              <a:schemeClr val="accent1"/>
-            </a:lnRef>
-            <a:fillRef idx="0">
-              <a:schemeClr val="accent1"/>
-            </a:fillRef>
-            <a:effectRef idx="0">
-              <a:schemeClr val="accent1"/>
-            </a:effectRef>
-            <a:fontRef idx="minor">
-              <a:schemeClr val="tx1"/>
-            </a:fontRef>
-          </p:style>
         </p:cxnSp>
         <p:cxnSp>
           <p:nvCxnSpPr>
-            <p:cNvPr id="93" name="Straight Connector 92">
+            <p:cNvPr id="198" name="Straight Connector 197">
               <a:extLst>
                 <a:ext uri="{FF2B5EF4-FFF2-40B4-BE49-F238E27FC236}">
-                  <a16:creationId xmlns:a16="http://schemas.microsoft.com/office/drawing/2014/main" id="{DD8B9B86-D03D-0097-D684-855BA0673508}"/>
+                  <a16:creationId xmlns:a16="http://schemas.microsoft.com/office/drawing/2014/main" id="{B62F4950-43ED-D67D-6AFA-643F3E19BAFA}"/>
                 </a:ext>
               </a:extLst>
             </p:cNvPr>
@@ -27054,35 +27525,24 @@
             <a:prstGeom prst="line">
               <a:avLst/>
             </a:prstGeom>
-            <a:ln w="22225">
+            <a:noFill/>
+            <a:ln w="22225" cap="flat" cmpd="sng" algn="ctr">
               <a:solidFill>
-                <a:schemeClr val="tx1"/>
+                <a:srgbClr val="000000"/>
               </a:solidFill>
+              <a:prstDash val="solid"/>
               <a:miter lim="800000"/>
             </a:ln>
+            <a:effectLst/>
           </p:spPr>
-          <p:style>
-            <a:lnRef idx="1">
-              <a:schemeClr val="accent1"/>
-            </a:lnRef>
-            <a:fillRef idx="0">
-              <a:schemeClr val="accent1"/>
-            </a:fillRef>
-            <a:effectRef idx="0">
-              <a:schemeClr val="accent1"/>
-            </a:effectRef>
-            <a:fontRef idx="minor">
-              <a:schemeClr val="tx1"/>
-            </a:fontRef>
-          </p:style>
         </p:cxnSp>
       </p:grpSp>
       <p:grpSp>
         <p:nvGrpSpPr>
-          <p:cNvPr id="96" name="Group 95">
+          <p:cNvPr id="165" name="Group 164">
             <a:extLst>
               <a:ext uri="{FF2B5EF4-FFF2-40B4-BE49-F238E27FC236}">
-                <a16:creationId xmlns:a16="http://schemas.microsoft.com/office/drawing/2014/main" id="{E3407391-5E34-A2BE-0A64-5DE6EF1AA551}"/>
+                <a16:creationId xmlns:a16="http://schemas.microsoft.com/office/drawing/2014/main" id="{0BCCE2F2-181C-2713-D173-DB5E1443E30B}"/>
               </a:ext>
             </a:extLst>
           </p:cNvPr>
@@ -27091,7 +27551,7 @@
         </p:nvGrpSpPr>
         <p:grpSpPr>
           <a:xfrm rot="16200000">
-            <a:off x="2304510" y="3006501"/>
+            <a:off x="3887264" y="5467913"/>
             <a:ext cx="146927" cy="263178"/>
             <a:chOff x="4487395" y="5226823"/>
             <a:chExt cx="144462" cy="258762"/>
@@ -27099,10 +27559,10 @@
         </p:grpSpPr>
         <p:sp>
           <p:nvSpPr>
-            <p:cNvPr id="97" name="Rectangle 96">
+            <p:cNvPr id="193" name="Rectangle 192">
               <a:extLst>
                 <a:ext uri="{FF2B5EF4-FFF2-40B4-BE49-F238E27FC236}">
-                  <a16:creationId xmlns:a16="http://schemas.microsoft.com/office/drawing/2014/main" id="{DCA4F15F-E4A5-A7FD-1D7B-4DC764249AA6}"/>
+                  <a16:creationId xmlns:a16="http://schemas.microsoft.com/office/drawing/2014/main" id="{E483B1C2-0756-B6E5-F459-93ABF47CD127}"/>
                 </a:ext>
               </a:extLst>
             </p:cNvPr>
@@ -27118,38 +27578,48 @@
               <a:avLst/>
             </a:prstGeom>
             <a:noFill/>
-            <a:ln w="19050">
+            <a:ln w="19050" cap="flat" cmpd="sng" algn="ctr">
               <a:solidFill>
-                <a:schemeClr val="tx1"/>
+                <a:srgbClr val="000000"/>
               </a:solidFill>
+              <a:prstDash val="solid"/>
               <a:miter lim="800000"/>
             </a:ln>
+            <a:effectLst/>
           </p:spPr>
-          <p:style>
-            <a:lnRef idx="2">
-              <a:schemeClr val="accent1">
-                <a:shade val="50000"/>
-              </a:schemeClr>
-            </a:lnRef>
-            <a:fillRef idx="1">
-              <a:schemeClr val="accent1"/>
-            </a:fillRef>
-            <a:effectRef idx="0">
-              <a:schemeClr val="accent1"/>
-            </a:effectRef>
-            <a:fontRef idx="minor">
-              <a:schemeClr val="lt1"/>
-            </a:fontRef>
-          </p:style>
           <p:txBody>
             <a:bodyPr anchor="ctr"/>
             <a:lstStyle/>
             <a:p>
-              <a:pPr algn="ctr">
+              <a:pPr marL="0" marR="0" lvl="0" indent="0" algn="ctr" defTabSz="914400" eaLnBrk="0" fontAlgn="base" latinLnBrk="0" hangingPunct="0">
+                <a:lnSpc>
+                  <a:spcPct val="100000"/>
+                </a:lnSpc>
+                <a:spcBef>
+                  <a:spcPct val="0"/>
+                </a:spcBef>
+                <a:spcAft>
+                  <a:spcPct val="0"/>
+                </a:spcAft>
+                <a:buClrTx/>
+                <a:buSzTx/>
+                <a:buFontTx/>
+                <a:buNone/>
+                <a:tabLst/>
                 <a:defRPr/>
               </a:pPr>
-              <a:endParaRPr lang="en-US">
+              <a:endParaRPr kumimoji="0" lang="en-US" sz="1800" b="0" i="0" u="none" strike="noStrike" kern="0" cap="none" spc="0" normalizeH="0" baseline="0" noProof="0">
+                <a:ln>
+                  <a:noFill/>
+                </a:ln>
+                <a:solidFill>
+                  <a:srgbClr val="FFFFFF"/>
+                </a:solidFill>
+                <a:effectLst/>
+                <a:uLnTx/>
+                <a:uFillTx/>
                 <a:latin typeface="Calibri" panose="020F0502020204030204" pitchFamily="34" charset="0"/>
+                <a:ea typeface="+mn-ea"/>
                 <a:cs typeface="Calibri" panose="020F0502020204030204" pitchFamily="34" charset="0"/>
               </a:endParaRPr>
             </a:p>
@@ -27157,10 +27627,10 @@
         </p:sp>
         <p:cxnSp>
           <p:nvCxnSpPr>
-            <p:cNvPr id="98" name="Straight Connector 97">
+            <p:cNvPr id="194" name="Straight Connector 193">
               <a:extLst>
                 <a:ext uri="{FF2B5EF4-FFF2-40B4-BE49-F238E27FC236}">
-                  <a16:creationId xmlns:a16="http://schemas.microsoft.com/office/drawing/2014/main" id="{BA756DA3-37E3-A228-170C-C484559D65AA}"/>
+                  <a16:creationId xmlns:a16="http://schemas.microsoft.com/office/drawing/2014/main" id="{E55C106F-0F06-9075-662B-D32E020FB4C9}"/>
                 </a:ext>
               </a:extLst>
             </p:cNvPr>
@@ -27175,34 +27645,23 @@
             <a:prstGeom prst="line">
               <a:avLst/>
             </a:prstGeom>
-            <a:ln w="22225">
+            <a:noFill/>
+            <a:ln w="22225" cap="flat" cmpd="sng" algn="ctr">
               <a:solidFill>
-                <a:schemeClr val="tx1"/>
+                <a:srgbClr val="000000"/>
               </a:solidFill>
+              <a:prstDash val="solid"/>
               <a:miter lim="800000"/>
             </a:ln>
+            <a:effectLst/>
           </p:spPr>
-          <p:style>
-            <a:lnRef idx="1">
-              <a:schemeClr val="accent1"/>
-            </a:lnRef>
-            <a:fillRef idx="0">
-              <a:schemeClr val="accent1"/>
-            </a:fillRef>
-            <a:effectRef idx="0">
-              <a:schemeClr val="accent1"/>
-            </a:effectRef>
-            <a:fontRef idx="minor">
-              <a:schemeClr val="tx1"/>
-            </a:fontRef>
-          </p:style>
         </p:cxnSp>
         <p:cxnSp>
           <p:nvCxnSpPr>
-            <p:cNvPr id="99" name="Straight Connector 98">
+            <p:cNvPr id="195" name="Straight Connector 194">
               <a:extLst>
                 <a:ext uri="{FF2B5EF4-FFF2-40B4-BE49-F238E27FC236}">
-                  <a16:creationId xmlns:a16="http://schemas.microsoft.com/office/drawing/2014/main" id="{E83D4ED0-54FC-D579-9828-0054FDCA9CA0}"/>
+                  <a16:creationId xmlns:a16="http://schemas.microsoft.com/office/drawing/2014/main" id="{A54BBC69-C6C9-4715-1231-06D6F3D2C011}"/>
                 </a:ext>
               </a:extLst>
             </p:cNvPr>
@@ -27217,35 +27676,24 @@
             <a:prstGeom prst="line">
               <a:avLst/>
             </a:prstGeom>
-            <a:ln w="22225">
+            <a:noFill/>
+            <a:ln w="22225" cap="flat" cmpd="sng" algn="ctr">
               <a:solidFill>
-                <a:schemeClr val="tx1"/>
+                <a:srgbClr val="000000"/>
               </a:solidFill>
+              <a:prstDash val="solid"/>
               <a:miter lim="800000"/>
             </a:ln>
+            <a:effectLst/>
           </p:spPr>
-          <p:style>
-            <a:lnRef idx="1">
-              <a:schemeClr val="accent1"/>
-            </a:lnRef>
-            <a:fillRef idx="0">
-              <a:schemeClr val="accent1"/>
-            </a:fillRef>
-            <a:effectRef idx="0">
-              <a:schemeClr val="accent1"/>
-            </a:effectRef>
-            <a:fontRef idx="minor">
-              <a:schemeClr val="tx1"/>
-            </a:fontRef>
-          </p:style>
         </p:cxnSp>
       </p:grpSp>
       <p:grpSp>
         <p:nvGrpSpPr>
-          <p:cNvPr id="104" name="Group 103">
+          <p:cNvPr id="166" name="Group 165">
             <a:extLst>
               <a:ext uri="{FF2B5EF4-FFF2-40B4-BE49-F238E27FC236}">
-                <a16:creationId xmlns:a16="http://schemas.microsoft.com/office/drawing/2014/main" id="{865FEF0D-0E58-7B02-06DF-A85EC9DDAF85}"/>
+                <a16:creationId xmlns:a16="http://schemas.microsoft.com/office/drawing/2014/main" id="{E43C6A9A-7010-EC82-A77B-7431D6887B47}"/>
               </a:ext>
             </a:extLst>
           </p:cNvPr>
@@ -27254,7 +27702,7 @@
         </p:nvGrpSpPr>
         <p:grpSpPr>
           <a:xfrm rot="16200000">
-            <a:off x="3764006" y="3007477"/>
+            <a:off x="5712518" y="5460708"/>
             <a:ext cx="144462" cy="258762"/>
             <a:chOff x="4487395" y="5226823"/>
             <a:chExt cx="144462" cy="258762"/>
@@ -27262,10 +27710,10 @@
         </p:grpSpPr>
         <p:sp>
           <p:nvSpPr>
-            <p:cNvPr id="105" name="Rectangle 104">
+            <p:cNvPr id="190" name="Rectangle 189">
               <a:extLst>
                 <a:ext uri="{FF2B5EF4-FFF2-40B4-BE49-F238E27FC236}">
-                  <a16:creationId xmlns:a16="http://schemas.microsoft.com/office/drawing/2014/main" id="{5CDAB0D0-02E0-42C6-1313-ED00A9B64999}"/>
+                  <a16:creationId xmlns:a16="http://schemas.microsoft.com/office/drawing/2014/main" id="{7BD356C8-2139-8E93-62B4-552BA48D9DF3}"/>
                 </a:ext>
               </a:extLst>
             </p:cNvPr>
@@ -27281,38 +27729,48 @@
               <a:avLst/>
             </a:prstGeom>
             <a:noFill/>
-            <a:ln w="19050">
+            <a:ln w="19050" cap="flat" cmpd="sng" algn="ctr">
               <a:solidFill>
-                <a:schemeClr val="tx1"/>
+                <a:srgbClr val="000000"/>
               </a:solidFill>
+              <a:prstDash val="solid"/>
               <a:miter lim="800000"/>
             </a:ln>
+            <a:effectLst/>
           </p:spPr>
-          <p:style>
-            <a:lnRef idx="2">
-              <a:schemeClr val="accent1">
-                <a:shade val="50000"/>
-              </a:schemeClr>
-            </a:lnRef>
-            <a:fillRef idx="1">
-              <a:schemeClr val="accent1"/>
-            </a:fillRef>
-            <a:effectRef idx="0">
-              <a:schemeClr val="accent1"/>
-            </a:effectRef>
-            <a:fontRef idx="minor">
-              <a:schemeClr val="lt1"/>
-            </a:fontRef>
-          </p:style>
           <p:txBody>
             <a:bodyPr anchor="ctr"/>
             <a:lstStyle/>
             <a:p>
-              <a:pPr algn="ctr">
+              <a:pPr marL="0" marR="0" lvl="0" indent="0" algn="ctr" defTabSz="914400" eaLnBrk="0" fontAlgn="base" latinLnBrk="0" hangingPunct="0">
+                <a:lnSpc>
+                  <a:spcPct val="100000"/>
+                </a:lnSpc>
+                <a:spcBef>
+                  <a:spcPct val="0"/>
+                </a:spcBef>
+                <a:spcAft>
+                  <a:spcPct val="0"/>
+                </a:spcAft>
+                <a:buClrTx/>
+                <a:buSzTx/>
+                <a:buFontTx/>
+                <a:buNone/>
+                <a:tabLst/>
                 <a:defRPr/>
               </a:pPr>
-              <a:endParaRPr lang="en-US">
+              <a:endParaRPr kumimoji="0" lang="en-US" sz="1800" b="0" i="0" u="none" strike="noStrike" kern="0" cap="none" spc="0" normalizeH="0" baseline="0" noProof="0">
+                <a:ln>
+                  <a:noFill/>
+                </a:ln>
+                <a:solidFill>
+                  <a:srgbClr val="FFFFFF"/>
+                </a:solidFill>
+                <a:effectLst/>
+                <a:uLnTx/>
+                <a:uFillTx/>
                 <a:latin typeface="Calibri" panose="020F0502020204030204" pitchFamily="34" charset="0"/>
+                <a:ea typeface="+mn-ea"/>
                 <a:cs typeface="Calibri" panose="020F0502020204030204" pitchFamily="34" charset="0"/>
               </a:endParaRPr>
             </a:p>
@@ -27320,10 +27778,10 @@
         </p:sp>
         <p:cxnSp>
           <p:nvCxnSpPr>
-            <p:cNvPr id="106" name="Straight Connector 105">
+            <p:cNvPr id="191" name="Straight Connector 190">
               <a:extLst>
                 <a:ext uri="{FF2B5EF4-FFF2-40B4-BE49-F238E27FC236}">
-                  <a16:creationId xmlns:a16="http://schemas.microsoft.com/office/drawing/2014/main" id="{B0A3F6E0-AA7C-7E6A-4160-6026D4DB06FE}"/>
+                  <a16:creationId xmlns:a16="http://schemas.microsoft.com/office/drawing/2014/main" id="{BA9F53E6-10C5-84E4-37A7-409D06A70C53}"/>
                 </a:ext>
               </a:extLst>
             </p:cNvPr>
@@ -27338,34 +27796,23 @@
             <a:prstGeom prst="line">
               <a:avLst/>
             </a:prstGeom>
-            <a:ln w="22225">
+            <a:noFill/>
+            <a:ln w="22225" cap="flat" cmpd="sng" algn="ctr">
               <a:solidFill>
-                <a:schemeClr val="tx1"/>
+                <a:srgbClr val="000000"/>
               </a:solidFill>
+              <a:prstDash val="solid"/>
               <a:miter lim="800000"/>
             </a:ln>
+            <a:effectLst/>
           </p:spPr>
-          <p:style>
-            <a:lnRef idx="1">
-              <a:schemeClr val="accent1"/>
-            </a:lnRef>
-            <a:fillRef idx="0">
-              <a:schemeClr val="accent1"/>
-            </a:fillRef>
-            <a:effectRef idx="0">
-              <a:schemeClr val="accent1"/>
-            </a:effectRef>
-            <a:fontRef idx="minor">
-              <a:schemeClr val="tx1"/>
-            </a:fontRef>
-          </p:style>
         </p:cxnSp>
         <p:cxnSp>
           <p:nvCxnSpPr>
-            <p:cNvPr id="107" name="Straight Connector 106">
+            <p:cNvPr id="192" name="Straight Connector 191">
               <a:extLst>
                 <a:ext uri="{FF2B5EF4-FFF2-40B4-BE49-F238E27FC236}">
-                  <a16:creationId xmlns:a16="http://schemas.microsoft.com/office/drawing/2014/main" id="{CABCF2C1-14F6-48DE-6779-ED70781E2A1A}"/>
+                  <a16:creationId xmlns:a16="http://schemas.microsoft.com/office/drawing/2014/main" id="{63D446CB-00BC-860B-EBC8-0EEF460DD8EF}"/>
                 </a:ext>
               </a:extLst>
             </p:cNvPr>
@@ -27380,35 +27827,24 @@
             <a:prstGeom prst="line">
               <a:avLst/>
             </a:prstGeom>
-            <a:ln w="22225">
+            <a:noFill/>
+            <a:ln w="22225" cap="flat" cmpd="sng" algn="ctr">
               <a:solidFill>
-                <a:schemeClr val="tx1"/>
+                <a:srgbClr val="000000"/>
               </a:solidFill>
+              <a:prstDash val="solid"/>
               <a:miter lim="800000"/>
             </a:ln>
+            <a:effectLst/>
           </p:spPr>
-          <p:style>
-            <a:lnRef idx="1">
-              <a:schemeClr val="accent1"/>
-            </a:lnRef>
-            <a:fillRef idx="0">
-              <a:schemeClr val="accent1"/>
-            </a:fillRef>
-            <a:effectRef idx="0">
-              <a:schemeClr val="accent1"/>
-            </a:effectRef>
-            <a:fontRef idx="minor">
-              <a:schemeClr val="tx1"/>
-            </a:fontRef>
-          </p:style>
         </p:cxnSp>
       </p:grpSp>
       <p:grpSp>
         <p:nvGrpSpPr>
-          <p:cNvPr id="116" name="Group 115">
+          <p:cNvPr id="167" name="Group 166">
             <a:extLst>
               <a:ext uri="{FF2B5EF4-FFF2-40B4-BE49-F238E27FC236}">
-                <a16:creationId xmlns:a16="http://schemas.microsoft.com/office/drawing/2014/main" id="{7539891F-F180-9891-1026-07D67E03B0C1}"/>
+                <a16:creationId xmlns:a16="http://schemas.microsoft.com/office/drawing/2014/main" id="{C77B66A6-14EC-7975-BA9D-8A9A9C7F8F49}"/>
               </a:ext>
             </a:extLst>
           </p:cNvPr>
@@ -27417,7 +27853,7 @@
         </p:nvGrpSpPr>
         <p:grpSpPr>
           <a:xfrm rot="16200000">
-            <a:off x="5655837" y="3007477"/>
+            <a:off x="7604349" y="5460708"/>
             <a:ext cx="144462" cy="258762"/>
             <a:chOff x="4487395" y="5226823"/>
             <a:chExt cx="144462" cy="258762"/>
@@ -27425,10 +27861,10 @@
         </p:grpSpPr>
         <p:sp>
           <p:nvSpPr>
-            <p:cNvPr id="117" name="Rectangle 116">
+            <p:cNvPr id="187" name="Rectangle 186">
               <a:extLst>
                 <a:ext uri="{FF2B5EF4-FFF2-40B4-BE49-F238E27FC236}">
-                  <a16:creationId xmlns:a16="http://schemas.microsoft.com/office/drawing/2014/main" id="{756CC32F-92A0-4CC3-DF8C-F8F3C08EB2BE}"/>
+                  <a16:creationId xmlns:a16="http://schemas.microsoft.com/office/drawing/2014/main" id="{63A0DAF3-04E2-E1C9-70DA-2B279B48B642}"/>
                 </a:ext>
               </a:extLst>
             </p:cNvPr>
@@ -27444,38 +27880,48 @@
               <a:avLst/>
             </a:prstGeom>
             <a:noFill/>
-            <a:ln w="19050">
+            <a:ln w="19050" cap="flat" cmpd="sng" algn="ctr">
               <a:solidFill>
-                <a:schemeClr val="tx1"/>
+                <a:srgbClr val="000000"/>
               </a:solidFill>
+              <a:prstDash val="solid"/>
               <a:miter lim="800000"/>
             </a:ln>
+            <a:effectLst/>
           </p:spPr>
-          <p:style>
-            <a:lnRef idx="2">
-              <a:schemeClr val="accent1">
-                <a:shade val="50000"/>
-              </a:schemeClr>
-            </a:lnRef>
-            <a:fillRef idx="1">
-              <a:schemeClr val="accent1"/>
-            </a:fillRef>
-            <a:effectRef idx="0">
-              <a:schemeClr val="accent1"/>
-            </a:effectRef>
-            <a:fontRef idx="minor">
-              <a:schemeClr val="lt1"/>
-            </a:fontRef>
-          </p:style>
           <p:txBody>
             <a:bodyPr anchor="ctr"/>
             <a:lstStyle/>
             <a:p>
-              <a:pPr algn="ctr">
+              <a:pPr marL="0" marR="0" lvl="0" indent="0" algn="ctr" defTabSz="914400" eaLnBrk="0" fontAlgn="base" latinLnBrk="0" hangingPunct="0">
+                <a:lnSpc>
+                  <a:spcPct val="100000"/>
+                </a:lnSpc>
+                <a:spcBef>
+                  <a:spcPct val="0"/>
+                </a:spcBef>
+                <a:spcAft>
+                  <a:spcPct val="0"/>
+                </a:spcAft>
+                <a:buClrTx/>
+                <a:buSzTx/>
+                <a:buFontTx/>
+                <a:buNone/>
+                <a:tabLst/>
                 <a:defRPr/>
               </a:pPr>
-              <a:endParaRPr lang="en-US">
+              <a:endParaRPr kumimoji="0" lang="en-US" sz="1800" b="0" i="0" u="none" strike="noStrike" kern="0" cap="none" spc="0" normalizeH="0" baseline="0" noProof="0">
+                <a:ln>
+                  <a:noFill/>
+                </a:ln>
+                <a:solidFill>
+                  <a:srgbClr val="FFFFFF"/>
+                </a:solidFill>
+                <a:effectLst/>
+                <a:uLnTx/>
+                <a:uFillTx/>
                 <a:latin typeface="Calibri" panose="020F0502020204030204" pitchFamily="34" charset="0"/>
+                <a:ea typeface="+mn-ea"/>
                 <a:cs typeface="Calibri" panose="020F0502020204030204" pitchFamily="34" charset="0"/>
               </a:endParaRPr>
             </a:p>
@@ -27483,10 +27929,10 @@
         </p:sp>
         <p:cxnSp>
           <p:nvCxnSpPr>
-            <p:cNvPr id="118" name="Straight Connector 117">
+            <p:cNvPr id="188" name="Straight Connector 187">
               <a:extLst>
                 <a:ext uri="{FF2B5EF4-FFF2-40B4-BE49-F238E27FC236}">
-                  <a16:creationId xmlns:a16="http://schemas.microsoft.com/office/drawing/2014/main" id="{6F7D5A72-E15C-55A0-BA66-F90DA3219686}"/>
+                  <a16:creationId xmlns:a16="http://schemas.microsoft.com/office/drawing/2014/main" id="{713E45C6-56F5-587B-0C5C-1AC18AD847D6}"/>
                 </a:ext>
               </a:extLst>
             </p:cNvPr>
@@ -27501,34 +27947,23 @@
             <a:prstGeom prst="line">
               <a:avLst/>
             </a:prstGeom>
-            <a:ln w="22225">
+            <a:noFill/>
+            <a:ln w="22225" cap="flat" cmpd="sng" algn="ctr">
               <a:solidFill>
-                <a:schemeClr val="tx1"/>
+                <a:srgbClr val="000000"/>
               </a:solidFill>
+              <a:prstDash val="solid"/>
               <a:miter lim="800000"/>
             </a:ln>
+            <a:effectLst/>
           </p:spPr>
-          <p:style>
-            <a:lnRef idx="1">
-              <a:schemeClr val="accent1"/>
-            </a:lnRef>
-            <a:fillRef idx="0">
-              <a:schemeClr val="accent1"/>
-            </a:fillRef>
-            <a:effectRef idx="0">
-              <a:schemeClr val="accent1"/>
-            </a:effectRef>
-            <a:fontRef idx="minor">
-              <a:schemeClr val="tx1"/>
-            </a:fontRef>
-          </p:style>
         </p:cxnSp>
         <p:cxnSp>
           <p:nvCxnSpPr>
-            <p:cNvPr id="119" name="Straight Connector 118">
+            <p:cNvPr id="189" name="Straight Connector 188">
               <a:extLst>
                 <a:ext uri="{FF2B5EF4-FFF2-40B4-BE49-F238E27FC236}">
-                  <a16:creationId xmlns:a16="http://schemas.microsoft.com/office/drawing/2014/main" id="{6536808B-3CF2-2C80-EFF6-3F06882A1734}"/>
+                  <a16:creationId xmlns:a16="http://schemas.microsoft.com/office/drawing/2014/main" id="{BD1FAA43-8BE0-5F1A-6154-28A90A2FDDD0}"/>
                 </a:ext>
               </a:extLst>
             </p:cNvPr>
@@ -27543,35 +27978,24 @@
             <a:prstGeom prst="line">
               <a:avLst/>
             </a:prstGeom>
-            <a:ln w="22225">
+            <a:noFill/>
+            <a:ln w="22225" cap="flat" cmpd="sng" algn="ctr">
               <a:solidFill>
-                <a:schemeClr val="tx1"/>
+                <a:srgbClr val="000000"/>
               </a:solidFill>
+              <a:prstDash val="solid"/>
               <a:miter lim="800000"/>
             </a:ln>
+            <a:effectLst/>
           </p:spPr>
-          <p:style>
-            <a:lnRef idx="1">
-              <a:schemeClr val="accent1"/>
-            </a:lnRef>
-            <a:fillRef idx="0">
-              <a:schemeClr val="accent1"/>
-            </a:fillRef>
-            <a:effectRef idx="0">
-              <a:schemeClr val="accent1"/>
-            </a:effectRef>
-            <a:fontRef idx="minor">
-              <a:schemeClr val="tx1"/>
-            </a:fontRef>
-          </p:style>
         </p:cxnSp>
       </p:grpSp>
       <p:grpSp>
         <p:nvGrpSpPr>
-          <p:cNvPr id="124" name="Group 123">
+          <p:cNvPr id="168" name="Group 167">
             <a:extLst>
               <a:ext uri="{FF2B5EF4-FFF2-40B4-BE49-F238E27FC236}">
-                <a16:creationId xmlns:a16="http://schemas.microsoft.com/office/drawing/2014/main" id="{728477EC-2EA0-66E7-3010-36394A77814A}"/>
+                <a16:creationId xmlns:a16="http://schemas.microsoft.com/office/drawing/2014/main" id="{779851D7-73E5-A50F-A3DF-766500AEB9DD}"/>
               </a:ext>
             </a:extLst>
           </p:cNvPr>
@@ -27580,7 +28004,7 @@
         </p:nvGrpSpPr>
         <p:grpSpPr>
           <a:xfrm rot="16200000">
-            <a:off x="6488030" y="3007477"/>
+            <a:off x="8436542" y="5460708"/>
             <a:ext cx="144462" cy="258762"/>
             <a:chOff x="4487395" y="5226823"/>
             <a:chExt cx="144462" cy="258762"/>
@@ -27588,10 +28012,10 @@
         </p:grpSpPr>
         <p:sp>
           <p:nvSpPr>
-            <p:cNvPr id="125" name="Rectangle 124">
+            <p:cNvPr id="184" name="Rectangle 183">
               <a:extLst>
                 <a:ext uri="{FF2B5EF4-FFF2-40B4-BE49-F238E27FC236}">
-                  <a16:creationId xmlns:a16="http://schemas.microsoft.com/office/drawing/2014/main" id="{B397BC43-AC34-692A-7D7E-BC0E3A7294DC}"/>
+                  <a16:creationId xmlns:a16="http://schemas.microsoft.com/office/drawing/2014/main" id="{30761934-11C7-B800-6102-041BD2A2376B}"/>
                 </a:ext>
               </a:extLst>
             </p:cNvPr>
@@ -27607,38 +28031,48 @@
               <a:avLst/>
             </a:prstGeom>
             <a:noFill/>
-            <a:ln w="19050">
+            <a:ln w="19050" cap="flat" cmpd="sng" algn="ctr">
               <a:solidFill>
-                <a:schemeClr val="tx1"/>
+                <a:srgbClr val="000000"/>
               </a:solidFill>
+              <a:prstDash val="solid"/>
               <a:miter lim="800000"/>
             </a:ln>
+            <a:effectLst/>
           </p:spPr>
-          <p:style>
-            <a:lnRef idx="2">
-              <a:schemeClr val="accent1">
-                <a:shade val="50000"/>
-              </a:schemeClr>
-            </a:lnRef>
-            <a:fillRef idx="1">
-              <a:schemeClr val="accent1"/>
-            </a:fillRef>
-            <a:effectRef idx="0">
-              <a:schemeClr val="accent1"/>
-            </a:effectRef>
-            <a:fontRef idx="minor">
-              <a:schemeClr val="lt1"/>
-            </a:fontRef>
-          </p:style>
           <p:txBody>
             <a:bodyPr anchor="ctr"/>
             <a:lstStyle/>
             <a:p>
-              <a:pPr algn="ctr">
+              <a:pPr marL="0" marR="0" lvl="0" indent="0" algn="ctr" defTabSz="914400" eaLnBrk="0" fontAlgn="base" latinLnBrk="0" hangingPunct="0">
+                <a:lnSpc>
+                  <a:spcPct val="100000"/>
+                </a:lnSpc>
+                <a:spcBef>
+                  <a:spcPct val="0"/>
+                </a:spcBef>
+                <a:spcAft>
+                  <a:spcPct val="0"/>
+                </a:spcAft>
+                <a:buClrTx/>
+                <a:buSzTx/>
+                <a:buFontTx/>
+                <a:buNone/>
+                <a:tabLst/>
                 <a:defRPr/>
               </a:pPr>
-              <a:endParaRPr lang="en-US">
+              <a:endParaRPr kumimoji="0" lang="en-US" sz="1800" b="0" i="0" u="none" strike="noStrike" kern="0" cap="none" spc="0" normalizeH="0" baseline="0" noProof="0">
+                <a:ln>
+                  <a:noFill/>
+                </a:ln>
+                <a:solidFill>
+                  <a:srgbClr val="FFFFFF"/>
+                </a:solidFill>
+                <a:effectLst/>
+                <a:uLnTx/>
+                <a:uFillTx/>
                 <a:latin typeface="Calibri" panose="020F0502020204030204" pitchFamily="34" charset="0"/>
+                <a:ea typeface="+mn-ea"/>
                 <a:cs typeface="Calibri" panose="020F0502020204030204" pitchFamily="34" charset="0"/>
               </a:endParaRPr>
             </a:p>
@@ -27646,10 +28080,10 @@
         </p:sp>
         <p:cxnSp>
           <p:nvCxnSpPr>
-            <p:cNvPr id="126" name="Straight Connector 125">
+            <p:cNvPr id="185" name="Straight Connector 184">
               <a:extLst>
                 <a:ext uri="{FF2B5EF4-FFF2-40B4-BE49-F238E27FC236}">
-                  <a16:creationId xmlns:a16="http://schemas.microsoft.com/office/drawing/2014/main" id="{9E84AE5A-7303-03D8-82D9-A5A4A3751931}"/>
+                  <a16:creationId xmlns:a16="http://schemas.microsoft.com/office/drawing/2014/main" id="{44143697-DBC5-21C8-3F77-25FCD8CFD6D5}"/>
                 </a:ext>
               </a:extLst>
             </p:cNvPr>
@@ -27664,34 +28098,23 @@
             <a:prstGeom prst="line">
               <a:avLst/>
             </a:prstGeom>
-            <a:ln w="22225">
+            <a:noFill/>
+            <a:ln w="22225" cap="flat" cmpd="sng" algn="ctr">
               <a:solidFill>
-                <a:schemeClr val="tx1"/>
+                <a:srgbClr val="000000"/>
               </a:solidFill>
+              <a:prstDash val="solid"/>
               <a:miter lim="800000"/>
             </a:ln>
+            <a:effectLst/>
           </p:spPr>
-          <p:style>
-            <a:lnRef idx="1">
-              <a:schemeClr val="accent1"/>
-            </a:lnRef>
-            <a:fillRef idx="0">
-              <a:schemeClr val="accent1"/>
-            </a:fillRef>
-            <a:effectRef idx="0">
-              <a:schemeClr val="accent1"/>
-            </a:effectRef>
-            <a:fontRef idx="minor">
-              <a:schemeClr val="tx1"/>
-            </a:fontRef>
-          </p:style>
         </p:cxnSp>
         <p:cxnSp>
           <p:nvCxnSpPr>
-            <p:cNvPr id="127" name="Straight Connector 126">
+            <p:cNvPr id="186" name="Straight Connector 185">
               <a:extLst>
                 <a:ext uri="{FF2B5EF4-FFF2-40B4-BE49-F238E27FC236}">
-                  <a16:creationId xmlns:a16="http://schemas.microsoft.com/office/drawing/2014/main" id="{70CAED30-D5FA-4DA4-3E4D-E3734D7E3976}"/>
+                  <a16:creationId xmlns:a16="http://schemas.microsoft.com/office/drawing/2014/main" id="{0C96528B-BF70-3CB1-1D85-052B740F1E02}"/>
                 </a:ext>
               </a:extLst>
             </p:cNvPr>
@@ -27706,35 +28129,24 @@
             <a:prstGeom prst="line">
               <a:avLst/>
             </a:prstGeom>
-            <a:ln w="22225">
+            <a:noFill/>
+            <a:ln w="22225" cap="flat" cmpd="sng" algn="ctr">
               <a:solidFill>
-                <a:schemeClr val="tx1"/>
+                <a:srgbClr val="000000"/>
               </a:solidFill>
+              <a:prstDash val="solid"/>
               <a:miter lim="800000"/>
             </a:ln>
+            <a:effectLst/>
           </p:spPr>
-          <p:style>
-            <a:lnRef idx="1">
-              <a:schemeClr val="accent1"/>
-            </a:lnRef>
-            <a:fillRef idx="0">
-              <a:schemeClr val="accent1"/>
-            </a:fillRef>
-            <a:effectRef idx="0">
-              <a:schemeClr val="accent1"/>
-            </a:effectRef>
-            <a:fontRef idx="minor">
-              <a:schemeClr val="tx1"/>
-            </a:fontRef>
-          </p:style>
         </p:cxnSp>
       </p:grpSp>
       <p:grpSp>
         <p:nvGrpSpPr>
-          <p:cNvPr id="128" name="Group 127">
+          <p:cNvPr id="169" name="Group 168">
             <a:extLst>
               <a:ext uri="{FF2B5EF4-FFF2-40B4-BE49-F238E27FC236}">
-                <a16:creationId xmlns:a16="http://schemas.microsoft.com/office/drawing/2014/main" id="{BA96D23D-CEB7-1640-4593-3211407EF4BC}"/>
+                <a16:creationId xmlns:a16="http://schemas.microsoft.com/office/drawing/2014/main" id="{54E0C2F5-CF67-70F9-CB90-061B85F23D4D}"/>
               </a:ext>
             </a:extLst>
           </p:cNvPr>
@@ -27743,7 +28155,7 @@
         </p:nvGrpSpPr>
         <p:grpSpPr>
           <a:xfrm rot="16200000">
-            <a:off x="7231077" y="3007477"/>
+            <a:off x="9179589" y="5460708"/>
             <a:ext cx="144462" cy="258762"/>
             <a:chOff x="4487395" y="5226823"/>
             <a:chExt cx="144462" cy="258762"/>
@@ -27751,10 +28163,10 @@
         </p:grpSpPr>
         <p:sp>
           <p:nvSpPr>
-            <p:cNvPr id="129" name="Rectangle 128">
+            <p:cNvPr id="181" name="Rectangle 180">
               <a:extLst>
                 <a:ext uri="{FF2B5EF4-FFF2-40B4-BE49-F238E27FC236}">
-                  <a16:creationId xmlns:a16="http://schemas.microsoft.com/office/drawing/2014/main" id="{0BA80261-0AD4-8F30-EBA3-CD353D0A29F6}"/>
+                  <a16:creationId xmlns:a16="http://schemas.microsoft.com/office/drawing/2014/main" id="{BD310679-11C7-3284-6CB5-0CAB6CAC4DD3}"/>
                 </a:ext>
               </a:extLst>
             </p:cNvPr>
@@ -27770,38 +28182,48 @@
               <a:avLst/>
             </a:prstGeom>
             <a:noFill/>
-            <a:ln w="19050">
+            <a:ln w="19050" cap="flat" cmpd="sng" algn="ctr">
               <a:solidFill>
-                <a:schemeClr val="tx1"/>
+                <a:srgbClr val="000000"/>
               </a:solidFill>
+              <a:prstDash val="solid"/>
               <a:miter lim="800000"/>
             </a:ln>
+            <a:effectLst/>
           </p:spPr>
-          <p:style>
-            <a:lnRef idx="2">
-              <a:schemeClr val="accent1">
-                <a:shade val="50000"/>
-              </a:schemeClr>
-            </a:lnRef>
-            <a:fillRef idx="1">
-              <a:schemeClr val="accent1"/>
-            </a:fillRef>
-            <a:effectRef idx="0">
-              <a:schemeClr val="accent1"/>
-            </a:effectRef>
-            <a:fontRef idx="minor">
-              <a:schemeClr val="lt1"/>
-            </a:fontRef>
-          </p:style>
           <p:txBody>
             <a:bodyPr anchor="ctr"/>
             <a:lstStyle/>
             <a:p>
-              <a:pPr algn="ctr">
+              <a:pPr marL="0" marR="0" lvl="0" indent="0" algn="ctr" defTabSz="914400" eaLnBrk="0" fontAlgn="base" latinLnBrk="0" hangingPunct="0">
+                <a:lnSpc>
+                  <a:spcPct val="100000"/>
+                </a:lnSpc>
+                <a:spcBef>
+                  <a:spcPct val="0"/>
+                </a:spcBef>
+                <a:spcAft>
+                  <a:spcPct val="0"/>
+                </a:spcAft>
+                <a:buClrTx/>
+                <a:buSzTx/>
+                <a:buFontTx/>
+                <a:buNone/>
+                <a:tabLst/>
                 <a:defRPr/>
               </a:pPr>
-              <a:endParaRPr lang="en-US">
+              <a:endParaRPr kumimoji="0" lang="en-US" sz="1800" b="0" i="0" u="none" strike="noStrike" kern="0" cap="none" spc="0" normalizeH="0" baseline="0" noProof="0">
+                <a:ln>
+                  <a:noFill/>
+                </a:ln>
+                <a:solidFill>
+                  <a:srgbClr val="FFFFFF"/>
+                </a:solidFill>
+                <a:effectLst/>
+                <a:uLnTx/>
+                <a:uFillTx/>
                 <a:latin typeface="Calibri" panose="020F0502020204030204" pitchFamily="34" charset="0"/>
+                <a:ea typeface="+mn-ea"/>
                 <a:cs typeface="Calibri" panose="020F0502020204030204" pitchFamily="34" charset="0"/>
               </a:endParaRPr>
             </a:p>
@@ -27809,10 +28231,10 @@
         </p:sp>
         <p:cxnSp>
           <p:nvCxnSpPr>
-            <p:cNvPr id="130" name="Straight Connector 129">
+            <p:cNvPr id="182" name="Straight Connector 181">
               <a:extLst>
                 <a:ext uri="{FF2B5EF4-FFF2-40B4-BE49-F238E27FC236}">
-                  <a16:creationId xmlns:a16="http://schemas.microsoft.com/office/drawing/2014/main" id="{AC89C242-A71C-49C2-856E-3ABF0E9AF306}"/>
+                  <a16:creationId xmlns:a16="http://schemas.microsoft.com/office/drawing/2014/main" id="{1FA2FEC5-2DCC-557F-8358-1E94A243848F}"/>
                 </a:ext>
               </a:extLst>
             </p:cNvPr>
@@ -27827,34 +28249,23 @@
             <a:prstGeom prst="line">
               <a:avLst/>
             </a:prstGeom>
-            <a:ln w="22225">
+            <a:noFill/>
+            <a:ln w="22225" cap="flat" cmpd="sng" algn="ctr">
               <a:solidFill>
-                <a:schemeClr val="tx1"/>
+                <a:srgbClr val="000000"/>
               </a:solidFill>
+              <a:prstDash val="solid"/>
               <a:miter lim="800000"/>
             </a:ln>
+            <a:effectLst/>
           </p:spPr>
-          <p:style>
-            <a:lnRef idx="1">
-              <a:schemeClr val="accent1"/>
-            </a:lnRef>
-            <a:fillRef idx="0">
-              <a:schemeClr val="accent1"/>
-            </a:fillRef>
-            <a:effectRef idx="0">
-              <a:schemeClr val="accent1"/>
-            </a:effectRef>
-            <a:fontRef idx="minor">
-              <a:schemeClr val="tx1"/>
-            </a:fontRef>
-          </p:style>
         </p:cxnSp>
         <p:cxnSp>
           <p:nvCxnSpPr>
-            <p:cNvPr id="131" name="Straight Connector 130">
+            <p:cNvPr id="183" name="Straight Connector 182">
               <a:extLst>
                 <a:ext uri="{FF2B5EF4-FFF2-40B4-BE49-F238E27FC236}">
-                  <a16:creationId xmlns:a16="http://schemas.microsoft.com/office/drawing/2014/main" id="{CADB0AFE-4343-3647-3D2C-E3F659C9D867}"/>
+                  <a16:creationId xmlns:a16="http://schemas.microsoft.com/office/drawing/2014/main" id="{759A3093-DDB2-8235-50DA-5CDE2D077933}"/>
                 </a:ext>
               </a:extLst>
             </p:cNvPr>
@@ -27869,35 +28280,24 @@
             <a:prstGeom prst="line">
               <a:avLst/>
             </a:prstGeom>
-            <a:ln w="22225">
+            <a:noFill/>
+            <a:ln w="22225" cap="flat" cmpd="sng" algn="ctr">
               <a:solidFill>
-                <a:schemeClr val="tx1"/>
+                <a:srgbClr val="000000"/>
               </a:solidFill>
+              <a:prstDash val="solid"/>
               <a:miter lim="800000"/>
             </a:ln>
+            <a:effectLst/>
           </p:spPr>
-          <p:style>
-            <a:lnRef idx="1">
-              <a:schemeClr val="accent1"/>
-            </a:lnRef>
-            <a:fillRef idx="0">
-              <a:schemeClr val="accent1"/>
-            </a:fillRef>
-            <a:effectRef idx="0">
-              <a:schemeClr val="accent1"/>
-            </a:effectRef>
-            <a:fontRef idx="minor">
-              <a:schemeClr val="tx1"/>
-            </a:fontRef>
-          </p:style>
         </p:cxnSp>
       </p:grpSp>
       <p:sp>
         <p:nvSpPr>
-          <p:cNvPr id="133" name="TextBox 132">
+          <p:cNvPr id="170" name="TextBox 169">
             <a:extLst>
               <a:ext uri="{FF2B5EF4-FFF2-40B4-BE49-F238E27FC236}">
-                <a16:creationId xmlns:a16="http://schemas.microsoft.com/office/drawing/2014/main" id="{D09FF2E0-EA3D-350B-3DAC-EB43777C3D98}"/>
+                <a16:creationId xmlns:a16="http://schemas.microsoft.com/office/drawing/2014/main" id="{9E9FF5A2-3BF8-F557-0519-48894A35AD11}"/>
               </a:ext>
             </a:extLst>
           </p:cNvPr>
@@ -27906,7 +28306,7 @@
         </p:nvSpPr>
         <p:spPr bwMode="auto">
           <a:xfrm>
-            <a:off x="6961310" y="3222459"/>
+            <a:off x="8909823" y="5675691"/>
             <a:ext cx="683997" cy="276999"/>
           </a:xfrm>
           <a:prstGeom prst="rect">
@@ -27923,12 +28323,36 @@
           </a:bodyPr>
           <a:lstStyle/>
           <a:p>
-            <a:pPr algn="ctr">
+            <a:pPr marL="0" marR="0" lvl="0" indent="0" algn="ctr" defTabSz="914400" eaLnBrk="0" fontAlgn="base" latinLnBrk="0" hangingPunct="0">
+              <a:lnSpc>
+                <a:spcPct val="100000"/>
+              </a:lnSpc>
+              <a:spcBef>
+                <a:spcPct val="0"/>
+              </a:spcBef>
+              <a:spcAft>
+                <a:spcPct val="0"/>
+              </a:spcAft>
+              <a:buClrTx/>
+              <a:buSzTx/>
+              <a:buFontTx/>
+              <a:buNone/>
+              <a:tabLst/>
               <a:defRPr/>
             </a:pPr>
             <a:r>
-              <a:rPr lang="en-US" sz="1200">
+              <a:rPr kumimoji="0" lang="en-US" sz="1200" b="0" i="0" u="none" strike="noStrike" kern="0" cap="none" spc="0" normalizeH="0" baseline="0" noProof="0">
+                <a:ln>
+                  <a:noFill/>
+                </a:ln>
+                <a:solidFill>
+                  <a:srgbClr val="000000"/>
+                </a:solidFill>
+                <a:effectLst/>
+                <a:uLnTx/>
+                <a:uFillTx/>
                 <a:latin typeface="Calibri" panose="020F0502020204030204" pitchFamily="34" charset="0"/>
+                <a:ea typeface="ＭＳ Ｐゴシック" panose="020B0600070205080204" pitchFamily="34" charset="-128"/>
                 <a:cs typeface="Calibri" panose="020F0502020204030204" pitchFamily="34" charset="0"/>
               </a:rPr>
               <a:t>RX/TX</a:t>
@@ -27938,10 +28362,10 @@
       </p:sp>
       <p:sp>
         <p:nvSpPr>
-          <p:cNvPr id="134" name="TextBox 133">
+          <p:cNvPr id="171" name="TextBox 170">
             <a:extLst>
               <a:ext uri="{FF2B5EF4-FFF2-40B4-BE49-F238E27FC236}">
-                <a16:creationId xmlns:a16="http://schemas.microsoft.com/office/drawing/2014/main" id="{DD96B573-393E-EBCC-44CB-DD87DE553F2D}"/>
+                <a16:creationId xmlns:a16="http://schemas.microsoft.com/office/drawing/2014/main" id="{6D1EC977-94CA-1CD9-184B-9E4F7DE0CABA}"/>
               </a:ext>
             </a:extLst>
           </p:cNvPr>
@@ -27950,7 +28374,7 @@
         </p:nvSpPr>
         <p:spPr bwMode="auto">
           <a:xfrm>
-            <a:off x="1683997" y="3222459"/>
+            <a:off x="3632509" y="5675691"/>
             <a:ext cx="648000" cy="276999"/>
           </a:xfrm>
           <a:prstGeom prst="rect">
@@ -27967,12 +28391,36 @@
           </a:bodyPr>
           <a:lstStyle/>
           <a:p>
-            <a:pPr algn="ctr">
+            <a:pPr marL="0" marR="0" lvl="0" indent="0" algn="ctr" defTabSz="914400" eaLnBrk="0" fontAlgn="base" latinLnBrk="0" hangingPunct="0">
+              <a:lnSpc>
+                <a:spcPct val="100000"/>
+              </a:lnSpc>
+              <a:spcBef>
+                <a:spcPct val="0"/>
+              </a:spcBef>
+              <a:spcAft>
+                <a:spcPct val="0"/>
+              </a:spcAft>
+              <a:buClrTx/>
+              <a:buSzTx/>
+              <a:buFontTx/>
+              <a:buNone/>
+              <a:tabLst/>
               <a:defRPr/>
             </a:pPr>
             <a:r>
-              <a:rPr lang="en-US" sz="1200" dirty="0">
+              <a:rPr kumimoji="0" lang="en-US" sz="1200" b="0" i="0" u="none" strike="noStrike" kern="0" cap="none" spc="0" normalizeH="0" baseline="0" noProof="0" dirty="0">
+                <a:ln>
+                  <a:noFill/>
+                </a:ln>
+                <a:solidFill>
+                  <a:srgbClr val="000000"/>
+                </a:solidFill>
+                <a:effectLst/>
+                <a:uLnTx/>
+                <a:uFillTx/>
                 <a:latin typeface="Calibri" panose="020F0502020204030204" pitchFamily="34" charset="0"/>
+                <a:ea typeface="ＭＳ Ｐゴシック" panose="020B0600070205080204" pitchFamily="34" charset="-128"/>
                 <a:cs typeface="Calibri" panose="020F0502020204030204" pitchFamily="34" charset="0"/>
               </a:rPr>
               <a:t>GPIO</a:t>
@@ -27982,10 +28430,10 @@
       </p:sp>
       <p:sp>
         <p:nvSpPr>
-          <p:cNvPr id="135" name="TextBox 134">
+          <p:cNvPr id="172" name="TextBox 171">
             <a:extLst>
               <a:ext uri="{FF2B5EF4-FFF2-40B4-BE49-F238E27FC236}">
-                <a16:creationId xmlns:a16="http://schemas.microsoft.com/office/drawing/2014/main" id="{12DFEF49-A35C-A955-0E2B-792AE1D9B907}"/>
+                <a16:creationId xmlns:a16="http://schemas.microsoft.com/office/drawing/2014/main" id="{4DDF0764-9DBE-654F-03C2-84A46976096C}"/>
               </a:ext>
             </a:extLst>
           </p:cNvPr>
@@ -27994,7 +28442,7 @@
         </p:nvSpPr>
         <p:spPr bwMode="auto">
           <a:xfrm>
-            <a:off x="2427188" y="3222459"/>
+            <a:off x="4375701" y="5675691"/>
             <a:ext cx="899999" cy="276999"/>
           </a:xfrm>
           <a:prstGeom prst="rect">
@@ -28011,12 +28459,36 @@
           </a:bodyPr>
           <a:lstStyle/>
           <a:p>
-            <a:pPr algn="ctr">
+            <a:pPr marL="0" marR="0" lvl="0" indent="0" algn="ctr" defTabSz="914400" eaLnBrk="0" fontAlgn="base" latinLnBrk="0" hangingPunct="0">
+              <a:lnSpc>
+                <a:spcPct val="100000"/>
+              </a:lnSpc>
+              <a:spcBef>
+                <a:spcPct val="0"/>
+              </a:spcBef>
+              <a:spcAft>
+                <a:spcPct val="0"/>
+              </a:spcAft>
+              <a:buClrTx/>
+              <a:buSzTx/>
+              <a:buFontTx/>
+              <a:buNone/>
+              <a:tabLst/>
               <a:defRPr/>
             </a:pPr>
             <a:r>
-              <a:rPr lang="en-US" sz="1200">
+              <a:rPr kumimoji="0" lang="en-US" sz="1200" b="0" i="0" u="none" strike="noStrike" kern="0" cap="none" spc="0" normalizeH="0" baseline="0" noProof="0">
+                <a:ln>
+                  <a:noFill/>
+                </a:ln>
+                <a:solidFill>
+                  <a:srgbClr val="000000"/>
+                </a:solidFill>
+                <a:effectLst/>
+                <a:uLnTx/>
+                <a:uFillTx/>
                 <a:latin typeface="Calibri" panose="020F0502020204030204" pitchFamily="34" charset="0"/>
+                <a:ea typeface="ＭＳ Ｐゴシック" panose="020B0600070205080204" pitchFamily="34" charset="-128"/>
                 <a:cs typeface="Calibri" panose="020F0502020204030204" pitchFamily="34" charset="0"/>
               </a:rPr>
               <a:t>USBD0</a:t>
@@ -28026,10 +28498,10 @@
       </p:sp>
       <p:sp>
         <p:nvSpPr>
-          <p:cNvPr id="138" name="TextBox 137">
+          <p:cNvPr id="173" name="TextBox 172">
             <a:extLst>
               <a:ext uri="{FF2B5EF4-FFF2-40B4-BE49-F238E27FC236}">
-                <a16:creationId xmlns:a16="http://schemas.microsoft.com/office/drawing/2014/main" id="{C7E2846B-5BD2-ED52-2A3C-1F6082ACABAF}"/>
+                <a16:creationId xmlns:a16="http://schemas.microsoft.com/office/drawing/2014/main" id="{B59750E1-839D-39A9-6FAA-8307177DCA15}"/>
               </a:ext>
             </a:extLst>
           </p:cNvPr>
@@ -28038,7 +28510,7 @@
         </p:nvSpPr>
         <p:spPr bwMode="auto">
           <a:xfrm>
-            <a:off x="5296067" y="3222459"/>
+            <a:off x="7244580" y="5675691"/>
             <a:ext cx="863995" cy="276999"/>
           </a:xfrm>
           <a:prstGeom prst="rect">
@@ -28055,12 +28527,36 @@
           </a:bodyPr>
           <a:lstStyle/>
           <a:p>
-            <a:pPr algn="ctr">
+            <a:pPr marL="0" marR="0" lvl="0" indent="0" algn="ctr" defTabSz="914400" eaLnBrk="0" fontAlgn="base" latinLnBrk="0" hangingPunct="0">
+              <a:lnSpc>
+                <a:spcPct val="100000"/>
+              </a:lnSpc>
+              <a:spcBef>
+                <a:spcPct val="0"/>
+              </a:spcBef>
+              <a:spcAft>
+                <a:spcPct val="0"/>
+              </a:spcAft>
+              <a:buClrTx/>
+              <a:buSzTx/>
+              <a:buFontTx/>
+              <a:buNone/>
+              <a:tabLst/>
               <a:defRPr/>
             </a:pPr>
             <a:r>
-              <a:rPr lang="en-US" sz="1200" dirty="0">
+              <a:rPr kumimoji="0" lang="en-US" sz="1200" b="0" i="0" u="none" strike="noStrike" kern="0" cap="none" spc="0" normalizeH="0" baseline="0" noProof="0" dirty="0">
+                <a:ln>
+                  <a:noFill/>
+                </a:ln>
+                <a:solidFill>
+                  <a:srgbClr val="000000"/>
+                </a:solidFill>
+                <a:effectLst/>
+                <a:uLnTx/>
+                <a:uFillTx/>
                 <a:latin typeface="Calibri" panose="020F0502020204030204" pitchFamily="34" charset="0"/>
+                <a:ea typeface="ＭＳ Ｐゴシック" panose="020B0600070205080204" pitchFamily="34" charset="-128"/>
                 <a:cs typeface="Calibri" panose="020F0502020204030204" pitchFamily="34" charset="0"/>
               </a:rPr>
               <a:t>SDIO0</a:t>
@@ -28070,10 +28566,10 @@
       </p:sp>
       <p:sp>
         <p:nvSpPr>
-          <p:cNvPr id="140" name="TextBox 139">
+          <p:cNvPr id="174" name="TextBox 173">
             <a:extLst>
               <a:ext uri="{FF2B5EF4-FFF2-40B4-BE49-F238E27FC236}">
-                <a16:creationId xmlns:a16="http://schemas.microsoft.com/office/drawing/2014/main" id="{C77D9C0A-B418-31E0-9363-3FCF80741C01}"/>
+                <a16:creationId xmlns:a16="http://schemas.microsoft.com/office/drawing/2014/main" id="{72A3258F-7685-C437-DB3D-4641A25E3CCF}"/>
               </a:ext>
             </a:extLst>
           </p:cNvPr>
@@ -28082,7 +28578,7 @@
         </p:nvSpPr>
         <p:spPr bwMode="auto">
           <a:xfrm>
-            <a:off x="6218262" y="3222459"/>
+            <a:off x="8166774" y="5675691"/>
             <a:ext cx="684000" cy="276999"/>
           </a:xfrm>
           <a:prstGeom prst="rect">
@@ -28099,12 +28595,36 @@
           </a:bodyPr>
           <a:lstStyle/>
           <a:p>
-            <a:pPr algn="ctr">
+            <a:pPr marL="0" marR="0" lvl="0" indent="0" algn="ctr" defTabSz="914400" eaLnBrk="0" fontAlgn="base" latinLnBrk="0" hangingPunct="0">
+              <a:lnSpc>
+                <a:spcPct val="100000"/>
+              </a:lnSpc>
+              <a:spcBef>
+                <a:spcPct val="0"/>
+              </a:spcBef>
+              <a:spcAft>
+                <a:spcPct val="0"/>
+              </a:spcAft>
+              <a:buClrTx/>
+              <a:buSzTx/>
+              <a:buFontTx/>
+              <a:buNone/>
+              <a:tabLst/>
               <a:defRPr/>
             </a:pPr>
             <a:r>
-              <a:rPr lang="en-US" sz="1200" dirty="0">
+              <a:rPr kumimoji="0" lang="en-US" sz="1200" b="0" i="0" u="none" strike="noStrike" kern="0" cap="none" spc="0" normalizeH="0" baseline="0" noProof="0" dirty="0">
+                <a:ln>
+                  <a:noFill/>
+                </a:ln>
+                <a:solidFill>
+                  <a:srgbClr val="000000"/>
+                </a:solidFill>
+                <a:effectLst/>
+                <a:uLnTx/>
+                <a:uFillTx/>
                 <a:latin typeface="Calibri" panose="020F0502020204030204" pitchFamily="34" charset="0"/>
+                <a:ea typeface="ＭＳ Ｐゴシック" panose="020B0600070205080204" pitchFamily="34" charset="-128"/>
                 <a:cs typeface="Calibri" panose="020F0502020204030204" pitchFamily="34" charset="0"/>
               </a:rPr>
               <a:t>SPI0</a:t>
@@ -28114,10 +28634,10 @@
       </p:sp>
       <p:sp>
         <p:nvSpPr>
-          <p:cNvPr id="141" name="Rounded Rectangle 140">
+          <p:cNvPr id="175" name="Rounded Rectangle 174">
             <a:extLst>
               <a:ext uri="{FF2B5EF4-FFF2-40B4-BE49-F238E27FC236}">
-                <a16:creationId xmlns:a16="http://schemas.microsoft.com/office/drawing/2014/main" id="{2C0C2ED6-2C65-D75D-E150-4548B602CFF9}"/>
+                <a16:creationId xmlns:a16="http://schemas.microsoft.com/office/drawing/2014/main" id="{68C02DA0-152C-0F2A-68C4-5763E1A64728}"/>
               </a:ext>
             </a:extLst>
           </p:cNvPr>
@@ -28126,7 +28646,7 @@
         </p:nvSpPr>
         <p:spPr bwMode="auto">
           <a:xfrm>
-            <a:off x="1673170" y="1033159"/>
+            <a:off x="3621683" y="3486390"/>
             <a:ext cx="5972137" cy="288000"/>
           </a:xfrm>
           <a:prstGeom prst="roundRect">
@@ -28148,22 +28668,36 @@
           <a:bodyPr wrap="none" lIns="121944" tIns="60972" rIns="121944" bIns="60972" anchor="ctr"/>
           <a:lstStyle/>
           <a:p>
-            <a:pPr algn="ctr" fontAlgn="auto">
+            <a:pPr marL="0" marR="0" lvl="0" indent="0" algn="ctr" defTabSz="914400" eaLnBrk="0" fontAlgn="auto" latinLnBrk="0" hangingPunct="0">
+              <a:lnSpc>
+                <a:spcPct val="100000"/>
+              </a:lnSpc>
               <a:spcBef>
                 <a:spcPts val="0"/>
               </a:spcBef>
               <a:spcAft>
                 <a:spcPts val="0"/>
               </a:spcAft>
+              <a:buClrTx/>
+              <a:buSzTx/>
+              <a:buFontTx/>
+              <a:buNone/>
+              <a:tabLst/>
               <a:defRPr/>
             </a:pPr>
             <a:r>
-              <a:rPr lang="en-US" sz="1400" b="1" kern="0">
+              <a:rPr kumimoji="0" lang="en-US" sz="1400" b="1" i="0" u="none" strike="noStrike" kern="0" cap="none" spc="0" normalizeH="0" baseline="0" noProof="0">
+                <a:ln>
+                  <a:noFill/>
+                </a:ln>
                 <a:solidFill>
                   <a:sysClr val="window" lastClr="FFFFFF"/>
                 </a:solidFill>
+                <a:effectLst/>
+                <a:uLnTx/>
+                <a:uFillTx/>
                 <a:latin typeface="Calibri" panose="020F0502020204030204" pitchFamily="34" charset="0"/>
-                <a:ea typeface="ＭＳ Ｐゴシック" pitchFamily="34" charset="-128"/>
+                <a:ea typeface="ＭＳ Ｐゴシック" panose="020B0600070205080204" pitchFamily="34" charset="-128"/>
                 <a:cs typeface="Calibri" panose="020F0502020204030204" pitchFamily="34" charset="0"/>
               </a:rPr>
               <a:t>User Application</a:t>
@@ -28173,10 +28707,10 @@
       </p:sp>
       <p:sp>
         <p:nvSpPr>
-          <p:cNvPr id="142" name="Rounded Rectangle 141">
+          <p:cNvPr id="176" name="Rounded Rectangle 175">
             <a:extLst>
               <a:ext uri="{FF2B5EF4-FFF2-40B4-BE49-F238E27FC236}">
-                <a16:creationId xmlns:a16="http://schemas.microsoft.com/office/drawing/2014/main" id="{D2538779-CB18-6E45-5B62-631B9FC1456F}"/>
+                <a16:creationId xmlns:a16="http://schemas.microsoft.com/office/drawing/2014/main" id="{A82BF4ED-4BF8-7C03-6B99-18151E403C77}"/>
               </a:ext>
             </a:extLst>
           </p:cNvPr>
@@ -28185,46 +28719,54 @@
         </p:nvSpPr>
         <p:spPr bwMode="auto">
           <a:xfrm>
-            <a:off x="593149" y="1429255"/>
-            <a:ext cx="1080000" cy="292915"/>
+            <a:off x="2646343" y="3882487"/>
+            <a:ext cx="975317" cy="292915"/>
           </a:xfrm>
           <a:prstGeom prst="roundRect">
             <a:avLst/>
           </a:prstGeom>
           <a:noFill/>
-          <a:ln w="12700">
+          <a:ln w="12700" cap="flat" cmpd="sng" algn="ctr">
             <a:noFill/>
-          </a:ln>
-        </p:spPr>
-        <p:style>
-          <a:lnRef idx="2">
-            <a:schemeClr val="accent1">
-              <a:shade val="50000"/>
-            </a:schemeClr>
-          </a:lnRef>
-          <a:fillRef idx="1">
-            <a:schemeClr val="accent1"/>
-          </a:fillRef>
-          <a:effectRef idx="0">
-            <a:schemeClr val="accent1"/>
-          </a:effectRef>
-          <a:fontRef idx="minor">
-            <a:schemeClr val="lt1"/>
-          </a:fontRef>
-        </p:style>
+            <a:prstDash val="solid"/>
+            <a:miter lim="800000"/>
+          </a:ln>
+          <a:effectLst/>
+        </p:spPr>
         <p:txBody>
           <a:bodyPr lIns="0" rIns="36000" anchor="ctr"/>
           <a:lstStyle/>
           <a:p>
-            <a:pPr algn="r">
+            <a:pPr marL="0" marR="0" lvl="0" indent="0" algn="r" defTabSz="914400" eaLnBrk="0" fontAlgn="base" latinLnBrk="0" hangingPunct="0">
+              <a:lnSpc>
+                <a:spcPct val="100000"/>
+              </a:lnSpc>
+              <a:spcBef>
+                <a:spcPct val="0"/>
+              </a:spcBef>
+              <a:spcAft>
+                <a:spcPct val="0"/>
+              </a:spcAft>
+              <a:buClrTx/>
+              <a:buSzTx/>
+              <a:buFontTx/>
+              <a:buNone/>
+              <a:tabLst/>
               <a:defRPr/>
             </a:pPr>
             <a:r>
-              <a:rPr lang="en-US" sz="1100">
+              <a:rPr kumimoji="0" lang="en-US" sz="1100" b="0" i="0" u="none" strike="noStrike" kern="0" cap="none" spc="0" normalizeH="0" baseline="0" noProof="0">
+                <a:ln>
+                  <a:noFill/>
+                </a:ln>
                 <a:solidFill>
-                  <a:schemeClr val="tx1"/>
+                  <a:srgbClr val="000000"/>
                 </a:solidFill>
+                <a:effectLst/>
+                <a:uLnTx/>
+                <a:uFillTx/>
                 <a:latin typeface="Calibri" panose="020F0502020204030204" pitchFamily="34" charset="0"/>
+                <a:ea typeface="+mn-ea"/>
                 <a:cs typeface="Calibri" panose="020F0502020204030204" pitchFamily="34" charset="0"/>
               </a:rPr>
               <a:t>Middleware</a:t>
@@ -28234,10 +28776,10 @@
       </p:sp>
       <p:sp>
         <p:nvSpPr>
-          <p:cNvPr id="144" name="Rounded Rectangle 143">
+          <p:cNvPr id="177" name="Rounded Rectangle 176">
             <a:extLst>
               <a:ext uri="{FF2B5EF4-FFF2-40B4-BE49-F238E27FC236}">
-                <a16:creationId xmlns:a16="http://schemas.microsoft.com/office/drawing/2014/main" id="{D33C40CB-D0E1-AFD9-E326-935EE4FC7543}"/>
+                <a16:creationId xmlns:a16="http://schemas.microsoft.com/office/drawing/2014/main" id="{2A546843-A133-D986-6D7E-CA34BA066737}"/>
               </a:ext>
             </a:extLst>
           </p:cNvPr>
@@ -28246,46 +28788,54 @@
         </p:nvSpPr>
         <p:spPr bwMode="auto">
           <a:xfrm>
-            <a:off x="593149" y="1033158"/>
-            <a:ext cx="1080000" cy="292915"/>
+            <a:off x="2646343" y="3486390"/>
+            <a:ext cx="975317" cy="292915"/>
           </a:xfrm>
           <a:prstGeom prst="roundRect">
             <a:avLst/>
           </a:prstGeom>
           <a:noFill/>
-          <a:ln w="12700">
+          <a:ln w="12700" cap="flat" cmpd="sng" algn="ctr">
             <a:noFill/>
-          </a:ln>
-        </p:spPr>
-        <p:style>
-          <a:lnRef idx="2">
-            <a:schemeClr val="accent1">
-              <a:shade val="50000"/>
-            </a:schemeClr>
-          </a:lnRef>
-          <a:fillRef idx="1">
-            <a:schemeClr val="accent1"/>
-          </a:fillRef>
-          <a:effectRef idx="0">
-            <a:schemeClr val="accent1"/>
-          </a:effectRef>
-          <a:fontRef idx="minor">
-            <a:schemeClr val="lt1"/>
-          </a:fontRef>
-        </p:style>
+            <a:prstDash val="solid"/>
+            <a:miter lim="800000"/>
+          </a:ln>
+          <a:effectLst/>
+        </p:spPr>
         <p:txBody>
           <a:bodyPr lIns="0" rIns="36000" anchor="ctr"/>
           <a:lstStyle/>
           <a:p>
-            <a:pPr algn="r">
+            <a:pPr marL="0" marR="0" lvl="0" indent="0" algn="r" defTabSz="914400" eaLnBrk="0" fontAlgn="base" latinLnBrk="0" hangingPunct="0">
+              <a:lnSpc>
+                <a:spcPct val="100000"/>
+              </a:lnSpc>
+              <a:spcBef>
+                <a:spcPct val="0"/>
+              </a:spcBef>
+              <a:spcAft>
+                <a:spcPct val="0"/>
+              </a:spcAft>
+              <a:buClrTx/>
+              <a:buSzTx/>
+              <a:buFontTx/>
+              <a:buNone/>
+              <a:tabLst/>
               <a:defRPr/>
             </a:pPr>
             <a:r>
-              <a:rPr lang="en-US" sz="1100">
+              <a:rPr kumimoji="0" lang="en-US" sz="1100" b="0" i="0" u="none" strike="noStrike" kern="0" cap="none" spc="0" normalizeH="0" baseline="0" noProof="0">
+                <a:ln>
+                  <a:noFill/>
+                </a:ln>
                 <a:solidFill>
-                  <a:schemeClr val="tx1"/>
+                  <a:srgbClr val="000000"/>
                 </a:solidFill>
+                <a:effectLst/>
+                <a:uLnTx/>
+                <a:uFillTx/>
                 <a:latin typeface="Calibri" panose="020F0502020204030204" pitchFamily="34" charset="0"/>
+                <a:ea typeface="+mn-ea"/>
                 <a:cs typeface="Calibri" panose="020F0502020204030204" pitchFamily="34" charset="0"/>
               </a:rPr>
               <a:t>Application</a:t>
@@ -28295,10 +28845,10 @@
       </p:sp>
       <p:sp>
         <p:nvSpPr>
-          <p:cNvPr id="145" name="Rounded Rectangle 144">
+          <p:cNvPr id="178" name="Rounded Rectangle 177">
             <a:extLst>
               <a:ext uri="{FF2B5EF4-FFF2-40B4-BE49-F238E27FC236}">
-                <a16:creationId xmlns:a16="http://schemas.microsoft.com/office/drawing/2014/main" id="{1894AC5C-4543-A617-A115-1A06A6052501}"/>
+                <a16:creationId xmlns:a16="http://schemas.microsoft.com/office/drawing/2014/main" id="{BA8908AE-81C2-F2D2-D32F-751EACDA827B}"/>
               </a:ext>
             </a:extLst>
           </p:cNvPr>
@@ -28307,46 +28857,54 @@
         </p:nvSpPr>
         <p:spPr bwMode="auto">
           <a:xfrm>
-            <a:off x="593149" y="2169441"/>
-            <a:ext cx="1080000" cy="292915"/>
+            <a:off x="2646343" y="4622673"/>
+            <a:ext cx="975317" cy="292915"/>
           </a:xfrm>
           <a:prstGeom prst="roundRect">
             <a:avLst/>
           </a:prstGeom>
           <a:noFill/>
-          <a:ln w="12700">
+          <a:ln w="12700" cap="flat" cmpd="sng" algn="ctr">
             <a:noFill/>
-          </a:ln>
-        </p:spPr>
-        <p:style>
-          <a:lnRef idx="2">
-            <a:schemeClr val="accent1">
-              <a:shade val="50000"/>
-            </a:schemeClr>
-          </a:lnRef>
-          <a:fillRef idx="1">
-            <a:schemeClr val="accent1"/>
-          </a:fillRef>
-          <a:effectRef idx="0">
-            <a:schemeClr val="accent1"/>
-          </a:effectRef>
-          <a:fontRef idx="minor">
-            <a:schemeClr val="lt1"/>
-          </a:fontRef>
-        </p:style>
+            <a:prstDash val="solid"/>
+            <a:miter lim="800000"/>
+          </a:ln>
+          <a:effectLst/>
+        </p:spPr>
         <p:txBody>
           <a:bodyPr lIns="0" rIns="36000" anchor="ctr"/>
           <a:lstStyle/>
           <a:p>
-            <a:pPr algn="r">
+            <a:pPr marL="0" marR="0" lvl="0" indent="0" algn="r" defTabSz="914400" eaLnBrk="0" fontAlgn="base" latinLnBrk="0" hangingPunct="0">
+              <a:lnSpc>
+                <a:spcPct val="100000"/>
+              </a:lnSpc>
+              <a:spcBef>
+                <a:spcPct val="0"/>
+              </a:spcBef>
+              <a:spcAft>
+                <a:spcPct val="0"/>
+              </a:spcAft>
+              <a:buClrTx/>
+              <a:buSzTx/>
+              <a:buFontTx/>
+              <a:buNone/>
+              <a:tabLst/>
               <a:defRPr/>
             </a:pPr>
             <a:r>
-              <a:rPr lang="en-US" sz="1100">
+              <a:rPr kumimoji="0" lang="en-US" sz="1100" b="0" i="0" u="none" strike="noStrike" kern="0" cap="none" spc="0" normalizeH="0" baseline="0" noProof="0">
+                <a:ln>
+                  <a:noFill/>
+                </a:ln>
                 <a:solidFill>
-                  <a:schemeClr val="tx1"/>
+                  <a:srgbClr val="000000"/>
                 </a:solidFill>
+                <a:effectLst/>
+                <a:uLnTx/>
+                <a:uFillTx/>
                 <a:latin typeface="Calibri" panose="020F0502020204030204" pitchFamily="34" charset="0"/>
+                <a:ea typeface="+mn-ea"/>
                 <a:cs typeface="Calibri" panose="020F0502020204030204" pitchFamily="34" charset="0"/>
               </a:rPr>
               <a:t>CMSIS-Driver</a:t>
@@ -28356,10 +28914,10 @@
       </p:sp>
       <p:sp>
         <p:nvSpPr>
-          <p:cNvPr id="146" name="Rounded Rectangle 145">
+          <p:cNvPr id="179" name="Rounded Rectangle 178">
             <a:extLst>
               <a:ext uri="{FF2B5EF4-FFF2-40B4-BE49-F238E27FC236}">
-                <a16:creationId xmlns:a16="http://schemas.microsoft.com/office/drawing/2014/main" id="{3078B079-987D-587C-BFEC-8036CF2E135D}"/>
+                <a16:creationId xmlns:a16="http://schemas.microsoft.com/office/drawing/2014/main" id="{EDBB4F20-714E-F753-10EE-5B7B157AD4B9}"/>
               </a:ext>
             </a:extLst>
           </p:cNvPr>
@@ -28368,65 +28926,87 @@
         </p:nvSpPr>
         <p:spPr bwMode="auto">
           <a:xfrm>
-            <a:off x="593149" y="2574264"/>
-            <a:ext cx="1080000" cy="439372"/>
+            <a:off x="2646343" y="5027495"/>
+            <a:ext cx="975317" cy="439372"/>
           </a:xfrm>
           <a:prstGeom prst="roundRect">
             <a:avLst/>
           </a:prstGeom>
           <a:noFill/>
-          <a:ln w="12700">
+          <a:ln w="12700" cap="flat" cmpd="sng" algn="ctr">
             <a:noFill/>
-          </a:ln>
-        </p:spPr>
-        <p:style>
-          <a:lnRef idx="2">
-            <a:schemeClr val="accent1">
-              <a:shade val="50000"/>
-            </a:schemeClr>
-          </a:lnRef>
-          <a:fillRef idx="1">
-            <a:schemeClr val="accent1"/>
-          </a:fillRef>
-          <a:effectRef idx="0">
-            <a:schemeClr val="accent1"/>
-          </a:effectRef>
-          <a:fontRef idx="minor">
-            <a:schemeClr val="lt1"/>
-          </a:fontRef>
-        </p:style>
+            <a:prstDash val="solid"/>
+            <a:miter lim="800000"/>
+          </a:ln>
+          <a:effectLst/>
+        </p:spPr>
         <p:txBody>
           <a:bodyPr lIns="0" rIns="36000" anchor="ctr"/>
           <a:lstStyle/>
           <a:p>
-            <a:pPr algn="r">
+            <a:pPr marL="0" marR="0" lvl="0" indent="0" algn="r" defTabSz="914400" eaLnBrk="0" fontAlgn="base" latinLnBrk="0" hangingPunct="0">
+              <a:lnSpc>
+                <a:spcPct val="100000"/>
+              </a:lnSpc>
+              <a:spcBef>
+                <a:spcPct val="0"/>
+              </a:spcBef>
+              <a:spcAft>
+                <a:spcPct val="0"/>
+              </a:spcAft>
+              <a:buClrTx/>
+              <a:buSzTx/>
+              <a:buFontTx/>
+              <a:buNone/>
+              <a:tabLst/>
               <a:defRPr/>
             </a:pPr>
             <a:r>
-              <a:rPr lang="en-US" sz="1100">
+              <a:rPr kumimoji="0" lang="en-US" sz="1100" b="0" i="0" u="none" strike="noStrike" kern="0" cap="none" spc="0" normalizeH="0" baseline="0" noProof="0">
+                <a:ln>
+                  <a:noFill/>
+                </a:ln>
                 <a:solidFill>
-                  <a:schemeClr val="tx1"/>
+                  <a:srgbClr val="000000"/>
                 </a:solidFill>
+                <a:effectLst/>
+                <a:uLnTx/>
+                <a:uFillTx/>
                 <a:latin typeface="Calibri" panose="020F0502020204030204" pitchFamily="34" charset="0"/>
+                <a:ea typeface="+mn-ea"/>
                 <a:cs typeface="Calibri" panose="020F0502020204030204" pitchFamily="34" charset="0"/>
               </a:rPr>
               <a:t>Device</a:t>
             </a:r>
             <a:br>
-              <a:rPr lang="en-US" sz="1100">
+              <a:rPr kumimoji="0" lang="en-US" sz="1100" b="0" i="0" u="none" strike="noStrike" kern="0" cap="none" spc="0" normalizeH="0" baseline="0" noProof="0">
+                <a:ln>
+                  <a:noFill/>
+                </a:ln>
                 <a:solidFill>
-                  <a:schemeClr val="tx1"/>
+                  <a:srgbClr val="000000"/>
                 </a:solidFill>
+                <a:effectLst/>
+                <a:uLnTx/>
+                <a:uFillTx/>
                 <a:latin typeface="Calibri" panose="020F0502020204030204" pitchFamily="34" charset="0"/>
+                <a:ea typeface="+mn-ea"/>
                 <a:cs typeface="Calibri" panose="020F0502020204030204" pitchFamily="34" charset="0"/>
               </a:rPr>
             </a:br>
             <a:r>
-              <a:rPr lang="en-US" sz="1100">
+              <a:rPr kumimoji="0" lang="en-US" sz="1100" b="0" i="0" u="none" strike="noStrike" kern="0" cap="none" spc="0" normalizeH="0" baseline="0" noProof="0">
+                <a:ln>
+                  <a:noFill/>
+                </a:ln>
                 <a:solidFill>
-                  <a:schemeClr val="tx1"/>
+                  <a:srgbClr val="000000"/>
                 </a:solidFill>
+                <a:effectLst/>
+                <a:uLnTx/>
+                <a:uFillTx/>
                 <a:latin typeface="Calibri" panose="020F0502020204030204" pitchFamily="34" charset="0"/>
+                <a:ea typeface="+mn-ea"/>
                 <a:cs typeface="Calibri" panose="020F0502020204030204" pitchFamily="34" charset="0"/>
               </a:rPr>
               <a:t>Peripheral</a:t>
@@ -28436,10 +29016,10 @@
       </p:sp>
       <p:sp>
         <p:nvSpPr>
-          <p:cNvPr id="147" name="Rounded Rectangle 146">
+          <p:cNvPr id="180" name="Rounded Rectangle 179">
             <a:extLst>
               <a:ext uri="{FF2B5EF4-FFF2-40B4-BE49-F238E27FC236}">
-                <a16:creationId xmlns:a16="http://schemas.microsoft.com/office/drawing/2014/main" id="{02BB2530-C05D-49E1-4DC4-9206569041E9}"/>
+                <a16:creationId xmlns:a16="http://schemas.microsoft.com/office/drawing/2014/main" id="{91725EE3-3984-D6EB-1F33-256EF4D2DAED}"/>
               </a:ext>
             </a:extLst>
           </p:cNvPr>
@@ -28448,65 +29028,87 @@
         </p:nvSpPr>
         <p:spPr bwMode="auto">
           <a:xfrm>
-            <a:off x="593149" y="3067458"/>
-            <a:ext cx="1080000" cy="439372"/>
+            <a:off x="2646343" y="5520689"/>
+            <a:ext cx="975317" cy="439372"/>
           </a:xfrm>
           <a:prstGeom prst="roundRect">
             <a:avLst/>
           </a:prstGeom>
           <a:noFill/>
-          <a:ln w="12700">
+          <a:ln w="12700" cap="flat" cmpd="sng" algn="ctr">
             <a:noFill/>
-          </a:ln>
-        </p:spPr>
-        <p:style>
-          <a:lnRef idx="2">
-            <a:schemeClr val="accent1">
-              <a:shade val="50000"/>
-            </a:schemeClr>
-          </a:lnRef>
-          <a:fillRef idx="1">
-            <a:schemeClr val="accent1"/>
-          </a:fillRef>
-          <a:effectRef idx="0">
-            <a:schemeClr val="accent1"/>
-          </a:effectRef>
-          <a:fontRef idx="minor">
-            <a:schemeClr val="lt1"/>
-          </a:fontRef>
-        </p:style>
+            <a:prstDash val="solid"/>
+            <a:miter lim="800000"/>
+          </a:ln>
+          <a:effectLst/>
+        </p:spPr>
         <p:txBody>
           <a:bodyPr lIns="0" rIns="36000" anchor="ctr"/>
           <a:lstStyle/>
           <a:p>
-            <a:pPr algn="r">
+            <a:pPr marL="0" marR="0" lvl="0" indent="0" algn="r" defTabSz="914400" eaLnBrk="0" fontAlgn="base" latinLnBrk="0" hangingPunct="0">
+              <a:lnSpc>
+                <a:spcPct val="100000"/>
+              </a:lnSpc>
+              <a:spcBef>
+                <a:spcPct val="0"/>
+              </a:spcBef>
+              <a:spcAft>
+                <a:spcPct val="0"/>
+              </a:spcAft>
+              <a:buClrTx/>
+              <a:buSzTx/>
+              <a:buFontTx/>
+              <a:buNone/>
+              <a:tabLst/>
               <a:defRPr/>
             </a:pPr>
             <a:r>
-              <a:rPr lang="en-US" sz="1100">
+              <a:rPr kumimoji="0" lang="en-US" sz="1100" b="0" i="0" u="none" strike="noStrike" kern="0" cap="none" spc="0" normalizeH="0" baseline="0" noProof="0">
+                <a:ln>
+                  <a:noFill/>
+                </a:ln>
                 <a:solidFill>
-                  <a:schemeClr val="tx1"/>
+                  <a:srgbClr val="000000"/>
                 </a:solidFill>
+                <a:effectLst/>
+                <a:uLnTx/>
+                <a:uFillTx/>
                 <a:latin typeface="Calibri" panose="020F0502020204030204" pitchFamily="34" charset="0"/>
+                <a:ea typeface="+mn-ea"/>
                 <a:cs typeface="Calibri" panose="020F0502020204030204" pitchFamily="34" charset="0"/>
               </a:rPr>
               <a:t>Device</a:t>
             </a:r>
             <a:br>
-              <a:rPr lang="en-US" sz="1100">
+              <a:rPr kumimoji="0" lang="en-US" sz="1100" b="0" i="0" u="none" strike="noStrike" kern="0" cap="none" spc="0" normalizeH="0" baseline="0" noProof="0">
+                <a:ln>
+                  <a:noFill/>
+                </a:ln>
                 <a:solidFill>
-                  <a:schemeClr val="tx1"/>
+                  <a:srgbClr val="000000"/>
                 </a:solidFill>
+                <a:effectLst/>
+                <a:uLnTx/>
+                <a:uFillTx/>
                 <a:latin typeface="Calibri" panose="020F0502020204030204" pitchFamily="34" charset="0"/>
+                <a:ea typeface="+mn-ea"/>
                 <a:cs typeface="Calibri" panose="020F0502020204030204" pitchFamily="34" charset="0"/>
               </a:rPr>
             </a:br>
             <a:r>
-              <a:rPr lang="en-US" sz="1100">
+              <a:rPr kumimoji="0" lang="en-US" sz="1100" b="0" i="0" u="none" strike="noStrike" kern="0" cap="none" spc="0" normalizeH="0" baseline="0" noProof="0">
+                <a:ln>
+                  <a:noFill/>
+                </a:ln>
                 <a:solidFill>
-                  <a:schemeClr val="tx1"/>
+                  <a:srgbClr val="000000"/>
                 </a:solidFill>
+                <a:effectLst/>
+                <a:uLnTx/>
+                <a:uFillTx/>
                 <a:latin typeface="Calibri" panose="020F0502020204030204" pitchFamily="34" charset="0"/>
+                <a:ea typeface="+mn-ea"/>
                 <a:cs typeface="Calibri" panose="020F0502020204030204" pitchFamily="34" charset="0"/>
               </a:rPr>
               <a:t>Pins</a:t>
@@ -29505,24 +30107,6 @@
 </file>
 
 <file path=customXml/item1.xml><?xml version="1.0" encoding="utf-8"?>
-<p:properties xmlns:p="http://schemas.microsoft.com/office/2006/metadata/properties" xmlns:xsi="http://www.w3.org/2001/XMLSchema-instance">
-  <documentManagement>
-    <AlternateThumbnailUrl xmlns="http://schemas.microsoft.com/sharepoint/v3">
-      <Url xsi:nil="true"/>
-      <Description xsi:nil="true"/>
-    </AlternateThumbnailUrl>
-    <ImageCreateDate xmlns="http://schemas.microsoft.com/sharepoint/v3" xsi:nil="true"/>
-    <Description xmlns="http://schemas.microsoft.com/sharepoint/v3" xsi:nil="true"/>
-    <_dlc_DocId xmlns="f2ad5090-61a8-4b8c-ab70-68f4ff4d1933">ARM-ECM-0151353</_dlc_DocId>
-    <_dlc_DocIdUrl xmlns="f2ad5090-61a8-4b8c-ab70-68f4ff4d1933">
-      <Url>http://teamsites.arm.com/sites/marketing/branding/_layouts/DocIdRedir.aspx?ID=ARM-ECM-0151353</Url>
-      <Description>ARM-ECM-0151353</Description>
-    </_dlc_DocIdUrl>
-  </documentManagement>
-</p:properties>
-</file>
-
-<file path=customXml/item2.xml><?xml version="1.0" encoding="utf-8"?>
 <ct:contentTypeSchema xmlns:ct="http://schemas.microsoft.com/office/2006/metadata/contentType" xmlns:ma="http://schemas.microsoft.com/office/2006/metadata/properties/metaAttributes" ct:_="" ma:_="" ma:contentTypeName="Picture" ma:contentTypeID="0x010102005A5C1BE65173D647975D08D04557E024" ma:contentTypeVersion="3" ma:contentTypeDescription="Upload an image or a photograph." ma:contentTypeScope="" ma:versionID="4e02033e9a8407b55ee482baa8e8773d">
   <xsd:schema xmlns:xsd="http://www.w3.org/2001/XMLSchema" xmlns:xs="http://www.w3.org/2001/XMLSchema" xmlns:p="http://schemas.microsoft.com/office/2006/metadata/properties" xmlns:ns1="http://schemas.microsoft.com/sharepoint/v3" xmlns:ns2="f2ad5090-61a8-4b8c-ab70-68f4ff4d1933" targetNamespace="http://schemas.microsoft.com/office/2006/metadata/properties" ma:root="true" ma:fieldsID="56baf7bb33d679821ced92383ddba583" ns1:_="" ns2:_="">
     <xsd:import namespace="http://schemas.microsoft.com/sharepoint/v3"/>
@@ -29723,7 +30307,7 @@
 </ct:contentTypeSchema>
 </file>
 
-<file path=customXml/item3.xml><?xml version="1.0" encoding="utf-8"?>
+<file path=customXml/item2.xml><?xml version="1.0" encoding="utf-8"?>
 <?mso-contentType ?>
 <FormTemplates xmlns="http://schemas.microsoft.com/sharepoint/v3/contenttype/forms">
   <Display>DocumentLibraryForm</Display>
@@ -29732,7 +30316,7 @@
 </FormTemplates>
 </file>
 
-<file path=customXml/item4.xml><?xml version="1.0" encoding="utf-8"?>
+<file path=customXml/item3.xml><?xml version="1.0" encoding="utf-8"?>
 <?mso-contentType ?>
 <spe:Receivers xmlns:spe="http://schemas.microsoft.com/sharepoint/events">
   <Receiver>
@@ -29778,24 +30362,25 @@
 </spe:Receivers>
 </file>
 
-<file path=customXml/itemProps1.xml><?xml version="1.0" encoding="utf-8"?>
-<ds:datastoreItem xmlns:ds="http://schemas.openxmlformats.org/officeDocument/2006/customXml" ds:itemID="{AE6E82D6-7FB8-4D99-A7B6-3C5BB1D894B9}">
-  <ds:schemaRefs>
-    <ds:schemaRef ds:uri="http://schemas.microsoft.com/office/2006/metadata/properties"/>
-    <ds:schemaRef ds:uri="http://schemas.openxmlformats.org/package/2006/metadata/core-properties"/>
-    <ds:schemaRef ds:uri="http://schemas.microsoft.com/office/2006/documentManagement/types"/>
-    <ds:schemaRef ds:uri="http://purl.org/dc/dcmitype/"/>
-    <ds:schemaRef ds:uri="http://purl.org/dc/elements/1.1/"/>
-    <ds:schemaRef ds:uri="http://schemas.microsoft.com/office/infopath/2007/PartnerControls"/>
-    <ds:schemaRef ds:uri="f2ad5090-61a8-4b8c-ab70-68f4ff4d1933"/>
-    <ds:schemaRef ds:uri="http://purl.org/dc/terms/"/>
-    <ds:schemaRef ds:uri="http://schemas.microsoft.com/sharepoint/v3"/>
-    <ds:schemaRef ds:uri="http://www.w3.org/XML/1998/namespace"/>
-  </ds:schemaRefs>
-</ds:datastoreItem>
+<file path=customXml/item4.xml><?xml version="1.0" encoding="utf-8"?>
+<p:properties xmlns:p="http://schemas.microsoft.com/office/2006/metadata/properties" xmlns:xsi="http://www.w3.org/2001/XMLSchema-instance">
+  <documentManagement>
+    <AlternateThumbnailUrl xmlns="http://schemas.microsoft.com/sharepoint/v3">
+      <Url xsi:nil="true"/>
+      <Description xsi:nil="true"/>
+    </AlternateThumbnailUrl>
+    <ImageCreateDate xmlns="http://schemas.microsoft.com/sharepoint/v3" xsi:nil="true"/>
+    <Description xmlns="http://schemas.microsoft.com/sharepoint/v3" xsi:nil="true"/>
+    <_dlc_DocId xmlns="f2ad5090-61a8-4b8c-ab70-68f4ff4d1933">ARM-ECM-0151353</_dlc_DocId>
+    <_dlc_DocIdUrl xmlns="f2ad5090-61a8-4b8c-ab70-68f4ff4d1933">
+      <Url>http://teamsites.arm.com/sites/marketing/branding/_layouts/DocIdRedir.aspx?ID=ARM-ECM-0151353</Url>
+      <Description>ARM-ECM-0151353</Description>
+    </_dlc_DocIdUrl>
+  </documentManagement>
+</p:properties>
 </file>
 
-<file path=customXml/itemProps2.xml><?xml version="1.0" encoding="utf-8"?>
+<file path=customXml/itemProps1.xml><?xml version="1.0" encoding="utf-8"?>
 <ds:datastoreItem xmlns:ds="http://schemas.openxmlformats.org/officeDocument/2006/customXml" ds:itemID="{E2FEA05E-38D0-44EA-8B8D-2375FC6AAF09}">
   <ds:schemaRefs>
     <ds:schemaRef ds:uri="http://schemas.microsoft.com/office/2006/metadata/contentType"/>
@@ -29814,7 +30399,7 @@
 </ds:datastoreItem>
 </file>
 
-<file path=customXml/itemProps3.xml><?xml version="1.0" encoding="utf-8"?>
+<file path=customXml/itemProps2.xml><?xml version="1.0" encoding="utf-8"?>
 <ds:datastoreItem xmlns:ds="http://schemas.openxmlformats.org/officeDocument/2006/customXml" ds:itemID="{9C777C69-0744-4BF3-8514-FB149EBD2248}">
   <ds:schemaRefs>
     <ds:schemaRef ds:uri="http://schemas.microsoft.com/sharepoint/v3/contenttype/forms"/>
@@ -29822,10 +30407,27 @@
 </ds:datastoreItem>
 </file>
 
-<file path=customXml/itemProps4.xml><?xml version="1.0" encoding="utf-8"?>
+<file path=customXml/itemProps3.xml><?xml version="1.0" encoding="utf-8"?>
 <ds:datastoreItem xmlns:ds="http://schemas.openxmlformats.org/officeDocument/2006/customXml" ds:itemID="{C8CB23D7-89E5-42FF-A5EB-008A06AB37C7}">
   <ds:schemaRefs>
     <ds:schemaRef ds:uri="http://schemas.microsoft.com/sharepoint/events"/>
   </ds:schemaRefs>
 </ds:datastoreItem>
+</file>
+
+<file path=customXml/itemProps4.xml><?xml version="1.0" encoding="utf-8"?>
+<ds:datastoreItem xmlns:ds="http://schemas.openxmlformats.org/officeDocument/2006/customXml" ds:itemID="{AE6E82D6-7FB8-4D99-A7B6-3C5BB1D894B9}">
+  <ds:schemaRefs>
+    <ds:schemaRef ds:uri="http://schemas.microsoft.com/office/2006/metadata/properties"/>
+    <ds:schemaRef ds:uri="http://schemas.openxmlformats.org/package/2006/metadata/core-properties"/>
+    <ds:schemaRef ds:uri="http://schemas.microsoft.com/office/2006/documentManagement/types"/>
+    <ds:schemaRef ds:uri="http://purl.org/dc/dcmitype/"/>
+    <ds:schemaRef ds:uri="http://purl.org/dc/elements/1.1/"/>
+    <ds:schemaRef ds:uri="http://schemas.microsoft.com/office/infopath/2007/PartnerControls"/>
+    <ds:schemaRef ds:uri="f2ad5090-61a8-4b8c-ab70-68f4ff4d1933"/>
+    <ds:schemaRef ds:uri="http://purl.org/dc/terms/"/>
+    <ds:schemaRef ds:uri="http://schemas.microsoft.com/sharepoint/v3"/>
+    <ds:schemaRef ds:uri="http://www.w3.org/XML/1998/namespace"/>
+  </ds:schemaRefs>
+</ds:datastoreItem>
 </file>
</xml_diff>

<commit_message>
Move gpio pins in image
</commit_message>
<xml_diff>
--- a/CMSIS/Documentation/Doxygen/Driver/src/images/driver.pptx
+++ b/CMSIS/Documentation/Doxygen/Driver/src/images/driver.pptx
@@ -122,7 +122,7 @@
             <a:srgbClr val="A4A3A4"/>
           </p15:clr>
         </p15:guide>
-        <p15:guide id="3" orient="horz" pos="1999">
+        <p15:guide id="3" orient="horz" pos="2024" userDrawn="1">
           <p15:clr>
             <a:srgbClr val="A4A3A4"/>
           </p15:clr>
@@ -259,7 +259,7 @@
             <a:fld id="{E72D30EF-8F20-0B47-8B5D-39A8BC29E860}" type="datetimeFigureOut">
               <a:rPr lang="en-US" smtClean="0"/>
               <a:pPr/>
-              <a:t>7/10/23</a:t>
+              <a:t>6/5/24</a:t>
             </a:fld>
             <a:endParaRPr lang="en-US"/>
           </a:p>
@@ -427,7 +427,7 @@
             <a:fld id="{77EDD36E-1E02-F241-9611-1F1D9EAAD326}" type="datetimeFigureOut">
               <a:rPr lang="en-US" smtClean="0"/>
               <a:pPr/>
-              <a:t>7/10/23</a:t>
+              <a:t>6/5/24</a:t>
             </a:fld>
             <a:endParaRPr lang="en-US"/>
           </a:p>
@@ -25143,10 +25143,10 @@
       </p:grpSpPr>
       <p:sp>
         <p:nvSpPr>
-          <p:cNvPr id="148" name="Rectangle 147">
+          <p:cNvPr id="110" name="Rectangle 109">
             <a:extLst>
               <a:ext uri="{FF2B5EF4-FFF2-40B4-BE49-F238E27FC236}">
-                <a16:creationId xmlns:a16="http://schemas.microsoft.com/office/drawing/2014/main" id="{EF1A8983-451E-4FCB-9C4B-B85D81DC79EB}"/>
+                <a16:creationId xmlns:a16="http://schemas.microsoft.com/office/drawing/2014/main" id="{B6F311E0-662C-EF4E-1FDC-5E70E9127FC3}"/>
               </a:ext>
             </a:extLst>
           </p:cNvPr>
@@ -25155,51 +25155,68 @@
         </p:nvSpPr>
         <p:spPr>
           <a:xfrm>
-            <a:off x="697831" y="975769"/>
+            <a:off x="2646344" y="3429000"/>
             <a:ext cx="7003995" cy="2531062"/>
           </a:xfrm>
           <a:prstGeom prst="rect">
             <a:avLst/>
           </a:prstGeom>
           <a:solidFill>
-            <a:schemeClr val="bg1"/>
+            <a:srgbClr val="FFFFFF"/>
           </a:solidFill>
-          <a:ln>
+          <a:ln w="6350" cap="flat" cmpd="sng" algn="ctr">
             <a:solidFill>
-              <a:schemeClr val="accent1"/>
+              <a:srgbClr val="0091BD"/>
             </a:solidFill>
+            <a:prstDash val="solid"/>
+            <a:miter lim="800000"/>
           </a:ln>
           <a:effectLst/>
         </p:spPr>
-        <p:style>
-          <a:lnRef idx="1">
-            <a:schemeClr val="accent1"/>
-          </a:lnRef>
-          <a:fillRef idx="3">
-            <a:schemeClr val="accent1"/>
-          </a:fillRef>
-          <a:effectRef idx="2">
-            <a:schemeClr val="accent1"/>
-          </a:effectRef>
-          <a:fontRef idx="minor">
-            <a:schemeClr val="lt1"/>
-          </a:fontRef>
-        </p:style>
         <p:txBody>
           <a:bodyPr rtlCol="0" anchor="ctr"/>
           <a:lstStyle/>
           <a:p>
-            <a:pPr algn="ctr"/>
-            <a:endParaRPr lang="en-US"/>
-          </a:p>
-        </p:txBody>
-      </p:sp>
-      <p:sp>
-        <p:nvSpPr>
-          <p:cNvPr id="4" name="Rounded Rectangle 3">
+            <a:pPr marL="0" marR="0" lvl="0" indent="0" algn="ctr" defTabSz="914400" eaLnBrk="0" fontAlgn="base" latinLnBrk="0" hangingPunct="0">
+              <a:lnSpc>
+                <a:spcPct val="100000"/>
+              </a:lnSpc>
+              <a:spcBef>
+                <a:spcPct val="0"/>
+              </a:spcBef>
+              <a:spcAft>
+                <a:spcPct val="0"/>
+              </a:spcAft>
+              <a:buClrTx/>
+              <a:buSzTx/>
+              <a:buFontTx/>
+              <a:buNone/>
+              <a:tabLst/>
+              <a:defRPr/>
+            </a:pPr>
+            <a:endParaRPr kumimoji="0" lang="en-US" sz="1800" b="0" i="0" u="none" strike="noStrike" kern="0" cap="none" spc="0" normalizeH="0" baseline="0" noProof="0">
+              <a:ln>
+                <a:noFill/>
+              </a:ln>
+              <a:solidFill>
+                <a:srgbClr val="FFFFFF"/>
+              </a:solidFill>
+              <a:effectLst/>
+              <a:uLnTx/>
+              <a:uFillTx/>
+              <a:latin typeface="Calibri"/>
+              <a:ea typeface="+mn-ea"/>
+              <a:cs typeface="+mn-cs"/>
+            </a:endParaRPr>
+          </a:p>
+        </p:txBody>
+      </p:sp>
+      <p:sp>
+        <p:nvSpPr>
+          <p:cNvPr id="111" name="Rounded Rectangle 110">
             <a:extLst>
               <a:ext uri="{FF2B5EF4-FFF2-40B4-BE49-F238E27FC236}">
-                <a16:creationId xmlns:a16="http://schemas.microsoft.com/office/drawing/2014/main" id="{42611988-3B36-ED23-74C7-CD79BEE958BA}"/>
+                <a16:creationId xmlns:a16="http://schemas.microsoft.com/office/drawing/2014/main" id="{2F2C0646-91D9-59D1-9704-23265AC34BCA}"/>
               </a:ext>
             </a:extLst>
           </p:cNvPr>
@@ -25208,7 +25225,7 @@
         </p:nvSpPr>
         <p:spPr bwMode="auto">
           <a:xfrm>
-            <a:off x="6218261" y="1429256"/>
+            <a:off x="8166773" y="3882487"/>
             <a:ext cx="684000" cy="288000"/>
           </a:xfrm>
           <a:prstGeom prst="roundRect">
@@ -25230,22 +25247,36 @@
           <a:bodyPr wrap="none" lIns="121944" tIns="60972" rIns="121944" bIns="60972" anchor="ctr"/>
           <a:lstStyle/>
           <a:p>
-            <a:pPr algn="ctr" fontAlgn="auto">
+            <a:pPr marL="0" marR="0" lvl="0" indent="0" algn="ctr" defTabSz="914400" eaLnBrk="0" fontAlgn="auto" latinLnBrk="0" hangingPunct="0">
+              <a:lnSpc>
+                <a:spcPct val="100000"/>
+              </a:lnSpc>
               <a:spcBef>
                 <a:spcPts val="0"/>
               </a:spcBef>
               <a:spcAft>
                 <a:spcPts val="0"/>
               </a:spcAft>
+              <a:buClrTx/>
+              <a:buSzTx/>
+              <a:buFontTx/>
+              <a:buNone/>
+              <a:tabLst/>
               <a:defRPr/>
             </a:pPr>
             <a:r>
-              <a:rPr lang="en-US" sz="1400" b="1" kern="0">
+              <a:rPr kumimoji="0" lang="en-US" sz="1400" b="1" i="0" u="none" strike="noStrike" kern="0" cap="none" spc="0" normalizeH="0" baseline="0" noProof="0">
+                <a:ln>
+                  <a:noFill/>
+                </a:ln>
                 <a:solidFill>
                   <a:sysClr val="window" lastClr="FFFFFF"/>
                 </a:solidFill>
+                <a:effectLst/>
+                <a:uLnTx/>
+                <a:uFillTx/>
                 <a:latin typeface="Calibri" panose="020F0502020204030204" pitchFamily="34" charset="0"/>
-                <a:ea typeface="ＭＳ Ｐゴシック" pitchFamily="34" charset="-128"/>
+                <a:ea typeface="ＭＳ Ｐゴシック" panose="020B0600070205080204" pitchFamily="34" charset="-128"/>
                 <a:cs typeface="Calibri" panose="020F0502020204030204" pitchFamily="34" charset="0"/>
               </a:rPr>
               <a:t>Graphics</a:t>
@@ -25255,10 +25286,10 @@
       </p:sp>
       <p:sp>
         <p:nvSpPr>
-          <p:cNvPr id="5" name="Rounded Rectangle 4">
+          <p:cNvPr id="112" name="Rounded Rectangle 111">
             <a:extLst>
               <a:ext uri="{FF2B5EF4-FFF2-40B4-BE49-F238E27FC236}">
-                <a16:creationId xmlns:a16="http://schemas.microsoft.com/office/drawing/2014/main" id="{41560457-1854-5E21-74A3-C5BF6C4AA3FB}"/>
+                <a16:creationId xmlns:a16="http://schemas.microsoft.com/office/drawing/2014/main" id="{750D1426-772B-C70B-3E82-E2EE974EEA1E}"/>
               </a:ext>
             </a:extLst>
           </p:cNvPr>
@@ -25267,7 +25298,7 @@
         </p:nvSpPr>
         <p:spPr bwMode="auto">
           <a:xfrm>
-            <a:off x="2421751" y="1429256"/>
+            <a:off x="4370263" y="3882487"/>
             <a:ext cx="900000" cy="288000"/>
           </a:xfrm>
           <a:prstGeom prst="roundRect">
@@ -25289,22 +25320,36 @@
           <a:bodyPr wrap="none" lIns="121944" tIns="60972" rIns="121944" bIns="60972" anchor="ctr"/>
           <a:lstStyle/>
           <a:p>
-            <a:pPr algn="ctr" fontAlgn="auto">
+            <a:pPr marL="0" marR="0" lvl="0" indent="0" algn="ctr" defTabSz="914400" eaLnBrk="0" fontAlgn="auto" latinLnBrk="0" hangingPunct="0">
+              <a:lnSpc>
+                <a:spcPct val="100000"/>
+              </a:lnSpc>
               <a:spcBef>
                 <a:spcPts val="0"/>
               </a:spcBef>
               <a:spcAft>
                 <a:spcPts val="0"/>
               </a:spcAft>
+              <a:buClrTx/>
+              <a:buSzTx/>
+              <a:buFontTx/>
+              <a:buNone/>
+              <a:tabLst/>
               <a:defRPr/>
             </a:pPr>
             <a:r>
-              <a:rPr lang="en-US" sz="1400" b="1" kern="0">
+              <a:rPr kumimoji="0" lang="en-US" sz="1400" b="1" i="0" u="none" strike="noStrike" kern="0" cap="none" spc="0" normalizeH="0" baseline="0" noProof="0">
+                <a:ln>
+                  <a:noFill/>
+                </a:ln>
                 <a:solidFill>
                   <a:sysClr val="window" lastClr="FFFFFF"/>
                 </a:solidFill>
+                <a:effectLst/>
+                <a:uLnTx/>
+                <a:uFillTx/>
                 <a:latin typeface="Calibri" panose="020F0502020204030204" pitchFamily="34" charset="0"/>
-                <a:ea typeface="ＭＳ Ｐゴシック" pitchFamily="34" charset="-128"/>
+                <a:ea typeface="ＭＳ Ｐゴシック" panose="020B0600070205080204" pitchFamily="34" charset="-128"/>
                 <a:cs typeface="Calibri" panose="020F0502020204030204" pitchFamily="34" charset="0"/>
               </a:rPr>
               <a:t>USB Device</a:t>
@@ -25314,10 +25359,10 @@
       </p:sp>
       <p:sp>
         <p:nvSpPr>
-          <p:cNvPr id="6" name="Rounded Rectangle 5">
+          <p:cNvPr id="113" name="Rounded Rectangle 112">
             <a:extLst>
               <a:ext uri="{FF2B5EF4-FFF2-40B4-BE49-F238E27FC236}">
-                <a16:creationId xmlns:a16="http://schemas.microsoft.com/office/drawing/2014/main" id="{A685A6A0-21B1-2A4B-BE7C-547C84A7B76B}"/>
+                <a16:creationId xmlns:a16="http://schemas.microsoft.com/office/drawing/2014/main" id="{6FDF485B-36A8-40C4-9791-B05182FACA1A}"/>
               </a:ext>
             </a:extLst>
           </p:cNvPr>
@@ -25326,7 +25371,7 @@
         </p:nvSpPr>
         <p:spPr bwMode="auto">
           <a:xfrm>
-            <a:off x="5296068" y="1429256"/>
+            <a:off x="7244580" y="3882487"/>
             <a:ext cx="864000" cy="288000"/>
           </a:xfrm>
           <a:prstGeom prst="roundRect">
@@ -25350,20 +25395,34 @@
           <a:bodyPr wrap="none" lIns="0" tIns="60972" rIns="0" bIns="60972" anchor="ctr"/>
           <a:lstStyle/>
           <a:p>
-            <a:pPr algn="ctr" fontAlgn="auto">
+            <a:pPr marL="0" marR="0" lvl="0" indent="0" algn="ctr" defTabSz="914400" eaLnBrk="0" fontAlgn="auto" latinLnBrk="0" hangingPunct="0">
+              <a:lnSpc>
+                <a:spcPct val="100000"/>
+              </a:lnSpc>
               <a:spcBef>
                 <a:spcPts val="0"/>
               </a:spcBef>
               <a:spcAft>
                 <a:spcPts val="0"/>
               </a:spcAft>
+              <a:buClrTx/>
+              <a:buSzTx/>
+              <a:buFontTx/>
+              <a:buNone/>
+              <a:tabLst/>
               <a:defRPr/>
             </a:pPr>
             <a:r>
-              <a:rPr lang="en-US" sz="1400" b="1" kern="0">
+              <a:rPr kumimoji="0" lang="en-US" sz="1400" b="1" i="0" u="none" strike="noStrike" kern="0" cap="none" spc="0" normalizeH="0" baseline="0" noProof="0">
+                <a:ln>
+                  <a:noFill/>
+                </a:ln>
                 <a:solidFill>
                   <a:srgbClr val="FDFDFD"/>
                 </a:solidFill>
+                <a:effectLst/>
+                <a:uLnTx/>
+                <a:uFillTx/>
                 <a:latin typeface="Calibri" panose="020F0502020204030204" pitchFamily="34" charset="0"/>
                 <a:ea typeface="MS PGothic" pitchFamily="34" charset="-128"/>
                 <a:cs typeface="Calibri" panose="020F0502020204030204" pitchFamily="34" charset="0"/>
@@ -25375,10 +25434,10 @@
       </p:sp>
       <p:sp>
         <p:nvSpPr>
-          <p:cNvPr id="7" name="Rounded Rectangle 6">
+          <p:cNvPr id="114" name="Rounded Rectangle 113">
             <a:extLst>
               <a:ext uri="{FF2B5EF4-FFF2-40B4-BE49-F238E27FC236}">
-                <a16:creationId xmlns:a16="http://schemas.microsoft.com/office/drawing/2014/main" id="{0790D936-5EDB-0A14-98C4-60665492C181}"/>
+                <a16:creationId xmlns:a16="http://schemas.microsoft.com/office/drawing/2014/main" id="{AD3CBD01-8C59-0C53-3540-27A0C61163D9}"/>
               </a:ext>
             </a:extLst>
           </p:cNvPr>
@@ -25387,7 +25446,7 @@
         </p:nvSpPr>
         <p:spPr bwMode="auto">
           <a:xfrm>
-            <a:off x="3397061" y="1429256"/>
+            <a:off x="5345573" y="3882487"/>
             <a:ext cx="1844092" cy="288000"/>
           </a:xfrm>
           <a:prstGeom prst="roundRect">
@@ -25409,22 +25468,36 @@
           <a:bodyPr wrap="none" lIns="121944" tIns="60972" rIns="121944" bIns="60972" anchor="ctr"/>
           <a:lstStyle/>
           <a:p>
-            <a:pPr algn="ctr" fontAlgn="auto">
+            <a:pPr marL="0" marR="0" lvl="0" indent="0" algn="ctr" defTabSz="914400" eaLnBrk="0" fontAlgn="auto" latinLnBrk="0" hangingPunct="0">
+              <a:lnSpc>
+                <a:spcPct val="100000"/>
+              </a:lnSpc>
               <a:spcBef>
                 <a:spcPts val="0"/>
               </a:spcBef>
               <a:spcAft>
                 <a:spcPts val="0"/>
               </a:spcAft>
+              <a:buClrTx/>
+              <a:buSzTx/>
+              <a:buFontTx/>
+              <a:buNone/>
+              <a:tabLst/>
               <a:defRPr/>
             </a:pPr>
             <a:r>
-              <a:rPr lang="en-US" sz="1400" b="1" kern="0">
+              <a:rPr kumimoji="0" lang="en-US" sz="1400" b="1" i="0" u="none" strike="noStrike" kern="0" cap="none" spc="0" normalizeH="0" baseline="0" noProof="0">
+                <a:ln>
+                  <a:noFill/>
+                </a:ln>
                 <a:solidFill>
                   <a:sysClr val="window" lastClr="FFFFFF"/>
                 </a:solidFill>
+                <a:effectLst/>
+                <a:uLnTx/>
+                <a:uFillTx/>
                 <a:latin typeface="Calibri" panose="020F0502020204030204" pitchFamily="34" charset="0"/>
-                <a:ea typeface="ＭＳ Ｐゴシック" pitchFamily="34" charset="-128"/>
+                <a:ea typeface="ＭＳ Ｐゴシック" panose="020B0600070205080204" pitchFamily="34" charset="-128"/>
                 <a:cs typeface="Calibri" panose="020F0502020204030204" pitchFamily="34" charset="0"/>
               </a:rPr>
               <a:t>Networking</a:t>
@@ -25434,10 +25507,10 @@
       </p:sp>
       <p:sp>
         <p:nvSpPr>
-          <p:cNvPr id="9" name="Rounded Rectangle 8">
+          <p:cNvPr id="115" name="Rounded Rectangle 114">
             <a:extLst>
               <a:ext uri="{FF2B5EF4-FFF2-40B4-BE49-F238E27FC236}">
-                <a16:creationId xmlns:a16="http://schemas.microsoft.com/office/drawing/2014/main" id="{8B463F3E-3724-5192-F2E8-861F5E155D81}"/>
+                <a16:creationId xmlns:a16="http://schemas.microsoft.com/office/drawing/2014/main" id="{2E388248-5924-5B37-D4AA-8F15B50C4EC7}"/>
               </a:ext>
             </a:extLst>
           </p:cNvPr>
@@ -25446,7 +25519,7 @@
         </p:nvSpPr>
         <p:spPr bwMode="auto">
           <a:xfrm>
-            <a:off x="1673170" y="1429256"/>
+            <a:off x="3621682" y="3882487"/>
             <a:ext cx="684000" cy="288000"/>
           </a:xfrm>
           <a:prstGeom prst="roundRect">
@@ -25468,22 +25541,36 @@
           <a:bodyPr wrap="none" lIns="121944" tIns="60972" rIns="121944" bIns="60972" anchor="ctr"/>
           <a:lstStyle/>
           <a:p>
-            <a:pPr algn="ctr" fontAlgn="auto">
+            <a:pPr marL="0" marR="0" lvl="0" indent="0" algn="ctr" defTabSz="914400" eaLnBrk="0" fontAlgn="auto" latinLnBrk="0" hangingPunct="0">
+              <a:lnSpc>
+                <a:spcPct val="100000"/>
+              </a:lnSpc>
               <a:spcBef>
                 <a:spcPts val="0"/>
               </a:spcBef>
               <a:spcAft>
                 <a:spcPts val="0"/>
               </a:spcAft>
+              <a:buClrTx/>
+              <a:buSzTx/>
+              <a:buFontTx/>
+              <a:buNone/>
+              <a:tabLst/>
               <a:defRPr/>
             </a:pPr>
             <a:r>
-              <a:rPr lang="en-US" sz="1400" b="1" kern="0">
+              <a:rPr kumimoji="0" lang="en-US" sz="1400" b="1" i="0" u="none" strike="noStrike" kern="0" cap="none" spc="0" normalizeH="0" baseline="0" noProof="0">
+                <a:ln>
+                  <a:noFill/>
+                </a:ln>
                 <a:solidFill>
                   <a:sysClr val="window" lastClr="FFFFFF"/>
                 </a:solidFill>
+                <a:effectLst/>
+                <a:uLnTx/>
+                <a:uFillTx/>
                 <a:latin typeface="Calibri" panose="020F0502020204030204" pitchFamily="34" charset="0"/>
-                <a:ea typeface="ＭＳ Ｐゴシック" pitchFamily="34" charset="-128"/>
+                <a:ea typeface="ＭＳ Ｐゴシック" panose="020B0600070205080204" pitchFamily="34" charset="-128"/>
                 <a:cs typeface="Calibri" panose="020F0502020204030204" pitchFamily="34" charset="0"/>
               </a:rPr>
               <a:t>Generic</a:t>
@@ -25493,10 +25580,10 @@
       </p:sp>
       <p:sp>
         <p:nvSpPr>
-          <p:cNvPr id="10" name="Rectangle 9">
+          <p:cNvPr id="120" name="Rectangle 119">
             <a:extLst>
               <a:ext uri="{FF2B5EF4-FFF2-40B4-BE49-F238E27FC236}">
-                <a16:creationId xmlns:a16="http://schemas.microsoft.com/office/drawing/2014/main" id="{41E64819-5585-43F5-BE77-30FEECF0CFCB}"/>
+                <a16:creationId xmlns:a16="http://schemas.microsoft.com/office/drawing/2014/main" id="{117FFCD4-DBB6-172C-D831-C5B5F304812B}"/>
               </a:ext>
             </a:extLst>
           </p:cNvPr>
@@ -25505,48 +25592,56 @@
         </p:nvSpPr>
         <p:spPr bwMode="auto">
           <a:xfrm>
-            <a:off x="6218261" y="1836620"/>
+            <a:off x="8166773" y="4289851"/>
             <a:ext cx="684000" cy="216000"/>
           </a:xfrm>
           <a:prstGeom prst="rect">
             <a:avLst/>
           </a:prstGeom>
           <a:noFill/>
-          <a:ln w="6350">
+          <a:ln w="6350" cap="flat" cmpd="sng" algn="ctr">
             <a:solidFill>
-              <a:schemeClr val="tx1"/>
+              <a:srgbClr val="000000"/>
             </a:solidFill>
-          </a:ln>
-        </p:spPr>
-        <p:style>
-          <a:lnRef idx="2">
-            <a:schemeClr val="accent1">
-              <a:shade val="50000"/>
-            </a:schemeClr>
-          </a:lnRef>
-          <a:fillRef idx="1">
-            <a:schemeClr val="accent1"/>
-          </a:fillRef>
-          <a:effectRef idx="0">
-            <a:schemeClr val="accent1"/>
-          </a:effectRef>
-          <a:fontRef idx="minor">
-            <a:schemeClr val="lt1"/>
-          </a:fontRef>
-        </p:style>
+            <a:prstDash val="solid"/>
+            <a:miter lim="800000"/>
+          </a:ln>
+          <a:effectLst/>
+        </p:spPr>
         <p:txBody>
           <a:bodyPr anchor="ctr"/>
           <a:lstStyle/>
           <a:p>
-            <a:pPr algn="ctr">
+            <a:pPr marL="0" marR="0" lvl="0" indent="0" algn="ctr" defTabSz="914400" eaLnBrk="0" fontAlgn="base" latinLnBrk="0" hangingPunct="0">
+              <a:lnSpc>
+                <a:spcPct val="100000"/>
+              </a:lnSpc>
+              <a:spcBef>
+                <a:spcPct val="0"/>
+              </a:spcBef>
+              <a:spcAft>
+                <a:spcPct val="0"/>
+              </a:spcAft>
+              <a:buClrTx/>
+              <a:buSzTx/>
+              <a:buFontTx/>
+              <a:buNone/>
+              <a:tabLst/>
               <a:defRPr/>
             </a:pPr>
             <a:r>
-              <a:rPr lang="en-US" sz="1100">
+              <a:rPr kumimoji="0" lang="en-US" sz="1100" b="0" i="0" u="none" strike="noStrike" kern="0" cap="none" spc="0" normalizeH="0" baseline="0" noProof="0">
+                <a:ln>
+                  <a:noFill/>
+                </a:ln>
                 <a:solidFill>
-                  <a:schemeClr val="tx1"/>
+                  <a:srgbClr val="000000"/>
                 </a:solidFill>
+                <a:effectLst/>
+                <a:uLnTx/>
+                <a:uFillTx/>
                 <a:latin typeface="Calibri" panose="020F0502020204030204" pitchFamily="34" charset="0"/>
+                <a:ea typeface="+mn-ea"/>
                 <a:cs typeface="Calibri" panose="020F0502020204030204" pitchFamily="34" charset="0"/>
               </a:rPr>
               <a:t>SPI0</a:t>
@@ -25556,10 +25651,10 @@
       </p:sp>
       <p:sp>
         <p:nvSpPr>
-          <p:cNvPr id="11" name="Rectangle 10">
+          <p:cNvPr id="121" name="Rectangle 120">
             <a:extLst>
               <a:ext uri="{FF2B5EF4-FFF2-40B4-BE49-F238E27FC236}">
-                <a16:creationId xmlns:a16="http://schemas.microsoft.com/office/drawing/2014/main" id="{0F27AE60-071B-007A-5058-46E39299D239}"/>
+                <a16:creationId xmlns:a16="http://schemas.microsoft.com/office/drawing/2014/main" id="{9B201D83-55F7-9B6A-3194-B76397D7E677}"/>
               </a:ext>
             </a:extLst>
           </p:cNvPr>
@@ -25568,48 +25663,56 @@
         </p:nvSpPr>
         <p:spPr bwMode="auto">
           <a:xfrm>
-            <a:off x="5296068" y="1836620"/>
+            <a:off x="7244580" y="4289851"/>
             <a:ext cx="864000" cy="216000"/>
           </a:xfrm>
           <a:prstGeom prst="rect">
             <a:avLst/>
           </a:prstGeom>
           <a:noFill/>
-          <a:ln w="6350">
+          <a:ln w="6350" cap="flat" cmpd="sng" algn="ctr">
             <a:solidFill>
-              <a:schemeClr val="tx1"/>
+              <a:srgbClr val="000000"/>
             </a:solidFill>
-          </a:ln>
-        </p:spPr>
-        <p:style>
-          <a:lnRef idx="2">
-            <a:schemeClr val="accent1">
-              <a:shade val="50000"/>
-            </a:schemeClr>
-          </a:lnRef>
-          <a:fillRef idx="1">
-            <a:schemeClr val="accent1"/>
-          </a:fillRef>
-          <a:effectRef idx="0">
-            <a:schemeClr val="accent1"/>
-          </a:effectRef>
-          <a:fontRef idx="minor">
-            <a:schemeClr val="lt1"/>
-          </a:fontRef>
-        </p:style>
+            <a:prstDash val="solid"/>
+            <a:miter lim="800000"/>
+          </a:ln>
+          <a:effectLst/>
+        </p:spPr>
         <p:txBody>
           <a:bodyPr anchor="ctr"/>
           <a:lstStyle/>
           <a:p>
-            <a:pPr algn="ctr">
+            <a:pPr marL="0" marR="0" lvl="0" indent="0" algn="ctr" defTabSz="914400" eaLnBrk="0" fontAlgn="base" latinLnBrk="0" hangingPunct="0">
+              <a:lnSpc>
+                <a:spcPct val="100000"/>
+              </a:lnSpc>
+              <a:spcBef>
+                <a:spcPct val="0"/>
+              </a:spcBef>
+              <a:spcAft>
+                <a:spcPct val="0"/>
+              </a:spcAft>
+              <a:buClrTx/>
+              <a:buSzTx/>
+              <a:buFontTx/>
+              <a:buNone/>
+              <a:tabLst/>
               <a:defRPr/>
             </a:pPr>
             <a:r>
-              <a:rPr lang="en-US" sz="1100">
+              <a:rPr kumimoji="0" lang="en-US" sz="1100" b="0" i="0" u="none" strike="noStrike" kern="0" cap="none" spc="0" normalizeH="0" baseline="0" noProof="0">
+                <a:ln>
+                  <a:noFill/>
+                </a:ln>
                 <a:solidFill>
-                  <a:schemeClr val="tx1"/>
+                  <a:srgbClr val="000000"/>
                 </a:solidFill>
+                <a:effectLst/>
+                <a:uLnTx/>
+                <a:uFillTx/>
                 <a:latin typeface="Calibri" panose="020F0502020204030204" pitchFamily="34" charset="0"/>
+                <a:ea typeface="+mn-ea"/>
                 <a:cs typeface="Calibri" panose="020F0502020204030204" pitchFamily="34" charset="0"/>
               </a:rPr>
               <a:t>MCI0</a:t>
@@ -25619,10 +25722,10 @@
       </p:sp>
       <p:sp>
         <p:nvSpPr>
-          <p:cNvPr id="13" name="Rectangle 12">
+          <p:cNvPr id="122" name="Rectangle 121">
             <a:extLst>
               <a:ext uri="{FF2B5EF4-FFF2-40B4-BE49-F238E27FC236}">
-                <a16:creationId xmlns:a16="http://schemas.microsoft.com/office/drawing/2014/main" id="{3A98AF13-41AB-0A47-445E-082AAA5A5B90}"/>
+                <a16:creationId xmlns:a16="http://schemas.microsoft.com/office/drawing/2014/main" id="{391FCF46-7614-7BDE-0184-72B8A95DAC02}"/>
               </a:ext>
             </a:extLst>
           </p:cNvPr>
@@ -25631,48 +25734,56 @@
         </p:nvSpPr>
         <p:spPr bwMode="auto">
           <a:xfrm>
-            <a:off x="2427188" y="1836620"/>
+            <a:off x="4375700" y="4289851"/>
             <a:ext cx="900000" cy="216000"/>
           </a:xfrm>
           <a:prstGeom prst="rect">
             <a:avLst/>
           </a:prstGeom>
           <a:noFill/>
-          <a:ln w="6350">
+          <a:ln w="6350" cap="flat" cmpd="sng" algn="ctr">
             <a:solidFill>
-              <a:schemeClr val="tx1"/>
+              <a:srgbClr val="000000"/>
             </a:solidFill>
-          </a:ln>
-        </p:spPr>
-        <p:style>
-          <a:lnRef idx="2">
-            <a:schemeClr val="accent1">
-              <a:shade val="50000"/>
-            </a:schemeClr>
-          </a:lnRef>
-          <a:fillRef idx="1">
-            <a:schemeClr val="accent1"/>
-          </a:fillRef>
-          <a:effectRef idx="0">
-            <a:schemeClr val="accent1"/>
-          </a:effectRef>
-          <a:fontRef idx="minor">
-            <a:schemeClr val="lt1"/>
-          </a:fontRef>
-        </p:style>
+            <a:prstDash val="solid"/>
+            <a:miter lim="800000"/>
+          </a:ln>
+          <a:effectLst/>
+        </p:spPr>
         <p:txBody>
           <a:bodyPr anchor="ctr"/>
           <a:lstStyle/>
           <a:p>
-            <a:pPr algn="ctr">
+            <a:pPr marL="0" marR="0" lvl="0" indent="0" algn="ctr" defTabSz="914400" eaLnBrk="0" fontAlgn="base" latinLnBrk="0" hangingPunct="0">
+              <a:lnSpc>
+                <a:spcPct val="100000"/>
+              </a:lnSpc>
+              <a:spcBef>
+                <a:spcPct val="0"/>
+              </a:spcBef>
+              <a:spcAft>
+                <a:spcPct val="0"/>
+              </a:spcAft>
+              <a:buClrTx/>
+              <a:buSzTx/>
+              <a:buFontTx/>
+              <a:buNone/>
+              <a:tabLst/>
               <a:defRPr/>
             </a:pPr>
             <a:r>
-              <a:rPr lang="en-US" sz="1100">
+              <a:rPr kumimoji="0" lang="en-US" sz="1100" b="0" i="0" u="none" strike="noStrike" kern="0" cap="none" spc="0" normalizeH="0" baseline="0" noProof="0">
+                <a:ln>
+                  <a:noFill/>
+                </a:ln>
                 <a:solidFill>
-                  <a:schemeClr val="tx1"/>
+                  <a:srgbClr val="000000"/>
                 </a:solidFill>
+                <a:effectLst/>
+                <a:uLnTx/>
+                <a:uFillTx/>
                 <a:latin typeface="Calibri" panose="020F0502020204030204" pitchFamily="34" charset="0"/>
+                <a:ea typeface="+mn-ea"/>
                 <a:cs typeface="Calibri" panose="020F0502020204030204" pitchFamily="34" charset="0"/>
               </a:rPr>
               <a:t>USBD0</a:t>
@@ -25682,10 +25793,10 @@
       </p:sp>
       <p:sp>
         <p:nvSpPr>
-          <p:cNvPr id="17" name="Rounded Rectangle 16">
+          <p:cNvPr id="123" name="Rounded Rectangle 122">
             <a:extLst>
               <a:ext uri="{FF2B5EF4-FFF2-40B4-BE49-F238E27FC236}">
-                <a16:creationId xmlns:a16="http://schemas.microsoft.com/office/drawing/2014/main" id="{124E1A72-1669-7DBD-EA23-0EB3287D7DD4}"/>
+                <a16:creationId xmlns:a16="http://schemas.microsoft.com/office/drawing/2014/main" id="{174A24DA-ABAD-DD03-F584-0E606E9B895E}"/>
               </a:ext>
             </a:extLst>
           </p:cNvPr>
@@ -25694,46 +25805,54 @@
         </p:nvSpPr>
         <p:spPr bwMode="auto">
           <a:xfrm>
-            <a:off x="593149" y="1836620"/>
-            <a:ext cx="1080000" cy="219686"/>
+            <a:off x="2646343" y="4289851"/>
+            <a:ext cx="975317" cy="219686"/>
           </a:xfrm>
           <a:prstGeom prst="roundRect">
             <a:avLst/>
           </a:prstGeom>
           <a:noFill/>
-          <a:ln w="12700">
+          <a:ln w="12700" cap="flat" cmpd="sng" algn="ctr">
             <a:noFill/>
-          </a:ln>
-        </p:spPr>
-        <p:style>
-          <a:lnRef idx="2">
-            <a:schemeClr val="accent1">
-              <a:shade val="50000"/>
-            </a:schemeClr>
-          </a:lnRef>
-          <a:fillRef idx="1">
-            <a:schemeClr val="accent1"/>
-          </a:fillRef>
-          <a:effectRef idx="0">
-            <a:schemeClr val="accent1"/>
-          </a:effectRef>
-          <a:fontRef idx="minor">
-            <a:schemeClr val="lt1"/>
-          </a:fontRef>
-        </p:style>
+            <a:prstDash val="solid"/>
+            <a:miter lim="800000"/>
+          </a:ln>
+          <a:effectLst/>
+        </p:spPr>
         <p:txBody>
           <a:bodyPr lIns="0" rIns="36000" anchor="ctr"/>
           <a:lstStyle/>
           <a:p>
-            <a:pPr algn="r">
+            <a:pPr marL="0" marR="0" lvl="0" indent="0" algn="r" defTabSz="914400" eaLnBrk="0" fontAlgn="base" latinLnBrk="0" hangingPunct="0">
+              <a:lnSpc>
+                <a:spcPct val="100000"/>
+              </a:lnSpc>
+              <a:spcBef>
+                <a:spcPct val="0"/>
+              </a:spcBef>
+              <a:spcAft>
+                <a:spcPct val="0"/>
+              </a:spcAft>
+              <a:buClrTx/>
+              <a:buSzTx/>
+              <a:buFontTx/>
+              <a:buNone/>
+              <a:tabLst/>
               <a:defRPr/>
             </a:pPr>
             <a:r>
-              <a:rPr lang="en-US" sz="1100">
+              <a:rPr kumimoji="0" lang="en-US" sz="1100" b="0" i="0" u="none" strike="noStrike" kern="0" cap="none" spc="0" normalizeH="0" baseline="0" noProof="0">
+                <a:ln>
+                  <a:noFill/>
+                </a:ln>
                 <a:solidFill>
-                  <a:schemeClr val="tx1"/>
+                  <a:srgbClr val="000000"/>
                 </a:solidFill>
+                <a:effectLst/>
+                <a:uLnTx/>
+                <a:uFillTx/>
                 <a:latin typeface="Calibri" panose="020F0502020204030204" pitchFamily="34" charset="0"/>
+                <a:ea typeface="+mn-ea"/>
                 <a:cs typeface="Calibri" panose="020F0502020204030204" pitchFamily="34" charset="0"/>
               </a:rPr>
               <a:t>Control Structs</a:t>
@@ -25743,10 +25862,10 @@
       </p:sp>
       <p:sp>
         <p:nvSpPr>
-          <p:cNvPr id="19" name="Rectangle 18">
+          <p:cNvPr id="132" name="Rectangle 131">
             <a:extLst>
               <a:ext uri="{FF2B5EF4-FFF2-40B4-BE49-F238E27FC236}">
-                <a16:creationId xmlns:a16="http://schemas.microsoft.com/office/drawing/2014/main" id="{BB7E5760-201A-C685-300F-69FD778AD4E4}"/>
+                <a16:creationId xmlns:a16="http://schemas.microsoft.com/office/drawing/2014/main" id="{32499253-184E-B162-CCC2-ABEAA434A124}"/>
               </a:ext>
             </a:extLst>
           </p:cNvPr>
@@ -25755,48 +25874,56 @@
         </p:nvSpPr>
         <p:spPr bwMode="auto">
           <a:xfrm>
-            <a:off x="6961310" y="1836620"/>
+            <a:off x="8909822" y="4289851"/>
             <a:ext cx="684000" cy="216000"/>
           </a:xfrm>
           <a:prstGeom prst="rect">
             <a:avLst/>
           </a:prstGeom>
           <a:noFill/>
-          <a:ln w="6350">
+          <a:ln w="6350" cap="flat" cmpd="sng" algn="ctr">
             <a:solidFill>
-              <a:schemeClr val="tx1"/>
+              <a:srgbClr val="000000"/>
             </a:solidFill>
-          </a:ln>
-        </p:spPr>
-        <p:style>
-          <a:lnRef idx="2">
-            <a:schemeClr val="accent1">
-              <a:shade val="50000"/>
-            </a:schemeClr>
-          </a:lnRef>
-          <a:fillRef idx="1">
-            <a:schemeClr val="accent1"/>
-          </a:fillRef>
-          <a:effectRef idx="0">
-            <a:schemeClr val="accent1"/>
-          </a:effectRef>
-          <a:fontRef idx="minor">
-            <a:schemeClr val="lt1"/>
-          </a:fontRef>
-        </p:style>
+            <a:prstDash val="solid"/>
+            <a:miter lim="800000"/>
+          </a:ln>
+          <a:effectLst/>
+        </p:spPr>
         <p:txBody>
           <a:bodyPr anchor="ctr"/>
           <a:lstStyle/>
           <a:p>
-            <a:pPr algn="ctr">
+            <a:pPr marL="0" marR="0" lvl="0" indent="0" algn="ctr" defTabSz="914400" eaLnBrk="0" fontAlgn="base" latinLnBrk="0" hangingPunct="0">
+              <a:lnSpc>
+                <a:spcPct val="100000"/>
+              </a:lnSpc>
+              <a:spcBef>
+                <a:spcPct val="0"/>
+              </a:spcBef>
+              <a:spcAft>
+                <a:spcPct val="0"/>
+              </a:spcAft>
+              <a:buClrTx/>
+              <a:buSzTx/>
+              <a:buFontTx/>
+              <a:buNone/>
+              <a:tabLst/>
               <a:defRPr/>
             </a:pPr>
             <a:r>
-              <a:rPr lang="en-US" sz="1100">
+              <a:rPr kumimoji="0" lang="en-US" sz="1100" b="0" i="0" u="none" strike="noStrike" kern="0" cap="none" spc="0" normalizeH="0" baseline="0" noProof="0">
+                <a:ln>
+                  <a:noFill/>
+                </a:ln>
                 <a:solidFill>
-                  <a:schemeClr val="tx1"/>
+                  <a:srgbClr val="000000"/>
                 </a:solidFill>
+                <a:effectLst/>
+                <a:uLnTx/>
+                <a:uFillTx/>
                 <a:latin typeface="Calibri" panose="020F0502020204030204" pitchFamily="34" charset="0"/>
+                <a:ea typeface="+mn-ea"/>
                 <a:cs typeface="Calibri" panose="020F0502020204030204" pitchFamily="34" charset="0"/>
               </a:rPr>
               <a:t>CAN0</a:t>
@@ -25806,10 +25933,10 @@
       </p:sp>
       <p:sp>
         <p:nvSpPr>
-          <p:cNvPr id="14" name="Rectangle 13">
+          <p:cNvPr id="136" name="Rectangle 135">
             <a:extLst>
               <a:ext uri="{FF2B5EF4-FFF2-40B4-BE49-F238E27FC236}">
-                <a16:creationId xmlns:a16="http://schemas.microsoft.com/office/drawing/2014/main" id="{64242524-24CF-DF65-519D-DA768C403A54}"/>
+                <a16:creationId xmlns:a16="http://schemas.microsoft.com/office/drawing/2014/main" id="{F8D1D9F6-D3E4-7610-02E4-3C37299F037B}"/>
               </a:ext>
             </a:extLst>
           </p:cNvPr>
@@ -25818,48 +25945,56 @@
         </p:nvSpPr>
         <p:spPr bwMode="auto">
           <a:xfrm>
-            <a:off x="3386237" y="1836620"/>
+            <a:off x="5334749" y="4289851"/>
             <a:ext cx="900000" cy="216000"/>
           </a:xfrm>
           <a:prstGeom prst="rect">
             <a:avLst/>
           </a:prstGeom>
           <a:noFill/>
-          <a:ln w="6350">
+          <a:ln w="6350" cap="flat" cmpd="sng" algn="ctr">
             <a:solidFill>
-              <a:schemeClr val="tx1"/>
+              <a:srgbClr val="000000"/>
             </a:solidFill>
-          </a:ln>
-        </p:spPr>
-        <p:style>
-          <a:lnRef idx="2">
-            <a:schemeClr val="accent1">
-              <a:shade val="50000"/>
-            </a:schemeClr>
-          </a:lnRef>
-          <a:fillRef idx="1">
-            <a:schemeClr val="accent1"/>
-          </a:fillRef>
-          <a:effectRef idx="0">
-            <a:schemeClr val="accent1"/>
-          </a:effectRef>
-          <a:fontRef idx="minor">
-            <a:schemeClr val="lt1"/>
-          </a:fontRef>
-        </p:style>
+            <a:prstDash val="solid"/>
+            <a:miter lim="800000"/>
+          </a:ln>
+          <a:effectLst/>
+        </p:spPr>
         <p:txBody>
           <a:bodyPr anchor="ctr"/>
           <a:lstStyle/>
           <a:p>
-            <a:pPr algn="ctr">
+            <a:pPr marL="0" marR="0" lvl="0" indent="0" algn="ctr" defTabSz="914400" eaLnBrk="0" fontAlgn="base" latinLnBrk="0" hangingPunct="0">
+              <a:lnSpc>
+                <a:spcPct val="100000"/>
+              </a:lnSpc>
+              <a:spcBef>
+                <a:spcPct val="0"/>
+              </a:spcBef>
+              <a:spcAft>
+                <a:spcPct val="0"/>
+              </a:spcAft>
+              <a:buClrTx/>
+              <a:buSzTx/>
+              <a:buFontTx/>
+              <a:buNone/>
+              <a:tabLst/>
               <a:defRPr/>
             </a:pPr>
             <a:r>
-              <a:rPr lang="en-US" sz="1100">
+              <a:rPr kumimoji="0" lang="en-US" sz="1100" b="0" i="0" u="none" strike="noStrike" kern="0" cap="none" spc="0" normalizeH="0" baseline="0" noProof="0">
+                <a:ln>
+                  <a:noFill/>
+                </a:ln>
                 <a:solidFill>
-                  <a:schemeClr val="tx1"/>
+                  <a:srgbClr val="000000"/>
                 </a:solidFill>
+                <a:effectLst/>
+                <a:uLnTx/>
+                <a:uFillTx/>
                 <a:latin typeface="Calibri" panose="020F0502020204030204" pitchFamily="34" charset="0"/>
+                <a:ea typeface="+mn-ea"/>
                 <a:cs typeface="Calibri" panose="020F0502020204030204" pitchFamily="34" charset="0"/>
               </a:rPr>
               <a:t>ETH_PHY0</a:t>
@@ -25869,10 +26004,10 @@
       </p:sp>
       <p:sp>
         <p:nvSpPr>
-          <p:cNvPr id="16" name="Rectangle 15">
+          <p:cNvPr id="137" name="Rectangle 136">
             <a:extLst>
               <a:ext uri="{FF2B5EF4-FFF2-40B4-BE49-F238E27FC236}">
-                <a16:creationId xmlns:a16="http://schemas.microsoft.com/office/drawing/2014/main" id="{C07C5AD1-F717-C30C-33AF-DC7E284815A6}"/>
+                <a16:creationId xmlns:a16="http://schemas.microsoft.com/office/drawing/2014/main" id="{C4925C99-41DF-CA69-48DA-2EA2C976F932}"/>
               </a:ext>
             </a:extLst>
           </p:cNvPr>
@@ -25881,48 +26016,56 @@
         </p:nvSpPr>
         <p:spPr bwMode="auto">
           <a:xfrm>
-            <a:off x="4341152" y="1836620"/>
+            <a:off x="6289664" y="4289851"/>
             <a:ext cx="900000" cy="216000"/>
           </a:xfrm>
           <a:prstGeom prst="rect">
             <a:avLst/>
           </a:prstGeom>
           <a:noFill/>
-          <a:ln w="6350">
+          <a:ln w="6350" cap="flat" cmpd="sng" algn="ctr">
             <a:solidFill>
-              <a:schemeClr val="tx1"/>
+              <a:srgbClr val="000000"/>
             </a:solidFill>
-          </a:ln>
-        </p:spPr>
-        <p:style>
-          <a:lnRef idx="2">
-            <a:schemeClr val="accent1">
-              <a:shade val="50000"/>
-            </a:schemeClr>
-          </a:lnRef>
-          <a:fillRef idx="1">
-            <a:schemeClr val="accent1"/>
-          </a:fillRef>
-          <a:effectRef idx="0">
-            <a:schemeClr val="accent1"/>
-          </a:effectRef>
-          <a:fontRef idx="minor">
-            <a:schemeClr val="lt1"/>
-          </a:fontRef>
-        </p:style>
+            <a:prstDash val="solid"/>
+            <a:miter lim="800000"/>
+          </a:ln>
+          <a:effectLst/>
+        </p:spPr>
         <p:txBody>
           <a:bodyPr anchor="ctr"/>
           <a:lstStyle/>
           <a:p>
-            <a:pPr algn="ctr">
+            <a:pPr marL="0" marR="0" lvl="0" indent="0" algn="ctr" defTabSz="914400" eaLnBrk="0" fontAlgn="base" latinLnBrk="0" hangingPunct="0">
+              <a:lnSpc>
+                <a:spcPct val="100000"/>
+              </a:lnSpc>
+              <a:spcBef>
+                <a:spcPct val="0"/>
+              </a:spcBef>
+              <a:spcAft>
+                <a:spcPct val="0"/>
+              </a:spcAft>
+              <a:buClrTx/>
+              <a:buSzTx/>
+              <a:buFontTx/>
+              <a:buNone/>
+              <a:tabLst/>
               <a:defRPr/>
             </a:pPr>
             <a:r>
-              <a:rPr lang="en-US" sz="1100">
+              <a:rPr kumimoji="0" lang="en-US" sz="1100" b="0" i="0" u="none" strike="noStrike" kern="0" cap="none" spc="0" normalizeH="0" baseline="0" noProof="0">
+                <a:ln>
+                  <a:noFill/>
+                </a:ln>
                 <a:solidFill>
-                  <a:schemeClr val="tx1"/>
+                  <a:srgbClr val="000000"/>
                 </a:solidFill>
+                <a:effectLst/>
+                <a:uLnTx/>
+                <a:uFillTx/>
                 <a:latin typeface="Calibri" panose="020F0502020204030204" pitchFamily="34" charset="0"/>
+                <a:ea typeface="+mn-ea"/>
                 <a:cs typeface="Calibri" panose="020F0502020204030204" pitchFamily="34" charset="0"/>
               </a:rPr>
               <a:t>ETH_MAC0</a:t>
@@ -25932,10 +26075,10 @@
       </p:sp>
       <p:sp>
         <p:nvSpPr>
-          <p:cNvPr id="22" name="Rectangle 21">
+          <p:cNvPr id="139" name="Rectangle 138">
             <a:extLst>
               <a:ext uri="{FF2B5EF4-FFF2-40B4-BE49-F238E27FC236}">
-                <a16:creationId xmlns:a16="http://schemas.microsoft.com/office/drawing/2014/main" id="{35EFC368-C610-0626-54A7-D1AF43BC25BC}"/>
+                <a16:creationId xmlns:a16="http://schemas.microsoft.com/office/drawing/2014/main" id="{BDD6F7D5-0998-BB97-15F3-39307DC10A69}"/>
               </a:ext>
             </a:extLst>
           </p:cNvPr>
@@ -25944,48 +26087,56 @@
         </p:nvSpPr>
         <p:spPr bwMode="auto">
           <a:xfrm>
-            <a:off x="1678607" y="1836620"/>
+            <a:off x="3627119" y="4289851"/>
             <a:ext cx="684000" cy="216000"/>
           </a:xfrm>
           <a:prstGeom prst="rect">
             <a:avLst/>
           </a:prstGeom>
           <a:noFill/>
-          <a:ln w="6350">
+          <a:ln w="6350" cap="flat" cmpd="sng" algn="ctr">
             <a:solidFill>
-              <a:schemeClr val="tx1"/>
+              <a:srgbClr val="000000"/>
             </a:solidFill>
-          </a:ln>
-        </p:spPr>
-        <p:style>
-          <a:lnRef idx="2">
-            <a:schemeClr val="accent1">
-              <a:shade val="50000"/>
-            </a:schemeClr>
-          </a:lnRef>
-          <a:fillRef idx="1">
-            <a:schemeClr val="accent1"/>
-          </a:fillRef>
-          <a:effectRef idx="0">
-            <a:schemeClr val="accent1"/>
-          </a:effectRef>
-          <a:fontRef idx="minor">
-            <a:schemeClr val="lt1"/>
-          </a:fontRef>
-        </p:style>
+            <a:prstDash val="solid"/>
+            <a:miter lim="800000"/>
+          </a:ln>
+          <a:effectLst/>
+        </p:spPr>
         <p:txBody>
           <a:bodyPr anchor="ctr"/>
           <a:lstStyle/>
           <a:p>
-            <a:pPr algn="ctr">
+            <a:pPr marL="0" marR="0" lvl="0" indent="0" algn="ctr" defTabSz="914400" eaLnBrk="0" fontAlgn="base" latinLnBrk="0" hangingPunct="0">
+              <a:lnSpc>
+                <a:spcPct val="100000"/>
+              </a:lnSpc>
+              <a:spcBef>
+                <a:spcPct val="0"/>
+              </a:spcBef>
+              <a:spcAft>
+                <a:spcPct val="0"/>
+              </a:spcAft>
+              <a:buClrTx/>
+              <a:buSzTx/>
+              <a:buFontTx/>
+              <a:buNone/>
+              <a:tabLst/>
               <a:defRPr/>
             </a:pPr>
             <a:r>
-              <a:rPr lang="en-US" sz="1100">
+              <a:rPr kumimoji="0" lang="en-US" sz="1100" b="0" i="0" u="none" strike="noStrike" kern="0" cap="none" spc="0" normalizeH="0" baseline="0" noProof="0">
+                <a:ln>
+                  <a:noFill/>
+                </a:ln>
                 <a:solidFill>
-                  <a:schemeClr val="tx1"/>
+                  <a:srgbClr val="000000"/>
                 </a:solidFill>
+                <a:effectLst/>
+                <a:uLnTx/>
+                <a:uFillTx/>
                 <a:latin typeface="Calibri" panose="020F0502020204030204" pitchFamily="34" charset="0"/>
+                <a:ea typeface="+mn-ea"/>
                 <a:cs typeface="Calibri" panose="020F0502020204030204" pitchFamily="34" charset="0"/>
               </a:rPr>
               <a:t>GPIO0</a:t>
@@ -25995,10 +26146,10 @@
       </p:sp>
       <p:sp>
         <p:nvSpPr>
-          <p:cNvPr id="23" name="Rounded Rectangle 22">
+          <p:cNvPr id="143" name="Rounded Rectangle 142">
             <a:extLst>
               <a:ext uri="{FF2B5EF4-FFF2-40B4-BE49-F238E27FC236}">
-                <a16:creationId xmlns:a16="http://schemas.microsoft.com/office/drawing/2014/main" id="{6FC437FC-9015-EBC6-FF24-C0B6CE178EB0}"/>
+                <a16:creationId xmlns:a16="http://schemas.microsoft.com/office/drawing/2014/main" id="{2C5A2E46-FD11-45C7-0352-2DA7B328855F}"/>
               </a:ext>
             </a:extLst>
           </p:cNvPr>
@@ -26007,7 +26158,7 @@
         </p:nvSpPr>
         <p:spPr bwMode="auto">
           <a:xfrm>
-            <a:off x="6961310" y="1429256"/>
+            <a:off x="8909822" y="3882487"/>
             <a:ext cx="684000" cy="288000"/>
           </a:xfrm>
           <a:prstGeom prst="roundRect">
@@ -26029,22 +26180,36 @@
           <a:bodyPr wrap="none" lIns="121944" tIns="60972" rIns="121944" bIns="60972" anchor="ctr"/>
           <a:lstStyle/>
           <a:p>
-            <a:pPr algn="ctr" fontAlgn="auto">
+            <a:pPr marL="0" marR="0" lvl="0" indent="0" algn="ctr" defTabSz="914400" eaLnBrk="0" fontAlgn="auto" latinLnBrk="0" hangingPunct="0">
+              <a:lnSpc>
+                <a:spcPct val="100000"/>
+              </a:lnSpc>
               <a:spcBef>
                 <a:spcPts val="0"/>
               </a:spcBef>
               <a:spcAft>
                 <a:spcPts val="0"/>
               </a:spcAft>
+              <a:buClrTx/>
+              <a:buSzTx/>
+              <a:buFontTx/>
+              <a:buNone/>
+              <a:tabLst/>
               <a:defRPr/>
             </a:pPr>
             <a:r>
-              <a:rPr lang="en-US" sz="1400" b="1" kern="0">
+              <a:rPr kumimoji="0" lang="en-US" sz="1400" b="1" i="0" u="none" strike="noStrike" kern="0" cap="none" spc="0" normalizeH="0" baseline="0" noProof="0">
+                <a:ln>
+                  <a:noFill/>
+                </a:ln>
                 <a:solidFill>
                   <a:sysClr val="window" lastClr="FFFFFF"/>
                 </a:solidFill>
+                <a:effectLst/>
+                <a:uLnTx/>
+                <a:uFillTx/>
                 <a:latin typeface="Calibri" panose="020F0502020204030204" pitchFamily="34" charset="0"/>
-                <a:ea typeface="ＭＳ Ｐゴシック" pitchFamily="34" charset="-128"/>
+                <a:ea typeface="ＭＳ Ｐゴシック" panose="020B0600070205080204" pitchFamily="34" charset="-128"/>
                 <a:cs typeface="Calibri" panose="020F0502020204030204" pitchFamily="34" charset="0"/>
               </a:rPr>
               <a:t>CAN</a:t>
@@ -26054,10 +26219,10 @@
       </p:sp>
       <p:sp>
         <p:nvSpPr>
-          <p:cNvPr id="25" name="Rounded Rectangle 24">
+          <p:cNvPr id="149" name="Rounded Rectangle 148">
             <a:extLst>
               <a:ext uri="{FF2B5EF4-FFF2-40B4-BE49-F238E27FC236}">
-                <a16:creationId xmlns:a16="http://schemas.microsoft.com/office/drawing/2014/main" id="{75BBDD7B-7AA8-E81A-5B23-94A97131EF56}"/>
+                <a16:creationId xmlns:a16="http://schemas.microsoft.com/office/drawing/2014/main" id="{C312DF6E-E496-3CA1-C01F-434B2245F022}"/>
               </a:ext>
             </a:extLst>
           </p:cNvPr>
@@ -26066,7 +26231,7 @@
         </p:nvSpPr>
         <p:spPr bwMode="auto">
           <a:xfrm>
-            <a:off x="6218261" y="2169442"/>
+            <a:off x="8166773" y="4622673"/>
             <a:ext cx="684000" cy="288000"/>
           </a:xfrm>
           <a:prstGeom prst="roundRect">
@@ -26090,22 +26255,36 @@
           </a:bodyPr>
           <a:lstStyle/>
           <a:p>
-            <a:pPr algn="ctr" fontAlgn="auto">
+            <a:pPr marL="0" marR="0" lvl="0" indent="0" algn="ctr" defTabSz="914400" eaLnBrk="0" fontAlgn="auto" latinLnBrk="0" hangingPunct="0">
+              <a:lnSpc>
+                <a:spcPct val="100000"/>
+              </a:lnSpc>
               <a:spcBef>
                 <a:spcPts val="0"/>
               </a:spcBef>
               <a:spcAft>
                 <a:spcPts val="0"/>
               </a:spcAft>
+              <a:buClrTx/>
+              <a:buSzTx/>
+              <a:buFontTx/>
+              <a:buNone/>
+              <a:tabLst/>
               <a:defRPr/>
             </a:pPr>
             <a:r>
-              <a:rPr lang="en-US" sz="1400" b="1" kern="0">
+              <a:rPr kumimoji="0" lang="en-US" sz="1400" b="1" i="0" u="none" strike="noStrike" kern="0" cap="none" spc="0" normalizeH="0" baseline="0" noProof="0">
+                <a:ln>
+                  <a:noFill/>
+                </a:ln>
                 <a:solidFill>
                   <a:sysClr val="window" lastClr="FFFFFF"/>
                 </a:solidFill>
+                <a:effectLst/>
+                <a:uLnTx/>
+                <a:uFillTx/>
                 <a:latin typeface="Calibri" panose="020F0502020204030204" pitchFamily="34" charset="0"/>
-                <a:ea typeface="ＭＳ Ｐゴシック" pitchFamily="34" charset="-128"/>
+                <a:ea typeface="ＭＳ Ｐゴシック" panose="020B0600070205080204" pitchFamily="34" charset="-128"/>
                 <a:cs typeface="Calibri" panose="020F0502020204030204" pitchFamily="34" charset="0"/>
               </a:rPr>
               <a:t>SPI</a:t>
@@ -26115,10 +26294,10 @@
       </p:sp>
       <p:sp>
         <p:nvSpPr>
-          <p:cNvPr id="26" name="Rounded Rectangle 25">
+          <p:cNvPr id="150" name="Rounded Rectangle 149">
             <a:extLst>
               <a:ext uri="{FF2B5EF4-FFF2-40B4-BE49-F238E27FC236}">
-                <a16:creationId xmlns:a16="http://schemas.microsoft.com/office/drawing/2014/main" id="{CDAF23D6-6158-9562-E41B-BD2088221D66}"/>
+                <a16:creationId xmlns:a16="http://schemas.microsoft.com/office/drawing/2014/main" id="{1F469D37-409A-0457-1AA0-BD30771D26E0}"/>
               </a:ext>
             </a:extLst>
           </p:cNvPr>
@@ -26127,7 +26306,7 @@
         </p:nvSpPr>
         <p:spPr bwMode="auto">
           <a:xfrm>
-            <a:off x="5296068" y="2169442"/>
+            <a:off x="7244580" y="4622673"/>
             <a:ext cx="864000" cy="288000"/>
           </a:xfrm>
           <a:prstGeom prst="roundRect">
@@ -26151,22 +26330,36 @@
           </a:bodyPr>
           <a:lstStyle/>
           <a:p>
-            <a:pPr algn="ctr" fontAlgn="auto">
+            <a:pPr marL="0" marR="0" lvl="0" indent="0" algn="ctr" defTabSz="914400" eaLnBrk="0" fontAlgn="auto" latinLnBrk="0" hangingPunct="0">
+              <a:lnSpc>
+                <a:spcPct val="100000"/>
+              </a:lnSpc>
               <a:spcBef>
                 <a:spcPts val="0"/>
               </a:spcBef>
               <a:spcAft>
                 <a:spcPts val="0"/>
               </a:spcAft>
+              <a:buClrTx/>
+              <a:buSzTx/>
+              <a:buFontTx/>
+              <a:buNone/>
+              <a:tabLst/>
               <a:defRPr/>
             </a:pPr>
             <a:r>
-              <a:rPr lang="en-US" sz="1400" b="1" kern="0">
+              <a:rPr kumimoji="0" lang="en-US" sz="1400" b="1" i="0" u="none" strike="noStrike" kern="0" cap="none" spc="0" normalizeH="0" baseline="0" noProof="0">
+                <a:ln>
+                  <a:noFill/>
+                </a:ln>
                 <a:solidFill>
                   <a:sysClr val="window" lastClr="FFFFFF"/>
                 </a:solidFill>
+                <a:effectLst/>
+                <a:uLnTx/>
+                <a:uFillTx/>
                 <a:latin typeface="Calibri" panose="020F0502020204030204" pitchFamily="34" charset="0"/>
-                <a:ea typeface="ＭＳ Ｐゴシック" pitchFamily="34" charset="-128"/>
+                <a:ea typeface="ＭＳ Ｐゴシック" panose="020B0600070205080204" pitchFamily="34" charset="-128"/>
                 <a:cs typeface="Calibri" panose="020F0502020204030204" pitchFamily="34" charset="0"/>
               </a:rPr>
               <a:t>MCI</a:t>
@@ -26176,10 +26369,10 @@
       </p:sp>
       <p:sp>
         <p:nvSpPr>
-          <p:cNvPr id="28" name="Rounded Rectangle 27">
+          <p:cNvPr id="151" name="Rounded Rectangle 150">
             <a:extLst>
               <a:ext uri="{FF2B5EF4-FFF2-40B4-BE49-F238E27FC236}">
-                <a16:creationId xmlns:a16="http://schemas.microsoft.com/office/drawing/2014/main" id="{DD1E0E29-1F06-642B-017C-F6ABC1BEA674}"/>
+                <a16:creationId xmlns:a16="http://schemas.microsoft.com/office/drawing/2014/main" id="{49BBE379-FF91-A196-AE44-D3DB325F6E0C}"/>
               </a:ext>
             </a:extLst>
           </p:cNvPr>
@@ -26188,7 +26381,7 @@
         </p:nvSpPr>
         <p:spPr bwMode="auto">
           <a:xfrm>
-            <a:off x="2427188" y="2169442"/>
+            <a:off x="4375700" y="4622673"/>
             <a:ext cx="900000" cy="288000"/>
           </a:xfrm>
           <a:prstGeom prst="roundRect">
@@ -26212,22 +26405,36 @@
           </a:bodyPr>
           <a:lstStyle/>
           <a:p>
-            <a:pPr algn="ctr" fontAlgn="auto">
+            <a:pPr marL="0" marR="0" lvl="0" indent="0" algn="ctr" defTabSz="914400" eaLnBrk="0" fontAlgn="auto" latinLnBrk="0" hangingPunct="0">
+              <a:lnSpc>
+                <a:spcPct val="100000"/>
+              </a:lnSpc>
               <a:spcBef>
                 <a:spcPts val="0"/>
               </a:spcBef>
               <a:spcAft>
                 <a:spcPts val="0"/>
               </a:spcAft>
+              <a:buClrTx/>
+              <a:buSzTx/>
+              <a:buFontTx/>
+              <a:buNone/>
+              <a:tabLst/>
               <a:defRPr/>
             </a:pPr>
             <a:r>
-              <a:rPr lang="en-US" sz="1400" b="1" kern="0">
+              <a:rPr kumimoji="0" lang="en-US" sz="1400" b="1" i="0" u="none" strike="noStrike" kern="0" cap="none" spc="0" normalizeH="0" baseline="0" noProof="0">
+                <a:ln>
+                  <a:noFill/>
+                </a:ln>
                 <a:solidFill>
                   <a:sysClr val="window" lastClr="FFFFFF"/>
                 </a:solidFill>
+                <a:effectLst/>
+                <a:uLnTx/>
+                <a:uFillTx/>
                 <a:latin typeface="Calibri" panose="020F0502020204030204" pitchFamily="34" charset="0"/>
-                <a:ea typeface="ＭＳ Ｐゴシック" pitchFamily="34" charset="-128"/>
+                <a:ea typeface="ＭＳ Ｐゴシック" panose="020B0600070205080204" pitchFamily="34" charset="-128"/>
                 <a:cs typeface="Calibri" panose="020F0502020204030204" pitchFamily="34" charset="0"/>
               </a:rPr>
               <a:t>USB Device</a:t>
@@ -26237,10 +26444,10 @@
       </p:sp>
       <p:sp>
         <p:nvSpPr>
-          <p:cNvPr id="30" name="Rounded Rectangle 29">
+          <p:cNvPr id="152" name="Rounded Rectangle 151">
             <a:extLst>
               <a:ext uri="{FF2B5EF4-FFF2-40B4-BE49-F238E27FC236}">
-                <a16:creationId xmlns:a16="http://schemas.microsoft.com/office/drawing/2014/main" id="{858BE6E4-FF32-92B8-83F1-F06CF6AA417C}"/>
+                <a16:creationId xmlns:a16="http://schemas.microsoft.com/office/drawing/2014/main" id="{492573DD-9999-D622-548B-F129E355418E}"/>
               </a:ext>
             </a:extLst>
           </p:cNvPr>
@@ -26249,7 +26456,7 @@
         </p:nvSpPr>
         <p:spPr bwMode="auto">
           <a:xfrm>
-            <a:off x="3386237" y="2169442"/>
+            <a:off x="5334749" y="4622673"/>
             <a:ext cx="900000" cy="288000"/>
           </a:xfrm>
           <a:prstGeom prst="roundRect">
@@ -26273,22 +26480,36 @@
           </a:bodyPr>
           <a:lstStyle/>
           <a:p>
-            <a:pPr algn="ctr" fontAlgn="auto">
+            <a:pPr marL="0" marR="0" lvl="0" indent="0" algn="ctr" defTabSz="914400" eaLnBrk="0" fontAlgn="auto" latinLnBrk="0" hangingPunct="0">
+              <a:lnSpc>
+                <a:spcPct val="100000"/>
+              </a:lnSpc>
               <a:spcBef>
                 <a:spcPts val="0"/>
               </a:spcBef>
               <a:spcAft>
                 <a:spcPts val="0"/>
               </a:spcAft>
+              <a:buClrTx/>
+              <a:buSzTx/>
+              <a:buFontTx/>
+              <a:buNone/>
+              <a:tabLst/>
               <a:defRPr/>
             </a:pPr>
             <a:r>
-              <a:rPr lang="en-US" sz="1400" b="1" kern="0">
+              <a:rPr kumimoji="0" lang="en-US" sz="1400" b="1" i="0" u="none" strike="noStrike" kern="0" cap="none" spc="0" normalizeH="0" baseline="0" noProof="0">
+                <a:ln>
+                  <a:noFill/>
+                </a:ln>
                 <a:solidFill>
                   <a:sysClr val="window" lastClr="FFFFFF"/>
                 </a:solidFill>
+                <a:effectLst/>
+                <a:uLnTx/>
+                <a:uFillTx/>
                 <a:latin typeface="Calibri" panose="020F0502020204030204" pitchFamily="34" charset="0"/>
-                <a:ea typeface="ＭＳ Ｐゴシック" pitchFamily="34" charset="-128"/>
+                <a:ea typeface="ＭＳ Ｐゴシック" panose="020B0600070205080204" pitchFamily="34" charset="-128"/>
                 <a:cs typeface="Calibri" panose="020F0502020204030204" pitchFamily="34" charset="0"/>
               </a:rPr>
               <a:t>Eth. PHY</a:t>
@@ -26298,10 +26519,10 @@
       </p:sp>
       <p:sp>
         <p:nvSpPr>
-          <p:cNvPr id="31" name="Rounded Rectangle 30">
+          <p:cNvPr id="153" name="Rounded Rectangle 152">
             <a:extLst>
               <a:ext uri="{FF2B5EF4-FFF2-40B4-BE49-F238E27FC236}">
-                <a16:creationId xmlns:a16="http://schemas.microsoft.com/office/drawing/2014/main" id="{B14B8886-0478-9C23-AC12-3CE03744709F}"/>
+                <a16:creationId xmlns:a16="http://schemas.microsoft.com/office/drawing/2014/main" id="{39DC9682-E912-874D-A5FE-3DF1DDB03135}"/>
               </a:ext>
             </a:extLst>
           </p:cNvPr>
@@ -26310,7 +26531,7 @@
         </p:nvSpPr>
         <p:spPr bwMode="auto">
           <a:xfrm>
-            <a:off x="4341152" y="2169442"/>
+            <a:off x="6289664" y="4622673"/>
             <a:ext cx="900000" cy="288000"/>
           </a:xfrm>
           <a:prstGeom prst="roundRect">
@@ -26334,22 +26555,36 @@
           </a:bodyPr>
           <a:lstStyle/>
           <a:p>
-            <a:pPr algn="ctr" fontAlgn="auto">
+            <a:pPr marL="0" marR="0" lvl="0" indent="0" algn="ctr" defTabSz="914400" eaLnBrk="0" fontAlgn="auto" latinLnBrk="0" hangingPunct="0">
+              <a:lnSpc>
+                <a:spcPct val="100000"/>
+              </a:lnSpc>
               <a:spcBef>
                 <a:spcPts val="0"/>
               </a:spcBef>
               <a:spcAft>
                 <a:spcPts val="0"/>
               </a:spcAft>
+              <a:buClrTx/>
+              <a:buSzTx/>
+              <a:buFontTx/>
+              <a:buNone/>
+              <a:tabLst/>
               <a:defRPr/>
             </a:pPr>
             <a:r>
-              <a:rPr lang="en-US" sz="1400" b="1" kern="0">
+              <a:rPr kumimoji="0" lang="en-US" sz="1400" b="1" i="0" u="none" strike="noStrike" kern="0" cap="none" spc="0" normalizeH="0" baseline="0" noProof="0">
+                <a:ln>
+                  <a:noFill/>
+                </a:ln>
                 <a:solidFill>
                   <a:sysClr val="window" lastClr="FFFFFF"/>
                 </a:solidFill>
+                <a:effectLst/>
+                <a:uLnTx/>
+                <a:uFillTx/>
                 <a:latin typeface="Calibri" panose="020F0502020204030204" pitchFamily="34" charset="0"/>
-                <a:ea typeface="ＭＳ Ｐゴシック" pitchFamily="34" charset="-128"/>
+                <a:ea typeface="ＭＳ Ｐゴシック" panose="020B0600070205080204" pitchFamily="34" charset="-128"/>
                 <a:cs typeface="Calibri" panose="020F0502020204030204" pitchFamily="34" charset="0"/>
               </a:rPr>
               <a:t>Eth. MAC</a:t>
@@ -26359,10 +26594,10 @@
       </p:sp>
       <p:sp>
         <p:nvSpPr>
-          <p:cNvPr id="33" name="Rounded Rectangle 32">
+          <p:cNvPr id="154" name="Rounded Rectangle 153">
             <a:extLst>
               <a:ext uri="{FF2B5EF4-FFF2-40B4-BE49-F238E27FC236}">
-                <a16:creationId xmlns:a16="http://schemas.microsoft.com/office/drawing/2014/main" id="{50C0D808-CA2D-9F60-DB5D-66F2E914D2C4}"/>
+                <a16:creationId xmlns:a16="http://schemas.microsoft.com/office/drawing/2014/main" id="{59A07E10-7985-18F0-86DD-2A687D9AD0BC}"/>
               </a:ext>
             </a:extLst>
           </p:cNvPr>
@@ -26371,7 +26606,7 @@
         </p:nvSpPr>
         <p:spPr bwMode="auto">
           <a:xfrm>
-            <a:off x="6961310" y="2169442"/>
+            <a:off x="8909822" y="4622673"/>
             <a:ext cx="684000" cy="288000"/>
           </a:xfrm>
           <a:prstGeom prst="roundRect">
@@ -26395,22 +26630,36 @@
           </a:bodyPr>
           <a:lstStyle/>
           <a:p>
-            <a:pPr algn="ctr" fontAlgn="auto">
+            <a:pPr marL="0" marR="0" lvl="0" indent="0" algn="ctr" defTabSz="914400" eaLnBrk="0" fontAlgn="auto" latinLnBrk="0" hangingPunct="0">
+              <a:lnSpc>
+                <a:spcPct val="100000"/>
+              </a:lnSpc>
               <a:spcBef>
                 <a:spcPts val="0"/>
               </a:spcBef>
               <a:spcAft>
                 <a:spcPts val="0"/>
               </a:spcAft>
+              <a:buClrTx/>
+              <a:buSzTx/>
+              <a:buFontTx/>
+              <a:buNone/>
+              <a:tabLst/>
               <a:defRPr/>
             </a:pPr>
             <a:r>
-              <a:rPr lang="en-US" sz="1400" b="1" kern="0">
+              <a:rPr kumimoji="0" lang="en-US" sz="1400" b="1" i="0" u="none" strike="noStrike" kern="0" cap="none" spc="0" normalizeH="0" baseline="0" noProof="0">
+                <a:ln>
+                  <a:noFill/>
+                </a:ln>
                 <a:solidFill>
                   <a:sysClr val="window" lastClr="FFFFFF"/>
                 </a:solidFill>
+                <a:effectLst/>
+                <a:uLnTx/>
+                <a:uFillTx/>
                 <a:latin typeface="Calibri" panose="020F0502020204030204" pitchFamily="34" charset="0"/>
-                <a:ea typeface="ＭＳ Ｐゴシック" pitchFamily="34" charset="-128"/>
+                <a:ea typeface="ＭＳ Ｐゴシック" panose="020B0600070205080204" pitchFamily="34" charset="-128"/>
                 <a:cs typeface="Calibri" panose="020F0502020204030204" pitchFamily="34" charset="0"/>
               </a:rPr>
               <a:t>CAN</a:t>
@@ -26420,10 +26669,10 @@
       </p:sp>
       <p:sp>
         <p:nvSpPr>
-          <p:cNvPr id="38" name="Rounded Rectangle 37">
+          <p:cNvPr id="155" name="Rounded Rectangle 154">
             <a:extLst>
               <a:ext uri="{FF2B5EF4-FFF2-40B4-BE49-F238E27FC236}">
-                <a16:creationId xmlns:a16="http://schemas.microsoft.com/office/drawing/2014/main" id="{2D4DA2DE-C564-E15D-1CCD-D347BCAA9DE7}"/>
+                <a16:creationId xmlns:a16="http://schemas.microsoft.com/office/drawing/2014/main" id="{25D90CF8-12CA-9AFA-1A8F-949A2C3001B5}"/>
               </a:ext>
             </a:extLst>
           </p:cNvPr>
@@ -26432,7 +26681,7 @@
         </p:nvSpPr>
         <p:spPr bwMode="auto">
           <a:xfrm>
-            <a:off x="1678607" y="2169442"/>
+            <a:off x="3627119" y="4622673"/>
             <a:ext cx="684000" cy="288000"/>
           </a:xfrm>
           <a:prstGeom prst="roundRect">
@@ -26456,22 +26705,36 @@
           </a:bodyPr>
           <a:lstStyle/>
           <a:p>
-            <a:pPr algn="ctr" fontAlgn="auto">
+            <a:pPr marL="0" marR="0" lvl="0" indent="0" algn="ctr" defTabSz="914400" eaLnBrk="0" fontAlgn="auto" latinLnBrk="0" hangingPunct="0">
+              <a:lnSpc>
+                <a:spcPct val="100000"/>
+              </a:lnSpc>
               <a:spcBef>
                 <a:spcPts val="0"/>
               </a:spcBef>
               <a:spcAft>
                 <a:spcPts val="0"/>
               </a:spcAft>
+              <a:buClrTx/>
+              <a:buSzTx/>
+              <a:buFontTx/>
+              <a:buNone/>
+              <a:tabLst/>
               <a:defRPr/>
             </a:pPr>
             <a:r>
-              <a:rPr lang="en-US" sz="1400" b="1" kern="0">
+              <a:rPr kumimoji="0" lang="en-US" sz="1400" b="1" i="0" u="none" strike="noStrike" kern="0" cap="none" spc="0" normalizeH="0" baseline="0" noProof="0">
+                <a:ln>
+                  <a:noFill/>
+                </a:ln>
                 <a:solidFill>
                   <a:sysClr val="window" lastClr="FFFFFF"/>
                 </a:solidFill>
+                <a:effectLst/>
+                <a:uLnTx/>
+                <a:uFillTx/>
                 <a:latin typeface="Calibri" panose="020F0502020204030204" pitchFamily="34" charset="0"/>
-                <a:ea typeface="ＭＳ Ｐゴシック" pitchFamily="34" charset="-128"/>
+                <a:ea typeface="ＭＳ Ｐゴシック" panose="020B0600070205080204" pitchFamily="34" charset="-128"/>
                 <a:cs typeface="Calibri" panose="020F0502020204030204" pitchFamily="34" charset="0"/>
               </a:rPr>
               <a:t>GPIO</a:t>
@@ -26481,10 +26744,10 @@
       </p:sp>
       <p:sp>
         <p:nvSpPr>
-          <p:cNvPr id="39" name="TextBox 38">
+          <p:cNvPr id="156" name="TextBox 155">
             <a:extLst>
               <a:ext uri="{FF2B5EF4-FFF2-40B4-BE49-F238E27FC236}">
-                <a16:creationId xmlns:a16="http://schemas.microsoft.com/office/drawing/2014/main" id="{484C5234-46E1-9C3C-AE48-419A8EB26929}"/>
+                <a16:creationId xmlns:a16="http://schemas.microsoft.com/office/drawing/2014/main" id="{CFD1D0CC-C985-FBE9-9626-1F5AFED37241}"/>
               </a:ext>
             </a:extLst>
           </p:cNvPr>
@@ -26493,8 +26756,8 @@
         </p:nvSpPr>
         <p:spPr bwMode="auto">
           <a:xfrm>
-            <a:off x="6218261" y="2574820"/>
-            <a:ext cx="684000" cy="432000"/>
+            <a:off x="8166773" y="5028051"/>
+            <a:ext cx="684000" cy="430332"/>
           </a:xfrm>
           <a:prstGeom prst="rect">
             <a:avLst/>
@@ -26507,47 +26770,54 @@
           </a:ln>
         </p:spPr>
         <p:txBody>
-          <a:bodyPr lIns="72000" rIns="72000">
-            <a:spAutoFit/>
+          <a:bodyPr lIns="72000" rIns="72000" anchor="ctr">
+            <a:noAutofit/>
           </a:bodyPr>
           <a:lstStyle/>
           <a:p>
-            <a:pPr algn="ctr">
+            <a:pPr marL="0" marR="0" lvl="0" indent="0" algn="ctr" defTabSz="914400" eaLnBrk="0" fontAlgn="base" latinLnBrk="0" hangingPunct="0">
+              <a:lnSpc>
+                <a:spcPct val="100000"/>
+              </a:lnSpc>
+              <a:spcBef>
+                <a:spcPct val="0"/>
+              </a:spcBef>
+              <a:spcAft>
+                <a:spcPct val="0"/>
+              </a:spcAft>
+              <a:buClrTx/>
+              <a:buSzTx/>
+              <a:buFontTx/>
+              <a:buNone/>
+              <a:tabLst/>
               <a:defRPr/>
             </a:pPr>
             <a:r>
-              <a:rPr lang="en-US" sz="1400">
+              <a:rPr kumimoji="0" lang="en-US" sz="1400" b="0" i="0" u="none" strike="noStrike" kern="0" cap="none" spc="0" normalizeH="0" baseline="0" noProof="0" dirty="0">
+                <a:ln>
+                  <a:noFill/>
+                </a:ln>
+                <a:solidFill>
+                  <a:srgbClr val="000000"/>
+                </a:solidFill>
+                <a:effectLst/>
+                <a:uLnTx/>
+                <a:uFillTx/>
                 <a:latin typeface="Calibri" panose="020F0502020204030204" pitchFamily="34" charset="0"/>
+                <a:ea typeface="ＭＳ Ｐゴシック" panose="020B0600070205080204" pitchFamily="34" charset="-128"/>
                 <a:cs typeface="Calibri" panose="020F0502020204030204" pitchFamily="34" charset="0"/>
               </a:rPr>
               <a:t>SPI</a:t>
             </a:r>
           </a:p>
-          <a:p>
-            <a:pPr algn="ctr">
-              <a:defRPr/>
-            </a:pPr>
-            <a:r>
-              <a:rPr lang="en-US" sz="800">
-                <a:latin typeface="Calibri" panose="020F0502020204030204" pitchFamily="34" charset="0"/>
-                <a:cs typeface="Calibri" panose="020F0502020204030204" pitchFamily="34" charset="0"/>
-              </a:rPr>
-              <a:t>Controller</a:t>
-            </a:r>
-            <a:endParaRPr lang="en-US" sz="800">
-              <a:latin typeface="Calibri" panose="020F0502020204030204" pitchFamily="34" charset="0"/>
-              <a:ea typeface="Segoe UI" panose="020B0502040204020203" pitchFamily="34" charset="0"/>
-              <a:cs typeface="Calibri" panose="020F0502020204030204" pitchFamily="34" charset="0"/>
-            </a:endParaRPr>
-          </a:p>
-        </p:txBody>
-      </p:sp>
-      <p:sp>
-        <p:nvSpPr>
-          <p:cNvPr id="42" name="TextBox 41">
+        </p:txBody>
+      </p:sp>
+      <p:sp>
+        <p:nvSpPr>
+          <p:cNvPr id="157" name="TextBox 156">
             <a:extLst>
               <a:ext uri="{FF2B5EF4-FFF2-40B4-BE49-F238E27FC236}">
-                <a16:creationId xmlns:a16="http://schemas.microsoft.com/office/drawing/2014/main" id="{E1C1C5E9-B9DB-A431-CDAA-7188727D9C16}"/>
+                <a16:creationId xmlns:a16="http://schemas.microsoft.com/office/drawing/2014/main" id="{06FEE6D9-EAB6-0780-C9CB-B4136904AA23}"/>
               </a:ext>
             </a:extLst>
           </p:cNvPr>
@@ -26556,8 +26826,8 @@
         </p:nvSpPr>
         <p:spPr bwMode="auto">
           <a:xfrm>
-            <a:off x="2427188" y="2574820"/>
-            <a:ext cx="900000" cy="432000"/>
+            <a:off x="4375700" y="5028051"/>
+            <a:ext cx="900000" cy="430332"/>
           </a:xfrm>
           <a:prstGeom prst="rect">
             <a:avLst/>
@@ -26570,42 +26840,54 @@
           </a:ln>
         </p:spPr>
         <p:txBody>
-          <a:bodyPr rIns="144000">
-            <a:spAutoFit/>
+          <a:bodyPr rIns="144000" anchor="ctr">
+            <a:noAutofit/>
           </a:bodyPr>
           <a:lstStyle/>
           <a:p>
-            <a:pPr algn="ctr">
+            <a:pPr marL="0" marR="0" lvl="0" indent="0" algn="ctr" defTabSz="914400" eaLnBrk="0" fontAlgn="base" latinLnBrk="0" hangingPunct="0">
+              <a:lnSpc>
+                <a:spcPct val="100000"/>
+              </a:lnSpc>
+              <a:spcBef>
+                <a:spcPct val="0"/>
+              </a:spcBef>
+              <a:spcAft>
+                <a:spcPct val="0"/>
+              </a:spcAft>
+              <a:buClrTx/>
+              <a:buSzTx/>
+              <a:buFontTx/>
+              <a:buNone/>
+              <a:tabLst/>
               <a:defRPr/>
             </a:pPr>
             <a:r>
-              <a:rPr lang="en-US" sz="1400">
+              <a:rPr kumimoji="0" lang="en-US" sz="1400" b="0" i="0" u="none" strike="noStrike" kern="0" cap="none" spc="0" normalizeH="0" baseline="0" noProof="0" dirty="0">
+                <a:ln>
+                  <a:noFill/>
+                </a:ln>
+                <a:solidFill>
+                  <a:srgbClr val="000000"/>
+                </a:solidFill>
+                <a:effectLst/>
+                <a:uLnTx/>
+                <a:uFillTx/>
                 <a:latin typeface="Calibri" panose="020F0502020204030204" pitchFamily="34" charset="0"/>
+                <a:ea typeface="ＭＳ Ｐゴシック" panose="020B0600070205080204" pitchFamily="34" charset="-128"/>
                 <a:cs typeface="Calibri" panose="020F0502020204030204" pitchFamily="34" charset="0"/>
               </a:rPr>
               <a:t>USB </a:t>
             </a:r>
           </a:p>
-          <a:p>
-            <a:pPr algn="ctr">
-              <a:defRPr/>
-            </a:pPr>
-            <a:r>
-              <a:rPr lang="en-US" sz="800">
-                <a:latin typeface="Calibri" panose="020F0502020204030204" pitchFamily="34" charset="0"/>
-                <a:cs typeface="Calibri" panose="020F0502020204030204" pitchFamily="34" charset="0"/>
-              </a:rPr>
-              <a:t>Controller</a:t>
-            </a:r>
-          </a:p>
-        </p:txBody>
-      </p:sp>
-      <p:sp>
-        <p:nvSpPr>
-          <p:cNvPr id="43" name="TextBox 42">
+        </p:txBody>
+      </p:sp>
+      <p:sp>
+        <p:nvSpPr>
+          <p:cNvPr id="158" name="TextBox 157">
             <a:extLst>
               <a:ext uri="{FF2B5EF4-FFF2-40B4-BE49-F238E27FC236}">
-                <a16:creationId xmlns:a16="http://schemas.microsoft.com/office/drawing/2014/main" id="{4CD31FA4-EAAA-F7BE-1E08-E09D88F76E8A}"/>
+                <a16:creationId xmlns:a16="http://schemas.microsoft.com/office/drawing/2014/main" id="{40FD697C-88B3-9827-192E-1C8A9DF0FD6F}"/>
               </a:ext>
             </a:extLst>
           </p:cNvPr>
@@ -26614,7 +26896,7 @@
         </p:nvSpPr>
         <p:spPr bwMode="auto">
           <a:xfrm>
-            <a:off x="3386237" y="2574820"/>
+            <a:off x="5334749" y="5028051"/>
             <a:ext cx="900000" cy="432000"/>
           </a:xfrm>
           <a:prstGeom prst="rect">
@@ -26628,29 +26910,77 @@
           </a:ln>
         </p:spPr>
         <p:txBody>
-          <a:bodyPr rIns="144000">
+          <a:bodyPr rIns="144000" anchor="ctr">
             <a:spAutoFit/>
           </a:bodyPr>
           <a:lstStyle/>
           <a:p>
-            <a:pPr algn="ctr">
+            <a:pPr marL="0" marR="0" lvl="0" indent="0" algn="ctr" defTabSz="914400" eaLnBrk="0" fontAlgn="base" latinLnBrk="0" hangingPunct="0">
+              <a:lnSpc>
+                <a:spcPct val="100000"/>
+              </a:lnSpc>
+              <a:spcBef>
+                <a:spcPct val="0"/>
+              </a:spcBef>
+              <a:spcAft>
+                <a:spcPct val="0"/>
+              </a:spcAft>
+              <a:buClrTx/>
+              <a:buSzTx/>
+              <a:buFontTx/>
+              <a:buNone/>
+              <a:tabLst/>
               <a:defRPr/>
             </a:pPr>
             <a:r>
-              <a:rPr lang="en-US" sz="1400">
+              <a:rPr kumimoji="0" lang="en-US" sz="1400" b="0" i="0" u="none" strike="noStrike" kern="0" cap="none" spc="0" normalizeH="0" baseline="0" noProof="0">
+                <a:ln>
+                  <a:noFill/>
+                </a:ln>
+                <a:solidFill>
+                  <a:srgbClr val="000000"/>
+                </a:solidFill>
+                <a:effectLst/>
+                <a:uLnTx/>
+                <a:uFillTx/>
                 <a:latin typeface="Calibri" panose="020F0502020204030204" pitchFamily="34" charset="0"/>
+                <a:ea typeface="ＭＳ Ｐゴシック" panose="020B0600070205080204" pitchFamily="34" charset="-128"/>
                 <a:cs typeface="Calibri" panose="020F0502020204030204" pitchFamily="34" charset="0"/>
               </a:rPr>
               <a:t>Ethernet</a:t>
             </a:r>
           </a:p>
           <a:p>
-            <a:pPr algn="ctr">
+            <a:pPr marL="0" marR="0" lvl="0" indent="0" algn="ctr" defTabSz="914400" eaLnBrk="0" fontAlgn="base" latinLnBrk="0" hangingPunct="0">
+              <a:lnSpc>
+                <a:spcPct val="100000"/>
+              </a:lnSpc>
+              <a:spcBef>
+                <a:spcPct val="0"/>
+              </a:spcBef>
+              <a:spcAft>
+                <a:spcPct val="0"/>
+              </a:spcAft>
+              <a:buClrTx/>
+              <a:buSzTx/>
+              <a:buFontTx/>
+              <a:buNone/>
+              <a:tabLst/>
               <a:defRPr/>
             </a:pPr>
             <a:r>
-              <a:rPr lang="en-US" sz="800">
+              <a:rPr kumimoji="0" lang="en-US" sz="800" b="0" i="0" u="none" strike="noStrike" kern="0" cap="none" spc="0" normalizeH="0" baseline="0" noProof="0">
+                <a:ln>
+                  <a:noFill/>
+                </a:ln>
+                <a:solidFill>
+                  <a:srgbClr val="000000"/>
+                </a:solidFill>
+                <a:effectLst/>
+                <a:uLnTx/>
+                <a:uFillTx/>
                 <a:latin typeface="Calibri" panose="020F0502020204030204" pitchFamily="34" charset="0"/>
+                <a:ea typeface="ＭＳ Ｐゴシック" panose="020B0600070205080204" pitchFamily="34" charset="-128"/>
                 <a:cs typeface="Calibri" panose="020F0502020204030204" pitchFamily="34" charset="0"/>
               </a:rPr>
               <a:t>PHY</a:t>
@@ -26660,10 +26990,10 @@
       </p:sp>
       <p:sp>
         <p:nvSpPr>
-          <p:cNvPr id="44" name="TextBox 43">
+          <p:cNvPr id="159" name="TextBox 158">
             <a:extLst>
               <a:ext uri="{FF2B5EF4-FFF2-40B4-BE49-F238E27FC236}">
-                <a16:creationId xmlns:a16="http://schemas.microsoft.com/office/drawing/2014/main" id="{AFBF7C09-8A1B-6EA3-B370-9C4403852786}"/>
+                <a16:creationId xmlns:a16="http://schemas.microsoft.com/office/drawing/2014/main" id="{46426D8B-B863-3B23-40B9-CA0603D62A78}"/>
               </a:ext>
             </a:extLst>
           </p:cNvPr>
@@ -26672,7 +27002,7 @@
         </p:nvSpPr>
         <p:spPr bwMode="auto">
           <a:xfrm>
-            <a:off x="5296068" y="2574264"/>
+            <a:off x="7244580" y="5027496"/>
             <a:ext cx="864000" cy="430887"/>
           </a:xfrm>
           <a:prstGeom prst="rect">
@@ -26691,12 +27021,36 @@
           </a:bodyPr>
           <a:lstStyle/>
           <a:p>
-            <a:pPr algn="ctr">
+            <a:pPr marL="0" marR="0" lvl="0" indent="0" algn="ctr" defTabSz="914400" eaLnBrk="0" fontAlgn="base" latinLnBrk="0" hangingPunct="0">
+              <a:lnSpc>
+                <a:spcPct val="100000"/>
+              </a:lnSpc>
+              <a:spcBef>
+                <a:spcPct val="0"/>
+              </a:spcBef>
+              <a:spcAft>
+                <a:spcPct val="0"/>
+              </a:spcAft>
+              <a:buClrTx/>
+              <a:buSzTx/>
+              <a:buFontTx/>
+              <a:buNone/>
+              <a:tabLst/>
               <a:defRPr/>
             </a:pPr>
             <a:r>
-              <a:rPr lang="en-US" sz="1200">
+              <a:rPr kumimoji="0" lang="en-US" sz="1400" b="0" i="0" u="none" strike="noStrike" kern="0" cap="none" spc="0" normalizeH="0" baseline="0" noProof="0">
+                <a:ln>
+                  <a:noFill/>
+                </a:ln>
+                <a:solidFill>
+                  <a:srgbClr val="000000"/>
+                </a:solidFill>
+                <a:effectLst/>
+                <a:uLnTx/>
+                <a:uFillTx/>
                 <a:latin typeface="Calibri" panose="020F0502020204030204" pitchFamily="34" charset="0"/>
+                <a:ea typeface="ＭＳ Ｐゴシック" panose="020B0600070205080204" pitchFamily="34" charset="-128"/>
                 <a:cs typeface="Calibri" panose="020F0502020204030204" pitchFamily="34" charset="0"/>
               </a:rPr>
               <a:t>SDIO</a:t>
@@ -26706,10 +27060,10 @@
       </p:sp>
       <p:sp>
         <p:nvSpPr>
-          <p:cNvPr id="46" name="TextBox 45">
+          <p:cNvPr id="160" name="TextBox 159">
             <a:extLst>
               <a:ext uri="{FF2B5EF4-FFF2-40B4-BE49-F238E27FC236}">
-                <a16:creationId xmlns:a16="http://schemas.microsoft.com/office/drawing/2014/main" id="{B99FA971-C681-3761-D235-634274CE50FF}"/>
+                <a16:creationId xmlns:a16="http://schemas.microsoft.com/office/drawing/2014/main" id="{13A5066E-14F6-6877-A2E7-B253DD3BD5DA}"/>
               </a:ext>
             </a:extLst>
           </p:cNvPr>
@@ -26718,7 +27072,7 @@
         </p:nvSpPr>
         <p:spPr bwMode="auto">
           <a:xfrm>
-            <a:off x="4341152" y="2574820"/>
+            <a:off x="6289664" y="5028051"/>
             <a:ext cx="900000" cy="432000"/>
           </a:xfrm>
           <a:prstGeom prst="rect">
@@ -26732,29 +27086,77 @@
           </a:ln>
         </p:spPr>
         <p:txBody>
-          <a:bodyPr wrap="square" rIns="144000">
+          <a:bodyPr wrap="square" rIns="144000" anchor="ctr">
             <a:spAutoFit/>
           </a:bodyPr>
           <a:lstStyle/>
           <a:p>
-            <a:pPr algn="ctr">
+            <a:pPr marL="0" marR="0" lvl="0" indent="0" algn="ctr" defTabSz="914400" eaLnBrk="0" fontAlgn="base" latinLnBrk="0" hangingPunct="0">
+              <a:lnSpc>
+                <a:spcPct val="100000"/>
+              </a:lnSpc>
+              <a:spcBef>
+                <a:spcPct val="0"/>
+              </a:spcBef>
+              <a:spcAft>
+                <a:spcPct val="0"/>
+              </a:spcAft>
+              <a:buClrTx/>
+              <a:buSzTx/>
+              <a:buFontTx/>
+              <a:buNone/>
+              <a:tabLst/>
               <a:defRPr/>
             </a:pPr>
             <a:r>
-              <a:rPr lang="en-US" sz="1400">
+              <a:rPr kumimoji="0" lang="en-US" sz="1400" b="0" i="0" u="none" strike="noStrike" kern="0" cap="none" spc="0" normalizeH="0" baseline="0" noProof="0" dirty="0">
+                <a:ln>
+                  <a:noFill/>
+                </a:ln>
+                <a:solidFill>
+                  <a:srgbClr val="000000"/>
+                </a:solidFill>
+                <a:effectLst/>
+                <a:uLnTx/>
+                <a:uFillTx/>
                 <a:latin typeface="Calibri" panose="020F0502020204030204" pitchFamily="34" charset="0"/>
+                <a:ea typeface="ＭＳ Ｐゴシック" panose="020B0600070205080204" pitchFamily="34" charset="-128"/>
                 <a:cs typeface="Calibri" panose="020F0502020204030204" pitchFamily="34" charset="0"/>
               </a:rPr>
               <a:t>Ethernet </a:t>
             </a:r>
           </a:p>
           <a:p>
-            <a:pPr algn="ctr">
+            <a:pPr marL="0" marR="0" lvl="0" indent="0" algn="ctr" defTabSz="914400" eaLnBrk="0" fontAlgn="base" latinLnBrk="0" hangingPunct="0">
+              <a:lnSpc>
+                <a:spcPct val="100000"/>
+              </a:lnSpc>
+              <a:spcBef>
+                <a:spcPct val="0"/>
+              </a:spcBef>
+              <a:spcAft>
+                <a:spcPct val="0"/>
+              </a:spcAft>
+              <a:buClrTx/>
+              <a:buSzTx/>
+              <a:buFontTx/>
+              <a:buNone/>
+              <a:tabLst/>
               <a:defRPr/>
             </a:pPr>
             <a:r>
-              <a:rPr lang="en-US" sz="800">
+              <a:rPr kumimoji="0" lang="en-US" sz="800" b="0" i="0" u="none" strike="noStrike" kern="0" cap="none" spc="0" normalizeH="0" baseline="0" noProof="0" dirty="0">
+                <a:ln>
+                  <a:noFill/>
+                </a:ln>
+                <a:solidFill>
+                  <a:srgbClr val="000000"/>
+                </a:solidFill>
+                <a:effectLst/>
+                <a:uLnTx/>
+                <a:uFillTx/>
                 <a:latin typeface="Calibri" panose="020F0502020204030204" pitchFamily="34" charset="0"/>
+                <a:ea typeface="ＭＳ Ｐゴシック" panose="020B0600070205080204" pitchFamily="34" charset="-128"/>
                 <a:cs typeface="Calibri" panose="020F0502020204030204" pitchFamily="34" charset="0"/>
               </a:rPr>
               <a:t>MAC</a:t>
@@ -26764,10 +27166,10 @@
       </p:sp>
       <p:sp>
         <p:nvSpPr>
-          <p:cNvPr id="48" name="TextBox 47">
+          <p:cNvPr id="161" name="TextBox 160">
             <a:extLst>
               <a:ext uri="{FF2B5EF4-FFF2-40B4-BE49-F238E27FC236}">
-                <a16:creationId xmlns:a16="http://schemas.microsoft.com/office/drawing/2014/main" id="{954240A7-F516-02FD-EE0C-441FDDC13BEB}"/>
+                <a16:creationId xmlns:a16="http://schemas.microsoft.com/office/drawing/2014/main" id="{A3EF2645-F36F-ECE7-5C00-993AD532EFEA}"/>
               </a:ext>
             </a:extLst>
           </p:cNvPr>
@@ -26776,8 +27178,8 @@
         </p:nvSpPr>
         <p:spPr bwMode="auto">
           <a:xfrm>
-            <a:off x="6961310" y="2575377"/>
-            <a:ext cx="684000" cy="430887"/>
+            <a:off x="8909822" y="5028609"/>
+            <a:ext cx="684000" cy="429774"/>
           </a:xfrm>
           <a:prstGeom prst="rect">
             <a:avLst/>
@@ -26790,46 +27192,68 @@
           </a:ln>
         </p:spPr>
         <p:txBody>
-          <a:bodyPr rIns="144000">
-            <a:spAutoFit/>
+          <a:bodyPr rIns="144000" anchor="ctr">
+            <a:noAutofit/>
           </a:bodyPr>
           <a:lstStyle/>
           <a:p>
-            <a:pPr algn="ctr">
+            <a:pPr marL="0" marR="0" lvl="0" indent="0" algn="ctr" defTabSz="914400" eaLnBrk="0" fontAlgn="base" latinLnBrk="0" hangingPunct="0">
+              <a:lnSpc>
+                <a:spcPct val="100000"/>
+              </a:lnSpc>
+              <a:spcBef>
+                <a:spcPct val="0"/>
+              </a:spcBef>
+              <a:spcAft>
+                <a:spcPct val="0"/>
+              </a:spcAft>
+              <a:buClrTx/>
+              <a:buSzTx/>
+              <a:buFontTx/>
+              <a:buNone/>
+              <a:tabLst/>
               <a:defRPr/>
             </a:pPr>
             <a:r>
-              <a:rPr lang="en-US" sz="1400">
+              <a:rPr kumimoji="0" lang="en-US" sz="1400" b="0" i="0" u="none" strike="noStrike" kern="0" cap="none" spc="0" normalizeH="0" baseline="0" noProof="0" dirty="0">
+                <a:ln>
+                  <a:noFill/>
+                </a:ln>
+                <a:solidFill>
+                  <a:srgbClr val="000000"/>
+                </a:solidFill>
+                <a:effectLst/>
+                <a:uLnTx/>
+                <a:uFillTx/>
                 <a:latin typeface="Calibri" panose="020F0502020204030204" pitchFamily="34" charset="0"/>
+                <a:ea typeface="ＭＳ Ｐゴシック" panose="020B0600070205080204" pitchFamily="34" charset="-128"/>
                 <a:cs typeface="Calibri" panose="020F0502020204030204" pitchFamily="34" charset="0"/>
               </a:rPr>
               <a:t>CAN</a:t>
             </a:r>
-            <a:endParaRPr lang="en-US" sz="1200">
+            <a:endParaRPr kumimoji="0" lang="en-US" sz="1200" b="0" i="0" u="none" strike="noStrike" kern="0" cap="none" spc="0" normalizeH="0" baseline="0" noProof="0" dirty="0">
+              <a:ln>
+                <a:noFill/>
+              </a:ln>
+              <a:solidFill>
+                <a:srgbClr val="000000"/>
+              </a:solidFill>
+              <a:effectLst/>
+              <a:uLnTx/>
+              <a:uFillTx/>
               <a:latin typeface="Calibri" panose="020F0502020204030204" pitchFamily="34" charset="0"/>
+              <a:ea typeface="ＭＳ Ｐゴシック" panose="020B0600070205080204" pitchFamily="34" charset="-128"/>
               <a:cs typeface="Calibri" panose="020F0502020204030204" pitchFamily="34" charset="0"/>
             </a:endParaRPr>
           </a:p>
-          <a:p>
-            <a:pPr algn="ctr">
-              <a:defRPr/>
-            </a:pPr>
-            <a:r>
-              <a:rPr lang="en-US" sz="800">
-                <a:latin typeface="Calibri" panose="020F0502020204030204" pitchFamily="34" charset="0"/>
-                <a:cs typeface="Calibri" panose="020F0502020204030204" pitchFamily="34" charset="0"/>
-              </a:rPr>
-              <a:t>Controller</a:t>
-            </a:r>
-          </a:p>
-        </p:txBody>
-      </p:sp>
-      <p:sp>
-        <p:nvSpPr>
-          <p:cNvPr id="50" name="TextBox 49">
+        </p:txBody>
+      </p:sp>
+      <p:sp>
+        <p:nvSpPr>
+          <p:cNvPr id="162" name="TextBox 161">
             <a:extLst>
               <a:ext uri="{FF2B5EF4-FFF2-40B4-BE49-F238E27FC236}">
-                <a16:creationId xmlns:a16="http://schemas.microsoft.com/office/drawing/2014/main" id="{A9544A76-DCFB-CF21-3A4D-28517AEB91B5}"/>
+                <a16:creationId xmlns:a16="http://schemas.microsoft.com/office/drawing/2014/main" id="{46E5CFB6-3041-A5EF-B953-D4AEA337D8C8}"/>
               </a:ext>
             </a:extLst>
           </p:cNvPr>
@@ -26838,7 +27262,7 @@
         </p:nvSpPr>
         <p:spPr bwMode="auto">
           <a:xfrm>
-            <a:off x="1673170" y="2574820"/>
+            <a:off x="3621682" y="5028051"/>
             <a:ext cx="684000" cy="432000"/>
           </a:xfrm>
           <a:prstGeom prst="rect">
@@ -26857,12 +27281,36 @@
           </a:bodyPr>
           <a:lstStyle/>
           <a:p>
-            <a:pPr algn="ctr">
+            <a:pPr marL="0" marR="0" lvl="0" indent="0" algn="ctr" defTabSz="914400" eaLnBrk="0" fontAlgn="base" latinLnBrk="0" hangingPunct="0">
+              <a:lnSpc>
+                <a:spcPct val="100000"/>
+              </a:lnSpc>
+              <a:spcBef>
+                <a:spcPct val="0"/>
+              </a:spcBef>
+              <a:spcAft>
+                <a:spcPct val="0"/>
+              </a:spcAft>
+              <a:buClrTx/>
+              <a:buSzTx/>
+              <a:buFontTx/>
+              <a:buNone/>
+              <a:tabLst/>
               <a:defRPr/>
             </a:pPr>
             <a:r>
-              <a:rPr lang="en-US" sz="1200">
+              <a:rPr kumimoji="0" lang="en-US" sz="1400" b="0" i="0" u="none" strike="noStrike" kern="0" cap="none" spc="0" normalizeH="0" baseline="0" noProof="0" dirty="0">
+                <a:ln>
+                  <a:noFill/>
+                </a:ln>
+                <a:solidFill>
+                  <a:srgbClr val="000000"/>
+                </a:solidFill>
+                <a:effectLst/>
+                <a:uLnTx/>
+                <a:uFillTx/>
                 <a:latin typeface="Calibri" panose="020F0502020204030204" pitchFamily="34" charset="0"/>
+                <a:ea typeface="ＭＳ Ｐゴシック" panose="020B0600070205080204" pitchFamily="34" charset="-128"/>
                 <a:cs typeface="Calibri" panose="020F0502020204030204" pitchFamily="34" charset="0"/>
               </a:rPr>
               <a:t>GPIO</a:t>
@@ -26872,10 +27320,10 @@
       </p:sp>
       <p:sp>
         <p:nvSpPr>
-          <p:cNvPr id="57" name="TextBox 56">
+          <p:cNvPr id="163" name="TextBox 162">
             <a:extLst>
               <a:ext uri="{FF2B5EF4-FFF2-40B4-BE49-F238E27FC236}">
-                <a16:creationId xmlns:a16="http://schemas.microsoft.com/office/drawing/2014/main" id="{6B2236CF-A36D-BE96-08FB-C8F5B6D97541}"/>
+                <a16:creationId xmlns:a16="http://schemas.microsoft.com/office/drawing/2014/main" id="{A7554A01-1070-B205-E822-27AFA1DB2537}"/>
               </a:ext>
             </a:extLst>
           </p:cNvPr>
@@ -26884,7 +27332,7 @@
         </p:nvSpPr>
         <p:spPr bwMode="auto">
           <a:xfrm>
-            <a:off x="3397061" y="3222459"/>
+            <a:off x="5345574" y="5675691"/>
             <a:ext cx="889173" cy="276999"/>
           </a:xfrm>
           <a:prstGeom prst="rect">
@@ -26901,12 +27349,36 @@
           </a:bodyPr>
           <a:lstStyle/>
           <a:p>
-            <a:pPr algn="ctr">
+            <a:pPr marL="0" marR="0" lvl="0" indent="0" algn="ctr" defTabSz="914400" eaLnBrk="0" fontAlgn="base" latinLnBrk="0" hangingPunct="0">
+              <a:lnSpc>
+                <a:spcPct val="100000"/>
+              </a:lnSpc>
+              <a:spcBef>
+                <a:spcPct val="0"/>
+              </a:spcBef>
+              <a:spcAft>
+                <a:spcPct val="0"/>
+              </a:spcAft>
+              <a:buClrTx/>
+              <a:buSzTx/>
+              <a:buFontTx/>
+              <a:buNone/>
+              <a:tabLst/>
               <a:defRPr/>
             </a:pPr>
             <a:r>
-              <a:rPr lang="en-US" sz="1200">
+              <a:rPr kumimoji="0" lang="en-US" sz="1200" b="0" i="0" u="none" strike="noStrike" kern="0" cap="none" spc="0" normalizeH="0" baseline="0" noProof="0">
+                <a:ln>
+                  <a:noFill/>
+                </a:ln>
+                <a:solidFill>
+                  <a:srgbClr val="000000"/>
+                </a:solidFill>
+                <a:effectLst/>
+                <a:uLnTx/>
+                <a:uFillTx/>
                 <a:latin typeface="Calibri" panose="020F0502020204030204" pitchFamily="34" charset="0"/>
+                <a:ea typeface="ＭＳ Ｐゴシック" panose="020B0600070205080204" pitchFamily="34" charset="-128"/>
                 <a:cs typeface="Calibri" panose="020F0502020204030204" pitchFamily="34" charset="0"/>
               </a:rPr>
               <a:t>Ethernet</a:t>
@@ -26916,10 +27388,10 @@
       </p:sp>
       <p:grpSp>
         <p:nvGrpSpPr>
-          <p:cNvPr id="90" name="Group 89">
+          <p:cNvPr id="164" name="Group 163">
             <a:extLst>
               <a:ext uri="{FF2B5EF4-FFF2-40B4-BE49-F238E27FC236}">
-                <a16:creationId xmlns:a16="http://schemas.microsoft.com/office/drawing/2014/main" id="{F1A78D8F-C949-B6DA-3067-66A5BD8A7C08}"/>
+                <a16:creationId xmlns:a16="http://schemas.microsoft.com/office/drawing/2014/main" id="{DB8DA5C5-8E26-82A2-4736-E1920FD95E06}"/>
               </a:ext>
             </a:extLst>
           </p:cNvPr>
@@ -26928,7 +27400,7 @@
         </p:nvGrpSpPr>
         <p:grpSpPr>
           <a:xfrm rot="16200000">
-            <a:off x="2804957" y="3007478"/>
+            <a:off x="4753469" y="5460709"/>
             <a:ext cx="144462" cy="258762"/>
             <a:chOff x="4487395" y="5226823"/>
             <a:chExt cx="144462" cy="258762"/>
@@ -26936,10 +27408,10 @@
         </p:grpSpPr>
         <p:sp>
           <p:nvSpPr>
-            <p:cNvPr id="91" name="Rectangle 90">
+            <p:cNvPr id="196" name="Rectangle 195">
               <a:extLst>
                 <a:ext uri="{FF2B5EF4-FFF2-40B4-BE49-F238E27FC236}">
-                  <a16:creationId xmlns:a16="http://schemas.microsoft.com/office/drawing/2014/main" id="{1F97BE2F-0A38-795E-B10E-D7BD927CE8E2}"/>
+                  <a16:creationId xmlns:a16="http://schemas.microsoft.com/office/drawing/2014/main" id="{4C4D8AE2-4530-5C34-6753-07887D952A12}"/>
                 </a:ext>
               </a:extLst>
             </p:cNvPr>
@@ -26955,38 +27427,48 @@
               <a:avLst/>
             </a:prstGeom>
             <a:noFill/>
-            <a:ln w="19050">
+            <a:ln w="19050" cap="flat" cmpd="sng" algn="ctr">
               <a:solidFill>
-                <a:schemeClr val="tx1"/>
+                <a:srgbClr val="000000"/>
               </a:solidFill>
+              <a:prstDash val="solid"/>
               <a:miter lim="800000"/>
             </a:ln>
+            <a:effectLst/>
           </p:spPr>
-          <p:style>
-            <a:lnRef idx="2">
-              <a:schemeClr val="accent1">
-                <a:shade val="50000"/>
-              </a:schemeClr>
-            </a:lnRef>
-            <a:fillRef idx="1">
-              <a:schemeClr val="accent1"/>
-            </a:fillRef>
-            <a:effectRef idx="0">
-              <a:schemeClr val="accent1"/>
-            </a:effectRef>
-            <a:fontRef idx="minor">
-              <a:schemeClr val="lt1"/>
-            </a:fontRef>
-          </p:style>
           <p:txBody>
             <a:bodyPr anchor="ctr"/>
             <a:lstStyle/>
             <a:p>
-              <a:pPr algn="ctr">
+              <a:pPr marL="0" marR="0" lvl="0" indent="0" algn="ctr" defTabSz="914400" eaLnBrk="0" fontAlgn="base" latinLnBrk="0" hangingPunct="0">
+                <a:lnSpc>
+                  <a:spcPct val="100000"/>
+                </a:lnSpc>
+                <a:spcBef>
+                  <a:spcPct val="0"/>
+                </a:spcBef>
+                <a:spcAft>
+                  <a:spcPct val="0"/>
+                </a:spcAft>
+                <a:buClrTx/>
+                <a:buSzTx/>
+                <a:buFontTx/>
+                <a:buNone/>
+                <a:tabLst/>
                 <a:defRPr/>
               </a:pPr>
-              <a:endParaRPr lang="en-US">
+              <a:endParaRPr kumimoji="0" lang="en-US" sz="1800" b="0" i="0" u="none" strike="noStrike" kern="0" cap="none" spc="0" normalizeH="0" baseline="0" noProof="0">
+                <a:ln>
+                  <a:noFill/>
+                </a:ln>
+                <a:solidFill>
+                  <a:srgbClr val="FFFFFF"/>
+                </a:solidFill>
+                <a:effectLst/>
+                <a:uLnTx/>
+                <a:uFillTx/>
                 <a:latin typeface="Calibri" panose="020F0502020204030204" pitchFamily="34" charset="0"/>
+                <a:ea typeface="+mn-ea"/>
                 <a:cs typeface="Calibri" panose="020F0502020204030204" pitchFamily="34" charset="0"/>
               </a:endParaRPr>
             </a:p>
@@ -26994,10 +27476,10 @@
         </p:sp>
         <p:cxnSp>
           <p:nvCxnSpPr>
-            <p:cNvPr id="92" name="Straight Connector 91">
+            <p:cNvPr id="197" name="Straight Connector 196">
               <a:extLst>
                 <a:ext uri="{FF2B5EF4-FFF2-40B4-BE49-F238E27FC236}">
-                  <a16:creationId xmlns:a16="http://schemas.microsoft.com/office/drawing/2014/main" id="{4556D3C8-ED00-B186-61F6-7485F7AABA67}"/>
+                  <a16:creationId xmlns:a16="http://schemas.microsoft.com/office/drawing/2014/main" id="{03FF1D1E-9EBA-1787-E4A9-A31EC6AD5AF8}"/>
                 </a:ext>
               </a:extLst>
             </p:cNvPr>
@@ -27012,34 +27494,23 @@
             <a:prstGeom prst="line">
               <a:avLst/>
             </a:prstGeom>
-            <a:ln w="22225">
+            <a:noFill/>
+            <a:ln w="22225" cap="flat" cmpd="sng" algn="ctr">
               <a:solidFill>
-                <a:schemeClr val="tx1"/>
+                <a:srgbClr val="000000"/>
               </a:solidFill>
+              <a:prstDash val="solid"/>
               <a:miter lim="800000"/>
             </a:ln>
+            <a:effectLst/>
           </p:spPr>
-          <p:style>
-            <a:lnRef idx="1">
-              <a:schemeClr val="accent1"/>
-            </a:lnRef>
-            <a:fillRef idx="0">
-              <a:schemeClr val="accent1"/>
-            </a:fillRef>
-            <a:effectRef idx="0">
-              <a:schemeClr val="accent1"/>
-            </a:effectRef>
-            <a:fontRef idx="minor">
-              <a:schemeClr val="tx1"/>
-            </a:fontRef>
-          </p:style>
         </p:cxnSp>
         <p:cxnSp>
           <p:nvCxnSpPr>
-            <p:cNvPr id="93" name="Straight Connector 92">
+            <p:cNvPr id="198" name="Straight Connector 197">
               <a:extLst>
                 <a:ext uri="{FF2B5EF4-FFF2-40B4-BE49-F238E27FC236}">
-                  <a16:creationId xmlns:a16="http://schemas.microsoft.com/office/drawing/2014/main" id="{DD8B9B86-D03D-0097-D684-855BA0673508}"/>
+                  <a16:creationId xmlns:a16="http://schemas.microsoft.com/office/drawing/2014/main" id="{B62F4950-43ED-D67D-6AFA-643F3E19BAFA}"/>
                 </a:ext>
               </a:extLst>
             </p:cNvPr>
@@ -27054,35 +27525,24 @@
             <a:prstGeom prst="line">
               <a:avLst/>
             </a:prstGeom>
-            <a:ln w="22225">
+            <a:noFill/>
+            <a:ln w="22225" cap="flat" cmpd="sng" algn="ctr">
               <a:solidFill>
-                <a:schemeClr val="tx1"/>
+                <a:srgbClr val="000000"/>
               </a:solidFill>
+              <a:prstDash val="solid"/>
               <a:miter lim="800000"/>
             </a:ln>
+            <a:effectLst/>
           </p:spPr>
-          <p:style>
-            <a:lnRef idx="1">
-              <a:schemeClr val="accent1"/>
-            </a:lnRef>
-            <a:fillRef idx="0">
-              <a:schemeClr val="accent1"/>
-            </a:fillRef>
-            <a:effectRef idx="0">
-              <a:schemeClr val="accent1"/>
-            </a:effectRef>
-            <a:fontRef idx="minor">
-              <a:schemeClr val="tx1"/>
-            </a:fontRef>
-          </p:style>
         </p:cxnSp>
       </p:grpSp>
       <p:grpSp>
         <p:nvGrpSpPr>
-          <p:cNvPr id="96" name="Group 95">
+          <p:cNvPr id="165" name="Group 164">
             <a:extLst>
               <a:ext uri="{FF2B5EF4-FFF2-40B4-BE49-F238E27FC236}">
-                <a16:creationId xmlns:a16="http://schemas.microsoft.com/office/drawing/2014/main" id="{E3407391-5E34-A2BE-0A64-5DE6EF1AA551}"/>
+                <a16:creationId xmlns:a16="http://schemas.microsoft.com/office/drawing/2014/main" id="{0BCCE2F2-181C-2713-D173-DB5E1443E30B}"/>
               </a:ext>
             </a:extLst>
           </p:cNvPr>
@@ -27091,7 +27551,7 @@
         </p:nvGrpSpPr>
         <p:grpSpPr>
           <a:xfrm rot="16200000">
-            <a:off x="2304510" y="3006501"/>
+            <a:off x="3887264" y="5467913"/>
             <a:ext cx="146927" cy="263178"/>
             <a:chOff x="4487395" y="5226823"/>
             <a:chExt cx="144462" cy="258762"/>
@@ -27099,10 +27559,10 @@
         </p:grpSpPr>
         <p:sp>
           <p:nvSpPr>
-            <p:cNvPr id="97" name="Rectangle 96">
+            <p:cNvPr id="193" name="Rectangle 192">
               <a:extLst>
                 <a:ext uri="{FF2B5EF4-FFF2-40B4-BE49-F238E27FC236}">
-                  <a16:creationId xmlns:a16="http://schemas.microsoft.com/office/drawing/2014/main" id="{DCA4F15F-E4A5-A7FD-1D7B-4DC764249AA6}"/>
+                  <a16:creationId xmlns:a16="http://schemas.microsoft.com/office/drawing/2014/main" id="{E483B1C2-0756-B6E5-F459-93ABF47CD127}"/>
                 </a:ext>
               </a:extLst>
             </p:cNvPr>
@@ -27118,38 +27578,48 @@
               <a:avLst/>
             </a:prstGeom>
             <a:noFill/>
-            <a:ln w="19050">
+            <a:ln w="19050" cap="flat" cmpd="sng" algn="ctr">
               <a:solidFill>
-                <a:schemeClr val="tx1"/>
+                <a:srgbClr val="000000"/>
               </a:solidFill>
+              <a:prstDash val="solid"/>
               <a:miter lim="800000"/>
             </a:ln>
+            <a:effectLst/>
           </p:spPr>
-          <p:style>
-            <a:lnRef idx="2">
-              <a:schemeClr val="accent1">
-                <a:shade val="50000"/>
-              </a:schemeClr>
-            </a:lnRef>
-            <a:fillRef idx="1">
-              <a:schemeClr val="accent1"/>
-            </a:fillRef>
-            <a:effectRef idx="0">
-              <a:schemeClr val="accent1"/>
-            </a:effectRef>
-            <a:fontRef idx="minor">
-              <a:schemeClr val="lt1"/>
-            </a:fontRef>
-          </p:style>
           <p:txBody>
             <a:bodyPr anchor="ctr"/>
             <a:lstStyle/>
             <a:p>
-              <a:pPr algn="ctr">
+              <a:pPr marL="0" marR="0" lvl="0" indent="0" algn="ctr" defTabSz="914400" eaLnBrk="0" fontAlgn="base" latinLnBrk="0" hangingPunct="0">
+                <a:lnSpc>
+                  <a:spcPct val="100000"/>
+                </a:lnSpc>
+                <a:spcBef>
+                  <a:spcPct val="0"/>
+                </a:spcBef>
+                <a:spcAft>
+                  <a:spcPct val="0"/>
+                </a:spcAft>
+                <a:buClrTx/>
+                <a:buSzTx/>
+                <a:buFontTx/>
+                <a:buNone/>
+                <a:tabLst/>
                 <a:defRPr/>
               </a:pPr>
-              <a:endParaRPr lang="en-US">
+              <a:endParaRPr kumimoji="0" lang="en-US" sz="1800" b="0" i="0" u="none" strike="noStrike" kern="0" cap="none" spc="0" normalizeH="0" baseline="0" noProof="0">
+                <a:ln>
+                  <a:noFill/>
+                </a:ln>
+                <a:solidFill>
+                  <a:srgbClr val="FFFFFF"/>
+                </a:solidFill>
+                <a:effectLst/>
+                <a:uLnTx/>
+                <a:uFillTx/>
                 <a:latin typeface="Calibri" panose="020F0502020204030204" pitchFamily="34" charset="0"/>
+                <a:ea typeface="+mn-ea"/>
                 <a:cs typeface="Calibri" panose="020F0502020204030204" pitchFamily="34" charset="0"/>
               </a:endParaRPr>
             </a:p>
@@ -27157,10 +27627,10 @@
         </p:sp>
         <p:cxnSp>
           <p:nvCxnSpPr>
-            <p:cNvPr id="98" name="Straight Connector 97">
+            <p:cNvPr id="194" name="Straight Connector 193">
               <a:extLst>
                 <a:ext uri="{FF2B5EF4-FFF2-40B4-BE49-F238E27FC236}">
-                  <a16:creationId xmlns:a16="http://schemas.microsoft.com/office/drawing/2014/main" id="{BA756DA3-37E3-A228-170C-C484559D65AA}"/>
+                  <a16:creationId xmlns:a16="http://schemas.microsoft.com/office/drawing/2014/main" id="{E55C106F-0F06-9075-662B-D32E020FB4C9}"/>
                 </a:ext>
               </a:extLst>
             </p:cNvPr>
@@ -27175,34 +27645,23 @@
             <a:prstGeom prst="line">
               <a:avLst/>
             </a:prstGeom>
-            <a:ln w="22225">
+            <a:noFill/>
+            <a:ln w="22225" cap="flat" cmpd="sng" algn="ctr">
               <a:solidFill>
-                <a:schemeClr val="tx1"/>
+                <a:srgbClr val="000000"/>
               </a:solidFill>
+              <a:prstDash val="solid"/>
               <a:miter lim="800000"/>
             </a:ln>
+            <a:effectLst/>
           </p:spPr>
-          <p:style>
-            <a:lnRef idx="1">
-              <a:schemeClr val="accent1"/>
-            </a:lnRef>
-            <a:fillRef idx="0">
-              <a:schemeClr val="accent1"/>
-            </a:fillRef>
-            <a:effectRef idx="0">
-              <a:schemeClr val="accent1"/>
-            </a:effectRef>
-            <a:fontRef idx="minor">
-              <a:schemeClr val="tx1"/>
-            </a:fontRef>
-          </p:style>
         </p:cxnSp>
         <p:cxnSp>
           <p:nvCxnSpPr>
-            <p:cNvPr id="99" name="Straight Connector 98">
+            <p:cNvPr id="195" name="Straight Connector 194">
               <a:extLst>
                 <a:ext uri="{FF2B5EF4-FFF2-40B4-BE49-F238E27FC236}">
-                  <a16:creationId xmlns:a16="http://schemas.microsoft.com/office/drawing/2014/main" id="{E83D4ED0-54FC-D579-9828-0054FDCA9CA0}"/>
+                  <a16:creationId xmlns:a16="http://schemas.microsoft.com/office/drawing/2014/main" id="{A54BBC69-C6C9-4715-1231-06D6F3D2C011}"/>
                 </a:ext>
               </a:extLst>
             </p:cNvPr>
@@ -27217,35 +27676,24 @@
             <a:prstGeom prst="line">
               <a:avLst/>
             </a:prstGeom>
-            <a:ln w="22225">
+            <a:noFill/>
+            <a:ln w="22225" cap="flat" cmpd="sng" algn="ctr">
               <a:solidFill>
-                <a:schemeClr val="tx1"/>
+                <a:srgbClr val="000000"/>
               </a:solidFill>
+              <a:prstDash val="solid"/>
               <a:miter lim="800000"/>
             </a:ln>
+            <a:effectLst/>
           </p:spPr>
-          <p:style>
-            <a:lnRef idx="1">
-              <a:schemeClr val="accent1"/>
-            </a:lnRef>
-            <a:fillRef idx="0">
-              <a:schemeClr val="accent1"/>
-            </a:fillRef>
-            <a:effectRef idx="0">
-              <a:schemeClr val="accent1"/>
-            </a:effectRef>
-            <a:fontRef idx="minor">
-              <a:schemeClr val="tx1"/>
-            </a:fontRef>
-          </p:style>
         </p:cxnSp>
       </p:grpSp>
       <p:grpSp>
         <p:nvGrpSpPr>
-          <p:cNvPr id="104" name="Group 103">
+          <p:cNvPr id="166" name="Group 165">
             <a:extLst>
               <a:ext uri="{FF2B5EF4-FFF2-40B4-BE49-F238E27FC236}">
-                <a16:creationId xmlns:a16="http://schemas.microsoft.com/office/drawing/2014/main" id="{865FEF0D-0E58-7B02-06DF-A85EC9DDAF85}"/>
+                <a16:creationId xmlns:a16="http://schemas.microsoft.com/office/drawing/2014/main" id="{E43C6A9A-7010-EC82-A77B-7431D6887B47}"/>
               </a:ext>
             </a:extLst>
           </p:cNvPr>
@@ -27254,7 +27702,7 @@
         </p:nvGrpSpPr>
         <p:grpSpPr>
           <a:xfrm rot="16200000">
-            <a:off x="3764006" y="3007477"/>
+            <a:off x="5712518" y="5460708"/>
             <a:ext cx="144462" cy="258762"/>
             <a:chOff x="4487395" y="5226823"/>
             <a:chExt cx="144462" cy="258762"/>
@@ -27262,10 +27710,10 @@
         </p:grpSpPr>
         <p:sp>
           <p:nvSpPr>
-            <p:cNvPr id="105" name="Rectangle 104">
+            <p:cNvPr id="190" name="Rectangle 189">
               <a:extLst>
                 <a:ext uri="{FF2B5EF4-FFF2-40B4-BE49-F238E27FC236}">
-                  <a16:creationId xmlns:a16="http://schemas.microsoft.com/office/drawing/2014/main" id="{5CDAB0D0-02E0-42C6-1313-ED00A9B64999}"/>
+                  <a16:creationId xmlns:a16="http://schemas.microsoft.com/office/drawing/2014/main" id="{7BD356C8-2139-8E93-62B4-552BA48D9DF3}"/>
                 </a:ext>
               </a:extLst>
             </p:cNvPr>
@@ -27281,38 +27729,48 @@
               <a:avLst/>
             </a:prstGeom>
             <a:noFill/>
-            <a:ln w="19050">
+            <a:ln w="19050" cap="flat" cmpd="sng" algn="ctr">
               <a:solidFill>
-                <a:schemeClr val="tx1"/>
+                <a:srgbClr val="000000"/>
               </a:solidFill>
+              <a:prstDash val="solid"/>
               <a:miter lim="800000"/>
             </a:ln>
+            <a:effectLst/>
           </p:spPr>
-          <p:style>
-            <a:lnRef idx="2">
-              <a:schemeClr val="accent1">
-                <a:shade val="50000"/>
-              </a:schemeClr>
-            </a:lnRef>
-            <a:fillRef idx="1">
-              <a:schemeClr val="accent1"/>
-            </a:fillRef>
-            <a:effectRef idx="0">
-              <a:schemeClr val="accent1"/>
-            </a:effectRef>
-            <a:fontRef idx="minor">
-              <a:schemeClr val="lt1"/>
-            </a:fontRef>
-          </p:style>
           <p:txBody>
             <a:bodyPr anchor="ctr"/>
             <a:lstStyle/>
             <a:p>
-              <a:pPr algn="ctr">
+              <a:pPr marL="0" marR="0" lvl="0" indent="0" algn="ctr" defTabSz="914400" eaLnBrk="0" fontAlgn="base" latinLnBrk="0" hangingPunct="0">
+                <a:lnSpc>
+                  <a:spcPct val="100000"/>
+                </a:lnSpc>
+                <a:spcBef>
+                  <a:spcPct val="0"/>
+                </a:spcBef>
+                <a:spcAft>
+                  <a:spcPct val="0"/>
+                </a:spcAft>
+                <a:buClrTx/>
+                <a:buSzTx/>
+                <a:buFontTx/>
+                <a:buNone/>
+                <a:tabLst/>
                 <a:defRPr/>
               </a:pPr>
-              <a:endParaRPr lang="en-US">
+              <a:endParaRPr kumimoji="0" lang="en-US" sz="1800" b="0" i="0" u="none" strike="noStrike" kern="0" cap="none" spc="0" normalizeH="0" baseline="0" noProof="0">
+                <a:ln>
+                  <a:noFill/>
+                </a:ln>
+                <a:solidFill>
+                  <a:srgbClr val="FFFFFF"/>
+                </a:solidFill>
+                <a:effectLst/>
+                <a:uLnTx/>
+                <a:uFillTx/>
                 <a:latin typeface="Calibri" panose="020F0502020204030204" pitchFamily="34" charset="0"/>
+                <a:ea typeface="+mn-ea"/>
                 <a:cs typeface="Calibri" panose="020F0502020204030204" pitchFamily="34" charset="0"/>
               </a:endParaRPr>
             </a:p>
@@ -27320,10 +27778,10 @@
         </p:sp>
         <p:cxnSp>
           <p:nvCxnSpPr>
-            <p:cNvPr id="106" name="Straight Connector 105">
+            <p:cNvPr id="191" name="Straight Connector 190">
               <a:extLst>
                 <a:ext uri="{FF2B5EF4-FFF2-40B4-BE49-F238E27FC236}">
-                  <a16:creationId xmlns:a16="http://schemas.microsoft.com/office/drawing/2014/main" id="{B0A3F6E0-AA7C-7E6A-4160-6026D4DB06FE}"/>
+                  <a16:creationId xmlns:a16="http://schemas.microsoft.com/office/drawing/2014/main" id="{BA9F53E6-10C5-84E4-37A7-409D06A70C53}"/>
                 </a:ext>
               </a:extLst>
             </p:cNvPr>
@@ -27338,34 +27796,23 @@
             <a:prstGeom prst="line">
               <a:avLst/>
             </a:prstGeom>
-            <a:ln w="22225">
+            <a:noFill/>
+            <a:ln w="22225" cap="flat" cmpd="sng" algn="ctr">
               <a:solidFill>
-                <a:schemeClr val="tx1"/>
+                <a:srgbClr val="000000"/>
               </a:solidFill>
+              <a:prstDash val="solid"/>
               <a:miter lim="800000"/>
             </a:ln>
+            <a:effectLst/>
           </p:spPr>
-          <p:style>
-            <a:lnRef idx="1">
-              <a:schemeClr val="accent1"/>
-            </a:lnRef>
-            <a:fillRef idx="0">
-              <a:schemeClr val="accent1"/>
-            </a:fillRef>
-            <a:effectRef idx="0">
-              <a:schemeClr val="accent1"/>
-            </a:effectRef>
-            <a:fontRef idx="minor">
-              <a:schemeClr val="tx1"/>
-            </a:fontRef>
-          </p:style>
         </p:cxnSp>
         <p:cxnSp>
           <p:nvCxnSpPr>
-            <p:cNvPr id="107" name="Straight Connector 106">
+            <p:cNvPr id="192" name="Straight Connector 191">
               <a:extLst>
                 <a:ext uri="{FF2B5EF4-FFF2-40B4-BE49-F238E27FC236}">
-                  <a16:creationId xmlns:a16="http://schemas.microsoft.com/office/drawing/2014/main" id="{CABCF2C1-14F6-48DE-6779-ED70781E2A1A}"/>
+                  <a16:creationId xmlns:a16="http://schemas.microsoft.com/office/drawing/2014/main" id="{63D446CB-00BC-860B-EBC8-0EEF460DD8EF}"/>
                 </a:ext>
               </a:extLst>
             </p:cNvPr>
@@ -27380,35 +27827,24 @@
             <a:prstGeom prst="line">
               <a:avLst/>
             </a:prstGeom>
-            <a:ln w="22225">
+            <a:noFill/>
+            <a:ln w="22225" cap="flat" cmpd="sng" algn="ctr">
               <a:solidFill>
-                <a:schemeClr val="tx1"/>
+                <a:srgbClr val="000000"/>
               </a:solidFill>
+              <a:prstDash val="solid"/>
               <a:miter lim="800000"/>
             </a:ln>
+            <a:effectLst/>
           </p:spPr>
-          <p:style>
-            <a:lnRef idx="1">
-              <a:schemeClr val="accent1"/>
-            </a:lnRef>
-            <a:fillRef idx="0">
-              <a:schemeClr val="accent1"/>
-            </a:fillRef>
-            <a:effectRef idx="0">
-              <a:schemeClr val="accent1"/>
-            </a:effectRef>
-            <a:fontRef idx="minor">
-              <a:schemeClr val="tx1"/>
-            </a:fontRef>
-          </p:style>
         </p:cxnSp>
       </p:grpSp>
       <p:grpSp>
         <p:nvGrpSpPr>
-          <p:cNvPr id="116" name="Group 115">
+          <p:cNvPr id="167" name="Group 166">
             <a:extLst>
               <a:ext uri="{FF2B5EF4-FFF2-40B4-BE49-F238E27FC236}">
-                <a16:creationId xmlns:a16="http://schemas.microsoft.com/office/drawing/2014/main" id="{7539891F-F180-9891-1026-07D67E03B0C1}"/>
+                <a16:creationId xmlns:a16="http://schemas.microsoft.com/office/drawing/2014/main" id="{C77B66A6-14EC-7975-BA9D-8A9A9C7F8F49}"/>
               </a:ext>
             </a:extLst>
           </p:cNvPr>
@@ -27417,7 +27853,7 @@
         </p:nvGrpSpPr>
         <p:grpSpPr>
           <a:xfrm rot="16200000">
-            <a:off x="5655837" y="3007477"/>
+            <a:off x="7604349" y="5460708"/>
             <a:ext cx="144462" cy="258762"/>
             <a:chOff x="4487395" y="5226823"/>
             <a:chExt cx="144462" cy="258762"/>
@@ -27425,10 +27861,10 @@
         </p:grpSpPr>
         <p:sp>
           <p:nvSpPr>
-            <p:cNvPr id="117" name="Rectangle 116">
+            <p:cNvPr id="187" name="Rectangle 186">
               <a:extLst>
                 <a:ext uri="{FF2B5EF4-FFF2-40B4-BE49-F238E27FC236}">
-                  <a16:creationId xmlns:a16="http://schemas.microsoft.com/office/drawing/2014/main" id="{756CC32F-92A0-4CC3-DF8C-F8F3C08EB2BE}"/>
+                  <a16:creationId xmlns:a16="http://schemas.microsoft.com/office/drawing/2014/main" id="{63A0DAF3-04E2-E1C9-70DA-2B279B48B642}"/>
                 </a:ext>
               </a:extLst>
             </p:cNvPr>
@@ -27444,38 +27880,48 @@
               <a:avLst/>
             </a:prstGeom>
             <a:noFill/>
-            <a:ln w="19050">
+            <a:ln w="19050" cap="flat" cmpd="sng" algn="ctr">
               <a:solidFill>
-                <a:schemeClr val="tx1"/>
+                <a:srgbClr val="000000"/>
               </a:solidFill>
+              <a:prstDash val="solid"/>
               <a:miter lim="800000"/>
             </a:ln>
+            <a:effectLst/>
           </p:spPr>
-          <p:style>
-            <a:lnRef idx="2">
-              <a:schemeClr val="accent1">
-                <a:shade val="50000"/>
-              </a:schemeClr>
-            </a:lnRef>
-            <a:fillRef idx="1">
-              <a:schemeClr val="accent1"/>
-            </a:fillRef>
-            <a:effectRef idx="0">
-              <a:schemeClr val="accent1"/>
-            </a:effectRef>
-            <a:fontRef idx="minor">
-              <a:schemeClr val="lt1"/>
-            </a:fontRef>
-          </p:style>
           <p:txBody>
             <a:bodyPr anchor="ctr"/>
             <a:lstStyle/>
             <a:p>
-              <a:pPr algn="ctr">
+              <a:pPr marL="0" marR="0" lvl="0" indent="0" algn="ctr" defTabSz="914400" eaLnBrk="0" fontAlgn="base" latinLnBrk="0" hangingPunct="0">
+                <a:lnSpc>
+                  <a:spcPct val="100000"/>
+                </a:lnSpc>
+                <a:spcBef>
+                  <a:spcPct val="0"/>
+                </a:spcBef>
+                <a:spcAft>
+                  <a:spcPct val="0"/>
+                </a:spcAft>
+                <a:buClrTx/>
+                <a:buSzTx/>
+                <a:buFontTx/>
+                <a:buNone/>
+                <a:tabLst/>
                 <a:defRPr/>
               </a:pPr>
-              <a:endParaRPr lang="en-US">
+              <a:endParaRPr kumimoji="0" lang="en-US" sz="1800" b="0" i="0" u="none" strike="noStrike" kern="0" cap="none" spc="0" normalizeH="0" baseline="0" noProof="0">
+                <a:ln>
+                  <a:noFill/>
+                </a:ln>
+                <a:solidFill>
+                  <a:srgbClr val="FFFFFF"/>
+                </a:solidFill>
+                <a:effectLst/>
+                <a:uLnTx/>
+                <a:uFillTx/>
                 <a:latin typeface="Calibri" panose="020F0502020204030204" pitchFamily="34" charset="0"/>
+                <a:ea typeface="+mn-ea"/>
                 <a:cs typeface="Calibri" panose="020F0502020204030204" pitchFamily="34" charset="0"/>
               </a:endParaRPr>
             </a:p>
@@ -27483,10 +27929,10 @@
         </p:sp>
         <p:cxnSp>
           <p:nvCxnSpPr>
-            <p:cNvPr id="118" name="Straight Connector 117">
+            <p:cNvPr id="188" name="Straight Connector 187">
               <a:extLst>
                 <a:ext uri="{FF2B5EF4-FFF2-40B4-BE49-F238E27FC236}">
-                  <a16:creationId xmlns:a16="http://schemas.microsoft.com/office/drawing/2014/main" id="{6F7D5A72-E15C-55A0-BA66-F90DA3219686}"/>
+                  <a16:creationId xmlns:a16="http://schemas.microsoft.com/office/drawing/2014/main" id="{713E45C6-56F5-587B-0C5C-1AC18AD847D6}"/>
                 </a:ext>
               </a:extLst>
             </p:cNvPr>
@@ -27501,34 +27947,23 @@
             <a:prstGeom prst="line">
               <a:avLst/>
             </a:prstGeom>
-            <a:ln w="22225">
+            <a:noFill/>
+            <a:ln w="22225" cap="flat" cmpd="sng" algn="ctr">
               <a:solidFill>
-                <a:schemeClr val="tx1"/>
+                <a:srgbClr val="000000"/>
               </a:solidFill>
+              <a:prstDash val="solid"/>
               <a:miter lim="800000"/>
             </a:ln>
+            <a:effectLst/>
           </p:spPr>
-          <p:style>
-            <a:lnRef idx="1">
-              <a:schemeClr val="accent1"/>
-            </a:lnRef>
-            <a:fillRef idx="0">
-              <a:schemeClr val="accent1"/>
-            </a:fillRef>
-            <a:effectRef idx="0">
-              <a:schemeClr val="accent1"/>
-            </a:effectRef>
-            <a:fontRef idx="minor">
-              <a:schemeClr val="tx1"/>
-            </a:fontRef>
-          </p:style>
         </p:cxnSp>
         <p:cxnSp>
           <p:nvCxnSpPr>
-            <p:cNvPr id="119" name="Straight Connector 118">
+            <p:cNvPr id="189" name="Straight Connector 188">
               <a:extLst>
                 <a:ext uri="{FF2B5EF4-FFF2-40B4-BE49-F238E27FC236}">
-                  <a16:creationId xmlns:a16="http://schemas.microsoft.com/office/drawing/2014/main" id="{6536808B-3CF2-2C80-EFF6-3F06882A1734}"/>
+                  <a16:creationId xmlns:a16="http://schemas.microsoft.com/office/drawing/2014/main" id="{BD1FAA43-8BE0-5F1A-6154-28A90A2FDDD0}"/>
                 </a:ext>
               </a:extLst>
             </p:cNvPr>
@@ -27543,35 +27978,24 @@
             <a:prstGeom prst="line">
               <a:avLst/>
             </a:prstGeom>
-            <a:ln w="22225">
+            <a:noFill/>
+            <a:ln w="22225" cap="flat" cmpd="sng" algn="ctr">
               <a:solidFill>
-                <a:schemeClr val="tx1"/>
+                <a:srgbClr val="000000"/>
               </a:solidFill>
+              <a:prstDash val="solid"/>
               <a:miter lim="800000"/>
             </a:ln>
+            <a:effectLst/>
           </p:spPr>
-          <p:style>
-            <a:lnRef idx="1">
-              <a:schemeClr val="accent1"/>
-            </a:lnRef>
-            <a:fillRef idx="0">
-              <a:schemeClr val="accent1"/>
-            </a:fillRef>
-            <a:effectRef idx="0">
-              <a:schemeClr val="accent1"/>
-            </a:effectRef>
-            <a:fontRef idx="minor">
-              <a:schemeClr val="tx1"/>
-            </a:fontRef>
-          </p:style>
         </p:cxnSp>
       </p:grpSp>
       <p:grpSp>
         <p:nvGrpSpPr>
-          <p:cNvPr id="124" name="Group 123">
+          <p:cNvPr id="168" name="Group 167">
             <a:extLst>
               <a:ext uri="{FF2B5EF4-FFF2-40B4-BE49-F238E27FC236}">
-                <a16:creationId xmlns:a16="http://schemas.microsoft.com/office/drawing/2014/main" id="{728477EC-2EA0-66E7-3010-36394A77814A}"/>
+                <a16:creationId xmlns:a16="http://schemas.microsoft.com/office/drawing/2014/main" id="{779851D7-73E5-A50F-A3DF-766500AEB9DD}"/>
               </a:ext>
             </a:extLst>
           </p:cNvPr>
@@ -27580,7 +28004,7 @@
         </p:nvGrpSpPr>
         <p:grpSpPr>
           <a:xfrm rot="16200000">
-            <a:off x="6488030" y="3007477"/>
+            <a:off x="8436542" y="5460708"/>
             <a:ext cx="144462" cy="258762"/>
             <a:chOff x="4487395" y="5226823"/>
             <a:chExt cx="144462" cy="258762"/>
@@ -27588,10 +28012,10 @@
         </p:grpSpPr>
         <p:sp>
           <p:nvSpPr>
-            <p:cNvPr id="125" name="Rectangle 124">
+            <p:cNvPr id="184" name="Rectangle 183">
               <a:extLst>
                 <a:ext uri="{FF2B5EF4-FFF2-40B4-BE49-F238E27FC236}">
-                  <a16:creationId xmlns:a16="http://schemas.microsoft.com/office/drawing/2014/main" id="{B397BC43-AC34-692A-7D7E-BC0E3A7294DC}"/>
+                  <a16:creationId xmlns:a16="http://schemas.microsoft.com/office/drawing/2014/main" id="{30761934-11C7-B800-6102-041BD2A2376B}"/>
                 </a:ext>
               </a:extLst>
             </p:cNvPr>
@@ -27607,38 +28031,48 @@
               <a:avLst/>
             </a:prstGeom>
             <a:noFill/>
-            <a:ln w="19050">
+            <a:ln w="19050" cap="flat" cmpd="sng" algn="ctr">
               <a:solidFill>
-                <a:schemeClr val="tx1"/>
+                <a:srgbClr val="000000"/>
               </a:solidFill>
+              <a:prstDash val="solid"/>
               <a:miter lim="800000"/>
             </a:ln>
+            <a:effectLst/>
           </p:spPr>
-          <p:style>
-            <a:lnRef idx="2">
-              <a:schemeClr val="accent1">
-                <a:shade val="50000"/>
-              </a:schemeClr>
-            </a:lnRef>
-            <a:fillRef idx="1">
-              <a:schemeClr val="accent1"/>
-            </a:fillRef>
-            <a:effectRef idx="0">
-              <a:schemeClr val="accent1"/>
-            </a:effectRef>
-            <a:fontRef idx="minor">
-              <a:schemeClr val="lt1"/>
-            </a:fontRef>
-          </p:style>
           <p:txBody>
             <a:bodyPr anchor="ctr"/>
             <a:lstStyle/>
             <a:p>
-              <a:pPr algn="ctr">
+              <a:pPr marL="0" marR="0" lvl="0" indent="0" algn="ctr" defTabSz="914400" eaLnBrk="0" fontAlgn="base" latinLnBrk="0" hangingPunct="0">
+                <a:lnSpc>
+                  <a:spcPct val="100000"/>
+                </a:lnSpc>
+                <a:spcBef>
+                  <a:spcPct val="0"/>
+                </a:spcBef>
+                <a:spcAft>
+                  <a:spcPct val="0"/>
+                </a:spcAft>
+                <a:buClrTx/>
+                <a:buSzTx/>
+                <a:buFontTx/>
+                <a:buNone/>
+                <a:tabLst/>
                 <a:defRPr/>
               </a:pPr>
-              <a:endParaRPr lang="en-US">
+              <a:endParaRPr kumimoji="0" lang="en-US" sz="1800" b="0" i="0" u="none" strike="noStrike" kern="0" cap="none" spc="0" normalizeH="0" baseline="0" noProof="0">
+                <a:ln>
+                  <a:noFill/>
+                </a:ln>
+                <a:solidFill>
+                  <a:srgbClr val="FFFFFF"/>
+                </a:solidFill>
+                <a:effectLst/>
+                <a:uLnTx/>
+                <a:uFillTx/>
                 <a:latin typeface="Calibri" panose="020F0502020204030204" pitchFamily="34" charset="0"/>
+                <a:ea typeface="+mn-ea"/>
                 <a:cs typeface="Calibri" panose="020F0502020204030204" pitchFamily="34" charset="0"/>
               </a:endParaRPr>
             </a:p>
@@ -27646,10 +28080,10 @@
         </p:sp>
         <p:cxnSp>
           <p:nvCxnSpPr>
-            <p:cNvPr id="126" name="Straight Connector 125">
+            <p:cNvPr id="185" name="Straight Connector 184">
               <a:extLst>
                 <a:ext uri="{FF2B5EF4-FFF2-40B4-BE49-F238E27FC236}">
-                  <a16:creationId xmlns:a16="http://schemas.microsoft.com/office/drawing/2014/main" id="{9E84AE5A-7303-03D8-82D9-A5A4A3751931}"/>
+                  <a16:creationId xmlns:a16="http://schemas.microsoft.com/office/drawing/2014/main" id="{44143697-DBC5-21C8-3F77-25FCD8CFD6D5}"/>
                 </a:ext>
               </a:extLst>
             </p:cNvPr>
@@ -27664,34 +28098,23 @@
             <a:prstGeom prst="line">
               <a:avLst/>
             </a:prstGeom>
-            <a:ln w="22225">
+            <a:noFill/>
+            <a:ln w="22225" cap="flat" cmpd="sng" algn="ctr">
               <a:solidFill>
-                <a:schemeClr val="tx1"/>
+                <a:srgbClr val="000000"/>
               </a:solidFill>
+              <a:prstDash val="solid"/>
               <a:miter lim="800000"/>
             </a:ln>
+            <a:effectLst/>
           </p:spPr>
-          <p:style>
-            <a:lnRef idx="1">
-              <a:schemeClr val="accent1"/>
-            </a:lnRef>
-            <a:fillRef idx="0">
-              <a:schemeClr val="accent1"/>
-            </a:fillRef>
-            <a:effectRef idx="0">
-              <a:schemeClr val="accent1"/>
-            </a:effectRef>
-            <a:fontRef idx="minor">
-              <a:schemeClr val="tx1"/>
-            </a:fontRef>
-          </p:style>
         </p:cxnSp>
         <p:cxnSp>
           <p:nvCxnSpPr>
-            <p:cNvPr id="127" name="Straight Connector 126">
+            <p:cNvPr id="186" name="Straight Connector 185">
               <a:extLst>
                 <a:ext uri="{FF2B5EF4-FFF2-40B4-BE49-F238E27FC236}">
-                  <a16:creationId xmlns:a16="http://schemas.microsoft.com/office/drawing/2014/main" id="{70CAED30-D5FA-4DA4-3E4D-E3734D7E3976}"/>
+                  <a16:creationId xmlns:a16="http://schemas.microsoft.com/office/drawing/2014/main" id="{0C96528B-BF70-3CB1-1D85-052B740F1E02}"/>
                 </a:ext>
               </a:extLst>
             </p:cNvPr>
@@ -27706,35 +28129,24 @@
             <a:prstGeom prst="line">
               <a:avLst/>
             </a:prstGeom>
-            <a:ln w="22225">
+            <a:noFill/>
+            <a:ln w="22225" cap="flat" cmpd="sng" algn="ctr">
               <a:solidFill>
-                <a:schemeClr val="tx1"/>
+                <a:srgbClr val="000000"/>
               </a:solidFill>
+              <a:prstDash val="solid"/>
               <a:miter lim="800000"/>
             </a:ln>
+            <a:effectLst/>
           </p:spPr>
-          <p:style>
-            <a:lnRef idx="1">
-              <a:schemeClr val="accent1"/>
-            </a:lnRef>
-            <a:fillRef idx="0">
-              <a:schemeClr val="accent1"/>
-            </a:fillRef>
-            <a:effectRef idx="0">
-              <a:schemeClr val="accent1"/>
-            </a:effectRef>
-            <a:fontRef idx="minor">
-              <a:schemeClr val="tx1"/>
-            </a:fontRef>
-          </p:style>
         </p:cxnSp>
       </p:grpSp>
       <p:grpSp>
         <p:nvGrpSpPr>
-          <p:cNvPr id="128" name="Group 127">
+          <p:cNvPr id="169" name="Group 168">
             <a:extLst>
               <a:ext uri="{FF2B5EF4-FFF2-40B4-BE49-F238E27FC236}">
-                <a16:creationId xmlns:a16="http://schemas.microsoft.com/office/drawing/2014/main" id="{BA96D23D-CEB7-1640-4593-3211407EF4BC}"/>
+                <a16:creationId xmlns:a16="http://schemas.microsoft.com/office/drawing/2014/main" id="{54E0C2F5-CF67-70F9-CB90-061B85F23D4D}"/>
               </a:ext>
             </a:extLst>
           </p:cNvPr>
@@ -27743,7 +28155,7 @@
         </p:nvGrpSpPr>
         <p:grpSpPr>
           <a:xfrm rot="16200000">
-            <a:off x="7231077" y="3007477"/>
+            <a:off x="9179589" y="5460708"/>
             <a:ext cx="144462" cy="258762"/>
             <a:chOff x="4487395" y="5226823"/>
             <a:chExt cx="144462" cy="258762"/>
@@ -27751,10 +28163,10 @@
         </p:grpSpPr>
         <p:sp>
           <p:nvSpPr>
-            <p:cNvPr id="129" name="Rectangle 128">
+            <p:cNvPr id="181" name="Rectangle 180">
               <a:extLst>
                 <a:ext uri="{FF2B5EF4-FFF2-40B4-BE49-F238E27FC236}">
-                  <a16:creationId xmlns:a16="http://schemas.microsoft.com/office/drawing/2014/main" id="{0BA80261-0AD4-8F30-EBA3-CD353D0A29F6}"/>
+                  <a16:creationId xmlns:a16="http://schemas.microsoft.com/office/drawing/2014/main" id="{BD310679-11C7-3284-6CB5-0CAB6CAC4DD3}"/>
                 </a:ext>
               </a:extLst>
             </p:cNvPr>
@@ -27770,38 +28182,48 @@
               <a:avLst/>
             </a:prstGeom>
             <a:noFill/>
-            <a:ln w="19050">
+            <a:ln w="19050" cap="flat" cmpd="sng" algn="ctr">
               <a:solidFill>
-                <a:schemeClr val="tx1"/>
+                <a:srgbClr val="000000"/>
               </a:solidFill>
+              <a:prstDash val="solid"/>
               <a:miter lim="800000"/>
             </a:ln>
+            <a:effectLst/>
           </p:spPr>
-          <p:style>
-            <a:lnRef idx="2">
-              <a:schemeClr val="accent1">
-                <a:shade val="50000"/>
-              </a:schemeClr>
-            </a:lnRef>
-            <a:fillRef idx="1">
-              <a:schemeClr val="accent1"/>
-            </a:fillRef>
-            <a:effectRef idx="0">
-              <a:schemeClr val="accent1"/>
-            </a:effectRef>
-            <a:fontRef idx="minor">
-              <a:schemeClr val="lt1"/>
-            </a:fontRef>
-          </p:style>
           <p:txBody>
             <a:bodyPr anchor="ctr"/>
             <a:lstStyle/>
             <a:p>
-              <a:pPr algn="ctr">
+              <a:pPr marL="0" marR="0" lvl="0" indent="0" algn="ctr" defTabSz="914400" eaLnBrk="0" fontAlgn="base" latinLnBrk="0" hangingPunct="0">
+                <a:lnSpc>
+                  <a:spcPct val="100000"/>
+                </a:lnSpc>
+                <a:spcBef>
+                  <a:spcPct val="0"/>
+                </a:spcBef>
+                <a:spcAft>
+                  <a:spcPct val="0"/>
+                </a:spcAft>
+                <a:buClrTx/>
+                <a:buSzTx/>
+                <a:buFontTx/>
+                <a:buNone/>
+                <a:tabLst/>
                 <a:defRPr/>
               </a:pPr>
-              <a:endParaRPr lang="en-US">
+              <a:endParaRPr kumimoji="0" lang="en-US" sz="1800" b="0" i="0" u="none" strike="noStrike" kern="0" cap="none" spc="0" normalizeH="0" baseline="0" noProof="0">
+                <a:ln>
+                  <a:noFill/>
+                </a:ln>
+                <a:solidFill>
+                  <a:srgbClr val="FFFFFF"/>
+                </a:solidFill>
+                <a:effectLst/>
+                <a:uLnTx/>
+                <a:uFillTx/>
                 <a:latin typeface="Calibri" panose="020F0502020204030204" pitchFamily="34" charset="0"/>
+                <a:ea typeface="+mn-ea"/>
                 <a:cs typeface="Calibri" panose="020F0502020204030204" pitchFamily="34" charset="0"/>
               </a:endParaRPr>
             </a:p>
@@ -27809,10 +28231,10 @@
         </p:sp>
         <p:cxnSp>
           <p:nvCxnSpPr>
-            <p:cNvPr id="130" name="Straight Connector 129">
+            <p:cNvPr id="182" name="Straight Connector 181">
               <a:extLst>
                 <a:ext uri="{FF2B5EF4-FFF2-40B4-BE49-F238E27FC236}">
-                  <a16:creationId xmlns:a16="http://schemas.microsoft.com/office/drawing/2014/main" id="{AC89C242-A71C-49C2-856E-3ABF0E9AF306}"/>
+                  <a16:creationId xmlns:a16="http://schemas.microsoft.com/office/drawing/2014/main" id="{1FA2FEC5-2DCC-557F-8358-1E94A243848F}"/>
                 </a:ext>
               </a:extLst>
             </p:cNvPr>
@@ -27827,34 +28249,23 @@
             <a:prstGeom prst="line">
               <a:avLst/>
             </a:prstGeom>
-            <a:ln w="22225">
+            <a:noFill/>
+            <a:ln w="22225" cap="flat" cmpd="sng" algn="ctr">
               <a:solidFill>
-                <a:schemeClr val="tx1"/>
+                <a:srgbClr val="000000"/>
               </a:solidFill>
+              <a:prstDash val="solid"/>
               <a:miter lim="800000"/>
             </a:ln>
+            <a:effectLst/>
           </p:spPr>
-          <p:style>
-            <a:lnRef idx="1">
-              <a:schemeClr val="accent1"/>
-            </a:lnRef>
-            <a:fillRef idx="0">
-              <a:schemeClr val="accent1"/>
-            </a:fillRef>
-            <a:effectRef idx="0">
-              <a:schemeClr val="accent1"/>
-            </a:effectRef>
-            <a:fontRef idx="minor">
-              <a:schemeClr val="tx1"/>
-            </a:fontRef>
-          </p:style>
         </p:cxnSp>
         <p:cxnSp>
           <p:nvCxnSpPr>
-            <p:cNvPr id="131" name="Straight Connector 130">
+            <p:cNvPr id="183" name="Straight Connector 182">
               <a:extLst>
                 <a:ext uri="{FF2B5EF4-FFF2-40B4-BE49-F238E27FC236}">
-                  <a16:creationId xmlns:a16="http://schemas.microsoft.com/office/drawing/2014/main" id="{CADB0AFE-4343-3647-3D2C-E3F659C9D867}"/>
+                  <a16:creationId xmlns:a16="http://schemas.microsoft.com/office/drawing/2014/main" id="{759A3093-DDB2-8235-50DA-5CDE2D077933}"/>
                 </a:ext>
               </a:extLst>
             </p:cNvPr>
@@ -27869,35 +28280,24 @@
             <a:prstGeom prst="line">
               <a:avLst/>
             </a:prstGeom>
-            <a:ln w="22225">
+            <a:noFill/>
+            <a:ln w="22225" cap="flat" cmpd="sng" algn="ctr">
               <a:solidFill>
-                <a:schemeClr val="tx1"/>
+                <a:srgbClr val="000000"/>
               </a:solidFill>
+              <a:prstDash val="solid"/>
               <a:miter lim="800000"/>
             </a:ln>
+            <a:effectLst/>
           </p:spPr>
-          <p:style>
-            <a:lnRef idx="1">
-              <a:schemeClr val="accent1"/>
-            </a:lnRef>
-            <a:fillRef idx="0">
-              <a:schemeClr val="accent1"/>
-            </a:fillRef>
-            <a:effectRef idx="0">
-              <a:schemeClr val="accent1"/>
-            </a:effectRef>
-            <a:fontRef idx="minor">
-              <a:schemeClr val="tx1"/>
-            </a:fontRef>
-          </p:style>
         </p:cxnSp>
       </p:grpSp>
       <p:sp>
         <p:nvSpPr>
-          <p:cNvPr id="133" name="TextBox 132">
+          <p:cNvPr id="170" name="TextBox 169">
             <a:extLst>
               <a:ext uri="{FF2B5EF4-FFF2-40B4-BE49-F238E27FC236}">
-                <a16:creationId xmlns:a16="http://schemas.microsoft.com/office/drawing/2014/main" id="{D09FF2E0-EA3D-350B-3DAC-EB43777C3D98}"/>
+                <a16:creationId xmlns:a16="http://schemas.microsoft.com/office/drawing/2014/main" id="{9E9FF5A2-3BF8-F557-0519-48894A35AD11}"/>
               </a:ext>
             </a:extLst>
           </p:cNvPr>
@@ -27906,7 +28306,7 @@
         </p:nvSpPr>
         <p:spPr bwMode="auto">
           <a:xfrm>
-            <a:off x="6961310" y="3222459"/>
+            <a:off x="8909823" y="5675691"/>
             <a:ext cx="683997" cy="276999"/>
           </a:xfrm>
           <a:prstGeom prst="rect">
@@ -27923,12 +28323,36 @@
           </a:bodyPr>
           <a:lstStyle/>
           <a:p>
-            <a:pPr algn="ctr">
+            <a:pPr marL="0" marR="0" lvl="0" indent="0" algn="ctr" defTabSz="914400" eaLnBrk="0" fontAlgn="base" latinLnBrk="0" hangingPunct="0">
+              <a:lnSpc>
+                <a:spcPct val="100000"/>
+              </a:lnSpc>
+              <a:spcBef>
+                <a:spcPct val="0"/>
+              </a:spcBef>
+              <a:spcAft>
+                <a:spcPct val="0"/>
+              </a:spcAft>
+              <a:buClrTx/>
+              <a:buSzTx/>
+              <a:buFontTx/>
+              <a:buNone/>
+              <a:tabLst/>
               <a:defRPr/>
             </a:pPr>
             <a:r>
-              <a:rPr lang="en-US" sz="1200">
+              <a:rPr kumimoji="0" lang="en-US" sz="1200" b="0" i="0" u="none" strike="noStrike" kern="0" cap="none" spc="0" normalizeH="0" baseline="0" noProof="0">
+                <a:ln>
+                  <a:noFill/>
+                </a:ln>
+                <a:solidFill>
+                  <a:srgbClr val="000000"/>
+                </a:solidFill>
+                <a:effectLst/>
+                <a:uLnTx/>
+                <a:uFillTx/>
                 <a:latin typeface="Calibri" panose="020F0502020204030204" pitchFamily="34" charset="0"/>
+                <a:ea typeface="ＭＳ Ｐゴシック" panose="020B0600070205080204" pitchFamily="34" charset="-128"/>
                 <a:cs typeface="Calibri" panose="020F0502020204030204" pitchFamily="34" charset="0"/>
               </a:rPr>
               <a:t>RX/TX</a:t>
@@ -27938,10 +28362,10 @@
       </p:sp>
       <p:sp>
         <p:nvSpPr>
-          <p:cNvPr id="134" name="TextBox 133">
+          <p:cNvPr id="171" name="TextBox 170">
             <a:extLst>
               <a:ext uri="{FF2B5EF4-FFF2-40B4-BE49-F238E27FC236}">
-                <a16:creationId xmlns:a16="http://schemas.microsoft.com/office/drawing/2014/main" id="{DD96B573-393E-EBCC-44CB-DD87DE553F2D}"/>
+                <a16:creationId xmlns:a16="http://schemas.microsoft.com/office/drawing/2014/main" id="{6D1EC977-94CA-1CD9-184B-9E4F7DE0CABA}"/>
               </a:ext>
             </a:extLst>
           </p:cNvPr>
@@ -27950,7 +28374,7 @@
         </p:nvSpPr>
         <p:spPr bwMode="auto">
           <a:xfrm>
-            <a:off x="1683997" y="3222459"/>
+            <a:off x="3632509" y="5675691"/>
             <a:ext cx="648000" cy="276999"/>
           </a:xfrm>
           <a:prstGeom prst="rect">
@@ -27967,12 +28391,36 @@
           </a:bodyPr>
           <a:lstStyle/>
           <a:p>
-            <a:pPr algn="ctr">
+            <a:pPr marL="0" marR="0" lvl="0" indent="0" algn="ctr" defTabSz="914400" eaLnBrk="0" fontAlgn="base" latinLnBrk="0" hangingPunct="0">
+              <a:lnSpc>
+                <a:spcPct val="100000"/>
+              </a:lnSpc>
+              <a:spcBef>
+                <a:spcPct val="0"/>
+              </a:spcBef>
+              <a:spcAft>
+                <a:spcPct val="0"/>
+              </a:spcAft>
+              <a:buClrTx/>
+              <a:buSzTx/>
+              <a:buFontTx/>
+              <a:buNone/>
+              <a:tabLst/>
               <a:defRPr/>
             </a:pPr>
             <a:r>
-              <a:rPr lang="en-US" sz="1200" dirty="0">
+              <a:rPr kumimoji="0" lang="en-US" sz="1200" b="0" i="0" u="none" strike="noStrike" kern="0" cap="none" spc="0" normalizeH="0" baseline="0" noProof="0" dirty="0">
+                <a:ln>
+                  <a:noFill/>
+                </a:ln>
+                <a:solidFill>
+                  <a:srgbClr val="000000"/>
+                </a:solidFill>
+                <a:effectLst/>
+                <a:uLnTx/>
+                <a:uFillTx/>
                 <a:latin typeface="Calibri" panose="020F0502020204030204" pitchFamily="34" charset="0"/>
+                <a:ea typeface="ＭＳ Ｐゴシック" panose="020B0600070205080204" pitchFamily="34" charset="-128"/>
                 <a:cs typeface="Calibri" panose="020F0502020204030204" pitchFamily="34" charset="0"/>
               </a:rPr>
               <a:t>GPIO</a:t>
@@ -27982,10 +28430,10 @@
       </p:sp>
       <p:sp>
         <p:nvSpPr>
-          <p:cNvPr id="135" name="TextBox 134">
+          <p:cNvPr id="172" name="TextBox 171">
             <a:extLst>
               <a:ext uri="{FF2B5EF4-FFF2-40B4-BE49-F238E27FC236}">
-                <a16:creationId xmlns:a16="http://schemas.microsoft.com/office/drawing/2014/main" id="{12DFEF49-A35C-A955-0E2B-792AE1D9B907}"/>
+                <a16:creationId xmlns:a16="http://schemas.microsoft.com/office/drawing/2014/main" id="{4DDF0764-9DBE-654F-03C2-84A46976096C}"/>
               </a:ext>
             </a:extLst>
           </p:cNvPr>
@@ -27994,7 +28442,7 @@
         </p:nvSpPr>
         <p:spPr bwMode="auto">
           <a:xfrm>
-            <a:off x="2427188" y="3222459"/>
+            <a:off x="4375701" y="5675691"/>
             <a:ext cx="899999" cy="276999"/>
           </a:xfrm>
           <a:prstGeom prst="rect">
@@ -28011,12 +28459,36 @@
           </a:bodyPr>
           <a:lstStyle/>
           <a:p>
-            <a:pPr algn="ctr">
+            <a:pPr marL="0" marR="0" lvl="0" indent="0" algn="ctr" defTabSz="914400" eaLnBrk="0" fontAlgn="base" latinLnBrk="0" hangingPunct="0">
+              <a:lnSpc>
+                <a:spcPct val="100000"/>
+              </a:lnSpc>
+              <a:spcBef>
+                <a:spcPct val="0"/>
+              </a:spcBef>
+              <a:spcAft>
+                <a:spcPct val="0"/>
+              </a:spcAft>
+              <a:buClrTx/>
+              <a:buSzTx/>
+              <a:buFontTx/>
+              <a:buNone/>
+              <a:tabLst/>
               <a:defRPr/>
             </a:pPr>
             <a:r>
-              <a:rPr lang="en-US" sz="1200">
+              <a:rPr kumimoji="0" lang="en-US" sz="1200" b="0" i="0" u="none" strike="noStrike" kern="0" cap="none" spc="0" normalizeH="0" baseline="0" noProof="0">
+                <a:ln>
+                  <a:noFill/>
+                </a:ln>
+                <a:solidFill>
+                  <a:srgbClr val="000000"/>
+                </a:solidFill>
+                <a:effectLst/>
+                <a:uLnTx/>
+                <a:uFillTx/>
                 <a:latin typeface="Calibri" panose="020F0502020204030204" pitchFamily="34" charset="0"/>
+                <a:ea typeface="ＭＳ Ｐゴシック" panose="020B0600070205080204" pitchFamily="34" charset="-128"/>
                 <a:cs typeface="Calibri" panose="020F0502020204030204" pitchFamily="34" charset="0"/>
               </a:rPr>
               <a:t>USBD0</a:t>
@@ -28026,10 +28498,10 @@
       </p:sp>
       <p:sp>
         <p:nvSpPr>
-          <p:cNvPr id="138" name="TextBox 137">
+          <p:cNvPr id="173" name="TextBox 172">
             <a:extLst>
               <a:ext uri="{FF2B5EF4-FFF2-40B4-BE49-F238E27FC236}">
-                <a16:creationId xmlns:a16="http://schemas.microsoft.com/office/drawing/2014/main" id="{C7E2846B-5BD2-ED52-2A3C-1F6082ACABAF}"/>
+                <a16:creationId xmlns:a16="http://schemas.microsoft.com/office/drawing/2014/main" id="{B59750E1-839D-39A9-6FAA-8307177DCA15}"/>
               </a:ext>
             </a:extLst>
           </p:cNvPr>
@@ -28038,7 +28510,7 @@
         </p:nvSpPr>
         <p:spPr bwMode="auto">
           <a:xfrm>
-            <a:off x="5296067" y="3222459"/>
+            <a:off x="7244580" y="5675691"/>
             <a:ext cx="863995" cy="276999"/>
           </a:xfrm>
           <a:prstGeom prst="rect">
@@ -28055,12 +28527,36 @@
           </a:bodyPr>
           <a:lstStyle/>
           <a:p>
-            <a:pPr algn="ctr">
+            <a:pPr marL="0" marR="0" lvl="0" indent="0" algn="ctr" defTabSz="914400" eaLnBrk="0" fontAlgn="base" latinLnBrk="0" hangingPunct="0">
+              <a:lnSpc>
+                <a:spcPct val="100000"/>
+              </a:lnSpc>
+              <a:spcBef>
+                <a:spcPct val="0"/>
+              </a:spcBef>
+              <a:spcAft>
+                <a:spcPct val="0"/>
+              </a:spcAft>
+              <a:buClrTx/>
+              <a:buSzTx/>
+              <a:buFontTx/>
+              <a:buNone/>
+              <a:tabLst/>
               <a:defRPr/>
             </a:pPr>
             <a:r>
-              <a:rPr lang="en-US" sz="1200" dirty="0">
+              <a:rPr kumimoji="0" lang="en-US" sz="1200" b="0" i="0" u="none" strike="noStrike" kern="0" cap="none" spc="0" normalizeH="0" baseline="0" noProof="0" dirty="0">
+                <a:ln>
+                  <a:noFill/>
+                </a:ln>
+                <a:solidFill>
+                  <a:srgbClr val="000000"/>
+                </a:solidFill>
+                <a:effectLst/>
+                <a:uLnTx/>
+                <a:uFillTx/>
                 <a:latin typeface="Calibri" panose="020F0502020204030204" pitchFamily="34" charset="0"/>
+                <a:ea typeface="ＭＳ Ｐゴシック" panose="020B0600070205080204" pitchFamily="34" charset="-128"/>
                 <a:cs typeface="Calibri" panose="020F0502020204030204" pitchFamily="34" charset="0"/>
               </a:rPr>
               <a:t>SDIO0</a:t>
@@ -28070,10 +28566,10 @@
       </p:sp>
       <p:sp>
         <p:nvSpPr>
-          <p:cNvPr id="140" name="TextBox 139">
+          <p:cNvPr id="174" name="TextBox 173">
             <a:extLst>
               <a:ext uri="{FF2B5EF4-FFF2-40B4-BE49-F238E27FC236}">
-                <a16:creationId xmlns:a16="http://schemas.microsoft.com/office/drawing/2014/main" id="{C77D9C0A-B418-31E0-9363-3FCF80741C01}"/>
+                <a16:creationId xmlns:a16="http://schemas.microsoft.com/office/drawing/2014/main" id="{72A3258F-7685-C437-DB3D-4641A25E3CCF}"/>
               </a:ext>
             </a:extLst>
           </p:cNvPr>
@@ -28082,7 +28578,7 @@
         </p:nvSpPr>
         <p:spPr bwMode="auto">
           <a:xfrm>
-            <a:off x="6218262" y="3222459"/>
+            <a:off x="8166774" y="5675691"/>
             <a:ext cx="684000" cy="276999"/>
           </a:xfrm>
           <a:prstGeom prst="rect">
@@ -28099,12 +28595,36 @@
           </a:bodyPr>
           <a:lstStyle/>
           <a:p>
-            <a:pPr algn="ctr">
+            <a:pPr marL="0" marR="0" lvl="0" indent="0" algn="ctr" defTabSz="914400" eaLnBrk="0" fontAlgn="base" latinLnBrk="0" hangingPunct="0">
+              <a:lnSpc>
+                <a:spcPct val="100000"/>
+              </a:lnSpc>
+              <a:spcBef>
+                <a:spcPct val="0"/>
+              </a:spcBef>
+              <a:spcAft>
+                <a:spcPct val="0"/>
+              </a:spcAft>
+              <a:buClrTx/>
+              <a:buSzTx/>
+              <a:buFontTx/>
+              <a:buNone/>
+              <a:tabLst/>
               <a:defRPr/>
             </a:pPr>
             <a:r>
-              <a:rPr lang="en-US" sz="1200" dirty="0">
+              <a:rPr kumimoji="0" lang="en-US" sz="1200" b="0" i="0" u="none" strike="noStrike" kern="0" cap="none" spc="0" normalizeH="0" baseline="0" noProof="0" dirty="0">
+                <a:ln>
+                  <a:noFill/>
+                </a:ln>
+                <a:solidFill>
+                  <a:srgbClr val="000000"/>
+                </a:solidFill>
+                <a:effectLst/>
+                <a:uLnTx/>
+                <a:uFillTx/>
                 <a:latin typeface="Calibri" panose="020F0502020204030204" pitchFamily="34" charset="0"/>
+                <a:ea typeface="ＭＳ Ｐゴシック" panose="020B0600070205080204" pitchFamily="34" charset="-128"/>
                 <a:cs typeface="Calibri" panose="020F0502020204030204" pitchFamily="34" charset="0"/>
               </a:rPr>
               <a:t>SPI0</a:t>
@@ -28114,10 +28634,10 @@
       </p:sp>
       <p:sp>
         <p:nvSpPr>
-          <p:cNvPr id="141" name="Rounded Rectangle 140">
+          <p:cNvPr id="175" name="Rounded Rectangle 174">
             <a:extLst>
               <a:ext uri="{FF2B5EF4-FFF2-40B4-BE49-F238E27FC236}">
-                <a16:creationId xmlns:a16="http://schemas.microsoft.com/office/drawing/2014/main" id="{2C0C2ED6-2C65-D75D-E150-4548B602CFF9}"/>
+                <a16:creationId xmlns:a16="http://schemas.microsoft.com/office/drawing/2014/main" id="{68C02DA0-152C-0F2A-68C4-5763E1A64728}"/>
               </a:ext>
             </a:extLst>
           </p:cNvPr>
@@ -28126,7 +28646,7 @@
         </p:nvSpPr>
         <p:spPr bwMode="auto">
           <a:xfrm>
-            <a:off x="1673170" y="1033159"/>
+            <a:off x="3621683" y="3486390"/>
             <a:ext cx="5972137" cy="288000"/>
           </a:xfrm>
           <a:prstGeom prst="roundRect">
@@ -28148,22 +28668,36 @@
           <a:bodyPr wrap="none" lIns="121944" tIns="60972" rIns="121944" bIns="60972" anchor="ctr"/>
           <a:lstStyle/>
           <a:p>
-            <a:pPr algn="ctr" fontAlgn="auto">
+            <a:pPr marL="0" marR="0" lvl="0" indent="0" algn="ctr" defTabSz="914400" eaLnBrk="0" fontAlgn="auto" latinLnBrk="0" hangingPunct="0">
+              <a:lnSpc>
+                <a:spcPct val="100000"/>
+              </a:lnSpc>
               <a:spcBef>
                 <a:spcPts val="0"/>
               </a:spcBef>
               <a:spcAft>
                 <a:spcPts val="0"/>
               </a:spcAft>
+              <a:buClrTx/>
+              <a:buSzTx/>
+              <a:buFontTx/>
+              <a:buNone/>
+              <a:tabLst/>
               <a:defRPr/>
             </a:pPr>
             <a:r>
-              <a:rPr lang="en-US" sz="1400" b="1" kern="0">
+              <a:rPr kumimoji="0" lang="en-US" sz="1400" b="1" i="0" u="none" strike="noStrike" kern="0" cap="none" spc="0" normalizeH="0" baseline="0" noProof="0">
+                <a:ln>
+                  <a:noFill/>
+                </a:ln>
                 <a:solidFill>
                   <a:sysClr val="window" lastClr="FFFFFF"/>
                 </a:solidFill>
+                <a:effectLst/>
+                <a:uLnTx/>
+                <a:uFillTx/>
                 <a:latin typeface="Calibri" panose="020F0502020204030204" pitchFamily="34" charset="0"/>
-                <a:ea typeface="ＭＳ Ｐゴシック" pitchFamily="34" charset="-128"/>
+                <a:ea typeface="ＭＳ Ｐゴシック" panose="020B0600070205080204" pitchFamily="34" charset="-128"/>
                 <a:cs typeface="Calibri" panose="020F0502020204030204" pitchFamily="34" charset="0"/>
               </a:rPr>
               <a:t>User Application</a:t>
@@ -28173,10 +28707,10 @@
       </p:sp>
       <p:sp>
         <p:nvSpPr>
-          <p:cNvPr id="142" name="Rounded Rectangle 141">
+          <p:cNvPr id="176" name="Rounded Rectangle 175">
             <a:extLst>
               <a:ext uri="{FF2B5EF4-FFF2-40B4-BE49-F238E27FC236}">
-                <a16:creationId xmlns:a16="http://schemas.microsoft.com/office/drawing/2014/main" id="{D2538779-CB18-6E45-5B62-631B9FC1456F}"/>
+                <a16:creationId xmlns:a16="http://schemas.microsoft.com/office/drawing/2014/main" id="{A82BF4ED-4BF8-7C03-6B99-18151E403C77}"/>
               </a:ext>
             </a:extLst>
           </p:cNvPr>
@@ -28185,46 +28719,54 @@
         </p:nvSpPr>
         <p:spPr bwMode="auto">
           <a:xfrm>
-            <a:off x="593149" y="1429255"/>
-            <a:ext cx="1080000" cy="292915"/>
+            <a:off x="2646343" y="3882487"/>
+            <a:ext cx="975317" cy="292915"/>
           </a:xfrm>
           <a:prstGeom prst="roundRect">
             <a:avLst/>
           </a:prstGeom>
           <a:noFill/>
-          <a:ln w="12700">
+          <a:ln w="12700" cap="flat" cmpd="sng" algn="ctr">
             <a:noFill/>
-          </a:ln>
-        </p:spPr>
-        <p:style>
-          <a:lnRef idx="2">
-            <a:schemeClr val="accent1">
-              <a:shade val="50000"/>
-            </a:schemeClr>
-          </a:lnRef>
-          <a:fillRef idx="1">
-            <a:schemeClr val="accent1"/>
-          </a:fillRef>
-          <a:effectRef idx="0">
-            <a:schemeClr val="accent1"/>
-          </a:effectRef>
-          <a:fontRef idx="minor">
-            <a:schemeClr val="lt1"/>
-          </a:fontRef>
-        </p:style>
+            <a:prstDash val="solid"/>
+            <a:miter lim="800000"/>
+          </a:ln>
+          <a:effectLst/>
+        </p:spPr>
         <p:txBody>
           <a:bodyPr lIns="0" rIns="36000" anchor="ctr"/>
           <a:lstStyle/>
           <a:p>
-            <a:pPr algn="r">
+            <a:pPr marL="0" marR="0" lvl="0" indent="0" algn="r" defTabSz="914400" eaLnBrk="0" fontAlgn="base" latinLnBrk="0" hangingPunct="0">
+              <a:lnSpc>
+                <a:spcPct val="100000"/>
+              </a:lnSpc>
+              <a:spcBef>
+                <a:spcPct val="0"/>
+              </a:spcBef>
+              <a:spcAft>
+                <a:spcPct val="0"/>
+              </a:spcAft>
+              <a:buClrTx/>
+              <a:buSzTx/>
+              <a:buFontTx/>
+              <a:buNone/>
+              <a:tabLst/>
               <a:defRPr/>
             </a:pPr>
             <a:r>
-              <a:rPr lang="en-US" sz="1100">
+              <a:rPr kumimoji="0" lang="en-US" sz="1100" b="0" i="0" u="none" strike="noStrike" kern="0" cap="none" spc="0" normalizeH="0" baseline="0" noProof="0">
+                <a:ln>
+                  <a:noFill/>
+                </a:ln>
                 <a:solidFill>
-                  <a:schemeClr val="tx1"/>
+                  <a:srgbClr val="000000"/>
                 </a:solidFill>
+                <a:effectLst/>
+                <a:uLnTx/>
+                <a:uFillTx/>
                 <a:latin typeface="Calibri" panose="020F0502020204030204" pitchFamily="34" charset="0"/>
+                <a:ea typeface="+mn-ea"/>
                 <a:cs typeface="Calibri" panose="020F0502020204030204" pitchFamily="34" charset="0"/>
               </a:rPr>
               <a:t>Middleware</a:t>
@@ -28234,10 +28776,10 @@
       </p:sp>
       <p:sp>
         <p:nvSpPr>
-          <p:cNvPr id="144" name="Rounded Rectangle 143">
+          <p:cNvPr id="177" name="Rounded Rectangle 176">
             <a:extLst>
               <a:ext uri="{FF2B5EF4-FFF2-40B4-BE49-F238E27FC236}">
-                <a16:creationId xmlns:a16="http://schemas.microsoft.com/office/drawing/2014/main" id="{D33C40CB-D0E1-AFD9-E326-935EE4FC7543}"/>
+                <a16:creationId xmlns:a16="http://schemas.microsoft.com/office/drawing/2014/main" id="{2A546843-A133-D986-6D7E-CA34BA066737}"/>
               </a:ext>
             </a:extLst>
           </p:cNvPr>
@@ -28246,46 +28788,54 @@
         </p:nvSpPr>
         <p:spPr bwMode="auto">
           <a:xfrm>
-            <a:off x="593149" y="1033158"/>
-            <a:ext cx="1080000" cy="292915"/>
+            <a:off x="2646343" y="3486390"/>
+            <a:ext cx="975317" cy="292915"/>
           </a:xfrm>
           <a:prstGeom prst="roundRect">
             <a:avLst/>
           </a:prstGeom>
           <a:noFill/>
-          <a:ln w="12700">
+          <a:ln w="12700" cap="flat" cmpd="sng" algn="ctr">
             <a:noFill/>
-          </a:ln>
-        </p:spPr>
-        <p:style>
-          <a:lnRef idx="2">
-            <a:schemeClr val="accent1">
-              <a:shade val="50000"/>
-            </a:schemeClr>
-          </a:lnRef>
-          <a:fillRef idx="1">
-            <a:schemeClr val="accent1"/>
-          </a:fillRef>
-          <a:effectRef idx="0">
-            <a:schemeClr val="accent1"/>
-          </a:effectRef>
-          <a:fontRef idx="minor">
-            <a:schemeClr val="lt1"/>
-          </a:fontRef>
-        </p:style>
+            <a:prstDash val="solid"/>
+            <a:miter lim="800000"/>
+          </a:ln>
+          <a:effectLst/>
+        </p:spPr>
         <p:txBody>
           <a:bodyPr lIns="0" rIns="36000" anchor="ctr"/>
           <a:lstStyle/>
           <a:p>
-            <a:pPr algn="r">
+            <a:pPr marL="0" marR="0" lvl="0" indent="0" algn="r" defTabSz="914400" eaLnBrk="0" fontAlgn="base" latinLnBrk="0" hangingPunct="0">
+              <a:lnSpc>
+                <a:spcPct val="100000"/>
+              </a:lnSpc>
+              <a:spcBef>
+                <a:spcPct val="0"/>
+              </a:spcBef>
+              <a:spcAft>
+                <a:spcPct val="0"/>
+              </a:spcAft>
+              <a:buClrTx/>
+              <a:buSzTx/>
+              <a:buFontTx/>
+              <a:buNone/>
+              <a:tabLst/>
               <a:defRPr/>
             </a:pPr>
             <a:r>
-              <a:rPr lang="en-US" sz="1100">
+              <a:rPr kumimoji="0" lang="en-US" sz="1100" b="0" i="0" u="none" strike="noStrike" kern="0" cap="none" spc="0" normalizeH="0" baseline="0" noProof="0">
+                <a:ln>
+                  <a:noFill/>
+                </a:ln>
                 <a:solidFill>
-                  <a:schemeClr val="tx1"/>
+                  <a:srgbClr val="000000"/>
                 </a:solidFill>
+                <a:effectLst/>
+                <a:uLnTx/>
+                <a:uFillTx/>
                 <a:latin typeface="Calibri" panose="020F0502020204030204" pitchFamily="34" charset="0"/>
+                <a:ea typeface="+mn-ea"/>
                 <a:cs typeface="Calibri" panose="020F0502020204030204" pitchFamily="34" charset="0"/>
               </a:rPr>
               <a:t>Application</a:t>
@@ -28295,10 +28845,10 @@
       </p:sp>
       <p:sp>
         <p:nvSpPr>
-          <p:cNvPr id="145" name="Rounded Rectangle 144">
+          <p:cNvPr id="178" name="Rounded Rectangle 177">
             <a:extLst>
               <a:ext uri="{FF2B5EF4-FFF2-40B4-BE49-F238E27FC236}">
-                <a16:creationId xmlns:a16="http://schemas.microsoft.com/office/drawing/2014/main" id="{1894AC5C-4543-A617-A115-1A06A6052501}"/>
+                <a16:creationId xmlns:a16="http://schemas.microsoft.com/office/drawing/2014/main" id="{BA8908AE-81C2-F2D2-D32F-751EACDA827B}"/>
               </a:ext>
             </a:extLst>
           </p:cNvPr>
@@ -28307,46 +28857,54 @@
         </p:nvSpPr>
         <p:spPr bwMode="auto">
           <a:xfrm>
-            <a:off x="593149" y="2169441"/>
-            <a:ext cx="1080000" cy="292915"/>
+            <a:off x="2646343" y="4622673"/>
+            <a:ext cx="975317" cy="292915"/>
           </a:xfrm>
           <a:prstGeom prst="roundRect">
             <a:avLst/>
           </a:prstGeom>
           <a:noFill/>
-          <a:ln w="12700">
+          <a:ln w="12700" cap="flat" cmpd="sng" algn="ctr">
             <a:noFill/>
-          </a:ln>
-        </p:spPr>
-        <p:style>
-          <a:lnRef idx="2">
-            <a:schemeClr val="accent1">
-              <a:shade val="50000"/>
-            </a:schemeClr>
-          </a:lnRef>
-          <a:fillRef idx="1">
-            <a:schemeClr val="accent1"/>
-          </a:fillRef>
-          <a:effectRef idx="0">
-            <a:schemeClr val="accent1"/>
-          </a:effectRef>
-          <a:fontRef idx="minor">
-            <a:schemeClr val="lt1"/>
-          </a:fontRef>
-        </p:style>
+            <a:prstDash val="solid"/>
+            <a:miter lim="800000"/>
+          </a:ln>
+          <a:effectLst/>
+        </p:spPr>
         <p:txBody>
           <a:bodyPr lIns="0" rIns="36000" anchor="ctr"/>
           <a:lstStyle/>
           <a:p>
-            <a:pPr algn="r">
+            <a:pPr marL="0" marR="0" lvl="0" indent="0" algn="r" defTabSz="914400" eaLnBrk="0" fontAlgn="base" latinLnBrk="0" hangingPunct="0">
+              <a:lnSpc>
+                <a:spcPct val="100000"/>
+              </a:lnSpc>
+              <a:spcBef>
+                <a:spcPct val="0"/>
+              </a:spcBef>
+              <a:spcAft>
+                <a:spcPct val="0"/>
+              </a:spcAft>
+              <a:buClrTx/>
+              <a:buSzTx/>
+              <a:buFontTx/>
+              <a:buNone/>
+              <a:tabLst/>
               <a:defRPr/>
             </a:pPr>
             <a:r>
-              <a:rPr lang="en-US" sz="1100">
+              <a:rPr kumimoji="0" lang="en-US" sz="1100" b="0" i="0" u="none" strike="noStrike" kern="0" cap="none" spc="0" normalizeH="0" baseline="0" noProof="0">
+                <a:ln>
+                  <a:noFill/>
+                </a:ln>
                 <a:solidFill>
-                  <a:schemeClr val="tx1"/>
+                  <a:srgbClr val="000000"/>
                 </a:solidFill>
+                <a:effectLst/>
+                <a:uLnTx/>
+                <a:uFillTx/>
                 <a:latin typeface="Calibri" panose="020F0502020204030204" pitchFamily="34" charset="0"/>
+                <a:ea typeface="+mn-ea"/>
                 <a:cs typeface="Calibri" panose="020F0502020204030204" pitchFamily="34" charset="0"/>
               </a:rPr>
               <a:t>CMSIS-Driver</a:t>
@@ -28356,10 +28914,10 @@
       </p:sp>
       <p:sp>
         <p:nvSpPr>
-          <p:cNvPr id="146" name="Rounded Rectangle 145">
+          <p:cNvPr id="179" name="Rounded Rectangle 178">
             <a:extLst>
               <a:ext uri="{FF2B5EF4-FFF2-40B4-BE49-F238E27FC236}">
-                <a16:creationId xmlns:a16="http://schemas.microsoft.com/office/drawing/2014/main" id="{3078B079-987D-587C-BFEC-8036CF2E135D}"/>
+                <a16:creationId xmlns:a16="http://schemas.microsoft.com/office/drawing/2014/main" id="{EDBB4F20-714E-F753-10EE-5B7B157AD4B9}"/>
               </a:ext>
             </a:extLst>
           </p:cNvPr>
@@ -28368,65 +28926,87 @@
         </p:nvSpPr>
         <p:spPr bwMode="auto">
           <a:xfrm>
-            <a:off x="593149" y="2574264"/>
-            <a:ext cx="1080000" cy="439372"/>
+            <a:off x="2646343" y="5027495"/>
+            <a:ext cx="975317" cy="439372"/>
           </a:xfrm>
           <a:prstGeom prst="roundRect">
             <a:avLst/>
           </a:prstGeom>
           <a:noFill/>
-          <a:ln w="12700">
+          <a:ln w="12700" cap="flat" cmpd="sng" algn="ctr">
             <a:noFill/>
-          </a:ln>
-        </p:spPr>
-        <p:style>
-          <a:lnRef idx="2">
-            <a:schemeClr val="accent1">
-              <a:shade val="50000"/>
-            </a:schemeClr>
-          </a:lnRef>
-          <a:fillRef idx="1">
-            <a:schemeClr val="accent1"/>
-          </a:fillRef>
-          <a:effectRef idx="0">
-            <a:schemeClr val="accent1"/>
-          </a:effectRef>
-          <a:fontRef idx="minor">
-            <a:schemeClr val="lt1"/>
-          </a:fontRef>
-        </p:style>
+            <a:prstDash val="solid"/>
+            <a:miter lim="800000"/>
+          </a:ln>
+          <a:effectLst/>
+        </p:spPr>
         <p:txBody>
           <a:bodyPr lIns="0" rIns="36000" anchor="ctr"/>
           <a:lstStyle/>
           <a:p>
-            <a:pPr algn="r">
+            <a:pPr marL="0" marR="0" lvl="0" indent="0" algn="r" defTabSz="914400" eaLnBrk="0" fontAlgn="base" latinLnBrk="0" hangingPunct="0">
+              <a:lnSpc>
+                <a:spcPct val="100000"/>
+              </a:lnSpc>
+              <a:spcBef>
+                <a:spcPct val="0"/>
+              </a:spcBef>
+              <a:spcAft>
+                <a:spcPct val="0"/>
+              </a:spcAft>
+              <a:buClrTx/>
+              <a:buSzTx/>
+              <a:buFontTx/>
+              <a:buNone/>
+              <a:tabLst/>
               <a:defRPr/>
             </a:pPr>
             <a:r>
-              <a:rPr lang="en-US" sz="1100">
+              <a:rPr kumimoji="0" lang="en-US" sz="1100" b="0" i="0" u="none" strike="noStrike" kern="0" cap="none" spc="0" normalizeH="0" baseline="0" noProof="0">
+                <a:ln>
+                  <a:noFill/>
+                </a:ln>
                 <a:solidFill>
-                  <a:schemeClr val="tx1"/>
+                  <a:srgbClr val="000000"/>
                 </a:solidFill>
+                <a:effectLst/>
+                <a:uLnTx/>
+                <a:uFillTx/>
                 <a:latin typeface="Calibri" panose="020F0502020204030204" pitchFamily="34" charset="0"/>
+                <a:ea typeface="+mn-ea"/>
                 <a:cs typeface="Calibri" panose="020F0502020204030204" pitchFamily="34" charset="0"/>
               </a:rPr>
               <a:t>Device</a:t>
             </a:r>
             <a:br>
-              <a:rPr lang="en-US" sz="1100">
+              <a:rPr kumimoji="0" lang="en-US" sz="1100" b="0" i="0" u="none" strike="noStrike" kern="0" cap="none" spc="0" normalizeH="0" baseline="0" noProof="0">
+                <a:ln>
+                  <a:noFill/>
+                </a:ln>
                 <a:solidFill>
-                  <a:schemeClr val="tx1"/>
+                  <a:srgbClr val="000000"/>
                 </a:solidFill>
+                <a:effectLst/>
+                <a:uLnTx/>
+                <a:uFillTx/>
                 <a:latin typeface="Calibri" panose="020F0502020204030204" pitchFamily="34" charset="0"/>
+                <a:ea typeface="+mn-ea"/>
                 <a:cs typeface="Calibri" panose="020F0502020204030204" pitchFamily="34" charset="0"/>
               </a:rPr>
             </a:br>
             <a:r>
-              <a:rPr lang="en-US" sz="1100">
+              <a:rPr kumimoji="0" lang="en-US" sz="1100" b="0" i="0" u="none" strike="noStrike" kern="0" cap="none" spc="0" normalizeH="0" baseline="0" noProof="0">
+                <a:ln>
+                  <a:noFill/>
+                </a:ln>
                 <a:solidFill>
-                  <a:schemeClr val="tx1"/>
+                  <a:srgbClr val="000000"/>
                 </a:solidFill>
+                <a:effectLst/>
+                <a:uLnTx/>
+                <a:uFillTx/>
                 <a:latin typeface="Calibri" panose="020F0502020204030204" pitchFamily="34" charset="0"/>
+                <a:ea typeface="+mn-ea"/>
                 <a:cs typeface="Calibri" panose="020F0502020204030204" pitchFamily="34" charset="0"/>
               </a:rPr>
               <a:t>Peripheral</a:t>
@@ -28436,10 +29016,10 @@
       </p:sp>
       <p:sp>
         <p:nvSpPr>
-          <p:cNvPr id="147" name="Rounded Rectangle 146">
+          <p:cNvPr id="180" name="Rounded Rectangle 179">
             <a:extLst>
               <a:ext uri="{FF2B5EF4-FFF2-40B4-BE49-F238E27FC236}">
-                <a16:creationId xmlns:a16="http://schemas.microsoft.com/office/drawing/2014/main" id="{02BB2530-C05D-49E1-4DC4-9206569041E9}"/>
+                <a16:creationId xmlns:a16="http://schemas.microsoft.com/office/drawing/2014/main" id="{91725EE3-3984-D6EB-1F33-256EF4D2DAED}"/>
               </a:ext>
             </a:extLst>
           </p:cNvPr>
@@ -28448,65 +29028,87 @@
         </p:nvSpPr>
         <p:spPr bwMode="auto">
           <a:xfrm>
-            <a:off x="593149" y="3067458"/>
-            <a:ext cx="1080000" cy="439372"/>
+            <a:off x="2646343" y="5520689"/>
+            <a:ext cx="975317" cy="439372"/>
           </a:xfrm>
           <a:prstGeom prst="roundRect">
             <a:avLst/>
           </a:prstGeom>
           <a:noFill/>
-          <a:ln w="12700">
+          <a:ln w="12700" cap="flat" cmpd="sng" algn="ctr">
             <a:noFill/>
-          </a:ln>
-        </p:spPr>
-        <p:style>
-          <a:lnRef idx="2">
-            <a:schemeClr val="accent1">
-              <a:shade val="50000"/>
-            </a:schemeClr>
-          </a:lnRef>
-          <a:fillRef idx="1">
-            <a:schemeClr val="accent1"/>
-          </a:fillRef>
-          <a:effectRef idx="0">
-            <a:schemeClr val="accent1"/>
-          </a:effectRef>
-          <a:fontRef idx="minor">
-            <a:schemeClr val="lt1"/>
-          </a:fontRef>
-        </p:style>
+            <a:prstDash val="solid"/>
+            <a:miter lim="800000"/>
+          </a:ln>
+          <a:effectLst/>
+        </p:spPr>
         <p:txBody>
           <a:bodyPr lIns="0" rIns="36000" anchor="ctr"/>
           <a:lstStyle/>
           <a:p>
-            <a:pPr algn="r">
+            <a:pPr marL="0" marR="0" lvl="0" indent="0" algn="r" defTabSz="914400" eaLnBrk="0" fontAlgn="base" latinLnBrk="0" hangingPunct="0">
+              <a:lnSpc>
+                <a:spcPct val="100000"/>
+              </a:lnSpc>
+              <a:spcBef>
+                <a:spcPct val="0"/>
+              </a:spcBef>
+              <a:spcAft>
+                <a:spcPct val="0"/>
+              </a:spcAft>
+              <a:buClrTx/>
+              <a:buSzTx/>
+              <a:buFontTx/>
+              <a:buNone/>
+              <a:tabLst/>
               <a:defRPr/>
             </a:pPr>
             <a:r>
-              <a:rPr lang="en-US" sz="1100">
+              <a:rPr kumimoji="0" lang="en-US" sz="1100" b="0" i="0" u="none" strike="noStrike" kern="0" cap="none" spc="0" normalizeH="0" baseline="0" noProof="0">
+                <a:ln>
+                  <a:noFill/>
+                </a:ln>
                 <a:solidFill>
-                  <a:schemeClr val="tx1"/>
+                  <a:srgbClr val="000000"/>
                 </a:solidFill>
+                <a:effectLst/>
+                <a:uLnTx/>
+                <a:uFillTx/>
                 <a:latin typeface="Calibri" panose="020F0502020204030204" pitchFamily="34" charset="0"/>
+                <a:ea typeface="+mn-ea"/>
                 <a:cs typeface="Calibri" panose="020F0502020204030204" pitchFamily="34" charset="0"/>
               </a:rPr>
               <a:t>Device</a:t>
             </a:r>
             <a:br>
-              <a:rPr lang="en-US" sz="1100">
+              <a:rPr kumimoji="0" lang="en-US" sz="1100" b="0" i="0" u="none" strike="noStrike" kern="0" cap="none" spc="0" normalizeH="0" baseline="0" noProof="0">
+                <a:ln>
+                  <a:noFill/>
+                </a:ln>
                 <a:solidFill>
-                  <a:schemeClr val="tx1"/>
+                  <a:srgbClr val="000000"/>
                 </a:solidFill>
+                <a:effectLst/>
+                <a:uLnTx/>
+                <a:uFillTx/>
                 <a:latin typeface="Calibri" panose="020F0502020204030204" pitchFamily="34" charset="0"/>
+                <a:ea typeface="+mn-ea"/>
                 <a:cs typeface="Calibri" panose="020F0502020204030204" pitchFamily="34" charset="0"/>
               </a:rPr>
             </a:br>
             <a:r>
-              <a:rPr lang="en-US" sz="1100">
+              <a:rPr kumimoji="0" lang="en-US" sz="1100" b="0" i="0" u="none" strike="noStrike" kern="0" cap="none" spc="0" normalizeH="0" baseline="0" noProof="0">
+                <a:ln>
+                  <a:noFill/>
+                </a:ln>
                 <a:solidFill>
-                  <a:schemeClr val="tx1"/>
+                  <a:srgbClr val="000000"/>
                 </a:solidFill>
+                <a:effectLst/>
+                <a:uLnTx/>
+                <a:uFillTx/>
                 <a:latin typeface="Calibri" panose="020F0502020204030204" pitchFamily="34" charset="0"/>
+                <a:ea typeface="+mn-ea"/>
                 <a:cs typeface="Calibri" panose="020F0502020204030204" pitchFamily="34" charset="0"/>
               </a:rPr>
               <a:t>Pins</a:t>
@@ -29505,24 +30107,6 @@
 </file>
 
 <file path=customXml/item1.xml><?xml version="1.0" encoding="utf-8"?>
-<p:properties xmlns:p="http://schemas.microsoft.com/office/2006/metadata/properties" xmlns:xsi="http://www.w3.org/2001/XMLSchema-instance">
-  <documentManagement>
-    <AlternateThumbnailUrl xmlns="http://schemas.microsoft.com/sharepoint/v3">
-      <Url xsi:nil="true"/>
-      <Description xsi:nil="true"/>
-    </AlternateThumbnailUrl>
-    <ImageCreateDate xmlns="http://schemas.microsoft.com/sharepoint/v3" xsi:nil="true"/>
-    <Description xmlns="http://schemas.microsoft.com/sharepoint/v3" xsi:nil="true"/>
-    <_dlc_DocId xmlns="f2ad5090-61a8-4b8c-ab70-68f4ff4d1933">ARM-ECM-0151353</_dlc_DocId>
-    <_dlc_DocIdUrl xmlns="f2ad5090-61a8-4b8c-ab70-68f4ff4d1933">
-      <Url>http://teamsites.arm.com/sites/marketing/branding/_layouts/DocIdRedir.aspx?ID=ARM-ECM-0151353</Url>
-      <Description>ARM-ECM-0151353</Description>
-    </_dlc_DocIdUrl>
-  </documentManagement>
-</p:properties>
-</file>
-
-<file path=customXml/item2.xml><?xml version="1.0" encoding="utf-8"?>
 <ct:contentTypeSchema xmlns:ct="http://schemas.microsoft.com/office/2006/metadata/contentType" xmlns:ma="http://schemas.microsoft.com/office/2006/metadata/properties/metaAttributes" ct:_="" ma:_="" ma:contentTypeName="Picture" ma:contentTypeID="0x010102005A5C1BE65173D647975D08D04557E024" ma:contentTypeVersion="3" ma:contentTypeDescription="Upload an image or a photograph." ma:contentTypeScope="" ma:versionID="4e02033e9a8407b55ee482baa8e8773d">
   <xsd:schema xmlns:xsd="http://www.w3.org/2001/XMLSchema" xmlns:xs="http://www.w3.org/2001/XMLSchema" xmlns:p="http://schemas.microsoft.com/office/2006/metadata/properties" xmlns:ns1="http://schemas.microsoft.com/sharepoint/v3" xmlns:ns2="f2ad5090-61a8-4b8c-ab70-68f4ff4d1933" targetNamespace="http://schemas.microsoft.com/office/2006/metadata/properties" ma:root="true" ma:fieldsID="56baf7bb33d679821ced92383ddba583" ns1:_="" ns2:_="">
     <xsd:import namespace="http://schemas.microsoft.com/sharepoint/v3"/>
@@ -29723,7 +30307,7 @@
 </ct:contentTypeSchema>
 </file>
 
-<file path=customXml/item3.xml><?xml version="1.0" encoding="utf-8"?>
+<file path=customXml/item2.xml><?xml version="1.0" encoding="utf-8"?>
 <?mso-contentType ?>
 <FormTemplates xmlns="http://schemas.microsoft.com/sharepoint/v3/contenttype/forms">
   <Display>DocumentLibraryForm</Display>
@@ -29732,7 +30316,7 @@
 </FormTemplates>
 </file>
 
-<file path=customXml/item4.xml><?xml version="1.0" encoding="utf-8"?>
+<file path=customXml/item3.xml><?xml version="1.0" encoding="utf-8"?>
 <?mso-contentType ?>
 <spe:Receivers xmlns:spe="http://schemas.microsoft.com/sharepoint/events">
   <Receiver>
@@ -29778,24 +30362,25 @@
 </spe:Receivers>
 </file>
 
-<file path=customXml/itemProps1.xml><?xml version="1.0" encoding="utf-8"?>
-<ds:datastoreItem xmlns:ds="http://schemas.openxmlformats.org/officeDocument/2006/customXml" ds:itemID="{AE6E82D6-7FB8-4D99-A7B6-3C5BB1D894B9}">
-  <ds:schemaRefs>
-    <ds:schemaRef ds:uri="http://schemas.microsoft.com/office/2006/metadata/properties"/>
-    <ds:schemaRef ds:uri="http://schemas.openxmlformats.org/package/2006/metadata/core-properties"/>
-    <ds:schemaRef ds:uri="http://schemas.microsoft.com/office/2006/documentManagement/types"/>
-    <ds:schemaRef ds:uri="http://purl.org/dc/dcmitype/"/>
-    <ds:schemaRef ds:uri="http://purl.org/dc/elements/1.1/"/>
-    <ds:schemaRef ds:uri="http://schemas.microsoft.com/office/infopath/2007/PartnerControls"/>
-    <ds:schemaRef ds:uri="f2ad5090-61a8-4b8c-ab70-68f4ff4d1933"/>
-    <ds:schemaRef ds:uri="http://purl.org/dc/terms/"/>
-    <ds:schemaRef ds:uri="http://schemas.microsoft.com/sharepoint/v3"/>
-    <ds:schemaRef ds:uri="http://www.w3.org/XML/1998/namespace"/>
-  </ds:schemaRefs>
-</ds:datastoreItem>
+<file path=customXml/item4.xml><?xml version="1.0" encoding="utf-8"?>
+<p:properties xmlns:p="http://schemas.microsoft.com/office/2006/metadata/properties" xmlns:xsi="http://www.w3.org/2001/XMLSchema-instance">
+  <documentManagement>
+    <AlternateThumbnailUrl xmlns="http://schemas.microsoft.com/sharepoint/v3">
+      <Url xsi:nil="true"/>
+      <Description xsi:nil="true"/>
+    </AlternateThumbnailUrl>
+    <ImageCreateDate xmlns="http://schemas.microsoft.com/sharepoint/v3" xsi:nil="true"/>
+    <Description xmlns="http://schemas.microsoft.com/sharepoint/v3" xsi:nil="true"/>
+    <_dlc_DocId xmlns="f2ad5090-61a8-4b8c-ab70-68f4ff4d1933">ARM-ECM-0151353</_dlc_DocId>
+    <_dlc_DocIdUrl xmlns="f2ad5090-61a8-4b8c-ab70-68f4ff4d1933">
+      <Url>http://teamsites.arm.com/sites/marketing/branding/_layouts/DocIdRedir.aspx?ID=ARM-ECM-0151353</Url>
+      <Description>ARM-ECM-0151353</Description>
+    </_dlc_DocIdUrl>
+  </documentManagement>
+</p:properties>
 </file>
 
-<file path=customXml/itemProps2.xml><?xml version="1.0" encoding="utf-8"?>
+<file path=customXml/itemProps1.xml><?xml version="1.0" encoding="utf-8"?>
 <ds:datastoreItem xmlns:ds="http://schemas.openxmlformats.org/officeDocument/2006/customXml" ds:itemID="{E2FEA05E-38D0-44EA-8B8D-2375FC6AAF09}">
   <ds:schemaRefs>
     <ds:schemaRef ds:uri="http://schemas.microsoft.com/office/2006/metadata/contentType"/>
@@ -29814,7 +30399,7 @@
 </ds:datastoreItem>
 </file>
 
-<file path=customXml/itemProps3.xml><?xml version="1.0" encoding="utf-8"?>
+<file path=customXml/itemProps2.xml><?xml version="1.0" encoding="utf-8"?>
 <ds:datastoreItem xmlns:ds="http://schemas.openxmlformats.org/officeDocument/2006/customXml" ds:itemID="{9C777C69-0744-4BF3-8514-FB149EBD2248}">
   <ds:schemaRefs>
     <ds:schemaRef ds:uri="http://schemas.microsoft.com/sharepoint/v3/contenttype/forms"/>
@@ -29822,10 +30407,27 @@
 </ds:datastoreItem>
 </file>
 
-<file path=customXml/itemProps4.xml><?xml version="1.0" encoding="utf-8"?>
+<file path=customXml/itemProps3.xml><?xml version="1.0" encoding="utf-8"?>
 <ds:datastoreItem xmlns:ds="http://schemas.openxmlformats.org/officeDocument/2006/customXml" ds:itemID="{C8CB23D7-89E5-42FF-A5EB-008A06AB37C7}">
   <ds:schemaRefs>
     <ds:schemaRef ds:uri="http://schemas.microsoft.com/sharepoint/events"/>
   </ds:schemaRefs>
 </ds:datastoreItem>
+</file>
+
+<file path=customXml/itemProps4.xml><?xml version="1.0" encoding="utf-8"?>
+<ds:datastoreItem xmlns:ds="http://schemas.openxmlformats.org/officeDocument/2006/customXml" ds:itemID="{AE6E82D6-7FB8-4D99-A7B6-3C5BB1D894B9}">
+  <ds:schemaRefs>
+    <ds:schemaRef ds:uri="http://schemas.microsoft.com/office/2006/metadata/properties"/>
+    <ds:schemaRef ds:uri="http://schemas.openxmlformats.org/package/2006/metadata/core-properties"/>
+    <ds:schemaRef ds:uri="http://schemas.microsoft.com/office/2006/documentManagement/types"/>
+    <ds:schemaRef ds:uri="http://purl.org/dc/dcmitype/"/>
+    <ds:schemaRef ds:uri="http://purl.org/dc/elements/1.1/"/>
+    <ds:schemaRef ds:uri="http://schemas.microsoft.com/office/infopath/2007/PartnerControls"/>
+    <ds:schemaRef ds:uri="f2ad5090-61a8-4b8c-ab70-68f4ff4d1933"/>
+    <ds:schemaRef ds:uri="http://purl.org/dc/terms/"/>
+    <ds:schemaRef ds:uri="http://schemas.microsoft.com/sharepoint/v3"/>
+    <ds:schemaRef ds:uri="http://www.w3.org/XML/1998/namespace"/>
+  </ds:schemaRefs>
+</ds:datastoreItem>
 </file>
</xml_diff>